<commit_message>
kulso konzulens hozzadva. Biralok kerdesei hozzaadva
</commit_message>
<xml_diff>
--- a/incquery-deps-thesis/presentation/zv_csikos_donat.pptx
+++ b/incquery-deps-thesis/presentation/zv_csikos_donat.pptx
@@ -5,7 +5,7 @@
     <p:sldMasterId id="2147483648" r:id="rId1"/>
   </p:sldMasterIdLst>
   <p:notesMasterIdLst>
-    <p:notesMasterId r:id="rId21"/>
+    <p:notesMasterId r:id="rId25"/>
   </p:notesMasterIdLst>
   <p:sldIdLst>
     <p:sldId id="256" r:id="rId2"/>
@@ -27,6 +27,10 @@
     <p:sldId id="290" r:id="rId18"/>
     <p:sldId id="273" r:id="rId19"/>
     <p:sldId id="291" r:id="rId20"/>
+    <p:sldId id="292" r:id="rId21"/>
+    <p:sldId id="293" r:id="rId22"/>
+    <p:sldId id="294" r:id="rId23"/>
+    <p:sldId id="295" r:id="rId24"/>
   </p:sldIdLst>
   <p:sldSz cx="9144000" cy="6858000" type="screen4x3"/>
   <p:notesSz cx="6858000" cy="9144000"/>
@@ -130,17 +134,8 @@
 
 <file path=ppt/charts/chart1.xml><?xml version="1.0" encoding="utf-8"?>
 <c:chartSpace xmlns:c="http://schemas.openxmlformats.org/drawingml/2006/chart" xmlns:a="http://schemas.openxmlformats.org/drawingml/2006/main" xmlns:r="http://schemas.openxmlformats.org/officeDocument/2006/relationships">
-  <c:date1904 val="0"/>
   <c:lang val="en-US"/>
-  <c:roundedCorners val="0"/>
-  <mc:AlternateContent xmlns:mc="http://schemas.openxmlformats.org/markup-compatibility/2006">
-    <mc:Choice xmlns:c14="http://schemas.microsoft.com/office/drawing/2007/8/2/chart" Requires="c14">
-      <c14:style val="104"/>
-    </mc:Choice>
-    <mc:Fallback>
-      <c:style val="4"/>
-    </mc:Fallback>
-  </mc:AlternateContent>
+  <c:style val="4"/>
   <c:chart>
     <c:title>
       <c:tx>
@@ -160,24 +155,21 @@
         </c:rich>
       </c:tx>
       <c:layout/>
-      <c:overlay val="0"/>
     </c:title>
-    <c:autoTitleDeleted val="0"/>
     <c:plotArea>
       <c:layout>
         <c:manualLayout>
           <c:layoutTarget val="inner"/>
           <c:xMode val="edge"/>
           <c:yMode val="edge"/>
-          <c:x val="9.2949199107120906E-2"/>
-          <c:y val="0.225597709377237"/>
-          <c:w val="0.88817816175755804"/>
-          <c:h val="0.63050757768182197"/>
+          <c:x val="9.2949199107120961E-2"/>
+          <c:y val="0.17004210411198603"/>
+          <c:w val="0.88817816175755793"/>
+          <c:h val="0.63050757768182208"/>
         </c:manualLayout>
       </c:layout>
       <c:lineChart>
         <c:grouping val="standard"/>
-        <c:varyColors val="0"/>
         <c:ser>
           <c:idx val="0"/>
           <c:order val="0"/>
@@ -294,27 +286,17 @@
               </c:numCache>
             </c:numRef>
           </c:val>
-          <c:smooth val="0"/>
         </c:ser>
-        <c:dLbls>
-          <c:showLegendKey val="0"/>
-          <c:showVal val="0"/>
-          <c:showCatName val="0"/>
-          <c:showSerName val="0"/>
-          <c:showPercent val="0"/>
-          <c:showBubbleSize val="0"/>
-        </c:dLbls>
+        <c:dLbls/>
         <c:marker val="1"/>
-        <c:smooth val="0"/>
-        <c:axId val="111832576"/>
-        <c:axId val="107451456"/>
+        <c:axId val="73126272"/>
+        <c:axId val="73128192"/>
       </c:lineChart>
       <c:catAx>
-        <c:axId val="111832576"/>
+        <c:axId val="73126272"/>
         <c:scaling>
           <c:orientation val="minMax"/>
         </c:scaling>
-        <c:delete val="0"/>
         <c:axPos val="b"/>
         <c:title>
           <c:tx>
@@ -338,11 +320,8 @@
             </c:rich>
           </c:tx>
           <c:layout/>
-          <c:overlay val="0"/>
         </c:title>
         <c:numFmt formatCode="General" sourceLinked="1"/>
-        <c:majorTickMark val="out"/>
-        <c:minorTickMark val="none"/>
         <c:tickLblPos val="nextTo"/>
         <c:txPr>
           <a:bodyPr/>
@@ -354,21 +333,18 @@
             <a:endParaRPr lang="en-US"/>
           </a:p>
         </c:txPr>
-        <c:crossAx val="107451456"/>
+        <c:crossAx val="73128192"/>
         <c:crosses val="autoZero"/>
-        <c:auto val="0"/>
         <c:lblAlgn val="ctr"/>
         <c:lblOffset val="0"/>
         <c:tickLblSkip val="1"/>
         <c:tickMarkSkip val="10"/>
-        <c:noMultiLvlLbl val="0"/>
       </c:catAx>
       <c:valAx>
-        <c:axId val="107451456"/>
+        <c:axId val="73128192"/>
         <c:scaling>
           <c:orientation val="minMax"/>
         </c:scaling>
-        <c:delete val="0"/>
         <c:axPos val="l"/>
         <c:majorGridlines/>
         <c:title>
@@ -389,11 +365,8 @@
             </c:rich>
           </c:tx>
           <c:layout/>
-          <c:overlay val="0"/>
         </c:title>
         <c:numFmt formatCode="General" sourceLinked="1"/>
-        <c:majorTickMark val="out"/>
-        <c:minorTickMark val="none"/>
         <c:tickLblPos val="nextTo"/>
         <c:txPr>
           <a:bodyPr/>
@@ -405,34 +378,21 @@
             <a:endParaRPr lang="en-US"/>
           </a:p>
         </c:txPr>
-        <c:crossAx val="111832576"/>
+        <c:crossAx val="73126272"/>
         <c:crosses val="autoZero"/>
         <c:crossBetween val="between"/>
       </c:valAx>
     </c:plotArea>
     <c:plotVisOnly val="1"/>
     <c:dispBlanksAs val="gap"/>
-    <c:showDLblsOverMax val="0"/>
   </c:chart>
-  <c:externalData r:id="rId1">
-    <c:autoUpdate val="0"/>
-  </c:externalData>
+  <c:externalData r:id="rId1"/>
 </c:chartSpace>
 </file>
 
 <file path=ppt/charts/chart2.xml><?xml version="1.0" encoding="utf-8"?>
 <c:chartSpace xmlns:c="http://schemas.openxmlformats.org/drawingml/2006/chart" xmlns:a="http://schemas.openxmlformats.org/drawingml/2006/main" xmlns:r="http://schemas.openxmlformats.org/officeDocument/2006/relationships">
-  <c:date1904 val="0"/>
   <c:lang val="en-US"/>
-  <c:roundedCorners val="0"/>
-  <mc:AlternateContent xmlns:mc="http://schemas.openxmlformats.org/markup-compatibility/2006">
-    <mc:Choice xmlns:c14="http://schemas.microsoft.com/office/drawing/2007/8/2/chart" Requires="c14">
-      <c14:style val="102"/>
-    </mc:Choice>
-    <mc:Fallback>
-      <c:style val="2"/>
-    </mc:Fallback>
-  </mc:AlternateContent>
   <c:chart>
     <c:title>
       <c:tx>
@@ -452,14 +412,11 @@
         </c:rich>
       </c:tx>
       <c:layout/>
-      <c:overlay val="0"/>
     </c:title>
-    <c:autoTitleDeleted val="0"/>
     <c:plotArea>
       <c:layout/>
       <c:lineChart>
         <c:grouping val="standard"/>
-        <c:varyColors val="0"/>
         <c:ser>
           <c:idx val="0"/>
           <c:order val="0"/>
@@ -516,27 +473,17 @@
               </c:numCache>
             </c:numRef>
           </c:val>
-          <c:smooth val="0"/>
         </c:ser>
-        <c:dLbls>
-          <c:showLegendKey val="0"/>
-          <c:showVal val="0"/>
-          <c:showCatName val="0"/>
-          <c:showSerName val="0"/>
-          <c:showPercent val="0"/>
-          <c:showBubbleSize val="0"/>
-        </c:dLbls>
+        <c:dLbls/>
         <c:marker val="1"/>
-        <c:smooth val="0"/>
-        <c:axId val="112535040"/>
-        <c:axId val="107453760"/>
+        <c:axId val="72988928"/>
+        <c:axId val="73137152"/>
       </c:lineChart>
       <c:catAx>
-        <c:axId val="112535040"/>
+        <c:axId val="72988928"/>
         <c:scaling>
           <c:orientation val="minMax"/>
         </c:scaling>
-        <c:delete val="0"/>
         <c:axPos val="b"/>
         <c:title>
           <c:tx>
@@ -560,11 +507,8 @@
             </c:rich>
           </c:tx>
           <c:layout/>
-          <c:overlay val="0"/>
         </c:title>
         <c:numFmt formatCode="General" sourceLinked="1"/>
-        <c:majorTickMark val="out"/>
-        <c:minorTickMark val="none"/>
         <c:tickLblPos val="nextTo"/>
         <c:txPr>
           <a:bodyPr/>
@@ -576,19 +520,17 @@
             <a:endParaRPr lang="en-US"/>
           </a:p>
         </c:txPr>
-        <c:crossAx val="107453760"/>
+        <c:crossAx val="73137152"/>
         <c:crosses val="autoZero"/>
         <c:auto val="1"/>
         <c:lblAlgn val="ctr"/>
         <c:lblOffset val="100"/>
-        <c:noMultiLvlLbl val="0"/>
       </c:catAx>
       <c:valAx>
-        <c:axId val="107453760"/>
+        <c:axId val="73137152"/>
         <c:scaling>
           <c:orientation val="minMax"/>
         </c:scaling>
-        <c:delete val="0"/>
         <c:axPos val="l"/>
         <c:majorGridlines/>
         <c:title>
@@ -609,11 +551,8 @@
             </c:rich>
           </c:tx>
           <c:layout/>
-          <c:overlay val="0"/>
         </c:title>
         <c:numFmt formatCode="General" sourceLinked="1"/>
-        <c:majorTickMark val="out"/>
-        <c:minorTickMark val="none"/>
         <c:tickLblPos val="nextTo"/>
         <c:txPr>
           <a:bodyPr/>
@@ -625,34 +564,21 @@
             <a:endParaRPr lang="en-US"/>
           </a:p>
         </c:txPr>
-        <c:crossAx val="112535040"/>
+        <c:crossAx val="72988928"/>
         <c:crosses val="autoZero"/>
         <c:crossBetween val="between"/>
       </c:valAx>
     </c:plotArea>
     <c:plotVisOnly val="1"/>
     <c:dispBlanksAs val="gap"/>
-    <c:showDLblsOverMax val="0"/>
   </c:chart>
-  <c:externalData r:id="rId1">
-    <c:autoUpdate val="0"/>
-  </c:externalData>
+  <c:externalData r:id="rId1"/>
 </c:chartSpace>
 </file>
 
 <file path=ppt/charts/chart3.xml><?xml version="1.0" encoding="utf-8"?>
 <c:chartSpace xmlns:c="http://schemas.openxmlformats.org/drawingml/2006/chart" xmlns:a="http://schemas.openxmlformats.org/drawingml/2006/main" xmlns:r="http://schemas.openxmlformats.org/officeDocument/2006/relationships">
-  <c:date1904 val="0"/>
   <c:lang val="en-US"/>
-  <c:roundedCorners val="0"/>
-  <mc:AlternateContent xmlns:mc="http://schemas.openxmlformats.org/markup-compatibility/2006">
-    <mc:Choice xmlns:c14="http://schemas.microsoft.com/office/drawing/2007/8/2/chart" Requires="c14">
-      <c14:style val="102"/>
-    </mc:Choice>
-    <mc:Fallback>
-      <c:style val="2"/>
-    </mc:Fallback>
-  </mc:AlternateContent>
   <c:chart>
     <c:title>
       <c:tx>
@@ -672,14 +598,11 @@
         </c:rich>
       </c:tx>
       <c:layout/>
-      <c:overlay val="0"/>
     </c:title>
-    <c:autoTitleDeleted val="0"/>
     <c:plotArea>
       <c:layout/>
       <c:lineChart>
         <c:grouping val="standard"/>
-        <c:varyColors val="0"/>
         <c:ser>
           <c:idx val="0"/>
           <c:order val="0"/>
@@ -736,27 +659,17 @@
               </c:numCache>
             </c:numRef>
           </c:val>
-          <c:smooth val="0"/>
         </c:ser>
-        <c:dLbls>
-          <c:showLegendKey val="0"/>
-          <c:showVal val="0"/>
-          <c:showCatName val="0"/>
-          <c:showSerName val="0"/>
-          <c:showPercent val="0"/>
-          <c:showBubbleSize val="0"/>
-        </c:dLbls>
+        <c:dLbls/>
         <c:marker val="1"/>
-        <c:smooth val="0"/>
-        <c:axId val="112535552"/>
-        <c:axId val="112911488"/>
+        <c:axId val="34599296"/>
+        <c:axId val="34601216"/>
       </c:lineChart>
       <c:catAx>
-        <c:axId val="112535552"/>
+        <c:axId val="34599296"/>
         <c:scaling>
           <c:orientation val="minMax"/>
         </c:scaling>
-        <c:delete val="0"/>
         <c:axPos val="b"/>
         <c:title>
           <c:tx>
@@ -780,11 +693,8 @@
             </c:rich>
           </c:tx>
           <c:layout/>
-          <c:overlay val="0"/>
         </c:title>
         <c:numFmt formatCode="General" sourceLinked="1"/>
-        <c:majorTickMark val="out"/>
-        <c:minorTickMark val="none"/>
         <c:tickLblPos val="nextTo"/>
         <c:txPr>
           <a:bodyPr/>
@@ -796,19 +706,17 @@
             <a:endParaRPr lang="en-US"/>
           </a:p>
         </c:txPr>
-        <c:crossAx val="112911488"/>
+        <c:crossAx val="34601216"/>
         <c:crosses val="autoZero"/>
         <c:auto val="1"/>
         <c:lblAlgn val="ctr"/>
         <c:lblOffset val="100"/>
-        <c:noMultiLvlLbl val="0"/>
       </c:catAx>
       <c:valAx>
-        <c:axId val="112911488"/>
+        <c:axId val="34601216"/>
         <c:scaling>
           <c:orientation val="minMax"/>
         </c:scaling>
-        <c:delete val="0"/>
         <c:axPos val="l"/>
         <c:majorGridlines/>
         <c:title>
@@ -829,11 +737,8 @@
             </c:rich>
           </c:tx>
           <c:layout/>
-          <c:overlay val="0"/>
         </c:title>
         <c:numFmt formatCode="General" sourceLinked="1"/>
-        <c:majorTickMark val="out"/>
-        <c:minorTickMark val="none"/>
         <c:tickLblPos val="nextTo"/>
         <c:txPr>
           <a:bodyPr/>
@@ -845,18 +750,15 @@
             <a:endParaRPr lang="en-US"/>
           </a:p>
         </c:txPr>
-        <c:crossAx val="112535552"/>
+        <c:crossAx val="34599296"/>
         <c:crosses val="autoZero"/>
         <c:crossBetween val="between"/>
       </c:valAx>
     </c:plotArea>
     <c:plotVisOnly val="1"/>
     <c:dispBlanksAs val="gap"/>
-    <c:showDLblsOverMax val="0"/>
   </c:chart>
-  <c:externalData r:id="rId1">
-    <c:autoUpdate val="0"/>
-  </c:externalData>
+  <c:externalData r:id="rId1"/>
 </c:chartSpace>
 </file>
 
@@ -942,7 +844,8 @@
           <a:p>
             <a:fld id="{B6BB6350-B212-4879-B209-4DF49D0B4F10}" type="datetimeFigureOut">
               <a:rPr lang="en-US" smtClean="0"/>
-              <a:t>1/14/2013</a:t>
+              <a:pPr/>
+              <a:t>1/20/2013</a:t>
             </a:fld>
             <a:endParaRPr lang="en-US"/>
           </a:p>
@@ -1101,6 +1004,7 @@
           <a:p>
             <a:fld id="{E7AA0654-642B-4EC6-9896-06614A0153EC}" type="slidenum">
               <a:rPr lang="en-US" smtClean="0"/>
+              <a:pPr/>
               <a:t>‹#›</a:t>
             </a:fld>
             <a:endParaRPr lang="en-US"/>
@@ -1110,7 +1014,7 @@
     </p:spTree>
     <p:extLst>
       <p:ext uri="{BB962C8B-B14F-4D97-AF65-F5344CB8AC3E}">
-        <p14:creationId xmlns:p14="http://schemas.microsoft.com/office/powerpoint/2010/main" val="3664610315"/>
+        <p14:creationId xmlns:p14="http://schemas.microsoft.com/office/powerpoint/2010/main" xmlns="" val="3664610315"/>
       </p:ext>
     </p:extLst>
   </p:cSld>
@@ -1301,6 +1205,7 @@
           <a:p>
             <a:fld id="{E7AA0654-642B-4EC6-9896-06614A0153EC}" type="slidenum">
               <a:rPr lang="en-US" smtClean="0"/>
+              <a:pPr/>
               <a:t>2</a:t>
             </a:fld>
             <a:endParaRPr lang="en-US"/>
@@ -1310,7 +1215,7 @@
     </p:spTree>
     <p:extLst>
       <p:ext uri="{BB962C8B-B14F-4D97-AF65-F5344CB8AC3E}">
-        <p14:creationId xmlns:p14="http://schemas.microsoft.com/office/powerpoint/2010/main" val="3109533612"/>
+        <p14:creationId xmlns:p14="http://schemas.microsoft.com/office/powerpoint/2010/main" xmlns="" val="3109533612"/>
       </p:ext>
     </p:extLst>
   </p:cSld>
@@ -1410,6 +1315,7 @@
           <a:p>
             <a:fld id="{E7AA0654-642B-4EC6-9896-06614A0153EC}" type="slidenum">
               <a:rPr lang="en-US" smtClean="0"/>
+              <a:pPr/>
               <a:t>4</a:t>
             </a:fld>
             <a:endParaRPr lang="en-US"/>
@@ -1419,7 +1325,7 @@
     </p:spTree>
     <p:extLst>
       <p:ext uri="{BB962C8B-B14F-4D97-AF65-F5344CB8AC3E}">
-        <p14:creationId xmlns:p14="http://schemas.microsoft.com/office/powerpoint/2010/main" val="212778437"/>
+        <p14:creationId xmlns:p14="http://schemas.microsoft.com/office/powerpoint/2010/main" xmlns="" val="212778437"/>
       </p:ext>
     </p:extLst>
   </p:cSld>
@@ -1494,6 +1400,7 @@
           <a:p>
             <a:fld id="{E7AA0654-642B-4EC6-9896-06614A0153EC}" type="slidenum">
               <a:rPr lang="en-US" smtClean="0"/>
+              <a:pPr/>
               <a:t>5</a:t>
             </a:fld>
             <a:endParaRPr lang="en-US"/>
@@ -1503,7 +1410,7 @@
     </p:spTree>
     <p:extLst>
       <p:ext uri="{BB962C8B-B14F-4D97-AF65-F5344CB8AC3E}">
-        <p14:creationId xmlns:p14="http://schemas.microsoft.com/office/powerpoint/2010/main" val="1846358032"/>
+        <p14:creationId xmlns:p14="http://schemas.microsoft.com/office/powerpoint/2010/main" xmlns="" val="1846358032"/>
       </p:ext>
     </p:extLst>
   </p:cSld>
@@ -1581,6 +1488,7 @@
           <a:p>
             <a:fld id="{E7AA0654-642B-4EC6-9896-06614A0153EC}" type="slidenum">
               <a:rPr lang="en-US" smtClean="0"/>
+              <a:pPr/>
               <a:t>7</a:t>
             </a:fld>
             <a:endParaRPr lang="en-US"/>
@@ -1590,7 +1498,7 @@
     </p:spTree>
     <p:extLst>
       <p:ext uri="{BB962C8B-B14F-4D97-AF65-F5344CB8AC3E}">
-        <p14:creationId xmlns:p14="http://schemas.microsoft.com/office/powerpoint/2010/main" val="2696810295"/>
+        <p14:creationId xmlns:p14="http://schemas.microsoft.com/office/powerpoint/2010/main" xmlns="" val="2696810295"/>
       </p:ext>
     </p:extLst>
   </p:cSld>
@@ -1675,6 +1583,7 @@
           <a:p>
             <a:fld id="{E7AA0654-642B-4EC6-9896-06614A0153EC}" type="slidenum">
               <a:rPr lang="en-US" smtClean="0"/>
+              <a:pPr/>
               <a:t>8</a:t>
             </a:fld>
             <a:endParaRPr lang="en-US"/>
@@ -1684,7 +1593,7 @@
     </p:spTree>
     <p:extLst>
       <p:ext uri="{BB962C8B-B14F-4D97-AF65-F5344CB8AC3E}">
-        <p14:creationId xmlns:p14="http://schemas.microsoft.com/office/powerpoint/2010/main" val="3679442458"/>
+        <p14:creationId xmlns:p14="http://schemas.microsoft.com/office/powerpoint/2010/main" xmlns="" val="3679442458"/>
       </p:ext>
     </p:extLst>
   </p:cSld>
@@ -1771,6 +1680,7 @@
           <a:p>
             <a:fld id="{660D7955-1178-45C7-88EB-DB10C946F729}" type="slidenum">
               <a:rPr lang="en-US" smtClean="0"/>
+              <a:pPr/>
               <a:t>9</a:t>
             </a:fld>
             <a:endParaRPr lang="en-US"/>
@@ -1780,7 +1690,7 @@
     </p:spTree>
     <p:extLst>
       <p:ext uri="{BB962C8B-B14F-4D97-AF65-F5344CB8AC3E}">
-        <p14:creationId xmlns:p14="http://schemas.microsoft.com/office/powerpoint/2010/main" val="2603194435"/>
+        <p14:creationId xmlns:p14="http://schemas.microsoft.com/office/powerpoint/2010/main" xmlns="" val="2603194435"/>
       </p:ext>
     </p:extLst>
   </p:cSld>
@@ -1855,6 +1765,7 @@
           <a:p>
             <a:fld id="{E7AA0654-642B-4EC6-9896-06614A0153EC}" type="slidenum">
               <a:rPr lang="en-US" smtClean="0"/>
+              <a:pPr/>
               <a:t>11</a:t>
             </a:fld>
             <a:endParaRPr lang="en-US"/>
@@ -1864,7 +1775,7 @@
     </p:spTree>
     <p:extLst>
       <p:ext uri="{BB962C8B-B14F-4D97-AF65-F5344CB8AC3E}">
-        <p14:creationId xmlns:p14="http://schemas.microsoft.com/office/powerpoint/2010/main" val="3832885243"/>
+        <p14:creationId xmlns:p14="http://schemas.microsoft.com/office/powerpoint/2010/main" xmlns="" val="3832885243"/>
       </p:ext>
     </p:extLst>
   </p:cSld>
@@ -1939,6 +1850,7 @@
           <a:p>
             <a:fld id="{660D7955-1178-45C7-88EB-DB10C946F729}" type="slidenum">
               <a:rPr lang="en-US" smtClean="0"/>
+              <a:pPr/>
               <a:t>13</a:t>
             </a:fld>
             <a:endParaRPr lang="en-US"/>
@@ -1948,7 +1860,7 @@
     </p:spTree>
     <p:extLst>
       <p:ext uri="{BB962C8B-B14F-4D97-AF65-F5344CB8AC3E}">
-        <p14:creationId xmlns:p14="http://schemas.microsoft.com/office/powerpoint/2010/main" val="1319460358"/>
+        <p14:creationId xmlns:p14="http://schemas.microsoft.com/office/powerpoint/2010/main" xmlns="" val="1319460358"/>
       </p:ext>
     </p:extLst>
   </p:cSld>
@@ -2023,6 +1935,7 @@
           <a:p>
             <a:fld id="{660D7955-1178-45C7-88EB-DB10C946F729}" type="slidenum">
               <a:rPr lang="en-US" smtClean="0"/>
+              <a:pPr/>
               <a:t>14</a:t>
             </a:fld>
             <a:endParaRPr lang="en-US"/>
@@ -2032,7 +1945,7 @@
     </p:spTree>
     <p:extLst>
       <p:ext uri="{BB962C8B-B14F-4D97-AF65-F5344CB8AC3E}">
-        <p14:creationId xmlns:p14="http://schemas.microsoft.com/office/powerpoint/2010/main" val="1319460358"/>
+        <p14:creationId xmlns:p14="http://schemas.microsoft.com/office/powerpoint/2010/main" xmlns="" val="1319460358"/>
       </p:ext>
     </p:extLst>
   </p:cSld>
@@ -2252,7 +2165,7 @@
             <a:fld id="{988E2377-5A2B-4430-898A-9BDF4D4B2C89}" type="datetime1">
               <a:rPr lang="hu-HU" smtClean="0"/>
               <a:pPr/>
-              <a:t>2013.01.14.</a:t>
+              <a:t>2013. 01. 20.</a:t>
             </a:fld>
             <a:endParaRPr lang="en-US" dirty="0"/>
           </a:p>
@@ -2275,6 +2188,7 @@
           <a:p>
             <a:fld id="{E5B09FA9-A177-4256-9C7F-5CF31ABA7234}" type="slidenum">
               <a:rPr lang="en-US" smtClean="0"/>
+              <a:pPr/>
               <a:t>‹#›</a:t>
             </a:fld>
             <a:endParaRPr lang="en-US"/>
@@ -2284,7 +2198,7 @@
     </p:spTree>
     <p:extLst>
       <p:ext uri="{BB962C8B-B14F-4D97-AF65-F5344CB8AC3E}">
-        <p14:creationId xmlns:p14="http://schemas.microsoft.com/office/powerpoint/2010/main" val="1671156955"/>
+        <p14:creationId xmlns:p14="http://schemas.microsoft.com/office/powerpoint/2010/main" xmlns="" val="1671156955"/>
       </p:ext>
     </p:extLst>
   </p:cSld>
@@ -2411,7 +2325,8 @@
           <a:p>
             <a:fld id="{EBB51852-6F03-4A13-AA91-55B0596808AB}" type="datetime1">
               <a:rPr lang="en-US" smtClean="0"/>
-              <a:t>1/14/2013</a:t>
+              <a:pPr/>
+              <a:t>1/20/2013</a:t>
             </a:fld>
             <a:endParaRPr lang="en-US"/>
           </a:p>
@@ -2453,6 +2368,7 @@
           <a:p>
             <a:fld id="{E5B09FA9-A177-4256-9C7F-5CF31ABA7234}" type="slidenum">
               <a:rPr lang="en-US" smtClean="0"/>
+              <a:pPr/>
               <a:t>‹#›</a:t>
             </a:fld>
             <a:endParaRPr lang="en-US"/>
@@ -2462,7 +2378,7 @@
     </p:spTree>
     <p:extLst>
       <p:ext uri="{BB962C8B-B14F-4D97-AF65-F5344CB8AC3E}">
-        <p14:creationId xmlns:p14="http://schemas.microsoft.com/office/powerpoint/2010/main" val="394942888"/>
+        <p14:creationId xmlns:p14="http://schemas.microsoft.com/office/powerpoint/2010/main" xmlns="" val="394942888"/>
       </p:ext>
     </p:extLst>
   </p:cSld>
@@ -2591,7 +2507,8 @@
           <a:p>
             <a:fld id="{AEC4224A-B86D-480C-80D3-0B1F736D6B50}" type="datetime1">
               <a:rPr lang="en-US" smtClean="0"/>
-              <a:t>1/14/2013</a:t>
+              <a:pPr/>
+              <a:t>1/20/2013</a:t>
             </a:fld>
             <a:endParaRPr lang="en-US"/>
           </a:p>
@@ -2633,6 +2550,7 @@
           <a:p>
             <a:fld id="{E5B09FA9-A177-4256-9C7F-5CF31ABA7234}" type="slidenum">
               <a:rPr lang="en-US" smtClean="0"/>
+              <a:pPr/>
               <a:t>‹#›</a:t>
             </a:fld>
             <a:endParaRPr lang="en-US"/>
@@ -2642,7 +2560,7 @@
     </p:spTree>
     <p:extLst>
       <p:ext uri="{BB962C8B-B14F-4D97-AF65-F5344CB8AC3E}">
-        <p14:creationId xmlns:p14="http://schemas.microsoft.com/office/powerpoint/2010/main" val="2222865572"/>
+        <p14:creationId xmlns:p14="http://schemas.microsoft.com/office/powerpoint/2010/main" xmlns="" val="2222865572"/>
       </p:ext>
     </p:extLst>
   </p:cSld>
@@ -2761,7 +2679,8 @@
           <a:p>
             <a:fld id="{FC89F6FF-6983-47B6-896B-DFAD3FEC5404}" type="datetime1">
               <a:rPr lang="en-US" smtClean="0"/>
-              <a:t>1/14/2013</a:t>
+              <a:pPr/>
+              <a:t>1/20/2013</a:t>
             </a:fld>
             <a:endParaRPr lang="en-US"/>
           </a:p>
@@ -2803,6 +2722,7 @@
           <a:p>
             <a:fld id="{E5B09FA9-A177-4256-9C7F-5CF31ABA7234}" type="slidenum">
               <a:rPr lang="en-US" smtClean="0"/>
+              <a:pPr/>
               <a:t>‹#›</a:t>
             </a:fld>
             <a:endParaRPr lang="en-US"/>
@@ -2812,7 +2732,7 @@
     </p:spTree>
     <p:extLst>
       <p:ext uri="{BB962C8B-B14F-4D97-AF65-F5344CB8AC3E}">
-        <p14:creationId xmlns:p14="http://schemas.microsoft.com/office/powerpoint/2010/main" val="1531784793"/>
+        <p14:creationId xmlns:p14="http://schemas.microsoft.com/office/powerpoint/2010/main" xmlns="" val="1531784793"/>
       </p:ext>
     </p:extLst>
   </p:cSld>
@@ -3007,7 +2927,8 @@
           <a:p>
             <a:fld id="{4FD5BFFF-D6A7-404D-B75B-FD402B77D341}" type="datetime1">
               <a:rPr lang="en-US" smtClean="0"/>
-              <a:t>1/14/2013</a:t>
+              <a:pPr/>
+              <a:t>1/20/2013</a:t>
             </a:fld>
             <a:endParaRPr lang="en-US"/>
           </a:p>
@@ -3049,6 +2970,7 @@
           <a:p>
             <a:fld id="{E5B09FA9-A177-4256-9C7F-5CF31ABA7234}" type="slidenum">
               <a:rPr lang="en-US" smtClean="0"/>
+              <a:pPr/>
               <a:t>‹#›</a:t>
             </a:fld>
             <a:endParaRPr lang="en-US"/>
@@ -3058,7 +2980,7 @@
     </p:spTree>
     <p:extLst>
       <p:ext uri="{BB962C8B-B14F-4D97-AF65-F5344CB8AC3E}">
-        <p14:creationId xmlns:p14="http://schemas.microsoft.com/office/powerpoint/2010/main" val="1598718328"/>
+        <p14:creationId xmlns:p14="http://schemas.microsoft.com/office/powerpoint/2010/main" xmlns="" val="1598718328"/>
       </p:ext>
     </p:extLst>
   </p:cSld>
@@ -3295,7 +3217,8 @@
           <a:p>
             <a:fld id="{675379F5-84BC-483B-951E-F251080202DB}" type="datetime1">
               <a:rPr lang="en-US" smtClean="0"/>
-              <a:t>1/14/2013</a:t>
+              <a:pPr/>
+              <a:t>1/20/2013</a:t>
             </a:fld>
             <a:endParaRPr lang="en-US"/>
           </a:p>
@@ -3337,6 +3260,7 @@
           <a:p>
             <a:fld id="{E5B09FA9-A177-4256-9C7F-5CF31ABA7234}" type="slidenum">
               <a:rPr lang="en-US" smtClean="0"/>
+              <a:pPr/>
               <a:t>‹#›</a:t>
             </a:fld>
             <a:endParaRPr lang="en-US"/>
@@ -3346,7 +3270,7 @@
     </p:spTree>
     <p:extLst>
       <p:ext uri="{BB962C8B-B14F-4D97-AF65-F5344CB8AC3E}">
-        <p14:creationId xmlns:p14="http://schemas.microsoft.com/office/powerpoint/2010/main" val="2437870851"/>
+        <p14:creationId xmlns:p14="http://schemas.microsoft.com/office/powerpoint/2010/main" xmlns="" val="2437870851"/>
       </p:ext>
     </p:extLst>
   </p:cSld>
@@ -3717,7 +3641,8 @@
           <a:p>
             <a:fld id="{7C24BFC6-6DC7-44C8-975D-44F36F89785D}" type="datetime1">
               <a:rPr lang="en-US" smtClean="0"/>
-              <a:t>1/14/2013</a:t>
+              <a:pPr/>
+              <a:t>1/20/2013</a:t>
             </a:fld>
             <a:endParaRPr lang="en-US"/>
           </a:p>
@@ -3759,6 +3684,7 @@
           <a:p>
             <a:fld id="{E5B09FA9-A177-4256-9C7F-5CF31ABA7234}" type="slidenum">
               <a:rPr lang="en-US" smtClean="0"/>
+              <a:pPr/>
               <a:t>‹#›</a:t>
             </a:fld>
             <a:endParaRPr lang="en-US"/>
@@ -3768,7 +3694,7 @@
     </p:spTree>
     <p:extLst>
       <p:ext uri="{BB962C8B-B14F-4D97-AF65-F5344CB8AC3E}">
-        <p14:creationId xmlns:p14="http://schemas.microsoft.com/office/powerpoint/2010/main" val="2810537295"/>
+        <p14:creationId xmlns:p14="http://schemas.microsoft.com/office/powerpoint/2010/main" xmlns="" val="2810537295"/>
       </p:ext>
     </p:extLst>
   </p:cSld>
@@ -3835,7 +3761,8 @@
           <a:p>
             <a:fld id="{D603358A-7423-4A08-AD10-C1AABD3EC89A}" type="datetime1">
               <a:rPr lang="en-US" smtClean="0"/>
-              <a:t>1/14/2013</a:t>
+              <a:pPr/>
+              <a:t>1/20/2013</a:t>
             </a:fld>
             <a:endParaRPr lang="en-US"/>
           </a:p>
@@ -3877,6 +3804,7 @@
           <a:p>
             <a:fld id="{E5B09FA9-A177-4256-9C7F-5CF31ABA7234}" type="slidenum">
               <a:rPr lang="en-US" smtClean="0"/>
+              <a:pPr/>
               <a:t>‹#›</a:t>
             </a:fld>
             <a:endParaRPr lang="en-US"/>
@@ -3886,7 +3814,7 @@
     </p:spTree>
     <p:extLst>
       <p:ext uri="{BB962C8B-B14F-4D97-AF65-F5344CB8AC3E}">
-        <p14:creationId xmlns:p14="http://schemas.microsoft.com/office/powerpoint/2010/main" val="3660223322"/>
+        <p14:creationId xmlns:p14="http://schemas.microsoft.com/office/powerpoint/2010/main" xmlns="" val="3660223322"/>
       </p:ext>
     </p:extLst>
   </p:cSld>
@@ -3930,7 +3858,8 @@
           <a:p>
             <a:fld id="{7C8EBF4A-BDC5-4ACC-A8F9-3185B72C1A00}" type="datetime1">
               <a:rPr lang="en-US" smtClean="0"/>
-              <a:t>1/14/2013</a:t>
+              <a:pPr/>
+              <a:t>1/20/2013</a:t>
             </a:fld>
             <a:endParaRPr lang="en-US"/>
           </a:p>
@@ -3972,6 +3901,7 @@
           <a:p>
             <a:fld id="{E5B09FA9-A177-4256-9C7F-5CF31ABA7234}" type="slidenum">
               <a:rPr lang="en-US" smtClean="0"/>
+              <a:pPr/>
               <a:t>‹#›</a:t>
             </a:fld>
             <a:endParaRPr lang="en-US"/>
@@ -3981,7 +3911,7 @@
     </p:spTree>
     <p:extLst>
       <p:ext uri="{BB962C8B-B14F-4D97-AF65-F5344CB8AC3E}">
-        <p14:creationId xmlns:p14="http://schemas.microsoft.com/office/powerpoint/2010/main" val="1013065890"/>
+        <p14:creationId xmlns:p14="http://schemas.microsoft.com/office/powerpoint/2010/main" xmlns="" val="1013065890"/>
       </p:ext>
     </p:extLst>
   </p:cSld>
@@ -4207,7 +4137,8 @@
           <a:p>
             <a:fld id="{381D60EE-3D79-455C-ACAD-DB08D31B7304}" type="datetime1">
               <a:rPr lang="en-US" smtClean="0"/>
-              <a:t>1/14/2013</a:t>
+              <a:pPr/>
+              <a:t>1/20/2013</a:t>
             </a:fld>
             <a:endParaRPr lang="en-US"/>
           </a:p>
@@ -4249,6 +4180,7 @@
           <a:p>
             <a:fld id="{E5B09FA9-A177-4256-9C7F-5CF31ABA7234}" type="slidenum">
               <a:rPr lang="en-US" smtClean="0"/>
+              <a:pPr/>
               <a:t>‹#›</a:t>
             </a:fld>
             <a:endParaRPr lang="en-US"/>
@@ -4258,7 +4190,7 @@
     </p:spTree>
     <p:extLst>
       <p:ext uri="{BB962C8B-B14F-4D97-AF65-F5344CB8AC3E}">
-        <p14:creationId xmlns:p14="http://schemas.microsoft.com/office/powerpoint/2010/main" val="261621455"/>
+        <p14:creationId xmlns:p14="http://schemas.microsoft.com/office/powerpoint/2010/main" xmlns="" val="261621455"/>
       </p:ext>
     </p:extLst>
   </p:cSld>
@@ -4460,7 +4392,8 @@
           <a:p>
             <a:fld id="{7B864028-9744-478B-88E3-26F084497025}" type="datetime1">
               <a:rPr lang="en-US" smtClean="0"/>
-              <a:t>1/14/2013</a:t>
+              <a:pPr/>
+              <a:t>1/20/2013</a:t>
             </a:fld>
             <a:endParaRPr lang="en-US"/>
           </a:p>
@@ -4502,6 +4435,7 @@
           <a:p>
             <a:fld id="{E5B09FA9-A177-4256-9C7F-5CF31ABA7234}" type="slidenum">
               <a:rPr lang="en-US" smtClean="0"/>
+              <a:pPr/>
               <a:t>‹#›</a:t>
             </a:fld>
             <a:endParaRPr lang="en-US"/>
@@ -4511,7 +4445,7 @@
     </p:spTree>
     <p:extLst>
       <p:ext uri="{BB962C8B-B14F-4D97-AF65-F5344CB8AC3E}">
-        <p14:creationId xmlns:p14="http://schemas.microsoft.com/office/powerpoint/2010/main" val="1250907821"/>
+        <p14:creationId xmlns:p14="http://schemas.microsoft.com/office/powerpoint/2010/main" xmlns="" val="1250907821"/>
       </p:ext>
     </p:extLst>
   </p:cSld>
@@ -4694,7 +4628,8 @@
           <a:p>
             <a:fld id="{9C3E8280-08C7-4D0C-A667-EBCDF03AF467}" type="datetime1">
               <a:rPr lang="en-US" smtClean="0"/>
-              <a:t>1/14/2013</a:t>
+              <a:pPr/>
+              <a:t>1/20/2013</a:t>
             </a:fld>
             <a:endParaRPr lang="en-US"/>
           </a:p>
@@ -4772,6 +4707,7 @@
           <a:p>
             <a:fld id="{E5B09FA9-A177-4256-9C7F-5CF31ABA7234}" type="slidenum">
               <a:rPr lang="en-US" smtClean="0"/>
+              <a:pPr/>
               <a:t>‹#›</a:t>
             </a:fld>
             <a:endParaRPr lang="en-US"/>
@@ -4781,7 +4717,7 @@
     </p:spTree>
     <p:extLst>
       <p:ext uri="{BB962C8B-B14F-4D97-AF65-F5344CB8AC3E}">
-        <p14:creationId xmlns:p14="http://schemas.microsoft.com/office/powerpoint/2010/main" val="820165002"/>
+        <p14:creationId xmlns:p14="http://schemas.microsoft.com/office/powerpoint/2010/main" xmlns="" val="820165002"/>
       </p:ext>
     </p:extLst>
   </p:cSld>
@@ -5105,28 +5041,71 @@
             <p:ph type="subTitle" idx="1"/>
           </p:nvPr>
         </p:nvSpPr>
-        <p:spPr/>
-        <p:txBody>
-          <a:bodyPr/>
-          <a:lstStyle/>
-          <a:p>
-            <a:r>
-              <a:rPr lang="hu-HU" dirty="0" smtClean="0"/>
-              <a:t>Készítette: Csikós Donát</a:t>
-            </a:r>
-          </a:p>
-          <a:p>
-            <a:r>
-              <a:rPr lang="hu-HU" dirty="0" smtClean="0"/>
-              <a:t>Konzulens: Horváth Ákos, Ráth István</a:t>
-            </a:r>
-          </a:p>
-          <a:p>
-            <a:r>
-              <a:rPr lang="hu-HU" dirty="0" smtClean="0"/>
-              <a:t>BME MIT</a:t>
-            </a:r>
-            <a:endParaRPr lang="en-US" dirty="0" smtClean="0"/>
+        <p:spPr>
+          <a:xfrm>
+            <a:off x="1371600" y="3733800"/>
+            <a:ext cx="6400800" cy="1752600"/>
+          </a:xfrm>
+        </p:spPr>
+        <p:txBody>
+          <a:bodyPr>
+            <a:normAutofit fontScale="85000" lnSpcReduction="20000"/>
+          </a:bodyPr>
+          <a:lstStyle/>
+          <a:p>
+            <a:r>
+              <a:rPr lang="hu-HU" dirty="0" smtClean="0"/>
+              <a:t>Készítette</a:t>
+            </a:r>
+            <a:r>
+              <a:rPr lang="hu-HU" dirty="0" smtClean="0"/>
+              <a:t>: Csikós </a:t>
+            </a:r>
+            <a:r>
+              <a:rPr lang="hu-HU" dirty="0" smtClean="0"/>
+              <a:t>Donát</a:t>
+            </a:r>
+            <a:endParaRPr lang="hu-HU" dirty="0" smtClean="0"/>
+          </a:p>
+          <a:p>
+            <a:r>
+              <a:rPr lang="hu-HU" dirty="0" smtClean="0"/>
+              <a:t>Konzulens: Horváth Ákos, Ráth </a:t>
+            </a:r>
+            <a:r>
+              <a:rPr lang="hu-HU" dirty="0" smtClean="0"/>
+              <a:t>István</a:t>
+            </a:r>
+          </a:p>
+          <a:p>
+            <a:r>
+              <a:rPr lang="hu-HU" dirty="0" smtClean="0"/>
+              <a:t>Külső konzulens: </a:t>
+            </a:r>
+            <a:r>
+              <a:rPr lang="hu-HU" dirty="0" err="1" smtClean="0"/>
+              <a:t>Vito</a:t>
+            </a:r>
+            <a:r>
+              <a:rPr lang="hu-HU" dirty="0" smtClean="0"/>
+              <a:t> </a:t>
+            </a:r>
+            <a:r>
+              <a:rPr lang="hu-HU" dirty="0" err="1" smtClean="0"/>
+              <a:t>Baggiolini</a:t>
+            </a:r>
+            <a:endParaRPr lang="hu-HU" dirty="0" smtClean="0"/>
+          </a:p>
+          <a:p>
+            <a:r>
+              <a:rPr lang="hu-HU" dirty="0" smtClean="0"/>
+              <a:t>BME </a:t>
+            </a:r>
+            <a:r>
+              <a:rPr lang="hu-HU" dirty="0" smtClean="0"/>
+              <a:t>MIT</a:t>
+            </a:r>
+            <a:endParaRPr lang="hu-HU" dirty="0" smtClean="0"/>
           </a:p>
         </p:txBody>
       </p:sp>
@@ -5140,14 +5119,20 @@
             <p:ph type="dt" sz="half" idx="10"/>
           </p:nvPr>
         </p:nvSpPr>
-        <p:spPr/>
+        <p:spPr>
+          <a:xfrm>
+            <a:off x="3505200" y="5943600"/>
+            <a:ext cx="2133600" cy="365125"/>
+          </a:xfrm>
+        </p:spPr>
         <p:txBody>
           <a:bodyPr/>
           <a:lstStyle/>
           <a:p>
             <a:fld id="{69502636-3651-4D64-AD56-5443027FFC3F}" type="datetime1">
               <a:rPr lang="hu-HU" smtClean="0"/>
-              <a:t>2013.01.14.</a:t>
+              <a:pPr/>
+              <a:t>2013. 01. 20.</a:t>
             </a:fld>
             <a:endParaRPr lang="en-US" dirty="0"/>
           </a:p>
@@ -5156,7 +5141,7 @@
     </p:spTree>
     <p:extLst>
       <p:ext uri="{BB962C8B-B14F-4D97-AF65-F5344CB8AC3E}">
-        <p14:creationId xmlns:p14="http://schemas.microsoft.com/office/powerpoint/2010/main" val="2578477526"/>
+        <p14:creationId xmlns:p14="http://schemas.microsoft.com/office/powerpoint/2010/main" xmlns="" val="2578477526"/>
       </p:ext>
     </p:extLst>
   </p:cSld>
@@ -5264,24 +5249,27 @@
           <a:p>
             <a:r>
               <a:rPr lang="hu-HU" dirty="0" smtClean="0"/>
-              <a:t>Komplex lekérdezések </a:t>
+              <a:t>Komplex </a:t>
+            </a:r>
+            <a:r>
+              <a:rPr lang="hu-HU" dirty="0" smtClean="0"/>
+              <a:t>lekérdezések</a:t>
+            </a:r>
+            <a:r>
+              <a:rPr lang="en-US" dirty="0" smtClean="0"/>
+              <a:t> → </a:t>
             </a:r>
             <a:r>
               <a:rPr lang="hu-HU" dirty="0" smtClean="0">
                 <a:sym typeface="Wingdings" pitchFamily="2" charset="2"/>
               </a:rPr>
-              <a:t></a:t>
-            </a:r>
-            <a:r>
-              <a:rPr lang="hu-HU" dirty="0">
-                <a:sym typeface="Wingdings" pitchFamily="2" charset="2"/>
-              </a:rPr>
               <a:t>v</a:t>
             </a:r>
             <a:r>
               <a:rPr lang="hu-HU" dirty="0" smtClean="0"/>
               <a:t>alidáció:</a:t>
             </a:r>
+            <a:endParaRPr lang="hu-HU" dirty="0" smtClean="0"/>
           </a:p>
           <a:p>
             <a:pPr marL="0" indent="0">
@@ -5336,7 +5324,7 @@
           <a:blip r:embed="rId2">
             <a:extLst>
               <a:ext uri="{28A0092B-C50C-407E-A947-70E740481C1C}">
-                <a14:useLocalDpi xmlns:a14="http://schemas.microsoft.com/office/drawing/2010/main" val="0"/>
+                <a14:useLocalDpi xmlns:a14="http://schemas.microsoft.com/office/drawing/2010/main" xmlns="" val="0"/>
               </a:ext>
             </a:extLst>
           </a:blip>
@@ -5356,7 +5344,7 @@
           <a:noFill/>
           <a:extLst>
             <a:ext uri="{909E8E84-426E-40DD-AFC4-6F175D3DCCD1}">
-              <a14:hiddenFill xmlns:a14="http://schemas.microsoft.com/office/drawing/2010/main">
+              <a14:hiddenFill xmlns:a14="http://schemas.microsoft.com/office/drawing/2010/main" xmlns="">
                 <a:solidFill>
                   <a:srgbClr val="FFFFFF"/>
                 </a:solidFill>
@@ -5377,7 +5365,7 @@
           <a:blip r:embed="rId3">
             <a:extLst>
               <a:ext uri="{28A0092B-C50C-407E-A947-70E740481C1C}">
-                <a14:useLocalDpi xmlns:a14="http://schemas.microsoft.com/office/drawing/2010/main" val="0"/>
+                <a14:useLocalDpi xmlns:a14="http://schemas.microsoft.com/office/drawing/2010/main" xmlns="" val="0"/>
               </a:ext>
             </a:extLst>
           </a:blip>
@@ -5395,7 +5383,7 @@
           <a:noFill/>
           <a:extLst>
             <a:ext uri="{909E8E84-426E-40DD-AFC4-6F175D3DCCD1}">
-              <a14:hiddenFill xmlns:a14="http://schemas.microsoft.com/office/drawing/2010/main">
+              <a14:hiddenFill xmlns:a14="http://schemas.microsoft.com/office/drawing/2010/main" xmlns="">
                 <a:solidFill>
                   <a:srgbClr val="FFFFFF"/>
                 </a:solidFill>
@@ -5407,7 +5395,7 @@
     </p:spTree>
     <p:extLst>
       <p:ext uri="{BB962C8B-B14F-4D97-AF65-F5344CB8AC3E}">
-        <p14:creationId xmlns:p14="http://schemas.microsoft.com/office/powerpoint/2010/main" val="83681440"/>
+        <p14:creationId xmlns:p14="http://schemas.microsoft.com/office/powerpoint/2010/main" xmlns="" val="83681440"/>
       </p:ext>
     </p:extLst>
   </p:cSld>
@@ -5500,6 +5488,7 @@
           <a:p>
             <a:fld id="{E5B09FA9-A177-4256-9C7F-5CF31ABA7234}" type="slidenum">
               <a:rPr lang="en-US" smtClean="0"/>
+              <a:pPr/>
               <a:t>11</a:t>
             </a:fld>
             <a:endParaRPr lang="en-US"/>
@@ -5509,7 +5498,7 @@
     </p:spTree>
     <p:extLst>
       <p:ext uri="{BB962C8B-B14F-4D97-AF65-F5344CB8AC3E}">
-        <p14:creationId xmlns:p14="http://schemas.microsoft.com/office/powerpoint/2010/main" val="2388552978"/>
+        <p14:creationId xmlns:p14="http://schemas.microsoft.com/office/powerpoint/2010/main" xmlns="" val="2388552978"/>
       </p:ext>
     </p:extLst>
   </p:cSld>
@@ -5664,6 +5653,7 @@
           <a:p>
             <a:fld id="{E5B09FA9-A177-4256-9C7F-5CF31ABA7234}" type="slidenum">
               <a:rPr lang="en-US" smtClean="0"/>
+              <a:pPr/>
               <a:t>12</a:t>
             </a:fld>
             <a:endParaRPr lang="en-US"/>
@@ -5673,7 +5663,7 @@
     </p:spTree>
     <p:extLst>
       <p:ext uri="{BB962C8B-B14F-4D97-AF65-F5344CB8AC3E}">
-        <p14:creationId xmlns:p14="http://schemas.microsoft.com/office/powerpoint/2010/main" val="1618283345"/>
+        <p14:creationId xmlns:p14="http://schemas.microsoft.com/office/powerpoint/2010/main" xmlns="" val="1618283345"/>
       </p:ext>
     </p:extLst>
   </p:cSld>
@@ -5847,7 +5837,7 @@
             <p:ph sz="half" idx="2"/>
             <p:extLst>
               <p:ext uri="{D42A27DB-BD31-4B8C-83A1-F6EECF244321}">
-                <p14:modId xmlns:p14="http://schemas.microsoft.com/office/powerpoint/2010/main" val="3134798546"/>
+                <p14:modId xmlns:p14="http://schemas.microsoft.com/office/powerpoint/2010/main" xmlns="" val="3134798546"/>
               </p:ext>
             </p:extLst>
           </p:nvPr>
@@ -5879,6 +5869,7 @@
           <a:p>
             <a:fld id="{E5B09FA9-A177-4256-9C7F-5CF31ABA7234}" type="slidenum">
               <a:rPr lang="en-US" smtClean="0"/>
+              <a:pPr/>
               <a:t>13</a:t>
             </a:fld>
             <a:endParaRPr lang="en-US"/>
@@ -5888,7 +5879,7 @@
     </p:spTree>
     <p:extLst>
       <p:ext uri="{BB962C8B-B14F-4D97-AF65-F5344CB8AC3E}">
-        <p14:creationId xmlns:p14="http://schemas.microsoft.com/office/powerpoint/2010/main" val="3923761561"/>
+        <p14:creationId xmlns:p14="http://schemas.microsoft.com/office/powerpoint/2010/main" xmlns="" val="3923761561"/>
       </p:ext>
     </p:extLst>
   </p:cSld>
@@ -5932,7 +5923,7 @@
             <p:ph sz="quarter" idx="4"/>
             <p:extLst>
               <p:ext uri="{D42A27DB-BD31-4B8C-83A1-F6EECF244321}">
-                <p14:modId xmlns:p14="http://schemas.microsoft.com/office/powerpoint/2010/main" val="1020975718"/>
+                <p14:modId xmlns:p14="http://schemas.microsoft.com/office/powerpoint/2010/main" xmlns="" val="1020975718"/>
               </p:ext>
             </p:extLst>
           </p:nvPr>
@@ -5980,7 +5971,7 @@
             <p:ph sz="half" idx="2"/>
             <p:extLst>
               <p:ext uri="{D42A27DB-BD31-4B8C-83A1-F6EECF244321}">
-                <p14:modId xmlns:p14="http://schemas.microsoft.com/office/powerpoint/2010/main" val="802661414"/>
+                <p14:modId xmlns:p14="http://schemas.microsoft.com/office/powerpoint/2010/main" xmlns="" val="802661414"/>
               </p:ext>
             </p:extLst>
           </p:nvPr>
@@ -6012,6 +6003,7 @@
           <a:p>
             <a:fld id="{E5B09FA9-A177-4256-9C7F-5CF31ABA7234}" type="slidenum">
               <a:rPr lang="en-US" smtClean="0"/>
+              <a:pPr/>
               <a:t>14</a:t>
             </a:fld>
             <a:endParaRPr lang="en-US"/>
@@ -6333,13 +6325,27 @@
             </a:r>
             <a:r>
               <a:rPr lang="hu-HU" dirty="0" smtClean="0"/>
-              <a:t> elemre és kapcsolatra </a:t>
+              <a:t> elemre és </a:t>
+            </a:r>
+            <a:r>
+              <a:rPr lang="hu-HU" dirty="0" smtClean="0"/>
+              <a:t>kapcsolatra</a:t>
+            </a:r>
+            <a:r>
+              <a:rPr lang="en-US" dirty="0" smtClean="0"/>
+              <a:t> → </a:t>
             </a:r>
             <a:r>
               <a:rPr lang="hu-HU" dirty="0" smtClean="0">
                 <a:sym typeface="Wingdings" pitchFamily="2" charset="2"/>
               </a:rPr>
-              <a:t> azonnali visszacsatolás</a:t>
+              <a:t>azonnali </a:t>
+            </a:r>
+            <a:r>
+              <a:rPr lang="hu-HU" dirty="0" smtClean="0">
+                <a:sym typeface="Wingdings" pitchFamily="2" charset="2"/>
+              </a:rPr>
+              <a:t>visszacsatolás</a:t>
             </a:r>
             <a:endParaRPr lang="hu-HU" dirty="0" smtClean="0"/>
           </a:p>
@@ -6354,7 +6360,7 @@
     </p:spTree>
     <p:extLst>
       <p:ext uri="{BB962C8B-B14F-4D97-AF65-F5344CB8AC3E}">
-        <p14:creationId xmlns:p14="http://schemas.microsoft.com/office/powerpoint/2010/main" val="2871537416"/>
+        <p14:creationId xmlns:p14="http://schemas.microsoft.com/office/powerpoint/2010/main" xmlns="" val="2871537416"/>
       </p:ext>
     </p:extLst>
   </p:cSld>
@@ -6571,6 +6577,7 @@
           <a:p>
             <a:fld id="{E5B09FA9-A177-4256-9C7F-5CF31ABA7234}" type="slidenum">
               <a:rPr lang="en-US" smtClean="0"/>
+              <a:pPr/>
               <a:t>15</a:t>
             </a:fld>
             <a:endParaRPr lang="en-US"/>
@@ -6580,7 +6587,7 @@
     </p:spTree>
     <p:extLst>
       <p:ext uri="{BB962C8B-B14F-4D97-AF65-F5344CB8AC3E}">
-        <p14:creationId xmlns:p14="http://schemas.microsoft.com/office/powerpoint/2010/main" val="819375693"/>
+        <p14:creationId xmlns:p14="http://schemas.microsoft.com/office/powerpoint/2010/main" xmlns="" val="819375693"/>
       </p:ext>
     </p:extLst>
   </p:cSld>
@@ -6695,23 +6702,14 @@
             <a:pPr lvl="1"/>
             <a:r>
               <a:rPr lang="hu-HU" dirty="0" smtClean="0"/>
-              <a:t>Inkrementális modell-forráskód </a:t>
-            </a:r>
-            <a:r>
-              <a:rPr lang="hu-HU" dirty="0" smtClean="0"/>
-              <a:t>szinkronizáció</a:t>
-            </a:r>
-            <a:endParaRPr lang="hu-HU" dirty="0" smtClean="0"/>
+              <a:t>Inkrementális modell-forráskód szinkronizáció</a:t>
+            </a:r>
           </a:p>
           <a:p>
             <a:pPr lvl="1"/>
             <a:r>
               <a:rPr lang="hu-HU" dirty="0" smtClean="0"/>
-              <a:t>A rendszer teljesítőképességét igazoló </a:t>
-            </a:r>
-            <a:r>
-              <a:rPr lang="hu-HU" dirty="0" smtClean="0"/>
-              <a:t>mérések</a:t>
+              <a:t>A rendszer teljesítőképességét igazoló mérések</a:t>
             </a:r>
           </a:p>
         </p:txBody>
@@ -6733,6 +6731,7 @@
           <a:p>
             <a:fld id="{E5B09FA9-A177-4256-9C7F-5CF31ABA7234}" type="slidenum">
               <a:rPr lang="en-US" smtClean="0"/>
+              <a:pPr/>
               <a:t>16</a:t>
             </a:fld>
             <a:endParaRPr lang="en-US"/>
@@ -6742,7 +6741,7 @@
     </p:spTree>
     <p:extLst>
       <p:ext uri="{BB962C8B-B14F-4D97-AF65-F5344CB8AC3E}">
-        <p14:creationId xmlns:p14="http://schemas.microsoft.com/office/powerpoint/2010/main" val="833660359"/>
+        <p14:creationId xmlns:p14="http://schemas.microsoft.com/office/powerpoint/2010/main" xmlns="" val="833660359"/>
       </p:ext>
     </p:extLst>
   </p:cSld>
@@ -6839,7 +6838,6 @@
               <a:rPr lang="hu-HU" dirty="0" smtClean="0"/>
               <a:t>Diplomaterv: komplex lekérdezések megvalósítása, inkrementális lekérdezések UI integrációja</a:t>
             </a:r>
-            <a:endParaRPr lang="hu-HU" dirty="0" smtClean="0"/>
           </a:p>
           <a:p>
             <a:r>
@@ -6891,6 +6889,7 @@
           <a:p>
             <a:fld id="{E5B09FA9-A177-4256-9C7F-5CF31ABA7234}" type="slidenum">
               <a:rPr lang="en-US" smtClean="0"/>
+              <a:pPr/>
               <a:t>17</a:t>
             </a:fld>
             <a:endParaRPr lang="en-US"/>
@@ -6900,7 +6899,7 @@
     </p:spTree>
     <p:extLst>
       <p:ext uri="{BB962C8B-B14F-4D97-AF65-F5344CB8AC3E}">
-        <p14:creationId xmlns:p14="http://schemas.microsoft.com/office/powerpoint/2010/main" val="2710977145"/>
+        <p14:creationId xmlns:p14="http://schemas.microsoft.com/office/powerpoint/2010/main" xmlns="" val="2710977145"/>
       </p:ext>
     </p:extLst>
   </p:cSld>
@@ -7015,10 +7014,12 @@
             </a:r>
             <a:r>
               <a:rPr lang="hu-HU" dirty="0" smtClean="0"/>
-              <a:t>ráfminták kiterjesztése metrikákra</a:t>
-            </a:r>
-          </a:p>
-          <a:p>
+              <a:t>ráfminták kiterjesztése </a:t>
+            </a:r>
+            <a:r>
+              <a:rPr lang="hu-HU" dirty="0" smtClean="0"/>
+              <a:t>metrikákra</a:t>
+            </a:r>
             <a:endParaRPr lang="en-US" dirty="0"/>
           </a:p>
         </p:txBody>
@@ -7040,6 +7041,7 @@
           <a:p>
             <a:fld id="{E5B09FA9-A177-4256-9C7F-5CF31ABA7234}" type="slidenum">
               <a:rPr lang="en-US" smtClean="0"/>
+              <a:pPr/>
               <a:t>18</a:t>
             </a:fld>
             <a:endParaRPr lang="en-US"/>
@@ -7049,18 +7051,18 @@
     </p:spTree>
     <p:extLst>
       <p:ext uri="{BB962C8B-B14F-4D97-AF65-F5344CB8AC3E}">
-        <p14:creationId xmlns:p14="http://schemas.microsoft.com/office/powerpoint/2010/main" val="1048539272"/>
+        <p14:creationId xmlns:p14="http://schemas.microsoft.com/office/powerpoint/2010/main" xmlns="" val="1048539272"/>
       </p:ext>
     </p:extLst>
   </p:cSld>
   <p:clrMapOvr>
     <a:masterClrMapping/>
   </p:clrMapOvr>
-  <mc:AlternateContent xmlns:mc="http://schemas.openxmlformats.org/markup-compatibility/2006" xmlns:p14="http://schemas.microsoft.com/office/powerpoint/2010/main">
-    <mc:Choice Requires="p14">
+  <mc:AlternateContent xmlns:mc="http://schemas.openxmlformats.org/markup-compatibility/2006">
+    <mc:Choice xmlns:p14="http://schemas.microsoft.com/office/powerpoint/2010/main" xmlns="" Requires="p14">
       <p:transition spd="slow" p14:dur="2000"/>
     </mc:Choice>
-    <mc:Fallback xmlns="">
+    <mc:Fallback>
       <p:transition spd="slow"/>
     </mc:Fallback>
   </mc:AlternateContent>
@@ -7168,7 +7170,7 @@
     </p:spTree>
     <p:extLst>
       <p:ext uri="{BB962C8B-B14F-4D97-AF65-F5344CB8AC3E}">
-        <p14:creationId xmlns:p14="http://schemas.microsoft.com/office/powerpoint/2010/main" val="1797703964"/>
+        <p14:creationId xmlns:p14="http://schemas.microsoft.com/office/powerpoint/2010/main" xmlns="" val="1797703964"/>
       </p:ext>
     </p:extLst>
   </p:cSld>
@@ -7345,6 +7347,7 @@
           <a:p>
             <a:fld id="{E5B09FA9-A177-4256-9C7F-5CF31ABA7234}" type="slidenum">
               <a:rPr lang="en-US" smtClean="0"/>
+              <a:pPr/>
               <a:t>2</a:t>
             </a:fld>
             <a:endParaRPr lang="en-US"/>
@@ -8658,7 +8661,7 @@
     </p:spTree>
     <p:extLst>
       <p:ext uri="{BB962C8B-B14F-4D97-AF65-F5344CB8AC3E}">
-        <p14:creationId xmlns:p14="http://schemas.microsoft.com/office/powerpoint/2010/main" val="3405118101"/>
+        <p14:creationId xmlns:p14="http://schemas.microsoft.com/office/powerpoint/2010/main" xmlns="" val="3405118101"/>
       </p:ext>
     </p:extLst>
   </p:cSld>
@@ -9305,6 +9308,898 @@
 </p:sld>
 </file>
 
+<file path=ppt/slides/slide20.xml><?xml version="1.0" encoding="utf-8"?>
+<p:sld xmlns:a="http://schemas.openxmlformats.org/drawingml/2006/main" xmlns:r="http://schemas.openxmlformats.org/officeDocument/2006/relationships" xmlns:p="http://schemas.openxmlformats.org/presentationml/2006/main">
+  <p:cSld>
+    <p:spTree>
+      <p:nvGrpSpPr>
+        <p:cNvPr id="1" name=""/>
+        <p:cNvGrpSpPr/>
+        <p:nvPr/>
+      </p:nvGrpSpPr>
+      <p:grpSpPr>
+        <a:xfrm>
+          <a:off x="0" y="0"/>
+          <a:ext cx="0" cy="0"/>
+          <a:chOff x="0" y="0"/>
+          <a:chExt cx="0" cy="0"/>
+        </a:xfrm>
+      </p:grpSpPr>
+      <p:sp>
+        <p:nvSpPr>
+          <p:cNvPr id="8" name="Title 7"/>
+          <p:cNvSpPr>
+            <a:spLocks noGrp="1"/>
+          </p:cNvSpPr>
+          <p:nvPr>
+            <p:ph type="title"/>
+          </p:nvPr>
+        </p:nvSpPr>
+        <p:spPr/>
+        <p:txBody>
+          <a:bodyPr>
+            <a:noAutofit/>
+          </a:bodyPr>
+          <a:lstStyle/>
+          <a:p>
+            <a:r>
+              <a:rPr lang="en-US" sz="2800" i="1" dirty="0" smtClean="0"/>
+              <a:t>“</a:t>
+            </a:r>
+            <a:r>
+              <a:rPr lang="hu-HU" sz="2800" i="1" dirty="0" smtClean="0"/>
+              <a:t>Hogyan </a:t>
+            </a:r>
+            <a:r>
+              <a:rPr lang="hu-HU" sz="2800" i="1" dirty="0" smtClean="0"/>
+              <a:t>kezeli a </a:t>
+            </a:r>
+            <a:r>
+              <a:rPr lang="hu-HU" sz="2800" i="1" dirty="0" smtClean="0"/>
+              <a:t>rendszer a feldolgozott </a:t>
+            </a:r>
+            <a:r>
+              <a:rPr lang="hu-HU" sz="2800" i="1" dirty="0" err="1" smtClean="0"/>
+              <a:t>jar</a:t>
+            </a:r>
+            <a:r>
+              <a:rPr lang="hu-HU" sz="2800" i="1" dirty="0" smtClean="0"/>
+              <a:t> állományok különböző verzióit?</a:t>
+            </a:r>
+            <a:r>
+              <a:rPr lang="en-US" sz="2800" i="1" dirty="0" smtClean="0"/>
+              <a:t>”</a:t>
+            </a:r>
+            <a:endParaRPr lang="hu-HU" sz="2800" i="1" dirty="0" smtClean="0"/>
+          </a:p>
+        </p:txBody>
+      </p:sp>
+      <p:sp>
+        <p:nvSpPr>
+          <p:cNvPr id="5" name="Tartalom helye 4"/>
+          <p:cNvSpPr>
+            <a:spLocks noGrp="1"/>
+          </p:cNvSpPr>
+          <p:nvPr>
+            <p:ph idx="1"/>
+          </p:nvPr>
+        </p:nvSpPr>
+        <p:spPr/>
+        <p:txBody>
+          <a:bodyPr>
+            <a:normAutofit/>
+          </a:bodyPr>
+          <a:lstStyle/>
+          <a:p>
+            <a:r>
+              <a:rPr lang="hu-HU" dirty="0" smtClean="0"/>
+              <a:t>Minden </a:t>
+            </a:r>
+            <a:r>
+              <a:rPr lang="hu-HU" dirty="0" smtClean="0"/>
+              <a:t>komponenshez verzió </a:t>
+            </a:r>
+            <a:r>
+              <a:rPr lang="hu-HU" dirty="0" smtClean="0"/>
+              <a:t>attribútum:</a:t>
+            </a:r>
+          </a:p>
+          <a:p>
+            <a:pPr lvl="1"/>
+            <a:r>
+              <a:rPr lang="hu-HU" dirty="0" smtClean="0"/>
+              <a:t>A </a:t>
+            </a:r>
+            <a:r>
+              <a:rPr lang="hu-HU" dirty="0" smtClean="0"/>
+              <a:t>verziószámok listája tárolva minden új </a:t>
+            </a:r>
+            <a:r>
+              <a:rPr lang="hu-HU" dirty="0" smtClean="0"/>
+              <a:t>objektumhoz</a:t>
+            </a:r>
+          </a:p>
+          <a:p>
+            <a:pPr lvl="1"/>
+            <a:r>
+              <a:rPr lang="hu-HU" dirty="0" smtClean="0"/>
+              <a:t>Új verzió → frissítés, </a:t>
+            </a:r>
+            <a:r>
+              <a:rPr lang="hu-HU" dirty="0" smtClean="0"/>
+              <a:t>ha a régi verzióban is létezett</a:t>
+            </a:r>
+            <a:r>
+              <a:rPr lang="hu-HU" dirty="0" smtClean="0"/>
+              <a:t>.</a:t>
+            </a:r>
+          </a:p>
+          <a:p>
+            <a:r>
+              <a:rPr lang="hu-HU" dirty="0" smtClean="0"/>
+              <a:t> Verziókat nem kell eltávolítani</a:t>
+            </a:r>
+          </a:p>
+          <a:p>
+            <a:pPr lvl="1"/>
+            <a:r>
+              <a:rPr lang="hu-HU" dirty="0" smtClean="0"/>
+              <a:t> Szerver </a:t>
+            </a:r>
+            <a:r>
+              <a:rPr lang="hu-HU" dirty="0" smtClean="0"/>
+              <a:t>folyamat: összes </a:t>
+            </a:r>
+            <a:r>
+              <a:rPr lang="hu-HU" dirty="0" smtClean="0"/>
+              <a:t>projekt összes </a:t>
+            </a:r>
+            <a:r>
+              <a:rPr lang="hu-HU" dirty="0" smtClean="0"/>
+              <a:t>verzióját felderíti egy kijelölt időponttól</a:t>
+            </a:r>
+            <a:r>
+              <a:rPr lang="hu-HU" dirty="0" smtClean="0"/>
+              <a:t>.</a:t>
+            </a:r>
+            <a:endParaRPr lang="hu-HU" dirty="0"/>
+          </a:p>
+        </p:txBody>
+      </p:sp>
+      <p:sp>
+        <p:nvSpPr>
+          <p:cNvPr id="4" name="Slide Number Placeholder 3"/>
+          <p:cNvSpPr>
+            <a:spLocks noGrp="1"/>
+          </p:cNvSpPr>
+          <p:nvPr>
+            <p:ph type="sldNum" sz="quarter" idx="12"/>
+          </p:nvPr>
+        </p:nvSpPr>
+        <p:spPr/>
+        <p:txBody>
+          <a:bodyPr/>
+          <a:lstStyle/>
+          <a:p>
+            <a:fld id="{E5B09FA9-A177-4256-9C7F-5CF31ABA7234}" type="slidenum">
+              <a:rPr lang="en-US" smtClean="0"/>
+              <a:pPr/>
+              <a:t>20</a:t>
+            </a:fld>
+            <a:endParaRPr lang="en-US"/>
+          </a:p>
+        </p:txBody>
+      </p:sp>
+    </p:spTree>
+    <p:extLst>
+      <p:ext uri="{BB962C8B-B14F-4D97-AF65-F5344CB8AC3E}">
+        <p14:creationId xmlns:p14="http://schemas.microsoft.com/office/powerpoint/2010/main" xmlns="" val="1797703964"/>
+      </p:ext>
+    </p:extLst>
+  </p:cSld>
+  <p:clrMapOvr>
+    <a:masterClrMapping/>
+  </p:clrMapOvr>
+  <p:timing>
+    <p:tnLst>
+      <p:par>
+        <p:cTn id="1" dur="indefinite" restart="never" nodeType="tmRoot"/>
+      </p:par>
+    </p:tnLst>
+  </p:timing>
+</p:sld>
+</file>
+
+<file path=ppt/slides/slide21.xml><?xml version="1.0" encoding="utf-8"?>
+<p:sld xmlns:a="http://schemas.openxmlformats.org/drawingml/2006/main" xmlns:r="http://schemas.openxmlformats.org/officeDocument/2006/relationships" xmlns:p="http://schemas.openxmlformats.org/presentationml/2006/main">
+  <p:cSld>
+    <p:spTree>
+      <p:nvGrpSpPr>
+        <p:cNvPr id="1" name=""/>
+        <p:cNvGrpSpPr/>
+        <p:nvPr/>
+      </p:nvGrpSpPr>
+      <p:grpSpPr>
+        <a:xfrm>
+          <a:off x="0" y="0"/>
+          <a:ext cx="0" cy="0"/>
+          <a:chOff x="0" y="0"/>
+          <a:chExt cx="0" cy="0"/>
+        </a:xfrm>
+      </p:grpSpPr>
+      <p:sp>
+        <p:nvSpPr>
+          <p:cNvPr id="8" name="Title 7"/>
+          <p:cNvSpPr>
+            <a:spLocks noGrp="1"/>
+          </p:cNvSpPr>
+          <p:nvPr>
+            <p:ph type="title"/>
+          </p:nvPr>
+        </p:nvSpPr>
+        <p:spPr/>
+        <p:txBody>
+          <a:bodyPr>
+            <a:noAutofit/>
+          </a:bodyPr>
+          <a:lstStyle/>
+          <a:p>
+            <a:r>
+              <a:rPr lang="en-US" sz="2800" i="1" dirty="0" smtClean="0"/>
+              <a:t>“</a:t>
+            </a:r>
+            <a:r>
+              <a:rPr lang="hu-HU" sz="2800" i="1" dirty="0" smtClean="0"/>
+              <a:t>Van-e </a:t>
+            </a:r>
+            <a:r>
+              <a:rPr lang="hu-HU" sz="2800" i="1" dirty="0" smtClean="0"/>
+              <a:t>olyan aspektus, melyet a statikus elemezhetőség szempontjából jobban </a:t>
+            </a:r>
+            <a:r>
+              <a:rPr lang="hu-HU" sz="2800" i="1" dirty="0" smtClean="0"/>
+              <a:t>támogathatna </a:t>
+            </a:r>
+            <a:r>
+              <a:rPr lang="hu-HU" sz="2800" i="1" dirty="0" smtClean="0"/>
+              <a:t>a Java nyelv</a:t>
+            </a:r>
+            <a:r>
+              <a:rPr lang="hu-HU" sz="2800" i="1" dirty="0" smtClean="0"/>
+              <a:t>?</a:t>
+            </a:r>
+            <a:r>
+              <a:rPr lang="en-US" sz="2800" i="1" dirty="0" smtClean="0"/>
+              <a:t>”</a:t>
+            </a:r>
+            <a:endParaRPr lang="hu-HU" sz="2800" i="1" dirty="0" smtClean="0"/>
+          </a:p>
+        </p:txBody>
+      </p:sp>
+      <p:sp>
+        <p:nvSpPr>
+          <p:cNvPr id="5" name="Tartalom helye 4"/>
+          <p:cNvSpPr>
+            <a:spLocks noGrp="1"/>
+          </p:cNvSpPr>
+          <p:nvPr>
+            <p:ph idx="1"/>
+          </p:nvPr>
+        </p:nvSpPr>
+        <p:spPr/>
+        <p:txBody>
+          <a:bodyPr>
+            <a:normAutofit/>
+          </a:bodyPr>
+          <a:lstStyle/>
+          <a:p>
+            <a:r>
+              <a:rPr lang="hu-HU" dirty="0" smtClean="0"/>
+              <a:t>Nem </a:t>
+            </a:r>
+            <a:r>
+              <a:rPr lang="hu-HU" dirty="0" smtClean="0"/>
+              <a:t>létezik a "komponens" fogalma </a:t>
+            </a:r>
+            <a:r>
+              <a:rPr lang="hu-HU" dirty="0" err="1" smtClean="0"/>
+              <a:t>Java-ban</a:t>
+            </a:r>
+            <a:endParaRPr lang="en-US" dirty="0" smtClean="0"/>
+          </a:p>
+          <a:p>
+            <a:pPr lvl="1"/>
+            <a:r>
+              <a:rPr lang="hu-HU" dirty="0" smtClean="0"/>
+              <a:t>Csak </a:t>
+            </a:r>
+            <a:r>
+              <a:rPr lang="hu-HU" dirty="0" smtClean="0"/>
+              <a:t>magasabb szinten van rá implementáció (Pl. </a:t>
+            </a:r>
+            <a:r>
+              <a:rPr lang="hu-HU" dirty="0" err="1" smtClean="0"/>
+              <a:t>OSGi</a:t>
+            </a:r>
+            <a:r>
+              <a:rPr lang="hu-HU" dirty="0" smtClean="0"/>
+              <a:t>)</a:t>
+            </a:r>
+            <a:endParaRPr lang="en-US" dirty="0" smtClean="0"/>
+          </a:p>
+          <a:p>
+            <a:pPr lvl="1"/>
+            <a:r>
+              <a:rPr lang="hu-HU" dirty="0" smtClean="0"/>
+              <a:t>Kézzel </a:t>
+            </a:r>
+            <a:r>
+              <a:rPr lang="hu-HU" dirty="0" smtClean="0"/>
+              <a:t>kell kikeresni, hogy hogyan oldja fel az import deklarációkat a JVM</a:t>
+            </a:r>
+          </a:p>
+          <a:p>
+            <a:r>
+              <a:rPr lang="hu-HU" dirty="0" smtClean="0"/>
+              <a:t>Megoldás </a:t>
+            </a:r>
+            <a:r>
+              <a:rPr lang="hu-HU" dirty="0" smtClean="0"/>
+              <a:t>Java 8-as </a:t>
+            </a:r>
+            <a:r>
+              <a:rPr lang="hu-HU" dirty="0" smtClean="0"/>
+              <a:t>verziójában</a:t>
+            </a:r>
+            <a:endParaRPr lang="en-US" dirty="0" smtClean="0"/>
+          </a:p>
+          <a:p>
+            <a:pPr lvl="1"/>
+            <a:r>
+              <a:rPr lang="hu-HU" dirty="0" smtClean="0"/>
+              <a:t>Project </a:t>
+            </a:r>
+            <a:r>
+              <a:rPr lang="hu-HU" dirty="0" err="1" smtClean="0"/>
+              <a:t>Jigsaw</a:t>
+            </a:r>
+            <a:endParaRPr lang="hu-HU" dirty="0"/>
+          </a:p>
+        </p:txBody>
+      </p:sp>
+      <p:sp>
+        <p:nvSpPr>
+          <p:cNvPr id="4" name="Slide Number Placeholder 3"/>
+          <p:cNvSpPr>
+            <a:spLocks noGrp="1"/>
+          </p:cNvSpPr>
+          <p:nvPr>
+            <p:ph type="sldNum" sz="quarter" idx="12"/>
+          </p:nvPr>
+        </p:nvSpPr>
+        <p:spPr/>
+        <p:txBody>
+          <a:bodyPr/>
+          <a:lstStyle/>
+          <a:p>
+            <a:fld id="{E5B09FA9-A177-4256-9C7F-5CF31ABA7234}" type="slidenum">
+              <a:rPr lang="en-US" smtClean="0"/>
+              <a:pPr/>
+              <a:t>21</a:t>
+            </a:fld>
+            <a:endParaRPr lang="en-US"/>
+          </a:p>
+        </p:txBody>
+      </p:sp>
+    </p:spTree>
+    <p:extLst>
+      <p:ext uri="{BB962C8B-B14F-4D97-AF65-F5344CB8AC3E}">
+        <p14:creationId xmlns:p14="http://schemas.microsoft.com/office/powerpoint/2010/main" xmlns="" val="1797703964"/>
+      </p:ext>
+    </p:extLst>
+  </p:cSld>
+  <p:clrMapOvr>
+    <a:masterClrMapping/>
+  </p:clrMapOvr>
+  <p:timing>
+    <p:tnLst>
+      <p:par>
+        <p:cTn id="1" dur="indefinite" restart="never" nodeType="tmRoot"/>
+      </p:par>
+    </p:tnLst>
+  </p:timing>
+</p:sld>
+</file>
+
+<file path=ppt/slides/slide22.xml><?xml version="1.0" encoding="utf-8"?>
+<p:sld xmlns:a="http://schemas.openxmlformats.org/drawingml/2006/main" xmlns:r="http://schemas.openxmlformats.org/officeDocument/2006/relationships" xmlns:p="http://schemas.openxmlformats.org/presentationml/2006/main">
+  <p:cSld>
+    <p:spTree>
+      <p:nvGrpSpPr>
+        <p:cNvPr id="1" name=""/>
+        <p:cNvGrpSpPr/>
+        <p:nvPr/>
+      </p:nvGrpSpPr>
+      <p:grpSpPr>
+        <a:xfrm>
+          <a:off x="0" y="0"/>
+          <a:ext cx="0" cy="0"/>
+          <a:chOff x="0" y="0"/>
+          <a:chExt cx="0" cy="0"/>
+        </a:xfrm>
+      </p:grpSpPr>
+      <p:sp>
+        <p:nvSpPr>
+          <p:cNvPr id="8" name="Title 7"/>
+          <p:cNvSpPr>
+            <a:spLocks noGrp="1"/>
+          </p:cNvSpPr>
+          <p:nvPr>
+            <p:ph type="title"/>
+          </p:nvPr>
+        </p:nvSpPr>
+        <p:spPr/>
+        <p:txBody>
+          <a:bodyPr>
+            <a:noAutofit/>
+          </a:bodyPr>
+          <a:lstStyle/>
+          <a:p>
+            <a:r>
+              <a:rPr lang="en-US" sz="2400" i="1" dirty="0" smtClean="0"/>
+              <a:t>“M</a:t>
+            </a:r>
+            <a:r>
+              <a:rPr lang="hu-HU" sz="2400" i="1" dirty="0" err="1" smtClean="0"/>
+              <a:t>egoldható-e</a:t>
+            </a:r>
+            <a:r>
+              <a:rPr lang="hu-HU" sz="2400" i="1" dirty="0" smtClean="0"/>
+              <a:t>, hogy a </a:t>
+            </a:r>
+            <a:r>
+              <a:rPr lang="hu-HU" sz="2400" i="1" dirty="0" err="1" smtClean="0"/>
+              <a:t>Workspace</a:t>
+            </a:r>
+            <a:r>
+              <a:rPr lang="hu-HU" sz="2400" i="1" dirty="0" smtClean="0"/>
+              <a:t> </a:t>
+            </a:r>
+            <a:r>
+              <a:rPr lang="hu-HU" sz="2400" i="1" dirty="0" err="1" smtClean="0"/>
+              <a:t>model</a:t>
+            </a:r>
+            <a:r>
+              <a:rPr lang="hu-HU" sz="2400" i="1" dirty="0" smtClean="0"/>
+              <a:t> </a:t>
+            </a:r>
+            <a:r>
+              <a:rPr lang="hu-HU" sz="2400" i="1" dirty="0" err="1" smtClean="0"/>
+              <a:t>generator</a:t>
+            </a:r>
+            <a:r>
+              <a:rPr lang="hu-HU" sz="2400" i="1" dirty="0" smtClean="0"/>
+              <a:t> komponens az </a:t>
+            </a:r>
+            <a:r>
+              <a:rPr lang="hu-HU" sz="2400" i="1" dirty="0" err="1" smtClean="0"/>
+              <a:t>Eclipse</a:t>
+            </a:r>
+            <a:r>
+              <a:rPr lang="hu-HU" sz="2400" i="1" dirty="0" smtClean="0"/>
+              <a:t> által fordított </a:t>
+            </a:r>
+            <a:r>
+              <a:rPr lang="hu-HU" sz="2400" i="1" dirty="0" err="1" smtClean="0"/>
+              <a:t>class</a:t>
+            </a:r>
+            <a:r>
+              <a:rPr lang="hu-HU" sz="2400" i="1" dirty="0" smtClean="0"/>
+              <a:t> fájlokból építse fel a modellt, hogy ne kelljen két különböző modellépítő komponenst írni? Mitől jobb a JDT megközelítés, mint az </a:t>
+            </a:r>
+            <a:r>
+              <a:rPr lang="hu-HU" sz="2400" i="1" dirty="0" err="1" smtClean="0"/>
+              <a:t>apache</a:t>
+            </a:r>
+            <a:r>
+              <a:rPr lang="hu-HU" sz="2400" i="1" dirty="0" smtClean="0"/>
+              <a:t> BCEL</a:t>
+            </a:r>
+            <a:r>
+              <a:rPr lang="hu-HU" sz="2400" i="1" dirty="0" smtClean="0"/>
+              <a:t>?</a:t>
+            </a:r>
+            <a:r>
+              <a:rPr lang="en-US" sz="2400" i="1" dirty="0" smtClean="0"/>
+              <a:t>”</a:t>
+            </a:r>
+            <a:endParaRPr lang="hu-HU" sz="2400" i="1" dirty="0" smtClean="0"/>
+          </a:p>
+        </p:txBody>
+      </p:sp>
+      <p:sp>
+        <p:nvSpPr>
+          <p:cNvPr id="5" name="Tartalom helye 4"/>
+          <p:cNvSpPr>
+            <a:spLocks noGrp="1"/>
+          </p:cNvSpPr>
+          <p:nvPr>
+            <p:ph idx="1"/>
+          </p:nvPr>
+        </p:nvSpPr>
+        <p:spPr/>
+        <p:txBody>
+          <a:bodyPr>
+            <a:normAutofit fontScale="92500" lnSpcReduction="10000"/>
+          </a:bodyPr>
+          <a:lstStyle/>
+          <a:p>
+            <a:r>
+              <a:rPr lang="hu-HU" dirty="0" smtClean="0"/>
+              <a:t>Megoldható, </a:t>
+            </a:r>
+            <a:r>
+              <a:rPr lang="hu-HU" dirty="0" smtClean="0"/>
+              <a:t>de</a:t>
+            </a:r>
+            <a:endParaRPr lang="en-US" dirty="0" smtClean="0"/>
+          </a:p>
+          <a:p>
+            <a:pPr lvl="1"/>
+            <a:r>
+              <a:rPr lang="hu-HU" dirty="0" smtClean="0"/>
+              <a:t>BCEL erőforrás igényes</a:t>
+            </a:r>
+            <a:endParaRPr lang="en-US" dirty="0" smtClean="0"/>
+          </a:p>
+          <a:p>
+            <a:pPr lvl="2"/>
+            <a:r>
+              <a:rPr lang="hu-HU" dirty="0" smtClean="0"/>
+              <a:t>Minden </a:t>
+            </a:r>
+            <a:r>
+              <a:rPr lang="hu-HU" dirty="0" smtClean="0"/>
+              <a:t>változtatáskor az egész </a:t>
+            </a:r>
+            <a:r>
+              <a:rPr lang="hu-HU" dirty="0" err="1" smtClean="0"/>
+              <a:t>class</a:t>
+            </a:r>
+            <a:r>
+              <a:rPr lang="hu-HU" dirty="0" smtClean="0"/>
+              <a:t> állományt fel kell </a:t>
+            </a:r>
+            <a:r>
+              <a:rPr lang="hu-HU" dirty="0" smtClean="0"/>
+              <a:t>dolgozni</a:t>
+            </a:r>
+            <a:endParaRPr lang="en-US" dirty="0" smtClean="0"/>
+          </a:p>
+          <a:p>
+            <a:pPr lvl="2"/>
+            <a:r>
+              <a:rPr lang="hu-HU" dirty="0" smtClean="0"/>
+              <a:t>Csak </a:t>
+            </a:r>
+            <a:r>
+              <a:rPr lang="hu-HU" dirty="0" smtClean="0"/>
+              <a:t>bináris információk érhetőek el </a:t>
+            </a:r>
+            <a:r>
+              <a:rPr lang="hu-HU" dirty="0" smtClean="0"/>
+              <a:t>belőle</a:t>
+            </a:r>
+            <a:endParaRPr lang="en-US" dirty="0" smtClean="0"/>
+          </a:p>
+          <a:p>
+            <a:pPr lvl="1"/>
+            <a:r>
+              <a:rPr lang="hu-HU" dirty="0" smtClean="0"/>
+              <a:t>JDT </a:t>
+            </a:r>
+            <a:r>
+              <a:rPr lang="hu-HU" dirty="0" smtClean="0"/>
+              <a:t>ezzel </a:t>
+            </a:r>
+            <a:r>
+              <a:rPr lang="hu-HU" dirty="0" smtClean="0"/>
+              <a:t>szemben</a:t>
+            </a:r>
+            <a:endParaRPr lang="en-US" dirty="0" smtClean="0"/>
+          </a:p>
+          <a:p>
+            <a:pPr lvl="2"/>
+            <a:r>
+              <a:rPr lang="hu-HU" dirty="0" smtClean="0"/>
+              <a:t>Függőségek </a:t>
+            </a:r>
+            <a:r>
+              <a:rPr lang="hu-HU" dirty="0" smtClean="0"/>
+              <a:t>lekérdezése alapból benne </a:t>
+            </a:r>
+            <a:r>
+              <a:rPr lang="hu-HU" dirty="0" smtClean="0"/>
+              <a:t>van</a:t>
+            </a:r>
+            <a:endParaRPr lang="en-US" dirty="0" smtClean="0"/>
+          </a:p>
+          <a:p>
+            <a:pPr lvl="2"/>
+            <a:r>
+              <a:rPr lang="hu-HU" dirty="0" smtClean="0"/>
+              <a:t>Inkrementális modellfrissítés</a:t>
+            </a:r>
+            <a:endParaRPr lang="en-US" dirty="0" smtClean="0"/>
+          </a:p>
+          <a:p>
+            <a:pPr lvl="2"/>
+            <a:r>
+              <a:rPr lang="hu-HU" dirty="0" smtClean="0"/>
+              <a:t>Több </a:t>
+            </a:r>
+            <a:r>
+              <a:rPr lang="hu-HU" dirty="0" smtClean="0"/>
+              <a:t>hozzáférhető </a:t>
+            </a:r>
+            <a:r>
+              <a:rPr lang="hu-HU" dirty="0" smtClean="0"/>
+              <a:t>információ</a:t>
+            </a:r>
+            <a:endParaRPr lang="en-US" dirty="0" smtClean="0"/>
+          </a:p>
+          <a:p>
+            <a:pPr lvl="2"/>
+            <a:r>
+              <a:rPr lang="hu-HU" dirty="0" smtClean="0"/>
+              <a:t>Nem </a:t>
+            </a:r>
+            <a:r>
+              <a:rPr lang="hu-HU" dirty="0" smtClean="0"/>
+              <a:t>kell </a:t>
+            </a:r>
+            <a:r>
+              <a:rPr lang="hu-HU" dirty="0" smtClean="0"/>
+              <a:t>bináris</a:t>
+            </a:r>
+            <a:r>
+              <a:rPr lang="en-US" dirty="0" smtClean="0"/>
+              <a:t> → </a:t>
+            </a:r>
+            <a:r>
+              <a:rPr lang="hu-HU" dirty="0" smtClean="0"/>
+              <a:t>forráskód konverzió</a:t>
+            </a:r>
+            <a:endParaRPr lang="en-US" dirty="0" smtClean="0"/>
+          </a:p>
+          <a:p>
+            <a:pPr lvl="2"/>
+            <a:r>
+              <a:rPr lang="hu-HU" dirty="0" smtClean="0"/>
+              <a:t>Közvetlen </a:t>
+            </a:r>
+            <a:r>
+              <a:rPr lang="hu-HU" dirty="0" smtClean="0"/>
+              <a:t>kötés a forráskód és a UI elemek között</a:t>
+            </a:r>
+            <a:endParaRPr lang="hu-HU" dirty="0"/>
+          </a:p>
+        </p:txBody>
+      </p:sp>
+      <p:sp>
+        <p:nvSpPr>
+          <p:cNvPr id="4" name="Slide Number Placeholder 3"/>
+          <p:cNvSpPr>
+            <a:spLocks noGrp="1"/>
+          </p:cNvSpPr>
+          <p:nvPr>
+            <p:ph type="sldNum" sz="quarter" idx="12"/>
+          </p:nvPr>
+        </p:nvSpPr>
+        <p:spPr/>
+        <p:txBody>
+          <a:bodyPr/>
+          <a:lstStyle/>
+          <a:p>
+            <a:fld id="{E5B09FA9-A177-4256-9C7F-5CF31ABA7234}" type="slidenum">
+              <a:rPr lang="en-US" smtClean="0"/>
+              <a:pPr/>
+              <a:t>22</a:t>
+            </a:fld>
+            <a:endParaRPr lang="en-US"/>
+          </a:p>
+        </p:txBody>
+      </p:sp>
+    </p:spTree>
+    <p:extLst>
+      <p:ext uri="{BB962C8B-B14F-4D97-AF65-F5344CB8AC3E}">
+        <p14:creationId xmlns:p14="http://schemas.microsoft.com/office/powerpoint/2010/main" xmlns="" val="1797703964"/>
+      </p:ext>
+    </p:extLst>
+  </p:cSld>
+  <p:clrMapOvr>
+    <a:masterClrMapping/>
+  </p:clrMapOvr>
+  <p:timing>
+    <p:tnLst>
+      <p:par>
+        <p:cTn id="1" dur="indefinite" restart="never" nodeType="tmRoot"/>
+      </p:par>
+    </p:tnLst>
+  </p:timing>
+</p:sld>
+</file>
+
+<file path=ppt/slides/slide23.xml><?xml version="1.0" encoding="utf-8"?>
+<p:sld xmlns:a="http://schemas.openxmlformats.org/drawingml/2006/main" xmlns:r="http://schemas.openxmlformats.org/officeDocument/2006/relationships" xmlns:p="http://schemas.openxmlformats.org/presentationml/2006/main">
+  <p:cSld>
+    <p:spTree>
+      <p:nvGrpSpPr>
+        <p:cNvPr id="1" name=""/>
+        <p:cNvGrpSpPr/>
+        <p:nvPr/>
+      </p:nvGrpSpPr>
+      <p:grpSpPr>
+        <a:xfrm>
+          <a:off x="0" y="0"/>
+          <a:ext cx="0" cy="0"/>
+          <a:chOff x="0" y="0"/>
+          <a:chExt cx="0" cy="0"/>
+        </a:xfrm>
+      </p:grpSpPr>
+      <p:sp>
+        <p:nvSpPr>
+          <p:cNvPr id="8" name="Title 7"/>
+          <p:cNvSpPr>
+            <a:spLocks noGrp="1"/>
+          </p:cNvSpPr>
+          <p:nvPr>
+            <p:ph type="title"/>
+          </p:nvPr>
+        </p:nvSpPr>
+        <p:spPr/>
+        <p:txBody>
+          <a:bodyPr>
+            <a:noAutofit/>
+          </a:bodyPr>
+          <a:lstStyle/>
+          <a:p>
+            <a:r>
+              <a:rPr lang="en-US" sz="2800" i="1" dirty="0" smtClean="0"/>
+              <a:t>“</a:t>
+            </a:r>
+            <a:r>
+              <a:rPr lang="hu-HU" sz="2800" i="1" dirty="0" smtClean="0"/>
+              <a:t>Az </a:t>
+            </a:r>
+            <a:r>
+              <a:rPr lang="hu-HU" sz="2800" i="1" dirty="0" smtClean="0"/>
+              <a:t>automatikusan generált forráskód valóban kizárja a forráskód alapján történő analízist?</a:t>
+            </a:r>
+            <a:r>
+              <a:rPr lang="en-US" sz="2800" i="1" dirty="0" smtClean="0"/>
+              <a:t>”</a:t>
+            </a:r>
+            <a:endParaRPr lang="hu-HU" sz="2800" i="1" dirty="0" smtClean="0"/>
+          </a:p>
+        </p:txBody>
+      </p:sp>
+      <p:sp>
+        <p:nvSpPr>
+          <p:cNvPr id="5" name="Tartalom helye 4"/>
+          <p:cNvSpPr>
+            <a:spLocks noGrp="1"/>
+          </p:cNvSpPr>
+          <p:nvPr>
+            <p:ph idx="1"/>
+          </p:nvPr>
+        </p:nvSpPr>
+        <p:spPr/>
+        <p:txBody>
+          <a:bodyPr>
+            <a:normAutofit/>
+          </a:bodyPr>
+          <a:lstStyle/>
+          <a:p>
+            <a:r>
+              <a:rPr lang="hu-HU" dirty="0" err="1" smtClean="0"/>
+              <a:t>CERN-specifikus</a:t>
+            </a:r>
+            <a:r>
+              <a:rPr lang="hu-HU" dirty="0" smtClean="0"/>
+              <a:t> kitétel volt, hogy binárisokon dolgozunk</a:t>
+            </a:r>
+            <a:r>
+              <a:rPr lang="hu-HU" dirty="0" smtClean="0"/>
+              <a:t>.</a:t>
+            </a:r>
+          </a:p>
+          <a:p>
+            <a:pPr lvl="1"/>
+            <a:r>
+              <a:rPr lang="hu-HU" dirty="0" smtClean="0"/>
+              <a:t>Egyedi </a:t>
+            </a:r>
+            <a:r>
+              <a:rPr lang="hu-HU" dirty="0" smtClean="0"/>
+              <a:t>esetek, a forráskódból deríthető fel automatizálva </a:t>
+            </a:r>
+            <a:r>
+              <a:rPr lang="hu-HU" dirty="0" smtClean="0"/>
+              <a:t>minden</a:t>
+            </a:r>
+          </a:p>
+          <a:p>
+            <a:pPr lvl="1"/>
+            <a:r>
+              <a:rPr lang="hu-HU" dirty="0" smtClean="0"/>
+              <a:t>De: egységes bináris tároló</a:t>
+            </a:r>
+          </a:p>
+          <a:p>
+            <a:pPr lvl="2"/>
+            <a:r>
+              <a:rPr lang="hu-HU" dirty="0" smtClean="0"/>
+              <a:t>Konzisztens</a:t>
+            </a:r>
+          </a:p>
+          <a:p>
+            <a:pPr lvl="2"/>
+            <a:r>
+              <a:rPr lang="hu-HU" dirty="0" smtClean="0"/>
+              <a:t>Minden elemet tartalmaz</a:t>
+            </a:r>
+          </a:p>
+          <a:p>
+            <a:pPr lvl="1"/>
+            <a:endParaRPr lang="hu-HU" dirty="0"/>
+          </a:p>
+        </p:txBody>
+      </p:sp>
+      <p:sp>
+        <p:nvSpPr>
+          <p:cNvPr id="4" name="Slide Number Placeholder 3"/>
+          <p:cNvSpPr>
+            <a:spLocks noGrp="1"/>
+          </p:cNvSpPr>
+          <p:nvPr>
+            <p:ph type="sldNum" sz="quarter" idx="12"/>
+          </p:nvPr>
+        </p:nvSpPr>
+        <p:spPr/>
+        <p:txBody>
+          <a:bodyPr/>
+          <a:lstStyle/>
+          <a:p>
+            <a:fld id="{E5B09FA9-A177-4256-9C7F-5CF31ABA7234}" type="slidenum">
+              <a:rPr lang="en-US" smtClean="0"/>
+              <a:pPr/>
+              <a:t>23</a:t>
+            </a:fld>
+            <a:endParaRPr lang="en-US"/>
+          </a:p>
+        </p:txBody>
+      </p:sp>
+    </p:spTree>
+    <p:extLst>
+      <p:ext uri="{BB962C8B-B14F-4D97-AF65-F5344CB8AC3E}">
+        <p14:creationId xmlns:p14="http://schemas.microsoft.com/office/powerpoint/2010/main" xmlns="" val="1797703964"/>
+      </p:ext>
+    </p:extLst>
+  </p:cSld>
+  <p:clrMapOvr>
+    <a:masterClrMapping/>
+  </p:clrMapOvr>
+  <p:timing>
+    <p:tnLst>
+      <p:par>
+        <p:cTn id="1" dur="indefinite" restart="never" nodeType="tmRoot"/>
+      </p:par>
+    </p:tnLst>
+  </p:timing>
+</p:sld>
+</file>
+
 <file path=ppt/slides/slide3.xml><?xml version="1.0" encoding="utf-8"?>
 <p:sld xmlns:a="http://schemas.openxmlformats.org/drawingml/2006/main" xmlns:r="http://schemas.openxmlformats.org/officeDocument/2006/relationships" xmlns:p="http://schemas.openxmlformats.org/presentationml/2006/main">
   <p:cSld>
@@ -9364,6 +10259,7 @@
           <a:p>
             <a:fld id="{E5B09FA9-A177-4256-9C7F-5CF31ABA7234}" type="slidenum">
               <a:rPr lang="en-US" smtClean="0"/>
+              <a:pPr/>
               <a:t>3</a:t>
             </a:fld>
             <a:endParaRPr lang="en-US"/>
@@ -9707,7 +10603,7 @@
     </p:spTree>
     <p:extLst>
       <p:ext uri="{BB962C8B-B14F-4D97-AF65-F5344CB8AC3E}">
-        <p14:creationId xmlns:p14="http://schemas.microsoft.com/office/powerpoint/2010/main" val="2670301997"/>
+        <p14:creationId xmlns:p14="http://schemas.microsoft.com/office/powerpoint/2010/main" xmlns="" val="2670301997"/>
       </p:ext>
     </p:extLst>
   </p:cSld>
@@ -10015,6 +10911,7 @@
           <a:p>
             <a:fld id="{E5B09FA9-A177-4256-9C7F-5CF31ABA7234}" type="slidenum">
               <a:rPr lang="en-US" smtClean="0"/>
+              <a:pPr/>
               <a:t>4</a:t>
             </a:fld>
             <a:endParaRPr lang="en-US"/>
@@ -10024,7 +10921,7 @@
     </p:spTree>
     <p:extLst>
       <p:ext uri="{BB962C8B-B14F-4D97-AF65-F5344CB8AC3E}">
-        <p14:creationId xmlns:p14="http://schemas.microsoft.com/office/powerpoint/2010/main" val="2033946797"/>
+        <p14:creationId xmlns:p14="http://schemas.microsoft.com/office/powerpoint/2010/main" xmlns="" val="2033946797"/>
       </p:ext>
     </p:extLst>
   </p:cSld>
@@ -10809,7 +11706,7 @@
             <a:blip r:embed="rId3" cstate="print">
               <a:extLst>
                 <a:ext uri="{BEBA8EAE-BF5A-486C-A8C5-ECC9F3942E4B}">
-                  <a14:imgProps xmlns:a14="http://schemas.microsoft.com/office/drawing/2010/main">
+                  <a14:imgProps xmlns:a14="http://schemas.microsoft.com/office/drawing/2010/main" xmlns="">
                     <a14:imgLayer r:embed="rId4">
                       <a14:imgEffect>
                         <a14:backgroundRemoval t="0" b="99603" l="0" r="100000"/>
@@ -10818,7 +11715,7 @@
                   </a14:imgProps>
                 </a:ext>
                 <a:ext uri="{28A0092B-C50C-407E-A947-70E740481C1C}">
-                  <a14:useLocalDpi xmlns:a14="http://schemas.microsoft.com/office/drawing/2010/main" val="0"/>
+                  <a14:useLocalDpi xmlns:a14="http://schemas.microsoft.com/office/drawing/2010/main" xmlns="" val="0"/>
                 </a:ext>
               </a:extLst>
             </a:blip>
@@ -10842,14 +11739,14 @@
             <a:effectLst/>
             <a:extLst>
               <a:ext uri="{909E8E84-426E-40DD-AFC4-6F175D3DCCD1}">
-                <a14:hiddenFill xmlns:a14="http://schemas.microsoft.com/office/drawing/2010/main">
+                <a14:hiddenFill xmlns:a14="http://schemas.microsoft.com/office/drawing/2010/main" xmlns="">
                   <a:solidFill>
                     <a:schemeClr val="accent1"/>
                   </a:solidFill>
                 </a14:hiddenFill>
               </a:ext>
               <a:ext uri="{91240B29-F687-4F45-9708-019B960494DF}">
-                <a14:hiddenLine xmlns:a14="http://schemas.microsoft.com/office/drawing/2010/main" w="9525">
+                <a14:hiddenLine xmlns:a14="http://schemas.microsoft.com/office/drawing/2010/main" xmlns="" w="9525">
                   <a:solidFill>
                     <a:schemeClr val="tx1"/>
                   </a:solidFill>
@@ -10859,7 +11756,7 @@
                 </a14:hiddenLine>
               </a:ext>
               <a:ext uri="{AF507438-7753-43E0-B8FC-AC1667EBCBE1}">
-                <a14:hiddenEffects xmlns:a14="http://schemas.microsoft.com/office/drawing/2010/main">
+                <a14:hiddenEffects xmlns:a14="http://schemas.microsoft.com/office/drawing/2010/main" xmlns="">
                   <a:effectLst>
                     <a:outerShdw dist="35921" dir="2700000" algn="ctr" rotWithShape="0">
                       <a:schemeClr val="bg2"/>
@@ -11023,6 +11920,7 @@
           <a:p>
             <a:fld id="{E5B09FA9-A177-4256-9C7F-5CF31ABA7234}" type="slidenum">
               <a:rPr lang="en-US" smtClean="0"/>
+              <a:pPr/>
               <a:t>5</a:t>
             </a:fld>
             <a:endParaRPr lang="en-US"/>
@@ -11128,11 +12026,7 @@
               </a:pPr>
               <a:r>
                 <a:rPr lang="hu-HU" sz="2800" dirty="0" smtClean="0"/>
-                <a:t>Függőségi  </a:t>
-              </a:r>
-              <a:r>
-                <a:rPr lang="hu-HU" sz="2800" dirty="0" smtClean="0"/>
-                <a:t>modell karbantartása új verziók esetén</a:t>
+                <a:t>Függőségi  modell karbantartása új verziók esetén</a:t>
               </a:r>
               <a:endParaRPr lang="hu-HU" sz="2800" dirty="0"/>
             </a:p>
@@ -11174,11 +12068,7 @@
               <a:pPr lvl="1"/>
               <a:r>
                 <a:rPr lang="hu-HU" sz="2800" b="1" dirty="0" smtClean="0"/>
-                <a:t>Függőségi információk </a:t>
-              </a:r>
-              <a:r>
-                <a:rPr lang="hu-HU" sz="2800" b="1" dirty="0" smtClean="0"/>
-                <a:t>megjelenítése </a:t>
+                <a:t>Függőségi információk megjelenítése </a:t>
               </a:r>
               <a:r>
                 <a:rPr lang="hu-HU" sz="2800" dirty="0" smtClean="0"/>
@@ -11205,11 +12095,7 @@
               </a:r>
               <a:r>
                 <a:rPr lang="hu-HU" sz="2800" dirty="0" smtClean="0"/>
-                <a:t>a függőségi </a:t>
-              </a:r>
-              <a:r>
-                <a:rPr lang="hu-HU" sz="2800" dirty="0" smtClean="0"/>
-                <a:t>modellen</a:t>
+                <a:t>a függőségi modellen</a:t>
               </a:r>
               <a:endParaRPr lang="hu-HU" sz="2800" dirty="0"/>
             </a:p>
@@ -11238,7 +12124,7 @@
     </p:spTree>
     <p:extLst>
       <p:ext uri="{BB962C8B-B14F-4D97-AF65-F5344CB8AC3E}">
-        <p14:creationId xmlns:p14="http://schemas.microsoft.com/office/powerpoint/2010/main" val="714506859"/>
+        <p14:creationId xmlns:p14="http://schemas.microsoft.com/office/powerpoint/2010/main" xmlns="" val="714506859"/>
       </p:ext>
     </p:extLst>
   </p:cSld>
@@ -11724,6 +12610,7 @@
           <a:p>
             <a:fld id="{E5B09FA9-A177-4256-9C7F-5CF31ABA7234}" type="slidenum">
               <a:rPr lang="en-US" smtClean="0"/>
+              <a:pPr/>
               <a:t>6</a:t>
             </a:fld>
             <a:endParaRPr lang="en-US"/>
@@ -11742,7 +12629,7 @@
           <a:blip r:embed="rId2">
             <a:extLst>
               <a:ext uri="{28A0092B-C50C-407E-A947-70E740481C1C}">
-                <a14:useLocalDpi xmlns:a14="http://schemas.microsoft.com/office/drawing/2010/main" val="0"/>
+                <a14:useLocalDpi xmlns:a14="http://schemas.microsoft.com/office/drawing/2010/main" xmlns="" val="0"/>
               </a:ext>
             </a:extLst>
           </a:blip>
@@ -11760,7 +12647,7 @@
           <a:noFill/>
           <a:extLst>
             <a:ext uri="{909E8E84-426E-40DD-AFC4-6F175D3DCCD1}">
-              <a14:hiddenFill xmlns:a14="http://schemas.microsoft.com/office/drawing/2010/main">
+              <a14:hiddenFill xmlns:a14="http://schemas.microsoft.com/office/drawing/2010/main" xmlns="">
                 <a:solidFill>
                   <a:srgbClr val="FFFFFF"/>
                 </a:solidFill>
@@ -11781,7 +12668,7 @@
           <a:blip r:embed="rId3">
             <a:extLst>
               <a:ext uri="{28A0092B-C50C-407E-A947-70E740481C1C}">
-                <a14:useLocalDpi xmlns:a14="http://schemas.microsoft.com/office/drawing/2010/main" val="0"/>
+                <a14:useLocalDpi xmlns:a14="http://schemas.microsoft.com/office/drawing/2010/main" xmlns="" val="0"/>
               </a:ext>
             </a:extLst>
           </a:blip>
@@ -11799,7 +12686,7 @@
           <a:noFill/>
           <a:extLst>
             <a:ext uri="{909E8E84-426E-40DD-AFC4-6F175D3DCCD1}">
-              <a14:hiddenFill xmlns:a14="http://schemas.microsoft.com/office/drawing/2010/main">
+              <a14:hiddenFill xmlns:a14="http://schemas.microsoft.com/office/drawing/2010/main" xmlns="">
                 <a:solidFill>
                   <a:srgbClr val="FFFFFF"/>
                 </a:solidFill>
@@ -11811,7 +12698,7 @@
     </p:spTree>
     <p:extLst>
       <p:ext uri="{BB962C8B-B14F-4D97-AF65-F5344CB8AC3E}">
-        <p14:creationId xmlns:p14="http://schemas.microsoft.com/office/powerpoint/2010/main" val="2658120881"/>
+        <p14:creationId xmlns:p14="http://schemas.microsoft.com/office/powerpoint/2010/main" xmlns="" val="2658120881"/>
       </p:ext>
     </p:extLst>
   </p:cSld>
@@ -12026,6 +12913,7 @@
           <a:p>
             <a:fld id="{E5B09FA9-A177-4256-9C7F-5CF31ABA7234}" type="slidenum">
               <a:rPr lang="en-US" smtClean="0"/>
+              <a:pPr/>
               <a:t>7</a:t>
             </a:fld>
             <a:endParaRPr lang="en-US"/>
@@ -12035,7 +12923,7 @@
     </p:spTree>
     <p:extLst>
       <p:ext uri="{BB962C8B-B14F-4D97-AF65-F5344CB8AC3E}">
-        <p14:creationId xmlns:p14="http://schemas.microsoft.com/office/powerpoint/2010/main" val="2653287153"/>
+        <p14:creationId xmlns:p14="http://schemas.microsoft.com/office/powerpoint/2010/main" xmlns="" val="2653287153"/>
       </p:ext>
     </p:extLst>
   </p:cSld>
@@ -12505,7 +13393,7 @@
             <a:blip r:embed="rId3" cstate="print">
               <a:extLst>
                 <a:ext uri="{BEBA8EAE-BF5A-486C-A8C5-ECC9F3942E4B}">
-                  <a14:imgProps xmlns:a14="http://schemas.microsoft.com/office/drawing/2010/main">
+                  <a14:imgProps xmlns:a14="http://schemas.microsoft.com/office/drawing/2010/main" xmlns="">
                     <a14:imgLayer r:embed="rId4">
                       <a14:imgEffect>
                         <a14:backgroundRemoval t="0" b="99603" l="0" r="100000"/>
@@ -12514,7 +13402,7 @@
                   </a14:imgProps>
                 </a:ext>
                 <a:ext uri="{28A0092B-C50C-407E-A947-70E740481C1C}">
-                  <a14:useLocalDpi xmlns:a14="http://schemas.microsoft.com/office/drawing/2010/main" val="0"/>
+                  <a14:useLocalDpi xmlns:a14="http://schemas.microsoft.com/office/drawing/2010/main" xmlns="" val="0"/>
                 </a:ext>
               </a:extLst>
             </a:blip>
@@ -12538,14 +13426,14 @@
             <a:effectLst/>
             <a:extLst>
               <a:ext uri="{909E8E84-426E-40DD-AFC4-6F175D3DCCD1}">
-                <a14:hiddenFill xmlns:a14="http://schemas.microsoft.com/office/drawing/2010/main">
+                <a14:hiddenFill xmlns:a14="http://schemas.microsoft.com/office/drawing/2010/main" xmlns="">
                   <a:solidFill>
                     <a:schemeClr val="accent1"/>
                   </a:solidFill>
                 </a14:hiddenFill>
               </a:ext>
               <a:ext uri="{91240B29-F687-4F45-9708-019B960494DF}">
-                <a14:hiddenLine xmlns:a14="http://schemas.microsoft.com/office/drawing/2010/main" w="9525">
+                <a14:hiddenLine xmlns:a14="http://schemas.microsoft.com/office/drawing/2010/main" xmlns="" w="9525">
                   <a:solidFill>
                     <a:schemeClr val="tx1"/>
                   </a:solidFill>
@@ -12555,7 +13443,7 @@
                 </a14:hiddenLine>
               </a:ext>
               <a:ext uri="{AF507438-7753-43E0-B8FC-AC1667EBCBE1}">
-                <a14:hiddenEffects xmlns:a14="http://schemas.microsoft.com/office/drawing/2010/main">
+                <a14:hiddenEffects xmlns:a14="http://schemas.microsoft.com/office/drawing/2010/main" xmlns="">
                   <a:effectLst>
                     <a:outerShdw dist="35921" dir="2700000" algn="ctr" rotWithShape="0">
                       <a:schemeClr val="bg2"/>
@@ -13343,6 +14231,7 @@
           <a:p>
             <a:fld id="{E5B09FA9-A177-4256-9C7F-5CF31ABA7234}" type="slidenum">
               <a:rPr lang="en-US" smtClean="0"/>
+              <a:pPr/>
               <a:t>8</a:t>
             </a:fld>
             <a:endParaRPr lang="en-US"/>
@@ -13352,7 +14241,7 @@
     </p:spTree>
     <p:extLst>
       <p:ext uri="{BB962C8B-B14F-4D97-AF65-F5344CB8AC3E}">
-        <p14:creationId xmlns:p14="http://schemas.microsoft.com/office/powerpoint/2010/main" val="3235243867"/>
+        <p14:creationId xmlns:p14="http://schemas.microsoft.com/office/powerpoint/2010/main" xmlns="" val="3235243867"/>
       </p:ext>
     </p:extLst>
   </p:cSld>
@@ -15460,6 +16349,7 @@
           <a:p>
             <a:fld id="{E5B09FA9-A177-4256-9C7F-5CF31ABA7234}" type="slidenum">
               <a:rPr lang="en-US" smtClean="0"/>
+              <a:pPr/>
               <a:t>9</a:t>
             </a:fld>
             <a:endParaRPr lang="en-US"/>
@@ -15469,7 +16359,7 @@
     </p:spTree>
     <p:extLst>
       <p:ext uri="{BB962C8B-B14F-4D97-AF65-F5344CB8AC3E}">
-        <p14:creationId xmlns:p14="http://schemas.microsoft.com/office/powerpoint/2010/main" val="1158459625"/>
+        <p14:creationId xmlns:p14="http://schemas.microsoft.com/office/powerpoint/2010/main" xmlns="" val="1158459625"/>
       </p:ext>
     </p:extLst>
   </p:cSld>

</xml_diff>

<commit_message>
Presentation practiced: typos, content fixed.
</commit_message>
<xml_diff>
--- a/incquery-deps-thesis/presentation/zv_csikos_donat.pptx
+++ b/incquery-deps-thesis/presentation/zv_csikos_donat.pptx
@@ -163,9 +163,9 @@
           <c:xMode val="edge"/>
           <c:yMode val="edge"/>
           <c:x val="9.2949199107120961E-2"/>
-          <c:y val="0.17004210411198603"/>
-          <c:w val="0.88817816175755793"/>
-          <c:h val="0.63050757768182208"/>
+          <c:y val="0.17004210411198609"/>
+          <c:w val="0.8881781617575577"/>
+          <c:h val="0.63050757768182231"/>
         </c:manualLayout>
       </c:layout>
       <c:lineChart>
@@ -287,13 +287,12 @@
             </c:numRef>
           </c:val>
         </c:ser>
-        <c:dLbls/>
         <c:marker val="1"/>
-        <c:axId val="73126272"/>
-        <c:axId val="73128192"/>
+        <c:axId val="64293120"/>
+        <c:axId val="35086720"/>
       </c:lineChart>
       <c:catAx>
-        <c:axId val="73126272"/>
+        <c:axId val="64293120"/>
         <c:scaling>
           <c:orientation val="minMax"/>
         </c:scaling>
@@ -333,7 +332,7 @@
             <a:endParaRPr lang="en-US"/>
           </a:p>
         </c:txPr>
-        <c:crossAx val="73128192"/>
+        <c:crossAx val="35086720"/>
         <c:crosses val="autoZero"/>
         <c:lblAlgn val="ctr"/>
         <c:lblOffset val="0"/>
@@ -341,7 +340,7 @@
         <c:tickMarkSkip val="10"/>
       </c:catAx>
       <c:valAx>
-        <c:axId val="73128192"/>
+        <c:axId val="35086720"/>
         <c:scaling>
           <c:orientation val="minMax"/>
         </c:scaling>
@@ -378,7 +377,7 @@
             <a:endParaRPr lang="en-US"/>
           </a:p>
         </c:txPr>
-        <c:crossAx val="73126272"/>
+        <c:crossAx val="64293120"/>
         <c:crosses val="autoZero"/>
         <c:crossBetween val="between"/>
       </c:valAx>
@@ -474,13 +473,12 @@
             </c:numRef>
           </c:val>
         </c:ser>
-        <c:dLbls/>
         <c:marker val="1"/>
-        <c:axId val="72988928"/>
-        <c:axId val="73137152"/>
+        <c:axId val="35105408"/>
+        <c:axId val="64439040"/>
       </c:lineChart>
       <c:catAx>
-        <c:axId val="72988928"/>
+        <c:axId val="35105408"/>
         <c:scaling>
           <c:orientation val="minMax"/>
         </c:scaling>
@@ -520,14 +518,14 @@
             <a:endParaRPr lang="en-US"/>
           </a:p>
         </c:txPr>
-        <c:crossAx val="73137152"/>
+        <c:crossAx val="64439040"/>
         <c:crosses val="autoZero"/>
         <c:auto val="1"/>
         <c:lblAlgn val="ctr"/>
         <c:lblOffset val="100"/>
       </c:catAx>
       <c:valAx>
-        <c:axId val="73137152"/>
+        <c:axId val="64439040"/>
         <c:scaling>
           <c:orientation val="minMax"/>
         </c:scaling>
@@ -564,7 +562,7 @@
             <a:endParaRPr lang="en-US"/>
           </a:p>
         </c:txPr>
-        <c:crossAx val="72988928"/>
+        <c:crossAx val="35105408"/>
         <c:crosses val="autoZero"/>
         <c:crossBetween val="between"/>
       </c:valAx>
@@ -578,6 +576,7 @@
 
 <file path=ppt/charts/chart3.xml><?xml version="1.0" encoding="utf-8"?>
 <c:chartSpace xmlns:c="http://schemas.openxmlformats.org/drawingml/2006/chart" xmlns:a="http://schemas.openxmlformats.org/drawingml/2006/main" xmlns:r="http://schemas.openxmlformats.org/officeDocument/2006/relationships">
+  <c:date1904 val="1"/>
   <c:lang val="en-US"/>
   <c:chart>
     <c:title>
@@ -660,13 +659,12 @@
             </c:numRef>
           </c:val>
         </c:ser>
-        <c:dLbls/>
         <c:marker val="1"/>
-        <c:axId val="34599296"/>
-        <c:axId val="34601216"/>
+        <c:axId val="64968192"/>
+        <c:axId val="64970112"/>
       </c:lineChart>
       <c:catAx>
-        <c:axId val="34599296"/>
+        <c:axId val="64968192"/>
         <c:scaling>
           <c:orientation val="minMax"/>
         </c:scaling>
@@ -706,14 +704,14 @@
             <a:endParaRPr lang="en-US"/>
           </a:p>
         </c:txPr>
-        <c:crossAx val="34601216"/>
+        <c:crossAx val="64970112"/>
         <c:crosses val="autoZero"/>
         <c:auto val="1"/>
         <c:lblAlgn val="ctr"/>
         <c:lblOffset val="100"/>
       </c:catAx>
       <c:valAx>
-        <c:axId val="34601216"/>
+        <c:axId val="64970112"/>
         <c:scaling>
           <c:orientation val="minMax"/>
         </c:scaling>
@@ -750,7 +748,7 @@
             <a:endParaRPr lang="en-US"/>
           </a:p>
         </c:txPr>
-        <c:crossAx val="34599296"/>
+        <c:crossAx val="64968192"/>
         <c:crosses val="autoZero"/>
         <c:crossBetween val="between"/>
       </c:valAx>
@@ -1133,6 +1131,88 @@
       </p:grpSpPr>
       <p:sp>
         <p:nvSpPr>
+          <p:cNvPr id="2" name="Diakép helye 1"/>
+          <p:cNvSpPr>
+            <a:spLocks noGrp="1" noRot="1" noChangeAspect="1"/>
+          </p:cNvSpPr>
+          <p:nvPr>
+            <p:ph type="sldImg"/>
+          </p:nvPr>
+        </p:nvSpPr>
+        <p:spPr/>
+      </p:sp>
+      <p:sp>
+        <p:nvSpPr>
+          <p:cNvPr id="3" name="Jegyzetek helye 2"/>
+          <p:cNvSpPr>
+            <a:spLocks noGrp="1"/>
+          </p:cNvSpPr>
+          <p:nvPr>
+            <p:ph type="body" idx="1"/>
+          </p:nvPr>
+        </p:nvSpPr>
+        <p:spPr/>
+        <p:txBody>
+          <a:bodyPr>
+            <a:normAutofit/>
+          </a:bodyPr>
+          <a:lstStyle/>
+          <a:p>
+            <a:endParaRPr lang="en-US"/>
+          </a:p>
+        </p:txBody>
+      </p:sp>
+      <p:sp>
+        <p:nvSpPr>
+          <p:cNvPr id="4" name="Dia számának helye 3"/>
+          <p:cNvSpPr>
+            <a:spLocks noGrp="1"/>
+          </p:cNvSpPr>
+          <p:nvPr>
+            <p:ph type="sldNum" sz="quarter" idx="10"/>
+          </p:nvPr>
+        </p:nvSpPr>
+        <p:spPr/>
+        <p:txBody>
+          <a:bodyPr/>
+          <a:lstStyle/>
+          <a:p>
+            <a:fld id="{E7AA0654-642B-4EC6-9896-06614A0153EC}" type="slidenum">
+              <a:rPr lang="en-US" smtClean="0"/>
+              <a:pPr/>
+              <a:t>1</a:t>
+            </a:fld>
+            <a:endParaRPr lang="en-US"/>
+          </a:p>
+        </p:txBody>
+      </p:sp>
+    </p:spTree>
+  </p:cSld>
+  <p:clrMapOvr>
+    <a:masterClrMapping/>
+  </p:clrMapOvr>
+</p:notes>
+</file>
+
+<file path=ppt/notesSlides/notesSlide10.xml><?xml version="1.0" encoding="utf-8"?>
+<p:notes xmlns:a="http://schemas.openxmlformats.org/drawingml/2006/main" xmlns:r="http://schemas.openxmlformats.org/officeDocument/2006/relationships" xmlns:p="http://schemas.openxmlformats.org/presentationml/2006/main">
+  <p:cSld>
+    <p:spTree>
+      <p:nvGrpSpPr>
+        <p:cNvPr id="1" name=""/>
+        <p:cNvGrpSpPr/>
+        <p:nvPr/>
+      </p:nvGrpSpPr>
+      <p:grpSpPr>
+        <a:xfrm>
+          <a:off x="0" y="0"/>
+          <a:ext cx="0" cy="0"/>
+          <a:chOff x="0" y="0"/>
+          <a:chExt cx="0" cy="0"/>
+        </a:xfrm>
+      </p:grpSpPr>
+      <p:sp>
+        <p:nvSpPr>
           <p:cNvPr id="2" name="Slide Image Placeholder 1"/>
           <p:cNvSpPr>
             <a:spLocks noGrp="1" noRot="1" noChangeAspect="1"/>
@@ -1158,33 +1238,7 @@
           <a:bodyPr/>
           <a:lstStyle/>
           <a:p>
-            <a:r>
-              <a:rPr lang="hu-HU" dirty="0" smtClean="0"/>
-              <a:t>Kód/bináris </a:t>
-            </a:r>
-            <a:r>
-              <a:rPr lang="hu-HU" dirty="0" smtClean="0">
-                <a:sym typeface="Wingdings" pitchFamily="2" charset="2"/>
-              </a:rPr>
-              <a:t> </a:t>
-            </a:r>
-            <a:r>
-              <a:rPr lang="hu-HU" dirty="0" smtClean="0"/>
-              <a:t>modell absztrakció</a:t>
-            </a:r>
-          </a:p>
-          <a:p>
-            <a:r>
-              <a:rPr lang="hu-HU" dirty="0" smtClean="0"/>
-              <a:t>Sokféle statikus függőség</a:t>
-            </a:r>
-          </a:p>
-          <a:p>
-            <a:r>
-              <a:rPr lang="hu-HU" dirty="0" smtClean="0"/>
-              <a:t>Szoftverkomponensek ÖSSZEFÜGGENEK</a:t>
-            </a:r>
-            <a:endParaRPr lang="hu-HU" dirty="0"/>
+            <a:endParaRPr lang="en-US" dirty="0"/>
           </a:p>
         </p:txBody>
       </p:sp>
@@ -1203,10 +1257,10 @@
           <a:bodyPr/>
           <a:lstStyle/>
           <a:p>
-            <a:fld id="{E7AA0654-642B-4EC6-9896-06614A0153EC}" type="slidenum">
+            <a:fld id="{660D7955-1178-45C7-88EB-DB10C946F729}" type="slidenum">
               <a:rPr lang="en-US" smtClean="0"/>
               <a:pPr/>
-              <a:t>2</a:t>
+              <a:t>14</a:t>
             </a:fld>
             <a:endParaRPr lang="en-US"/>
           </a:p>
@@ -1215,7 +1269,7 @@
     </p:spTree>
     <p:extLst>
       <p:ext uri="{BB962C8B-B14F-4D97-AF65-F5344CB8AC3E}">
-        <p14:creationId xmlns:p14="http://schemas.microsoft.com/office/powerpoint/2010/main" xmlns="" val="3109533612"/>
+        <p14:creationId xmlns:p14="http://schemas.microsoft.com/office/powerpoint/2010/main" xmlns="" val="1319460358"/>
       </p:ext>
     </p:extLst>
   </p:cSld>
@@ -1269,6 +1323,117 @@
           <a:bodyPr/>
           <a:lstStyle/>
           <a:p>
+            <a:r>
+              <a:rPr lang="hu-HU" dirty="0" smtClean="0"/>
+              <a:t>Kód/bináris </a:t>
+            </a:r>
+            <a:r>
+              <a:rPr lang="hu-HU" dirty="0" smtClean="0">
+                <a:sym typeface="Wingdings" pitchFamily="2" charset="2"/>
+              </a:rPr>
+              <a:t> </a:t>
+            </a:r>
+            <a:r>
+              <a:rPr lang="hu-HU" dirty="0" smtClean="0"/>
+              <a:t>modell absztrakció</a:t>
+            </a:r>
+          </a:p>
+          <a:p>
+            <a:r>
+              <a:rPr lang="hu-HU" dirty="0" smtClean="0"/>
+              <a:t>Sokféle statikus függőség</a:t>
+            </a:r>
+          </a:p>
+          <a:p>
+            <a:r>
+              <a:rPr lang="hu-HU" dirty="0" smtClean="0"/>
+              <a:t>Szoftverkomponensek ÖSSZEFÜGGENEK</a:t>
+            </a:r>
+            <a:endParaRPr lang="hu-HU" dirty="0"/>
+          </a:p>
+        </p:txBody>
+      </p:sp>
+      <p:sp>
+        <p:nvSpPr>
+          <p:cNvPr id="4" name="Slide Number Placeholder 3"/>
+          <p:cNvSpPr>
+            <a:spLocks noGrp="1"/>
+          </p:cNvSpPr>
+          <p:nvPr>
+            <p:ph type="sldNum" sz="quarter" idx="10"/>
+          </p:nvPr>
+        </p:nvSpPr>
+        <p:spPr/>
+        <p:txBody>
+          <a:bodyPr/>
+          <a:lstStyle/>
+          <a:p>
+            <a:fld id="{E7AA0654-642B-4EC6-9896-06614A0153EC}" type="slidenum">
+              <a:rPr lang="en-US" smtClean="0"/>
+              <a:pPr/>
+              <a:t>2</a:t>
+            </a:fld>
+            <a:endParaRPr lang="en-US"/>
+          </a:p>
+        </p:txBody>
+      </p:sp>
+    </p:spTree>
+    <p:extLst>
+      <p:ext uri="{BB962C8B-B14F-4D97-AF65-F5344CB8AC3E}">
+        <p14:creationId xmlns:p14="http://schemas.microsoft.com/office/powerpoint/2010/main" xmlns="" val="3109533612"/>
+      </p:ext>
+    </p:extLst>
+  </p:cSld>
+  <p:clrMapOvr>
+    <a:masterClrMapping/>
+  </p:clrMapOvr>
+</p:notes>
+</file>
+
+<file path=ppt/notesSlides/notesSlide3.xml><?xml version="1.0" encoding="utf-8"?>
+<p:notes xmlns:a="http://schemas.openxmlformats.org/drawingml/2006/main" xmlns:r="http://schemas.openxmlformats.org/officeDocument/2006/relationships" xmlns:p="http://schemas.openxmlformats.org/presentationml/2006/main">
+  <p:cSld>
+    <p:spTree>
+      <p:nvGrpSpPr>
+        <p:cNvPr id="1" name=""/>
+        <p:cNvGrpSpPr/>
+        <p:nvPr/>
+      </p:nvGrpSpPr>
+      <p:grpSpPr>
+        <a:xfrm>
+          <a:off x="0" y="0"/>
+          <a:ext cx="0" cy="0"/>
+          <a:chOff x="0" y="0"/>
+          <a:chExt cx="0" cy="0"/>
+        </a:xfrm>
+      </p:grpSpPr>
+      <p:sp>
+        <p:nvSpPr>
+          <p:cNvPr id="2" name="Slide Image Placeholder 1"/>
+          <p:cNvSpPr>
+            <a:spLocks noGrp="1" noRot="1" noChangeAspect="1"/>
+          </p:cNvSpPr>
+          <p:nvPr>
+            <p:ph type="sldImg"/>
+          </p:nvPr>
+        </p:nvSpPr>
+        <p:spPr/>
+      </p:sp>
+      <p:sp>
+        <p:nvSpPr>
+          <p:cNvPr id="3" name="Notes Placeholder 2"/>
+          <p:cNvSpPr>
+            <a:spLocks noGrp="1"/>
+          </p:cNvSpPr>
+          <p:nvPr>
+            <p:ph type="body" idx="1"/>
+          </p:nvPr>
+        </p:nvSpPr>
+        <p:spPr/>
+        <p:txBody>
+          <a:bodyPr/>
+          <a:lstStyle/>
+          <a:p>
             <a:pPr marL="0" marR="0" indent="0" algn="l" defTabSz="914400" rtl="0" eaLnBrk="1" fontAlgn="auto" latinLnBrk="0" hangingPunct="1">
               <a:lnSpc>
                 <a:spcPct val="100000"/>
@@ -1335,91 +1500,6 @@
 </p:notes>
 </file>
 
-<file path=ppt/notesSlides/notesSlide3.xml><?xml version="1.0" encoding="utf-8"?>
-<p:notes xmlns:a="http://schemas.openxmlformats.org/drawingml/2006/main" xmlns:r="http://schemas.openxmlformats.org/officeDocument/2006/relationships" xmlns:p="http://schemas.openxmlformats.org/presentationml/2006/main">
-  <p:cSld>
-    <p:spTree>
-      <p:nvGrpSpPr>
-        <p:cNvPr id="1" name=""/>
-        <p:cNvGrpSpPr/>
-        <p:nvPr/>
-      </p:nvGrpSpPr>
-      <p:grpSpPr>
-        <a:xfrm>
-          <a:off x="0" y="0"/>
-          <a:ext cx="0" cy="0"/>
-          <a:chOff x="0" y="0"/>
-          <a:chExt cx="0" cy="0"/>
-        </a:xfrm>
-      </p:grpSpPr>
-      <p:sp>
-        <p:nvSpPr>
-          <p:cNvPr id="2" name="Slide Image Placeholder 1"/>
-          <p:cNvSpPr>
-            <a:spLocks noGrp="1" noRot="1" noChangeAspect="1"/>
-          </p:cNvSpPr>
-          <p:nvPr>
-            <p:ph type="sldImg"/>
-          </p:nvPr>
-        </p:nvSpPr>
-        <p:spPr/>
-      </p:sp>
-      <p:sp>
-        <p:nvSpPr>
-          <p:cNvPr id="3" name="Notes Placeholder 2"/>
-          <p:cNvSpPr>
-            <a:spLocks noGrp="1"/>
-          </p:cNvSpPr>
-          <p:nvPr>
-            <p:ph type="body" idx="1"/>
-          </p:nvPr>
-        </p:nvSpPr>
-        <p:spPr/>
-        <p:txBody>
-          <a:bodyPr/>
-          <a:lstStyle/>
-          <a:p>
-            <a:endParaRPr lang="en-US" dirty="0"/>
-          </a:p>
-        </p:txBody>
-      </p:sp>
-      <p:sp>
-        <p:nvSpPr>
-          <p:cNvPr id="4" name="Slide Number Placeholder 3"/>
-          <p:cNvSpPr>
-            <a:spLocks noGrp="1"/>
-          </p:cNvSpPr>
-          <p:nvPr>
-            <p:ph type="sldNum" sz="quarter" idx="10"/>
-          </p:nvPr>
-        </p:nvSpPr>
-        <p:spPr/>
-        <p:txBody>
-          <a:bodyPr/>
-          <a:lstStyle/>
-          <a:p>
-            <a:fld id="{E7AA0654-642B-4EC6-9896-06614A0153EC}" type="slidenum">
-              <a:rPr lang="en-US" smtClean="0"/>
-              <a:pPr/>
-              <a:t>5</a:t>
-            </a:fld>
-            <a:endParaRPr lang="en-US"/>
-          </a:p>
-        </p:txBody>
-      </p:sp>
-    </p:spTree>
-    <p:extLst>
-      <p:ext uri="{BB962C8B-B14F-4D97-AF65-F5344CB8AC3E}">
-        <p14:creationId xmlns:p14="http://schemas.microsoft.com/office/powerpoint/2010/main" xmlns="" val="1846358032"/>
-      </p:ext>
-    </p:extLst>
-  </p:cSld>
-  <p:clrMapOvr>
-    <a:masterClrMapping/>
-  </p:clrMapOvr>
-</p:notes>
-</file>
-
 <file path=ppt/notesSlides/notesSlide4.xml><?xml version="1.0" encoding="utf-8"?>
 <p:notes xmlns:a="http://schemas.openxmlformats.org/drawingml/2006/main" xmlns:r="http://schemas.openxmlformats.org/officeDocument/2006/relationships" xmlns:p="http://schemas.openxmlformats.org/presentationml/2006/main">
   <p:cSld>
@@ -1464,9 +1544,6 @@
           <a:bodyPr/>
           <a:lstStyle/>
           <a:p>
-            <a:endParaRPr lang="hu-HU" dirty="0" smtClean="0"/>
-          </a:p>
-          <a:p>
             <a:endParaRPr lang="en-US" dirty="0"/>
           </a:p>
         </p:txBody>
@@ -1489,7 +1566,7 @@
             <a:fld id="{E7AA0654-642B-4EC6-9896-06614A0153EC}" type="slidenum">
               <a:rPr lang="en-US" smtClean="0"/>
               <a:pPr/>
-              <a:t>7</a:t>
+              <a:t>5</a:t>
             </a:fld>
             <a:endParaRPr lang="en-US"/>
           </a:p>
@@ -1498,7 +1575,7 @@
     </p:spTree>
     <p:extLst>
       <p:ext uri="{BB962C8B-B14F-4D97-AF65-F5344CB8AC3E}">
-        <p14:creationId xmlns:p14="http://schemas.microsoft.com/office/powerpoint/2010/main" xmlns="" val="2696810295"/>
+        <p14:creationId xmlns:p14="http://schemas.microsoft.com/office/powerpoint/2010/main" xmlns="" val="1846358032"/>
       </p:ext>
     </p:extLst>
   </p:cSld>
@@ -1552,14 +1629,7 @@
           <a:bodyPr/>
           <a:lstStyle/>
           <a:p>
-            <a:r>
-              <a:rPr lang="hu-HU" dirty="0" smtClean="0"/>
-              <a:t>Ami boldface,</a:t>
-            </a:r>
-            <a:r>
-              <a:rPr lang="hu-HU" baseline="0" dirty="0" smtClean="0"/>
-              <a:t> azt hangsúlyozni is!!!</a:t>
-            </a:r>
+            <a:endParaRPr lang="hu-HU" dirty="0" smtClean="0"/>
           </a:p>
           <a:p>
             <a:endParaRPr lang="en-US" dirty="0"/>
@@ -1584,7 +1654,7 @@
             <a:fld id="{E7AA0654-642B-4EC6-9896-06614A0153EC}" type="slidenum">
               <a:rPr lang="en-US" smtClean="0"/>
               <a:pPr/>
-              <a:t>8</a:t>
+              <a:t>7</a:t>
             </a:fld>
             <a:endParaRPr lang="en-US"/>
           </a:p>
@@ -1593,7 +1663,7 @@
     </p:spTree>
     <p:extLst>
       <p:ext uri="{BB962C8B-B14F-4D97-AF65-F5344CB8AC3E}">
-        <p14:creationId xmlns:p14="http://schemas.microsoft.com/office/powerpoint/2010/main" xmlns="" val="3679442458"/>
+        <p14:creationId xmlns:p14="http://schemas.microsoft.com/office/powerpoint/2010/main" xmlns="" val="2696810295"/>
       </p:ext>
     </p:extLst>
   </p:cSld>
@@ -1647,16 +1717,14 @@
           <a:bodyPr/>
           <a:lstStyle/>
           <a:p>
-            <a:pPr lvl="1"/>
-            <a:r>
-              <a:rPr lang="hu-HU" dirty="0" smtClean="0"/>
-              <a:t>Esetleg:</a:t>
+            <a:r>
+              <a:rPr lang="hu-HU" dirty="0" smtClean="0"/>
+              <a:t>Ami boldface,</a:t>
             </a:r>
             <a:r>
               <a:rPr lang="hu-HU" baseline="0" dirty="0" smtClean="0"/>
-              <a:t> függőségi modell és forráskód modell alulra!</a:t>
-            </a:r>
-            <a:endParaRPr lang="hu-HU" dirty="0" smtClean="0"/>
+              <a:t> azt hangsúlyozni is!!!</a:t>
+            </a:r>
           </a:p>
           <a:p>
             <a:endParaRPr lang="en-US" dirty="0"/>
@@ -1678,10 +1746,10 @@
           <a:bodyPr/>
           <a:lstStyle/>
           <a:p>
-            <a:fld id="{660D7955-1178-45C7-88EB-DB10C946F729}" type="slidenum">
+            <a:fld id="{E7AA0654-642B-4EC6-9896-06614A0153EC}" type="slidenum">
               <a:rPr lang="en-US" smtClean="0"/>
               <a:pPr/>
-              <a:t>9</a:t>
+              <a:t>8</a:t>
             </a:fld>
             <a:endParaRPr lang="en-US"/>
           </a:p>
@@ -1690,7 +1758,7 @@
     </p:spTree>
     <p:extLst>
       <p:ext uri="{BB962C8B-B14F-4D97-AF65-F5344CB8AC3E}">
-        <p14:creationId xmlns:p14="http://schemas.microsoft.com/office/powerpoint/2010/main" xmlns="" val="2603194435"/>
+        <p14:creationId xmlns:p14="http://schemas.microsoft.com/office/powerpoint/2010/main" xmlns="" val="3679442458"/>
       </p:ext>
     </p:extLst>
   </p:cSld>
@@ -1744,6 +1812,18 @@
           <a:bodyPr/>
           <a:lstStyle/>
           <a:p>
+            <a:pPr lvl="1"/>
+            <a:r>
+              <a:rPr lang="hu-HU" dirty="0" smtClean="0"/>
+              <a:t>Esetleg:</a:t>
+            </a:r>
+            <a:r>
+              <a:rPr lang="hu-HU" baseline="0" dirty="0" smtClean="0"/>
+              <a:t> függőségi modell és forráskód modell alulra!</a:t>
+            </a:r>
+            <a:endParaRPr lang="hu-HU" dirty="0" smtClean="0"/>
+          </a:p>
+          <a:p>
             <a:endParaRPr lang="en-US" dirty="0"/>
           </a:p>
         </p:txBody>
@@ -1763,10 +1843,10 @@
           <a:bodyPr/>
           <a:lstStyle/>
           <a:p>
-            <a:fld id="{E7AA0654-642B-4EC6-9896-06614A0153EC}" type="slidenum">
+            <a:fld id="{660D7955-1178-45C7-88EB-DB10C946F729}" type="slidenum">
               <a:rPr lang="en-US" smtClean="0"/>
               <a:pPr/>
-              <a:t>11</a:t>
+              <a:t>9</a:t>
             </a:fld>
             <a:endParaRPr lang="en-US"/>
           </a:p>
@@ -1775,7 +1855,7 @@
     </p:spTree>
     <p:extLst>
       <p:ext uri="{BB962C8B-B14F-4D97-AF65-F5344CB8AC3E}">
-        <p14:creationId xmlns:p14="http://schemas.microsoft.com/office/powerpoint/2010/main" xmlns="" val="3832885243"/>
+        <p14:creationId xmlns:p14="http://schemas.microsoft.com/office/powerpoint/2010/main" xmlns="" val="2603194435"/>
       </p:ext>
     </p:extLst>
   </p:cSld>
@@ -1848,10 +1928,10 @@
           <a:bodyPr/>
           <a:lstStyle/>
           <a:p>
-            <a:fld id="{660D7955-1178-45C7-88EB-DB10C946F729}" type="slidenum">
+            <a:fld id="{E7AA0654-642B-4EC6-9896-06614A0153EC}" type="slidenum">
               <a:rPr lang="en-US" smtClean="0"/>
               <a:pPr/>
-              <a:t>13</a:t>
+              <a:t>11</a:t>
             </a:fld>
             <a:endParaRPr lang="en-US"/>
           </a:p>
@@ -1860,7 +1940,7 @@
     </p:spTree>
     <p:extLst>
       <p:ext uri="{BB962C8B-B14F-4D97-AF65-F5344CB8AC3E}">
-        <p14:creationId xmlns:p14="http://schemas.microsoft.com/office/powerpoint/2010/main" xmlns="" val="1319460358"/>
+        <p14:creationId xmlns:p14="http://schemas.microsoft.com/office/powerpoint/2010/main" xmlns="" val="3832885243"/>
       </p:ext>
     </p:extLst>
   </p:cSld>
@@ -1936,7 +2016,7 @@
             <a:fld id="{660D7955-1178-45C7-88EB-DB10C946F729}" type="slidenum">
               <a:rPr lang="en-US" smtClean="0"/>
               <a:pPr/>
-              <a:t>14</a:t>
+              <a:t>13</a:t>
             </a:fld>
             <a:endParaRPr lang="en-US"/>
           </a:p>
@@ -2217,6 +2297,261 @@
 </file>
 
 <file path=ppt/slideLayouts/slideLayout10.xml><?xml version="1.0" encoding="utf-8"?>
+<p:sldLayout xmlns:a="http://schemas.openxmlformats.org/drawingml/2006/main" xmlns:r="http://schemas.openxmlformats.org/officeDocument/2006/relationships" xmlns:p="http://schemas.openxmlformats.org/presentationml/2006/main" type="picTx" preserve="1">
+  <p:cSld name="Picture with Caption">
+    <p:spTree>
+      <p:nvGrpSpPr>
+        <p:cNvPr id="1" name=""/>
+        <p:cNvGrpSpPr/>
+        <p:nvPr/>
+      </p:nvGrpSpPr>
+      <p:grpSpPr>
+        <a:xfrm>
+          <a:off x="0" y="0"/>
+          <a:ext cx="0" cy="0"/>
+          <a:chOff x="0" y="0"/>
+          <a:chExt cx="0" cy="0"/>
+        </a:xfrm>
+      </p:grpSpPr>
+      <p:sp>
+        <p:nvSpPr>
+          <p:cNvPr id="2" name="Title 1"/>
+          <p:cNvSpPr>
+            <a:spLocks noGrp="1"/>
+          </p:cNvSpPr>
+          <p:nvPr>
+            <p:ph type="title"/>
+          </p:nvPr>
+        </p:nvSpPr>
+        <p:spPr>
+          <a:xfrm>
+            <a:off x="1792288" y="4800600"/>
+            <a:ext cx="5486400" cy="566738"/>
+          </a:xfrm>
+        </p:spPr>
+        <p:txBody>
+          <a:bodyPr anchor="b"/>
+          <a:lstStyle>
+            <a:lvl1pPr algn="l">
+              <a:defRPr sz="2000" b="1"/>
+            </a:lvl1pPr>
+          </a:lstStyle>
+          <a:p>
+            <a:r>
+              <a:rPr lang="en-US" smtClean="0"/>
+              <a:t>Click to edit Master title style</a:t>
+            </a:r>
+            <a:endParaRPr lang="en-US"/>
+          </a:p>
+        </p:txBody>
+      </p:sp>
+      <p:sp>
+        <p:nvSpPr>
+          <p:cNvPr id="3" name="Picture Placeholder 2"/>
+          <p:cNvSpPr>
+            <a:spLocks noGrp="1"/>
+          </p:cNvSpPr>
+          <p:nvPr>
+            <p:ph type="pic" idx="1"/>
+          </p:nvPr>
+        </p:nvSpPr>
+        <p:spPr>
+          <a:xfrm>
+            <a:off x="1792288" y="612775"/>
+            <a:ext cx="5486400" cy="4114800"/>
+          </a:xfrm>
+        </p:spPr>
+        <p:txBody>
+          <a:bodyPr/>
+          <a:lstStyle>
+            <a:lvl1pPr marL="0" indent="0">
+              <a:buNone/>
+              <a:defRPr sz="3200"/>
+            </a:lvl1pPr>
+            <a:lvl2pPr marL="457200" indent="0">
+              <a:buNone/>
+              <a:defRPr sz="2800"/>
+            </a:lvl2pPr>
+            <a:lvl3pPr marL="914400" indent="0">
+              <a:buNone/>
+              <a:defRPr sz="2400"/>
+            </a:lvl3pPr>
+            <a:lvl4pPr marL="1371600" indent="0">
+              <a:buNone/>
+              <a:defRPr sz="2000"/>
+            </a:lvl4pPr>
+            <a:lvl5pPr marL="1828800" indent="0">
+              <a:buNone/>
+              <a:defRPr sz="2000"/>
+            </a:lvl5pPr>
+            <a:lvl6pPr marL="2286000" indent="0">
+              <a:buNone/>
+              <a:defRPr sz="2000"/>
+            </a:lvl6pPr>
+            <a:lvl7pPr marL="2743200" indent="0">
+              <a:buNone/>
+              <a:defRPr sz="2000"/>
+            </a:lvl7pPr>
+            <a:lvl8pPr marL="3200400" indent="0">
+              <a:buNone/>
+              <a:defRPr sz="2000"/>
+            </a:lvl8pPr>
+            <a:lvl9pPr marL="3657600" indent="0">
+              <a:buNone/>
+              <a:defRPr sz="2000"/>
+            </a:lvl9pPr>
+          </a:lstStyle>
+          <a:p>
+            <a:endParaRPr lang="en-US"/>
+          </a:p>
+        </p:txBody>
+      </p:sp>
+      <p:sp>
+        <p:nvSpPr>
+          <p:cNvPr id="4" name="Text Placeholder 3"/>
+          <p:cNvSpPr>
+            <a:spLocks noGrp="1"/>
+          </p:cNvSpPr>
+          <p:nvPr>
+            <p:ph type="body" sz="half" idx="2"/>
+          </p:nvPr>
+        </p:nvSpPr>
+        <p:spPr>
+          <a:xfrm>
+            <a:off x="1792288" y="5367338"/>
+            <a:ext cx="5486400" cy="804862"/>
+          </a:xfrm>
+        </p:spPr>
+        <p:txBody>
+          <a:bodyPr/>
+          <a:lstStyle>
+            <a:lvl1pPr marL="0" indent="0">
+              <a:buNone/>
+              <a:defRPr sz="1400"/>
+            </a:lvl1pPr>
+            <a:lvl2pPr marL="457200" indent="0">
+              <a:buNone/>
+              <a:defRPr sz="1200"/>
+            </a:lvl2pPr>
+            <a:lvl3pPr marL="914400" indent="0">
+              <a:buNone/>
+              <a:defRPr sz="1000"/>
+            </a:lvl3pPr>
+            <a:lvl4pPr marL="1371600" indent="0">
+              <a:buNone/>
+              <a:defRPr sz="900"/>
+            </a:lvl4pPr>
+            <a:lvl5pPr marL="1828800" indent="0">
+              <a:buNone/>
+              <a:defRPr sz="900"/>
+            </a:lvl5pPr>
+            <a:lvl6pPr marL="2286000" indent="0">
+              <a:buNone/>
+              <a:defRPr sz="900"/>
+            </a:lvl6pPr>
+            <a:lvl7pPr marL="2743200" indent="0">
+              <a:buNone/>
+              <a:defRPr sz="900"/>
+            </a:lvl7pPr>
+            <a:lvl8pPr marL="3200400" indent="0">
+              <a:buNone/>
+              <a:defRPr sz="900"/>
+            </a:lvl8pPr>
+            <a:lvl9pPr marL="3657600" indent="0">
+              <a:buNone/>
+              <a:defRPr sz="900"/>
+            </a:lvl9pPr>
+          </a:lstStyle>
+          <a:p>
+            <a:pPr lvl="0"/>
+            <a:r>
+              <a:rPr lang="en-US" smtClean="0"/>
+              <a:t>Click to edit Master text styles</a:t>
+            </a:r>
+          </a:p>
+        </p:txBody>
+      </p:sp>
+      <p:sp>
+        <p:nvSpPr>
+          <p:cNvPr id="5" name="Date Placeholder 4"/>
+          <p:cNvSpPr>
+            <a:spLocks noGrp="1"/>
+          </p:cNvSpPr>
+          <p:nvPr>
+            <p:ph type="dt" sz="half" idx="10"/>
+          </p:nvPr>
+        </p:nvSpPr>
+        <p:spPr/>
+        <p:txBody>
+          <a:bodyPr/>
+          <a:lstStyle/>
+          <a:p>
+            <a:fld id="{7B864028-9744-478B-88E3-26F084497025}" type="datetime1">
+              <a:rPr lang="en-US" smtClean="0"/>
+              <a:pPr/>
+              <a:t>1/20/2013</a:t>
+            </a:fld>
+            <a:endParaRPr lang="en-US"/>
+          </a:p>
+        </p:txBody>
+      </p:sp>
+      <p:sp>
+        <p:nvSpPr>
+          <p:cNvPr id="6" name="Footer Placeholder 5"/>
+          <p:cNvSpPr>
+            <a:spLocks noGrp="1"/>
+          </p:cNvSpPr>
+          <p:nvPr>
+            <p:ph type="ftr" sz="quarter" idx="11"/>
+          </p:nvPr>
+        </p:nvSpPr>
+        <p:spPr/>
+        <p:txBody>
+          <a:bodyPr/>
+          <a:lstStyle/>
+          <a:p>
+            <a:endParaRPr lang="en-US"/>
+          </a:p>
+        </p:txBody>
+      </p:sp>
+      <p:sp>
+        <p:nvSpPr>
+          <p:cNvPr id="7" name="Slide Number Placeholder 6"/>
+          <p:cNvSpPr>
+            <a:spLocks noGrp="1"/>
+          </p:cNvSpPr>
+          <p:nvPr>
+            <p:ph type="sldNum" sz="quarter" idx="12"/>
+          </p:nvPr>
+        </p:nvSpPr>
+        <p:spPr/>
+        <p:txBody>
+          <a:bodyPr/>
+          <a:lstStyle/>
+          <a:p>
+            <a:fld id="{E5B09FA9-A177-4256-9C7F-5CF31ABA7234}" type="slidenum">
+              <a:rPr lang="en-US" smtClean="0"/>
+              <a:pPr/>
+              <a:t>‹#›</a:t>
+            </a:fld>
+            <a:endParaRPr lang="en-US"/>
+          </a:p>
+        </p:txBody>
+      </p:sp>
+    </p:spTree>
+    <p:extLst>
+      <p:ext uri="{BB962C8B-B14F-4D97-AF65-F5344CB8AC3E}">
+        <p14:creationId xmlns:p14="http://schemas.microsoft.com/office/powerpoint/2010/main" xmlns="" val="1250907821"/>
+      </p:ext>
+    </p:extLst>
+  </p:cSld>
+  <p:clrMapOvr>
+    <a:masterClrMapping/>
+  </p:clrMapOvr>
+</p:sldLayout>
+</file>
+
+<file path=ppt/slideLayouts/slideLayout11.xml><?xml version="1.0" encoding="utf-8"?>
 <p:sldLayout xmlns:a="http://schemas.openxmlformats.org/drawingml/2006/main" xmlns:r="http://schemas.openxmlformats.org/officeDocument/2006/relationships" xmlns:p="http://schemas.openxmlformats.org/presentationml/2006/main" type="vertTx" preserve="1">
   <p:cSld name="Title and Vertical Text">
     <p:spTree>
@@ -2388,7 +2723,7 @@
 </p:sldLayout>
 </file>
 
-<file path=ppt/slideLayouts/slideLayout11.xml><?xml version="1.0" encoding="utf-8"?>
+<file path=ppt/slideLayouts/slideLayout12.xml><?xml version="1.0" encoding="utf-8"?>
 <p:sldLayout xmlns:a="http://schemas.openxmlformats.org/drawingml/2006/main" xmlns:r="http://schemas.openxmlformats.org/officeDocument/2006/relationships" xmlns:p="http://schemas.openxmlformats.org/presentationml/2006/main" type="vertTitleAndTx" preserve="1">
   <p:cSld name="Vertical Title and Text">
     <p:spTree>
@@ -2743,6 +3078,194 @@
 </file>
 
 <file path=ppt/slideLayouts/slideLayout3.xml><?xml version="1.0" encoding="utf-8"?>
+<p:sldLayout xmlns:a="http://schemas.openxmlformats.org/drawingml/2006/main" xmlns:r="http://schemas.openxmlformats.org/officeDocument/2006/relationships" xmlns:p="http://schemas.openxmlformats.org/presentationml/2006/main" type="obj" preserve="1">
+  <p:cSld name="Q_and_A">
+    <p:spTree>
+      <p:nvGrpSpPr>
+        <p:cNvPr id="1" name=""/>
+        <p:cNvGrpSpPr/>
+        <p:nvPr/>
+      </p:nvGrpSpPr>
+      <p:grpSpPr>
+        <a:xfrm>
+          <a:off x="0" y="0"/>
+          <a:ext cx="0" cy="0"/>
+          <a:chOff x="0" y="0"/>
+          <a:chExt cx="0" cy="0"/>
+        </a:xfrm>
+      </p:grpSpPr>
+      <p:sp>
+        <p:nvSpPr>
+          <p:cNvPr id="2" name="Title 1"/>
+          <p:cNvSpPr>
+            <a:spLocks noGrp="1"/>
+          </p:cNvSpPr>
+          <p:nvPr>
+            <p:ph type="title"/>
+          </p:nvPr>
+        </p:nvSpPr>
+        <p:spPr>
+          <a:xfrm>
+            <a:off x="457200" y="274638"/>
+            <a:ext cx="8229600" cy="2163762"/>
+          </a:xfrm>
+        </p:spPr>
+        <p:txBody>
+          <a:bodyPr>
+            <a:normAutofit/>
+          </a:bodyPr>
+          <a:lstStyle>
+            <a:lvl1pPr>
+              <a:defRPr sz="3600" i="1"/>
+            </a:lvl1pPr>
+          </a:lstStyle>
+          <a:p>
+            <a:r>
+              <a:rPr lang="en-US" dirty="0" smtClean="0"/>
+              <a:t>Click to edit Master title style</a:t>
+            </a:r>
+            <a:endParaRPr lang="en-US" dirty="0"/>
+          </a:p>
+        </p:txBody>
+      </p:sp>
+      <p:sp>
+        <p:nvSpPr>
+          <p:cNvPr id="3" name="Content Placeholder 2"/>
+          <p:cNvSpPr>
+            <a:spLocks noGrp="1"/>
+          </p:cNvSpPr>
+          <p:nvPr>
+            <p:ph idx="1"/>
+          </p:nvPr>
+        </p:nvSpPr>
+        <p:spPr>
+          <a:xfrm>
+            <a:off x="457200" y="2667000"/>
+            <a:ext cx="8229600" cy="3459163"/>
+          </a:xfrm>
+        </p:spPr>
+        <p:txBody>
+          <a:bodyPr/>
+          <a:lstStyle/>
+          <a:p>
+            <a:pPr lvl="0"/>
+            <a:r>
+              <a:rPr lang="en-US" dirty="0" smtClean="0"/>
+              <a:t>Click to edit Master text styles</a:t>
+            </a:r>
+          </a:p>
+          <a:p>
+            <a:pPr lvl="1"/>
+            <a:r>
+              <a:rPr lang="en-US" dirty="0" smtClean="0"/>
+              <a:t>Second level</a:t>
+            </a:r>
+          </a:p>
+          <a:p>
+            <a:pPr lvl="2"/>
+            <a:r>
+              <a:rPr lang="en-US" dirty="0" smtClean="0"/>
+              <a:t>Third level</a:t>
+            </a:r>
+          </a:p>
+          <a:p>
+            <a:pPr lvl="3"/>
+            <a:r>
+              <a:rPr lang="en-US" dirty="0" smtClean="0"/>
+              <a:t>Fourth level</a:t>
+            </a:r>
+          </a:p>
+          <a:p>
+            <a:pPr lvl="4"/>
+            <a:r>
+              <a:rPr lang="en-US" dirty="0" smtClean="0"/>
+              <a:t>Fifth level</a:t>
+            </a:r>
+            <a:endParaRPr lang="en-US" dirty="0"/>
+          </a:p>
+        </p:txBody>
+      </p:sp>
+      <p:sp>
+        <p:nvSpPr>
+          <p:cNvPr id="4" name="Date Placeholder 3"/>
+          <p:cNvSpPr>
+            <a:spLocks noGrp="1"/>
+          </p:cNvSpPr>
+          <p:nvPr>
+            <p:ph type="dt" sz="half" idx="10"/>
+          </p:nvPr>
+        </p:nvSpPr>
+        <p:spPr/>
+        <p:txBody>
+          <a:bodyPr/>
+          <a:lstStyle/>
+          <a:p>
+            <a:fld id="{FC89F6FF-6983-47B6-896B-DFAD3FEC5404}" type="datetime1">
+              <a:rPr lang="en-US" smtClean="0"/>
+              <a:pPr/>
+              <a:t>1/20/2013</a:t>
+            </a:fld>
+            <a:endParaRPr lang="en-US"/>
+          </a:p>
+        </p:txBody>
+      </p:sp>
+      <p:sp>
+        <p:nvSpPr>
+          <p:cNvPr id="5" name="Footer Placeholder 4"/>
+          <p:cNvSpPr>
+            <a:spLocks noGrp="1"/>
+          </p:cNvSpPr>
+          <p:nvPr>
+            <p:ph type="ftr" sz="quarter" idx="11"/>
+          </p:nvPr>
+        </p:nvSpPr>
+        <p:spPr/>
+        <p:txBody>
+          <a:bodyPr/>
+          <a:lstStyle/>
+          <a:p>
+            <a:endParaRPr lang="en-US"/>
+          </a:p>
+        </p:txBody>
+      </p:sp>
+      <p:sp>
+        <p:nvSpPr>
+          <p:cNvPr id="6" name="Slide Number Placeholder 5"/>
+          <p:cNvSpPr>
+            <a:spLocks noGrp="1"/>
+          </p:cNvSpPr>
+          <p:nvPr>
+            <p:ph type="sldNum" sz="quarter" idx="12"/>
+          </p:nvPr>
+        </p:nvSpPr>
+        <p:spPr/>
+        <p:txBody>
+          <a:bodyPr/>
+          <a:lstStyle/>
+          <a:p>
+            <a:fld id="{E5B09FA9-A177-4256-9C7F-5CF31ABA7234}" type="slidenum">
+              <a:rPr lang="en-US" smtClean="0"/>
+              <a:pPr/>
+              <a:t>‹#›</a:t>
+            </a:fld>
+            <a:endParaRPr lang="en-US"/>
+          </a:p>
+        </p:txBody>
+      </p:sp>
+    </p:spTree>
+    <p:extLst>
+      <p:ext uri="{BB962C8B-B14F-4D97-AF65-F5344CB8AC3E}">
+        <p14:creationId xmlns:p14="http://schemas.microsoft.com/office/powerpoint/2010/main" xmlns="" val="1531784793"/>
+      </p:ext>
+    </p:extLst>
+  </p:cSld>
+  <p:clrMapOvr>
+    <a:masterClrMapping/>
+  </p:clrMapOvr>
+</p:sldLayout>
+</file>
+
+<file path=ppt/slideLayouts/slideLayout4.xml><?xml version="1.0" encoding="utf-8"?>
 <p:sldLayout xmlns:a="http://schemas.openxmlformats.org/drawingml/2006/main" xmlns:r="http://schemas.openxmlformats.org/officeDocument/2006/relationships" xmlns:p="http://schemas.openxmlformats.org/presentationml/2006/main" type="secHead" preserve="1">
   <p:cSld name="Section Header">
     <p:spTree>
@@ -2990,7 +3513,7 @@
 </p:sldLayout>
 </file>
 
-<file path=ppt/slideLayouts/slideLayout4.xml><?xml version="1.0" encoding="utf-8"?>
+<file path=ppt/slideLayouts/slideLayout5.xml><?xml version="1.0" encoding="utf-8"?>
 <p:sldLayout xmlns:a="http://schemas.openxmlformats.org/drawingml/2006/main" xmlns:r="http://schemas.openxmlformats.org/officeDocument/2006/relationships" xmlns:p="http://schemas.openxmlformats.org/presentationml/2006/main" type="twoObj" preserve="1">
   <p:cSld name="Two Content">
     <p:spTree>
@@ -3280,7 +3803,7 @@
 </p:sldLayout>
 </file>
 
-<file path=ppt/slideLayouts/slideLayout5.xml><?xml version="1.0" encoding="utf-8"?>
+<file path=ppt/slideLayouts/slideLayout6.xml><?xml version="1.0" encoding="utf-8"?>
 <p:sldLayout xmlns:a="http://schemas.openxmlformats.org/drawingml/2006/main" xmlns:r="http://schemas.openxmlformats.org/officeDocument/2006/relationships" xmlns:p="http://schemas.openxmlformats.org/presentationml/2006/main" type="twoTxTwoObj" preserve="1">
   <p:cSld name="Comparison">
     <p:spTree>
@@ -3704,7 +4227,7 @@
 </p:sldLayout>
 </file>
 
-<file path=ppt/slideLayouts/slideLayout6.xml><?xml version="1.0" encoding="utf-8"?>
+<file path=ppt/slideLayouts/slideLayout7.xml><?xml version="1.0" encoding="utf-8"?>
 <p:sldLayout xmlns:a="http://schemas.openxmlformats.org/drawingml/2006/main" xmlns:r="http://schemas.openxmlformats.org/officeDocument/2006/relationships" xmlns:p="http://schemas.openxmlformats.org/presentationml/2006/main" type="titleOnly" preserve="1">
   <p:cSld name="Title Only">
     <p:spTree>
@@ -3824,7 +4347,7 @@
 </p:sldLayout>
 </file>
 
-<file path=ppt/slideLayouts/slideLayout7.xml><?xml version="1.0" encoding="utf-8"?>
+<file path=ppt/slideLayouts/slideLayout8.xml><?xml version="1.0" encoding="utf-8"?>
 <p:sldLayout xmlns:a="http://schemas.openxmlformats.org/drawingml/2006/main" xmlns:r="http://schemas.openxmlformats.org/officeDocument/2006/relationships" xmlns:p="http://schemas.openxmlformats.org/presentationml/2006/main" type="blank" preserve="1">
   <p:cSld name="Blank">
     <p:spTree>
@@ -3921,7 +4444,7 @@
 </p:sldLayout>
 </file>
 
-<file path=ppt/slideLayouts/slideLayout8.xml><?xml version="1.0" encoding="utf-8"?>
+<file path=ppt/slideLayouts/slideLayout9.xml><?xml version="1.0" encoding="utf-8"?>
 <p:sldLayout xmlns:a="http://schemas.openxmlformats.org/drawingml/2006/main" xmlns:r="http://schemas.openxmlformats.org/officeDocument/2006/relationships" xmlns:p="http://schemas.openxmlformats.org/presentationml/2006/main" type="objTx" preserve="1">
   <p:cSld name="Content with Caption">
     <p:spTree>
@@ -4191,261 +4714,6 @@
     <p:extLst>
       <p:ext uri="{BB962C8B-B14F-4D97-AF65-F5344CB8AC3E}">
         <p14:creationId xmlns:p14="http://schemas.microsoft.com/office/powerpoint/2010/main" xmlns="" val="261621455"/>
-      </p:ext>
-    </p:extLst>
-  </p:cSld>
-  <p:clrMapOvr>
-    <a:masterClrMapping/>
-  </p:clrMapOvr>
-</p:sldLayout>
-</file>
-
-<file path=ppt/slideLayouts/slideLayout9.xml><?xml version="1.0" encoding="utf-8"?>
-<p:sldLayout xmlns:a="http://schemas.openxmlformats.org/drawingml/2006/main" xmlns:r="http://schemas.openxmlformats.org/officeDocument/2006/relationships" xmlns:p="http://schemas.openxmlformats.org/presentationml/2006/main" type="picTx" preserve="1">
-  <p:cSld name="Picture with Caption">
-    <p:spTree>
-      <p:nvGrpSpPr>
-        <p:cNvPr id="1" name=""/>
-        <p:cNvGrpSpPr/>
-        <p:nvPr/>
-      </p:nvGrpSpPr>
-      <p:grpSpPr>
-        <a:xfrm>
-          <a:off x="0" y="0"/>
-          <a:ext cx="0" cy="0"/>
-          <a:chOff x="0" y="0"/>
-          <a:chExt cx="0" cy="0"/>
-        </a:xfrm>
-      </p:grpSpPr>
-      <p:sp>
-        <p:nvSpPr>
-          <p:cNvPr id="2" name="Title 1"/>
-          <p:cNvSpPr>
-            <a:spLocks noGrp="1"/>
-          </p:cNvSpPr>
-          <p:nvPr>
-            <p:ph type="title"/>
-          </p:nvPr>
-        </p:nvSpPr>
-        <p:spPr>
-          <a:xfrm>
-            <a:off x="1792288" y="4800600"/>
-            <a:ext cx="5486400" cy="566738"/>
-          </a:xfrm>
-        </p:spPr>
-        <p:txBody>
-          <a:bodyPr anchor="b"/>
-          <a:lstStyle>
-            <a:lvl1pPr algn="l">
-              <a:defRPr sz="2000" b="1"/>
-            </a:lvl1pPr>
-          </a:lstStyle>
-          <a:p>
-            <a:r>
-              <a:rPr lang="en-US" smtClean="0"/>
-              <a:t>Click to edit Master title style</a:t>
-            </a:r>
-            <a:endParaRPr lang="en-US"/>
-          </a:p>
-        </p:txBody>
-      </p:sp>
-      <p:sp>
-        <p:nvSpPr>
-          <p:cNvPr id="3" name="Picture Placeholder 2"/>
-          <p:cNvSpPr>
-            <a:spLocks noGrp="1"/>
-          </p:cNvSpPr>
-          <p:nvPr>
-            <p:ph type="pic" idx="1"/>
-          </p:nvPr>
-        </p:nvSpPr>
-        <p:spPr>
-          <a:xfrm>
-            <a:off x="1792288" y="612775"/>
-            <a:ext cx="5486400" cy="4114800"/>
-          </a:xfrm>
-        </p:spPr>
-        <p:txBody>
-          <a:bodyPr/>
-          <a:lstStyle>
-            <a:lvl1pPr marL="0" indent="0">
-              <a:buNone/>
-              <a:defRPr sz="3200"/>
-            </a:lvl1pPr>
-            <a:lvl2pPr marL="457200" indent="0">
-              <a:buNone/>
-              <a:defRPr sz="2800"/>
-            </a:lvl2pPr>
-            <a:lvl3pPr marL="914400" indent="0">
-              <a:buNone/>
-              <a:defRPr sz="2400"/>
-            </a:lvl3pPr>
-            <a:lvl4pPr marL="1371600" indent="0">
-              <a:buNone/>
-              <a:defRPr sz="2000"/>
-            </a:lvl4pPr>
-            <a:lvl5pPr marL="1828800" indent="0">
-              <a:buNone/>
-              <a:defRPr sz="2000"/>
-            </a:lvl5pPr>
-            <a:lvl6pPr marL="2286000" indent="0">
-              <a:buNone/>
-              <a:defRPr sz="2000"/>
-            </a:lvl6pPr>
-            <a:lvl7pPr marL="2743200" indent="0">
-              <a:buNone/>
-              <a:defRPr sz="2000"/>
-            </a:lvl7pPr>
-            <a:lvl8pPr marL="3200400" indent="0">
-              <a:buNone/>
-              <a:defRPr sz="2000"/>
-            </a:lvl8pPr>
-            <a:lvl9pPr marL="3657600" indent="0">
-              <a:buNone/>
-              <a:defRPr sz="2000"/>
-            </a:lvl9pPr>
-          </a:lstStyle>
-          <a:p>
-            <a:endParaRPr lang="en-US"/>
-          </a:p>
-        </p:txBody>
-      </p:sp>
-      <p:sp>
-        <p:nvSpPr>
-          <p:cNvPr id="4" name="Text Placeholder 3"/>
-          <p:cNvSpPr>
-            <a:spLocks noGrp="1"/>
-          </p:cNvSpPr>
-          <p:nvPr>
-            <p:ph type="body" sz="half" idx="2"/>
-          </p:nvPr>
-        </p:nvSpPr>
-        <p:spPr>
-          <a:xfrm>
-            <a:off x="1792288" y="5367338"/>
-            <a:ext cx="5486400" cy="804862"/>
-          </a:xfrm>
-        </p:spPr>
-        <p:txBody>
-          <a:bodyPr/>
-          <a:lstStyle>
-            <a:lvl1pPr marL="0" indent="0">
-              <a:buNone/>
-              <a:defRPr sz="1400"/>
-            </a:lvl1pPr>
-            <a:lvl2pPr marL="457200" indent="0">
-              <a:buNone/>
-              <a:defRPr sz="1200"/>
-            </a:lvl2pPr>
-            <a:lvl3pPr marL="914400" indent="0">
-              <a:buNone/>
-              <a:defRPr sz="1000"/>
-            </a:lvl3pPr>
-            <a:lvl4pPr marL="1371600" indent="0">
-              <a:buNone/>
-              <a:defRPr sz="900"/>
-            </a:lvl4pPr>
-            <a:lvl5pPr marL="1828800" indent="0">
-              <a:buNone/>
-              <a:defRPr sz="900"/>
-            </a:lvl5pPr>
-            <a:lvl6pPr marL="2286000" indent="0">
-              <a:buNone/>
-              <a:defRPr sz="900"/>
-            </a:lvl6pPr>
-            <a:lvl7pPr marL="2743200" indent="0">
-              <a:buNone/>
-              <a:defRPr sz="900"/>
-            </a:lvl7pPr>
-            <a:lvl8pPr marL="3200400" indent="0">
-              <a:buNone/>
-              <a:defRPr sz="900"/>
-            </a:lvl8pPr>
-            <a:lvl9pPr marL="3657600" indent="0">
-              <a:buNone/>
-              <a:defRPr sz="900"/>
-            </a:lvl9pPr>
-          </a:lstStyle>
-          <a:p>
-            <a:pPr lvl="0"/>
-            <a:r>
-              <a:rPr lang="en-US" smtClean="0"/>
-              <a:t>Click to edit Master text styles</a:t>
-            </a:r>
-          </a:p>
-        </p:txBody>
-      </p:sp>
-      <p:sp>
-        <p:nvSpPr>
-          <p:cNvPr id="5" name="Date Placeholder 4"/>
-          <p:cNvSpPr>
-            <a:spLocks noGrp="1"/>
-          </p:cNvSpPr>
-          <p:nvPr>
-            <p:ph type="dt" sz="half" idx="10"/>
-          </p:nvPr>
-        </p:nvSpPr>
-        <p:spPr/>
-        <p:txBody>
-          <a:bodyPr/>
-          <a:lstStyle/>
-          <a:p>
-            <a:fld id="{7B864028-9744-478B-88E3-26F084497025}" type="datetime1">
-              <a:rPr lang="en-US" smtClean="0"/>
-              <a:pPr/>
-              <a:t>1/20/2013</a:t>
-            </a:fld>
-            <a:endParaRPr lang="en-US"/>
-          </a:p>
-        </p:txBody>
-      </p:sp>
-      <p:sp>
-        <p:nvSpPr>
-          <p:cNvPr id="6" name="Footer Placeholder 5"/>
-          <p:cNvSpPr>
-            <a:spLocks noGrp="1"/>
-          </p:cNvSpPr>
-          <p:nvPr>
-            <p:ph type="ftr" sz="quarter" idx="11"/>
-          </p:nvPr>
-        </p:nvSpPr>
-        <p:spPr/>
-        <p:txBody>
-          <a:bodyPr/>
-          <a:lstStyle/>
-          <a:p>
-            <a:endParaRPr lang="en-US"/>
-          </a:p>
-        </p:txBody>
-      </p:sp>
-      <p:sp>
-        <p:nvSpPr>
-          <p:cNvPr id="7" name="Slide Number Placeholder 6"/>
-          <p:cNvSpPr>
-            <a:spLocks noGrp="1"/>
-          </p:cNvSpPr>
-          <p:nvPr>
-            <p:ph type="sldNum" sz="quarter" idx="12"/>
-          </p:nvPr>
-        </p:nvSpPr>
-        <p:spPr/>
-        <p:txBody>
-          <a:bodyPr/>
-          <a:lstStyle/>
-          <a:p>
-            <a:fld id="{E5B09FA9-A177-4256-9C7F-5CF31ABA7234}" type="slidenum">
-              <a:rPr lang="en-US" smtClean="0"/>
-              <a:pPr/>
-              <a:t>‹#›</a:t>
-            </a:fld>
-            <a:endParaRPr lang="en-US"/>
-          </a:p>
-        </p:txBody>
-      </p:sp>
-    </p:spTree>
-    <p:extLst>
-      <p:ext uri="{BB962C8B-B14F-4D97-AF65-F5344CB8AC3E}">
-        <p14:creationId xmlns:p14="http://schemas.microsoft.com/office/powerpoint/2010/main" xmlns="" val="1250907821"/>
       </p:ext>
     </p:extLst>
   </p:cSld>
@@ -4725,15 +4993,16 @@
   <p:sldLayoutIdLst>
     <p:sldLayoutId id="2147483649" r:id="rId1"/>
     <p:sldLayoutId id="2147483650" r:id="rId2"/>
-    <p:sldLayoutId id="2147483651" r:id="rId3"/>
-    <p:sldLayoutId id="2147483652" r:id="rId4"/>
-    <p:sldLayoutId id="2147483653" r:id="rId5"/>
-    <p:sldLayoutId id="2147483654" r:id="rId6"/>
-    <p:sldLayoutId id="2147483655" r:id="rId7"/>
-    <p:sldLayoutId id="2147483656" r:id="rId8"/>
-    <p:sldLayoutId id="2147483657" r:id="rId9"/>
-    <p:sldLayoutId id="2147483658" r:id="rId10"/>
-    <p:sldLayoutId id="2147483659" r:id="rId11"/>
+    <p:sldLayoutId id="2147483660" r:id="rId3"/>
+    <p:sldLayoutId id="2147483651" r:id="rId4"/>
+    <p:sldLayoutId id="2147483652" r:id="rId5"/>
+    <p:sldLayoutId id="2147483653" r:id="rId6"/>
+    <p:sldLayoutId id="2147483654" r:id="rId7"/>
+    <p:sldLayoutId id="2147483655" r:id="rId8"/>
+    <p:sldLayoutId id="2147483656" r:id="rId9"/>
+    <p:sldLayoutId id="2147483657" r:id="rId10"/>
+    <p:sldLayoutId id="2147483658" r:id="rId11"/>
+    <p:sldLayoutId id="2147483659" r:id="rId12"/>
   </p:sldLayoutIdLst>
   <p:hf hdr="0" ftr="0" dt="0"/>
   <p:txStyles>
@@ -5055,26 +5324,13 @@
           <a:p>
             <a:r>
               <a:rPr lang="hu-HU" dirty="0" smtClean="0"/>
-              <a:t>Készítette</a:t>
-            </a:r>
-            <a:r>
-              <a:rPr lang="hu-HU" dirty="0" smtClean="0"/>
-              <a:t>: Csikós </a:t>
-            </a:r>
-            <a:r>
-              <a:rPr lang="hu-HU" dirty="0" smtClean="0"/>
-              <a:t>Donát</a:t>
-            </a:r>
-            <a:endParaRPr lang="hu-HU" dirty="0" smtClean="0"/>
-          </a:p>
-          <a:p>
-            <a:r>
-              <a:rPr lang="hu-HU" dirty="0" smtClean="0"/>
-              <a:t>Konzulens: Horváth Ákos, Ráth </a:t>
-            </a:r>
-            <a:r>
-              <a:rPr lang="hu-HU" dirty="0" smtClean="0"/>
-              <a:t>István</a:t>
+              <a:t>Készítette: Csikós Donát</a:t>
+            </a:r>
+          </a:p>
+          <a:p>
+            <a:r>
+              <a:rPr lang="hu-HU" dirty="0" smtClean="0"/>
+              <a:t>Konzulens: Horváth Ákos, Ráth István</a:t>
             </a:r>
           </a:p>
           <a:p>
@@ -5099,13 +5355,8 @@
           <a:p>
             <a:r>
               <a:rPr lang="hu-HU" dirty="0" smtClean="0"/>
-              <a:t>BME </a:t>
-            </a:r>
-            <a:r>
-              <a:rPr lang="hu-HU" dirty="0" smtClean="0"/>
-              <a:t>MIT</a:t>
-            </a:r>
-            <a:endParaRPr lang="hu-HU" dirty="0" smtClean="0"/>
+              <a:t>BME MIT</a:t>
+            </a:r>
           </a:p>
         </p:txBody>
       </p:sp>
@@ -5132,7 +5383,7 @@
             <a:fld id="{69502636-3651-4D64-AD56-5443027FFC3F}" type="datetime1">
               <a:rPr lang="hu-HU" smtClean="0"/>
               <a:pPr/>
-              <a:t>2013. 01. 20.</a:t>
+              <a:t>2013. 01. 21.</a:t>
             </a:fld>
             <a:endParaRPr lang="en-US" dirty="0"/>
           </a:p>
@@ -5249,11 +5500,7 @@
           <a:p>
             <a:r>
               <a:rPr lang="hu-HU" dirty="0" smtClean="0"/>
-              <a:t>Komplex </a:t>
-            </a:r>
-            <a:r>
-              <a:rPr lang="hu-HU" dirty="0" smtClean="0"/>
-              <a:t>lekérdezések</a:t>
+              <a:t>Komplex lekérdezések</a:t>
             </a:r>
             <a:r>
               <a:rPr lang="en-US" dirty="0" smtClean="0"/>
@@ -5269,7 +5516,6 @@
               <a:rPr lang="hu-HU" dirty="0" smtClean="0"/>
               <a:t>alidáció:</a:t>
             </a:r>
-            <a:endParaRPr lang="hu-HU" dirty="0" smtClean="0"/>
           </a:p>
           <a:p>
             <a:pPr marL="0" indent="0">
@@ -5321,7 +5567,7 @@
           <p:nvPr/>
         </p:nvPicPr>
         <p:blipFill>
-          <a:blip r:embed="rId2">
+          <a:blip r:embed="rId2" cstate="print">
             <a:extLst>
               <a:ext uri="{28A0092B-C50C-407E-A947-70E740481C1C}">
                 <a14:useLocalDpi xmlns:a14="http://schemas.microsoft.com/office/drawing/2010/main" xmlns="" val="0"/>
@@ -5362,7 +5608,7 @@
           <p:nvPr/>
         </p:nvPicPr>
         <p:blipFill rotWithShape="1">
-          <a:blip r:embed="rId3">
+          <a:blip r:embed="rId3" cstate="print">
             <a:extLst>
               <a:ext uri="{28A0092B-C50C-407E-A947-70E740481C1C}">
                 <a14:useLocalDpi xmlns:a14="http://schemas.microsoft.com/office/drawing/2010/main" xmlns="" val="0"/>
@@ -6325,11 +6571,7 @@
             </a:r>
             <a:r>
               <a:rPr lang="hu-HU" dirty="0" smtClean="0"/>
-              <a:t> elemre és </a:t>
-            </a:r>
-            <a:r>
-              <a:rPr lang="hu-HU" dirty="0" smtClean="0"/>
-              <a:t>kapcsolatra</a:t>
+              <a:t> elemre és kapcsolatra</a:t>
             </a:r>
             <a:r>
               <a:rPr lang="en-US" dirty="0" smtClean="0"/>
@@ -6339,13 +6581,7 @@
               <a:rPr lang="hu-HU" dirty="0" smtClean="0">
                 <a:sym typeface="Wingdings" pitchFamily="2" charset="2"/>
               </a:rPr>
-              <a:t>azonnali </a:t>
-            </a:r>
-            <a:r>
-              <a:rPr lang="hu-HU" dirty="0" smtClean="0">
-                <a:sym typeface="Wingdings" pitchFamily="2" charset="2"/>
-              </a:rPr>
-              <a:t>visszacsatolás</a:t>
+              <a:t>azonnali visszacsatolás</a:t>
             </a:r>
             <a:endParaRPr lang="hu-HU" dirty="0" smtClean="0"/>
           </a:p>
@@ -6856,7 +7092,7 @@
             <a:pPr lvl="1"/>
             <a:r>
               <a:rPr lang="hu-HU" dirty="0" smtClean="0"/>
-              <a:t>~1300 Java projekt, projektenként átlag 15 aktív verzió / projekt, átlagosan összesen 10 release / nap</a:t>
+              <a:t>~1300 Java projekt, projektenként átlag 15 aktív verzió/projekt, átlagosan összesen 10 release / nap</a:t>
             </a:r>
           </a:p>
           <a:p>
@@ -7014,11 +7250,7 @@
             </a:r>
             <a:r>
               <a:rPr lang="hu-HU" dirty="0" smtClean="0"/>
-              <a:t>ráfminták kiterjesztése </a:t>
-            </a:r>
-            <a:r>
-              <a:rPr lang="hu-HU" dirty="0" smtClean="0"/>
-              <a:t>metrikákra</a:t>
+              <a:t>ráfminták kiterjesztése metrikákra</a:t>
             </a:r>
             <a:endParaRPr lang="en-US" dirty="0"/>
           </a:p>
@@ -9343,32 +9575,20 @@
           <a:lstStyle/>
           <a:p>
             <a:r>
-              <a:rPr lang="en-US" sz="2800" i="1" dirty="0" smtClean="0"/>
-              <a:t>“</a:t>
-            </a:r>
-            <a:r>
               <a:rPr lang="hu-HU" sz="2800" i="1" dirty="0" smtClean="0"/>
-              <a:t>Hogyan </a:t>
+              <a:t>“Hogyan kezeli a rendszer a </a:t>
+            </a:r>
+            <a:r>
+              <a:rPr lang="hu-HU" sz="2800" i="1" dirty="0" err="1" smtClean="0"/>
+              <a:t>product-ok</a:t>
             </a:r>
             <a:r>
               <a:rPr lang="hu-HU" sz="2800" i="1" dirty="0" smtClean="0"/>
-              <a:t>kezeli a </a:t>
-            </a:r>
-            <a:r>
-              <a:rPr lang="hu-HU" sz="2800" i="1" dirty="0" smtClean="0"/>
-              <a:t>rendszer a feldolgozott </a:t>
-            </a:r>
-            <a:r>
-              <a:rPr lang="hu-HU" sz="2800" i="1" dirty="0" err="1" smtClean="0"/>
-              <a:t>jar</a:t>
-            </a:r>
-            <a:r>
-              <a:rPr lang="hu-HU" sz="2800" i="1" dirty="0" smtClean="0"/>
-              <a:t> állományok különböző verzióit?</a:t>
-            </a:r>
-            <a:r>
-              <a:rPr lang="en-US" sz="2800" i="1" dirty="0" smtClean="0"/>
-              <a:t>”</a:t>
+              <a:t> különböző verzióit? A régi verzióka</a:t>
+            </a:r>
+            <a:r>
+              <a:rPr lang="hu-HU" sz="2800" dirty="0" smtClean="0"/>
+              <a:t>t milyen szabály szerint tünteti el a rendszer?”</a:t>
             </a:r>
             <a:endParaRPr lang="hu-HU" sz="2800" i="1" dirty="0" smtClean="0"/>
           </a:p>
@@ -9393,74 +9613,42 @@
           <a:p>
             <a:r>
               <a:rPr lang="hu-HU" dirty="0" smtClean="0"/>
-              <a:t>Minden </a:t>
-            </a:r>
-            <a:r>
-              <a:rPr lang="hu-HU" dirty="0" smtClean="0"/>
-              <a:t>komponenshez verzió </a:t>
-            </a:r>
-            <a:r>
-              <a:rPr lang="hu-HU" dirty="0" smtClean="0"/>
-              <a:t>attribútum:</a:t>
-            </a:r>
+              <a:t>Verziószám-lista minden objektumhoz</a:t>
+            </a:r>
+            <a:endParaRPr lang="hu-HU" dirty="0" smtClean="0"/>
           </a:p>
           <a:p>
             <a:pPr lvl="1"/>
             <a:r>
               <a:rPr lang="hu-HU" dirty="0" smtClean="0"/>
-              <a:t>A </a:t>
-            </a:r>
-            <a:r>
-              <a:rPr lang="hu-HU" dirty="0" smtClean="0"/>
-              <a:t>verziószámok listája tárolva minden új </a:t>
-            </a:r>
-            <a:r>
-              <a:rPr lang="hu-HU" dirty="0" smtClean="0"/>
-              <a:t>objektumhoz</a:t>
-            </a:r>
+              <a:t>Már létező objektum</a:t>
+            </a:r>
+            <a:r>
+              <a:rPr lang="hu-HU" dirty="0" smtClean="0"/>
+              <a:t> → csak ez a lista frissül</a:t>
+            </a:r>
+            <a:endParaRPr lang="hu-HU" dirty="0" smtClean="0"/>
+          </a:p>
+          <a:p>
+            <a:r>
+              <a:rPr lang="hu-HU" dirty="0" smtClean="0"/>
+              <a:t> Nincs szükség eltávolításra</a:t>
+            </a:r>
+            <a:endParaRPr lang="hu-HU" dirty="0" smtClean="0"/>
           </a:p>
           <a:p>
             <a:pPr lvl="1"/>
             <a:r>
               <a:rPr lang="hu-HU" dirty="0" smtClean="0"/>
-              <a:t>Új verzió → frissítés, </a:t>
-            </a:r>
-            <a:r>
-              <a:rPr lang="hu-HU" dirty="0" smtClean="0"/>
-              <a:t>ha a régi verzióban is létezett</a:t>
-            </a:r>
-            <a:r>
-              <a:rPr lang="hu-HU" dirty="0" smtClean="0"/>
-              <a:t>.</a:t>
-            </a:r>
-          </a:p>
-          <a:p>
-            <a:r>
-              <a:rPr lang="hu-HU" dirty="0" smtClean="0"/>
-              <a:t> Verziókat nem kell eltávolítani</a:t>
-            </a:r>
-          </a:p>
-          <a:p>
-            <a:pPr lvl="1"/>
-            <a:r>
-              <a:rPr lang="hu-HU" dirty="0" smtClean="0"/>
-              <a:t> Szerver </a:t>
-            </a:r>
-            <a:r>
-              <a:rPr lang="hu-HU" dirty="0" smtClean="0"/>
-              <a:t>folyamat: összes </a:t>
-            </a:r>
-            <a:r>
-              <a:rPr lang="hu-HU" dirty="0" smtClean="0"/>
-              <a:t>projekt összes </a:t>
-            </a:r>
-            <a:r>
-              <a:rPr lang="hu-HU" dirty="0" smtClean="0"/>
-              <a:t>verzióját felderíti egy kijelölt időponttól</a:t>
-            </a:r>
-            <a:r>
-              <a:rPr lang="hu-HU" dirty="0" smtClean="0"/>
-              <a:t>.</a:t>
+              <a:t>Szerver </a:t>
+            </a:r>
+            <a:r>
+              <a:rPr lang="hu-HU" dirty="0" smtClean="0"/>
+              <a:t>folyamat: összes projekt összes verzióját felderíti egy kijelölt </a:t>
+            </a:r>
+            <a:r>
+              <a:rPr lang="hu-HU" dirty="0" smtClean="0"/>
+              <a:t>időponttól</a:t>
             </a:r>
             <a:endParaRPr lang="hu-HU" dirty="0"/>
           </a:p>
@@ -9545,31 +9733,15 @@
           <a:lstStyle/>
           <a:p>
             <a:r>
-              <a:rPr lang="en-US" sz="2800" i="1" dirty="0" smtClean="0"/>
-              <a:t>“</a:t>
-            </a:r>
-            <a:r>
               <a:rPr lang="hu-HU" sz="2800" i="1" dirty="0" smtClean="0"/>
-              <a:t>Van-e </a:t>
+              <a:t>“A projekt tapasztalatai alapján van-e olyan aspektus, amit jobban támogathatna a Java programozási nyelv – statikus elemezhetőség szempontjából</a:t>
+            </a:r>
+            <a:r>
+              <a:rPr lang="hu-HU" sz="2800" dirty="0" smtClean="0"/>
+              <a:t>?</a:t>
             </a:r>
             <a:r>
               <a:rPr lang="hu-HU" sz="2800" i="1" dirty="0" smtClean="0"/>
-              <a:t>olyan aspektus, melyet a statikus elemezhetőség szempontjából jobban </a:t>
-            </a:r>
-            <a:r>
-              <a:rPr lang="hu-HU" sz="2800" i="1" dirty="0" smtClean="0"/>
-              <a:t>támogathatna </a:t>
-            </a:r>
-            <a:r>
-              <a:rPr lang="hu-HU" sz="2800" i="1" dirty="0" smtClean="0"/>
-              <a:t>a Java nyelv</a:t>
-            </a:r>
-            <a:r>
-              <a:rPr lang="hu-HU" sz="2800" i="1" dirty="0" smtClean="0"/>
-              <a:t>?</a:t>
-            </a:r>
-            <a:r>
-              <a:rPr lang="en-US" sz="2800" i="1" dirty="0" smtClean="0"/>
               <a:t>”</a:t>
             </a:r>
             <a:endParaRPr lang="hu-HU" sz="2800" i="1" dirty="0" smtClean="0"/>
@@ -9595,17 +9767,13 @@
           <a:p>
             <a:r>
               <a:rPr lang="hu-HU" dirty="0" smtClean="0"/>
-              <a:t>Nem </a:t>
-            </a:r>
-            <a:r>
-              <a:rPr lang="hu-HU" dirty="0" smtClean="0"/>
-              <a:t>létezik a "komponens" fogalma </a:t>
+              <a:t>Nem létezik a "komponens" fogalma </a:t>
             </a:r>
             <a:r>
               <a:rPr lang="hu-HU" dirty="0" err="1" smtClean="0"/>
               <a:t>Java-ban</a:t>
             </a:r>
-            <a:endParaRPr lang="en-US" dirty="0" smtClean="0"/>
+            <a:endParaRPr lang="hu-HU" dirty="0" smtClean="0"/>
           </a:p>
           <a:p>
             <a:pPr lvl="1"/>
@@ -9615,7 +9783,15 @@
             </a:r>
             <a:r>
               <a:rPr lang="hu-HU" dirty="0" smtClean="0"/>
-              <a:t>magasabb szinten van rá implementáció (Pl. </a:t>
+              <a:t>magasabb szinten van </a:t>
+            </a:r>
+            <a:r>
+              <a:rPr lang="hu-HU" dirty="0" smtClean="0"/>
+              <a:t>rá </a:t>
+            </a:r>
+            <a:r>
+              <a:rPr lang="hu-HU" dirty="0" smtClean="0"/>
+              <a:t>implementáció (Pl. </a:t>
             </a:r>
             <a:r>
               <a:rPr lang="hu-HU" dirty="0" err="1" smtClean="0"/>
@@ -9625,36 +9801,32 @@
               <a:rPr lang="hu-HU" dirty="0" smtClean="0"/>
               <a:t>)</a:t>
             </a:r>
-            <a:endParaRPr lang="en-US" dirty="0" smtClean="0"/>
           </a:p>
           <a:p>
             <a:pPr lvl="1"/>
             <a:r>
               <a:rPr lang="hu-HU" dirty="0" smtClean="0"/>
-              <a:t>Kézzel </a:t>
-            </a:r>
-            <a:r>
-              <a:rPr lang="hu-HU" dirty="0" smtClean="0"/>
-              <a:t>kell kikeresni, hogy hogyan oldja fel az import deklarációkat a JVM</a:t>
-            </a:r>
-          </a:p>
-          <a:p>
+              <a:t>Implementáció kereséssel oldja fel az import deklarációkat</a:t>
+            </a:r>
+            <a:endParaRPr lang="hu-HU" dirty="0" smtClean="0"/>
+          </a:p>
+          <a:p>
+            <a:pPr marL="342900" lvl="1" indent="-342900">
+              <a:buFont typeface="Arial" pitchFamily="34" charset="0"/>
+              <a:buChar char="•"/>
+            </a:pPr>
             <a:r>
               <a:rPr lang="hu-HU" dirty="0" smtClean="0"/>
               <a:t>Megoldás </a:t>
             </a:r>
             <a:r>
               <a:rPr lang="hu-HU" dirty="0" smtClean="0"/>
-              <a:t>Java 8-as </a:t>
-            </a:r>
-            <a:r>
-              <a:rPr lang="hu-HU" dirty="0" smtClean="0"/>
-              <a:t>verziójában</a:t>
-            </a:r>
-            <a:endParaRPr lang="en-US" dirty="0" smtClean="0"/>
-          </a:p>
-          <a:p>
-            <a:pPr lvl="1"/>
+              <a:t>Java </a:t>
+            </a:r>
+            <a:r>
+              <a:rPr lang="hu-HU" dirty="0" smtClean="0"/>
+              <a:t>8-ban (</a:t>
+            </a:r>
             <a:r>
               <a:rPr lang="hu-HU" dirty="0" smtClean="0"/>
               <a:t>Project </a:t>
@@ -9663,7 +9835,11 @@
               <a:rPr lang="hu-HU" dirty="0" err="1" smtClean="0"/>
               <a:t>Jigsaw</a:t>
             </a:r>
-            <a:endParaRPr lang="hu-HU" dirty="0"/>
+            <a:r>
+              <a:rPr lang="hu-HU" dirty="0" smtClean="0"/>
+              <a:t>)</a:t>
+            </a:r>
+            <a:endParaRPr lang="hu-HU" dirty="0" smtClean="0"/>
           </a:p>
         </p:txBody>
       </p:sp>
@@ -9746,71 +9922,75 @@
           <a:lstStyle/>
           <a:p>
             <a:r>
-              <a:rPr lang="en-US" sz="2400" i="1" dirty="0" smtClean="0"/>
-              <a:t>“M</a:t>
-            </a:r>
-            <a:r>
-              <a:rPr lang="hu-HU" sz="2400" i="1" dirty="0" err="1" smtClean="0"/>
-              <a:t>egoldható-e</a:t>
-            </a:r>
-            <a:r>
               <a:rPr lang="hu-HU" sz="2400" i="1" dirty="0" smtClean="0"/>
+              <a:t>“</a:t>
+            </a:r>
+            <a:r>
+              <a:rPr lang="hu-HU" sz="2400" i="1" u="sng" dirty="0" smtClean="0"/>
+              <a:t>Meg lehetett-e volna oldani</a:t>
+            </a:r>
+            <a:r>
+              <a:rPr lang="hu-HU" sz="2400" dirty="0" smtClean="0"/>
               <a:t>, hogy a </a:t>
             </a:r>
             <a:r>
-              <a:rPr lang="hu-HU" sz="2400" i="1" dirty="0" err="1" smtClean="0"/>
+              <a:rPr lang="hu-HU" sz="2400" dirty="0" err="1" smtClean="0"/>
               <a:t>Workspace</a:t>
             </a:r>
             <a:r>
+              <a:rPr lang="hu-HU" sz="2400" dirty="0" smtClean="0"/>
+              <a:t> </a:t>
+            </a:r>
+            <a:r>
+              <a:rPr lang="hu-HU" sz="2400" dirty="0" err="1" smtClean="0"/>
+              <a:t>model</a:t>
+            </a:r>
+            <a:r>
+              <a:rPr lang="hu-HU" sz="2400" dirty="0" smtClean="0"/>
+              <a:t> </a:t>
+            </a:r>
+            <a:r>
+              <a:rPr lang="hu-HU" sz="2400" dirty="0" err="1" smtClean="0"/>
+              <a:t>generator</a:t>
+            </a:r>
+            <a:r>
+              <a:rPr lang="hu-HU" sz="2400" dirty="0" smtClean="0"/>
+              <a:t> komponens az </a:t>
+            </a:r>
+            <a:r>
+              <a:rPr lang="hu-HU" sz="2400" dirty="0" err="1" smtClean="0"/>
+              <a:t>Eclipse</a:t>
+            </a:r>
+            <a:r>
+              <a:rPr lang="hu-HU" sz="2400" dirty="0" smtClean="0"/>
+              <a:t> által fordított </a:t>
+            </a:r>
+            <a:r>
+              <a:rPr lang="hu-HU" sz="2400" dirty="0" err="1" smtClean="0"/>
+              <a:t>class</a:t>
+            </a:r>
+            <a:r>
+              <a:rPr lang="hu-HU" sz="2400" dirty="0" smtClean="0"/>
+              <a:t> fájlokból induljon ki? (Ezáltal </a:t>
+            </a:r>
+            <a:r>
+              <a:rPr lang="hu-HU" sz="2400" u="sng" dirty="0" smtClean="0"/>
+              <a:t>ugyanazon komponenst használná a szerver és a kliens oldal a modell építésére</a:t>
+            </a:r>
+            <a:r>
+              <a:rPr lang="hu-HU" sz="2400" dirty="0" smtClean="0"/>
+              <a:t>. Így nem kellett volna két különböző komponenst írni.) Mitől jobb a JDT megközelítés, mint az </a:t>
+            </a:r>
+            <a:r>
+              <a:rPr lang="hu-HU" sz="2400" dirty="0" err="1" smtClean="0"/>
+              <a:t>Apache</a:t>
+            </a:r>
+            <a:r>
+              <a:rPr lang="hu-HU" sz="2400" dirty="0" smtClean="0"/>
+              <a:t> BCEL?</a:t>
+            </a:r>
+            <a:r>
               <a:rPr lang="hu-HU" sz="2400" i="1" dirty="0" smtClean="0"/>
-              <a:t> </a:t>
-            </a:r>
-            <a:r>
-              <a:rPr lang="hu-HU" sz="2400" i="1" dirty="0" err="1" smtClean="0"/>
-              <a:t>model</a:t>
-            </a:r>
-            <a:r>
-              <a:rPr lang="hu-HU" sz="2400" i="1" dirty="0" smtClean="0"/>
-              <a:t> </a:t>
-            </a:r>
-            <a:r>
-              <a:rPr lang="hu-HU" sz="2400" i="1" dirty="0" err="1" smtClean="0"/>
-              <a:t>generator</a:t>
-            </a:r>
-            <a:r>
-              <a:rPr lang="hu-HU" sz="2400" i="1" dirty="0" smtClean="0"/>
-              <a:t> komponens az </a:t>
-            </a:r>
-            <a:r>
-              <a:rPr lang="hu-HU" sz="2400" i="1" dirty="0" err="1" smtClean="0"/>
-              <a:t>Eclipse</a:t>
-            </a:r>
-            <a:r>
-              <a:rPr lang="hu-HU" sz="2400" i="1" dirty="0" smtClean="0"/>
-              <a:t> által fordított </a:t>
-            </a:r>
-            <a:r>
-              <a:rPr lang="hu-HU" sz="2400" i="1" dirty="0" err="1" smtClean="0"/>
-              <a:t>class</a:t>
-            </a:r>
-            <a:r>
-              <a:rPr lang="hu-HU" sz="2400" i="1" dirty="0" smtClean="0"/>
-              <a:t> fájlokból építse fel a modellt, hogy ne kelljen két különböző modellépítő komponenst írni? Mitől jobb a JDT megközelítés, mint az </a:t>
-            </a:r>
-            <a:r>
-              <a:rPr lang="hu-HU" sz="2400" i="1" dirty="0" err="1" smtClean="0"/>
-              <a:t>apache</a:t>
-            </a:r>
-            <a:r>
-              <a:rPr lang="hu-HU" sz="2400" i="1" dirty="0" smtClean="0"/>
-              <a:t> BCEL</a:t>
-            </a:r>
-            <a:r>
-              <a:rPr lang="hu-HU" sz="2400" i="1" dirty="0" smtClean="0"/>
-              <a:t>?</a:t>
-            </a:r>
-            <a:r>
-              <a:rPr lang="en-US" sz="2400" i="1" dirty="0" smtClean="0"/>
               <a:t>”</a:t>
             </a:r>
             <a:endParaRPr lang="hu-HU" sz="2400" i="1" dirty="0" smtClean="0"/>
@@ -9842,25 +10022,12 @@
               <a:rPr lang="hu-HU" dirty="0" smtClean="0"/>
               <a:t>de</a:t>
             </a:r>
-            <a:endParaRPr lang="en-US" dirty="0" smtClean="0"/>
           </a:p>
           <a:p>
             <a:pPr lvl="1"/>
             <a:r>
               <a:rPr lang="hu-HU" dirty="0" smtClean="0"/>
-              <a:t>BCEL erőforrás igényes</a:t>
-            </a:r>
-            <a:endParaRPr lang="en-US" dirty="0" smtClean="0"/>
-          </a:p>
-          <a:p>
-            <a:pPr lvl="2"/>
-            <a:r>
-              <a:rPr lang="hu-HU" dirty="0" smtClean="0"/>
-              <a:t>Minden </a:t>
-            </a:r>
-            <a:r>
-              <a:rPr lang="hu-HU" dirty="0" smtClean="0"/>
-              <a:t>változtatáskor az egész </a:t>
+              <a:t>BCEL: egész </a:t>
             </a:r>
             <a:r>
               <a:rPr lang="hu-HU" dirty="0" err="1" smtClean="0"/>
@@ -9868,45 +10035,53 @@
             </a:r>
             <a:r>
               <a:rPr lang="hu-HU" dirty="0" smtClean="0"/>
-              <a:t> állományt fel kell </a:t>
-            </a:r>
-            <a:r>
-              <a:rPr lang="hu-HU" dirty="0" smtClean="0"/>
-              <a:t>dolgozni</a:t>
-            </a:r>
-            <a:endParaRPr lang="en-US" dirty="0" smtClean="0"/>
+              <a:t> állományok feldolgozása</a:t>
+            </a:r>
+          </a:p>
+          <a:p>
+            <a:pPr lvl="3"/>
+            <a:r>
+              <a:rPr lang="hu-HU" dirty="0" smtClean="0"/>
+              <a:t>Számítás-intenzív</a:t>
+            </a:r>
+          </a:p>
+          <a:p>
+            <a:pPr lvl="3"/>
+            <a:r>
+              <a:rPr lang="hu-HU" dirty="0" smtClean="0"/>
+              <a:t>Bináris → forráskód konverzió</a:t>
+            </a:r>
+          </a:p>
+          <a:p>
+            <a:pPr lvl="3"/>
+            <a:r>
+              <a:rPr lang="hu-HU" dirty="0" smtClean="0"/>
+              <a:t>Méretfüggő</a:t>
+            </a:r>
+            <a:endParaRPr lang="hu-HU" dirty="0" smtClean="0"/>
+          </a:p>
+          <a:p>
+            <a:pPr lvl="1"/>
+            <a:r>
+              <a:rPr lang="hu-HU" dirty="0" smtClean="0"/>
+              <a:t>JDT ezzel szemben</a:t>
+            </a:r>
           </a:p>
           <a:p>
             <a:pPr lvl="2"/>
             <a:r>
               <a:rPr lang="hu-HU" dirty="0" smtClean="0"/>
-              <a:t>Csak </a:t>
-            </a:r>
-            <a:r>
-              <a:rPr lang="hu-HU" dirty="0" smtClean="0"/>
-              <a:t>bináris információk érhetőek el </a:t>
-            </a:r>
-            <a:r>
-              <a:rPr lang="hu-HU" dirty="0" smtClean="0"/>
-              <a:t>belőle</a:t>
-            </a:r>
-            <a:endParaRPr lang="en-US" dirty="0" smtClean="0"/>
-          </a:p>
-          <a:p>
-            <a:pPr lvl="1"/>
-            <a:r>
-              <a:rPr lang="hu-HU" dirty="0" smtClean="0"/>
-              <a:t>JDT </a:t>
-            </a:r>
-            <a:r>
-              <a:rPr lang="hu-HU" dirty="0" smtClean="0"/>
-              <a:t>ezzel </a:t>
-            </a:r>
-            <a:r>
-              <a:rPr lang="hu-HU" dirty="0" smtClean="0"/>
-              <a:t>szemben</a:t>
-            </a:r>
-            <a:endParaRPr lang="en-US" dirty="0" smtClean="0"/>
+              <a:t>Gazdag, </a:t>
+            </a:r>
+            <a:r>
+              <a:rPr lang="hu-HU" dirty="0" err="1" smtClean="0"/>
+              <a:t>in-memory</a:t>
+            </a:r>
+            <a:r>
+              <a:rPr lang="hu-HU" dirty="0" smtClean="0"/>
+              <a:t> modell </a:t>
+            </a:r>
+            <a:endParaRPr lang="hu-HU" dirty="0" smtClean="0"/>
           </a:p>
           <a:p>
             <a:pPr lvl="2"/>
@@ -9916,71 +10091,18 @@
             </a:r>
             <a:r>
               <a:rPr lang="hu-HU" dirty="0" smtClean="0"/>
-              <a:t>lekérdezése alapból benne </a:t>
-            </a:r>
-            <a:r>
-              <a:rPr lang="hu-HU" dirty="0" smtClean="0"/>
-              <a:t>van</a:t>
-            </a:r>
-            <a:endParaRPr lang="en-US" dirty="0" smtClean="0"/>
+              <a:t>lekérdezése </a:t>
+            </a:r>
+            <a:r>
+              <a:rPr lang="hu-HU" dirty="0" smtClean="0"/>
+              <a:t>elérhető</a:t>
+            </a:r>
           </a:p>
           <a:p>
             <a:pPr lvl="2"/>
             <a:r>
               <a:rPr lang="hu-HU" dirty="0" smtClean="0"/>
-              <a:t>Inkrementális modellfrissítés</a:t>
-            </a:r>
-            <a:endParaRPr lang="en-US" dirty="0" smtClean="0"/>
-          </a:p>
-          <a:p>
-            <a:pPr lvl="2"/>
-            <a:r>
-              <a:rPr lang="hu-HU" dirty="0" smtClean="0"/>
-              <a:t>Több </a:t>
-            </a:r>
-            <a:r>
-              <a:rPr lang="hu-HU" dirty="0" smtClean="0"/>
-              <a:t>hozzáférhető </a:t>
-            </a:r>
-            <a:r>
-              <a:rPr lang="hu-HU" dirty="0" smtClean="0"/>
-              <a:t>információ</a:t>
-            </a:r>
-            <a:endParaRPr lang="en-US" dirty="0" smtClean="0"/>
-          </a:p>
-          <a:p>
-            <a:pPr lvl="2"/>
-            <a:r>
-              <a:rPr lang="hu-HU" dirty="0" smtClean="0"/>
-              <a:t>Nem </a:t>
-            </a:r>
-            <a:r>
-              <a:rPr lang="hu-HU" dirty="0" smtClean="0"/>
-              <a:t>kell </a:t>
-            </a:r>
-            <a:r>
-              <a:rPr lang="hu-HU" dirty="0" smtClean="0"/>
-              <a:t>bináris</a:t>
-            </a:r>
-            <a:r>
-              <a:rPr lang="en-US" dirty="0" smtClean="0"/>
-              <a:t> → </a:t>
-            </a:r>
-            <a:r>
-              <a:rPr lang="hu-HU" dirty="0" smtClean="0"/>
-              <a:t>forráskód konverzió</a:t>
-            </a:r>
-            <a:endParaRPr lang="en-US" dirty="0" smtClean="0"/>
-          </a:p>
-          <a:p>
-            <a:pPr lvl="2"/>
-            <a:r>
-              <a:rPr lang="hu-HU" dirty="0" smtClean="0"/>
-              <a:t>Közvetlen </a:t>
-            </a:r>
-            <a:r>
-              <a:rPr lang="hu-HU" dirty="0" smtClean="0"/>
-              <a:t>kötés a forráskód és a UI elemek között</a:t>
+              <a:t>Forráskód–UI kötés: egyszerű integráció</a:t>
             </a:r>
             <a:endParaRPr lang="hu-HU" dirty="0"/>
           </a:p>
@@ -10065,22 +10187,21 @@
           <a:lstStyle/>
           <a:p>
             <a:r>
-              <a:rPr lang="en-US" sz="2800" i="1" dirty="0" smtClean="0"/>
-              <a:t>“</a:t>
-            </a:r>
-            <a:r>
               <a:rPr lang="hu-HU" sz="2800" i="1" dirty="0" smtClean="0"/>
-              <a:t>Az </a:t>
+              <a:t>“…  A nagyméretű</a:t>
+            </a:r>
+            <a:r>
+              <a:rPr lang="hu-HU" sz="2800" dirty="0" smtClean="0"/>
+              <a:t>, automatikusan </a:t>
             </a:r>
             <a:r>
               <a:rPr lang="hu-HU" sz="2800" i="1" dirty="0" smtClean="0"/>
-              <a:t>automatikusan generált forráskód valóban kizárja a forráskód alapján történő analízist?</a:t>
-            </a:r>
-            <a:r>
-              <a:rPr lang="en-US" sz="2800" i="1" dirty="0" smtClean="0"/>
-              <a:t>”</a:t>
-            </a:r>
-            <a:endParaRPr lang="hu-HU" sz="2800" i="1" dirty="0" smtClean="0"/>
+              <a:t>generált </a:t>
+            </a:r>
+            <a:r>
+              <a:rPr lang="hu-HU" sz="2800" i="1" dirty="0" smtClean="0"/>
+              <a:t>forráskód valóban kizárja a forráskód alapján történő analízist?”</a:t>
+            </a:r>
           </a:p>
         </p:txBody>
       </p:sp>
@@ -10097,62 +10218,209 @@
         <p:spPr/>
         <p:txBody>
           <a:bodyPr>
-            <a:normAutofit/>
+            <a:normAutofit lnSpcReduction="10000"/>
           </a:bodyPr>
           <a:lstStyle/>
           <a:p>
             <a:r>
-              <a:rPr lang="hu-HU" dirty="0" err="1" smtClean="0"/>
-              <a:t>CERN-specifikus</a:t>
-            </a:r>
-            <a:r>
-              <a:rPr lang="hu-HU" dirty="0" smtClean="0"/>
-              <a:t> kitétel volt, hogy binárisokon dolgozunk</a:t>
-            </a:r>
-            <a:r>
-              <a:rPr lang="hu-HU" dirty="0" smtClean="0"/>
-              <a:t>.</a:t>
-            </a:r>
+              <a:rPr lang="en-US" dirty="0" err="1" smtClean="0"/>
+              <a:t>Nem</a:t>
+            </a:r>
+            <a:r>
+              <a:rPr lang="en-US" dirty="0" smtClean="0"/>
+              <a:t>, ha a </a:t>
+            </a:r>
+            <a:r>
+              <a:rPr lang="en-US" dirty="0" err="1" smtClean="0"/>
+              <a:t>forráskód</a:t>
+            </a:r>
+            <a:r>
+              <a:rPr lang="en-US" dirty="0" smtClean="0"/>
+              <a:t> </a:t>
+            </a:r>
+            <a:r>
+              <a:rPr lang="en-US" dirty="0" err="1" smtClean="0"/>
+              <a:t>elérhető</a:t>
+            </a:r>
+            <a:endParaRPr lang="en-US" dirty="0" smtClean="0"/>
+          </a:p>
+          <a:p>
+            <a:r>
+              <a:rPr lang="hu-HU" dirty="0" smtClean="0"/>
+              <a:t>CE</a:t>
+            </a:r>
+            <a:r>
+              <a:rPr lang="en-US" dirty="0" smtClean="0"/>
+              <a:t>R</a:t>
+            </a:r>
+            <a:r>
+              <a:rPr lang="hu-HU" dirty="0" smtClean="0"/>
+              <a:t>N-specifikus</a:t>
+            </a:r>
+            <a:r>
+              <a:rPr lang="en-US" dirty="0" smtClean="0"/>
+              <a:t> </a:t>
+            </a:r>
+            <a:r>
+              <a:rPr lang="en-US" dirty="0" err="1" smtClean="0"/>
+              <a:t>követelmény</a:t>
+            </a:r>
+            <a:endParaRPr lang="hu-HU" dirty="0" smtClean="0"/>
           </a:p>
           <a:p>
             <a:pPr lvl="1"/>
             <a:r>
-              <a:rPr lang="hu-HU" dirty="0" smtClean="0"/>
-              <a:t>Egyedi </a:t>
-            </a:r>
-            <a:r>
-              <a:rPr lang="hu-HU" dirty="0" smtClean="0"/>
-              <a:t>esetek, a forráskódból deríthető fel automatizálva </a:t>
-            </a:r>
-            <a:r>
-              <a:rPr lang="hu-HU" dirty="0" smtClean="0"/>
+              <a:rPr lang="en-US" dirty="0" err="1" smtClean="0"/>
+              <a:t>Egyedi</a:t>
+            </a:r>
+            <a:r>
+              <a:rPr lang="en-US" dirty="0" smtClean="0"/>
+              <a:t> </a:t>
+            </a:r>
+            <a:r>
+              <a:rPr lang="en-US" dirty="0" err="1" smtClean="0"/>
+              <a:t>esetek</a:t>
+            </a:r>
+            <a:r>
+              <a:rPr lang="en-US" dirty="0" smtClean="0"/>
+              <a:t>, </a:t>
+            </a:r>
+            <a:r>
+              <a:rPr lang="en-US" dirty="0" err="1" smtClean="0"/>
+              <a:t>sokféle</a:t>
+            </a:r>
+            <a:r>
+              <a:rPr lang="en-US" dirty="0" smtClean="0"/>
+              <a:t> </a:t>
+            </a:r>
+            <a:r>
+              <a:rPr lang="en-US" dirty="0" err="1" smtClean="0"/>
+              <a:t>szoftver</a:t>
+            </a:r>
+            <a:r>
+              <a:rPr lang="en-US" dirty="0" smtClean="0"/>
+              <a:t> a </a:t>
+            </a:r>
+            <a:r>
+              <a:rPr lang="en-US" dirty="0" err="1" smtClean="0"/>
+              <a:t>tárolókban</a:t>
+            </a:r>
+            <a:endParaRPr lang="en-US" dirty="0" smtClean="0"/>
+          </a:p>
+          <a:p>
+            <a:pPr lvl="2"/>
+            <a:r>
+              <a:rPr lang="en-US" dirty="0" err="1" smtClean="0"/>
+              <a:t>Nem</a:t>
+            </a:r>
+            <a:r>
+              <a:rPr lang="en-US" dirty="0" smtClean="0"/>
+              <a:t> </a:t>
+            </a:r>
+            <a:r>
+              <a:rPr lang="en-US" dirty="0" err="1" smtClean="0"/>
+              <a:t>garantált</a:t>
+            </a:r>
+            <a:r>
+              <a:rPr lang="en-US" dirty="0" smtClean="0"/>
+              <a:t>, </a:t>
+            </a:r>
+            <a:r>
+              <a:rPr lang="en-US" dirty="0" err="1" smtClean="0"/>
+              <a:t>hogy</a:t>
+            </a:r>
+            <a:r>
+              <a:rPr lang="en-US" dirty="0" smtClean="0"/>
+              <a:t> </a:t>
+            </a:r>
+            <a:r>
+              <a:rPr lang="en-US" dirty="0" err="1" smtClean="0"/>
               <a:t>minden</a:t>
             </a:r>
+            <a:r>
+              <a:rPr lang="en-US" dirty="0" smtClean="0"/>
+              <a:t> </a:t>
+            </a:r>
+            <a:r>
+              <a:rPr lang="en-US" dirty="0" err="1" smtClean="0"/>
+              <a:t>elem</a:t>
+            </a:r>
+            <a:r>
+              <a:rPr lang="en-US" dirty="0" smtClean="0"/>
+              <a:t> </a:t>
+            </a:r>
+            <a:r>
+              <a:rPr lang="en-US" dirty="0" err="1" smtClean="0"/>
+              <a:t>az</a:t>
+            </a:r>
+            <a:r>
+              <a:rPr lang="en-US" dirty="0" smtClean="0"/>
+              <a:t> SVN-</a:t>
+            </a:r>
+            <a:r>
+              <a:rPr lang="en-US" dirty="0" err="1" smtClean="0"/>
+              <a:t>ben</a:t>
+            </a:r>
+            <a:endParaRPr lang="hu-HU" dirty="0" smtClean="0"/>
           </a:p>
           <a:p>
             <a:pPr lvl="1"/>
             <a:r>
-              <a:rPr lang="hu-HU" dirty="0" smtClean="0"/>
-              <a:t>De: egységes bináris tároló</a:t>
+              <a:rPr lang="en-US" dirty="0" err="1" smtClean="0"/>
+              <a:t>Közös</a:t>
+            </a:r>
+            <a:r>
+              <a:rPr lang="en-US" dirty="0" smtClean="0"/>
+              <a:t> </a:t>
+            </a:r>
+            <a:r>
+              <a:rPr lang="en-US" dirty="0" err="1" smtClean="0"/>
+              <a:t>pont</a:t>
+            </a:r>
+            <a:r>
+              <a:rPr lang="hu-HU" dirty="0" smtClean="0"/>
+              <a:t>: </a:t>
+            </a:r>
+            <a:r>
+              <a:rPr lang="hu-HU" dirty="0" smtClean="0"/>
+              <a:t>egységes bináris tároló</a:t>
             </a:r>
           </a:p>
           <a:p>
             <a:pPr lvl="2"/>
             <a:r>
-              <a:rPr lang="hu-HU" dirty="0" smtClean="0"/>
+              <a:rPr lang="en-US" dirty="0" smtClean="0"/>
+              <a:t>Minden </a:t>
+            </a:r>
+            <a:r>
+              <a:rPr lang="en-US" dirty="0" err="1" smtClean="0"/>
+              <a:t>szoftvert</a:t>
+            </a:r>
+            <a:r>
+              <a:rPr lang="en-US" dirty="0" smtClean="0"/>
+              <a:t> </a:t>
+            </a:r>
+            <a:r>
+              <a:rPr lang="en-US" dirty="0" err="1" smtClean="0"/>
+              <a:t>tartalmaz</a:t>
+            </a:r>
+            <a:endParaRPr lang="en-US" dirty="0" smtClean="0"/>
+          </a:p>
+          <a:p>
+            <a:pPr lvl="2"/>
+            <a:r>
+              <a:rPr lang="en-US" dirty="0" err="1" smtClean="0"/>
               <a:t>Konzisztens</a:t>
             </a:r>
-          </a:p>
-          <a:p>
-            <a:pPr lvl="2"/>
-            <a:r>
-              <a:rPr lang="hu-HU" dirty="0" smtClean="0"/>
-              <a:t>Minden elemet tartalmaz</a:t>
-            </a:r>
-          </a:p>
-          <a:p>
-            <a:pPr lvl="1"/>
-            <a:endParaRPr lang="hu-HU" dirty="0"/>
+            <a:r>
+              <a:rPr lang="en-US" dirty="0" smtClean="0"/>
+              <a:t> + </a:t>
+            </a:r>
+            <a:r>
+              <a:rPr lang="en-US" dirty="0" err="1" smtClean="0"/>
+              <a:t>metainformációk</a:t>
+            </a:r>
+            <a:endParaRPr lang="hu-HU" dirty="0" smtClean="0"/>
           </a:p>
         </p:txBody>
       </p:sp>
@@ -10275,7 +10543,7 @@
           <p:nvPr/>
         </p:nvPicPr>
         <p:blipFill>
-          <a:blip r:embed="rId2"/>
+          <a:blip r:embed="rId2" cstate="print"/>
           <a:stretch>
             <a:fillRect/>
           </a:stretch>
@@ -10299,12 +10567,12 @@
         <p:spPr>
           <a:xfrm>
             <a:off x="304800" y="1181100"/>
-            <a:ext cx="2590800" cy="1447800"/>
+            <a:ext cx="2590800" cy="1028700"/>
           </a:xfrm>
           <a:prstGeom prst="wedgeRectCallout">
             <a:avLst>
-              <a:gd name="adj1" fmla="val 60343"/>
-              <a:gd name="adj2" fmla="val 15132"/>
+              <a:gd name="adj1" fmla="val 61814"/>
+              <a:gd name="adj2" fmla="val 52169"/>
             </a:avLst>
           </a:prstGeom>
         </p:spPr>
@@ -10339,7 +10607,15 @@
             </a:r>
             <a:r>
               <a:rPr lang="hu-HU" dirty="0"/>
-              <a:t> hibajavítások, új funkciók</a:t>
+              <a:t> </a:t>
+            </a:r>
+            <a:r>
+              <a:rPr lang="hu-HU" dirty="0" smtClean="0"/>
+              <a:t>hibajavítások</a:t>
+            </a:r>
+            <a:r>
+              <a:rPr lang="hu-HU" dirty="0"/>
+              <a:t>, új funkciók</a:t>
             </a:r>
           </a:p>
         </p:txBody>
@@ -10588,14 +10864,12 @@
               <a:buChar char="•"/>
             </a:pPr>
             <a:r>
-              <a:rPr lang="hu-HU" sz="2000" dirty="0">
-                <a:sym typeface="Wingdings"/>
-              </a:rPr>
-              <a:t> </a:t>
+              <a:rPr lang="hu-HU" sz="2000" i="1" dirty="0" smtClean="0"/>
+              <a:t>→Mit </a:t>
             </a:r>
             <a:r>
               <a:rPr lang="hu-HU" sz="2000" i="1" dirty="0"/>
-              <a:t>Mit változtathatunk meg és hogyan</a:t>
+              <a:t>változtathatunk meg és hogyan</a:t>
             </a:r>
           </a:p>
         </p:txBody>
@@ -11532,8 +11806,8 @@
         </p:nvSpPr>
         <p:spPr>
           <a:xfrm>
-            <a:off x="1704179" y="1258633"/>
-            <a:ext cx="1896504" cy="798766"/>
+            <a:off x="1524000" y="1258633"/>
+            <a:ext cx="2438400" cy="798766"/>
           </a:xfrm>
           <a:prstGeom prst="wedgeRoundRectCallout">
             <a:avLst>
@@ -11562,8 +11836,32 @@
           <a:lstStyle/>
           <a:p>
             <a:r>
-              <a:rPr lang="hu-HU" dirty="0" smtClean="0"/>
-              <a:t>Lekérdezés a forráskód szerkesztőből</a:t>
+              <a:rPr lang="en-US" dirty="0" smtClean="0"/>
+              <a:t>Explicit l</a:t>
+            </a:r>
+            <a:r>
+              <a:rPr lang="hu-HU" dirty="0" err="1" smtClean="0"/>
+              <a:t>ekérdezés</a:t>
+            </a:r>
+            <a:r>
+              <a:rPr lang="hu-HU" dirty="0" smtClean="0"/>
+              <a:t> </a:t>
+            </a:r>
+            <a:r>
+              <a:rPr lang="hu-HU" dirty="0" smtClean="0"/>
+              <a:t>a </a:t>
+            </a:r>
+            <a:r>
+              <a:rPr lang="en-US" dirty="0" smtClean="0"/>
+              <a:t>f</a:t>
+            </a:r>
+            <a:r>
+              <a:rPr lang="hu-HU" dirty="0" err="1" smtClean="0"/>
+              <a:t>orráskód</a:t>
+            </a:r>
+            <a:r>
+              <a:rPr lang="hu-HU" dirty="0" smtClean="0"/>
+              <a:t> szerkesztőből</a:t>
             </a:r>
           </a:p>
         </p:txBody>
@@ -11576,8 +11874,8 @@
         </p:nvSpPr>
         <p:spPr>
           <a:xfrm>
-            <a:off x="4785489" y="2879000"/>
-            <a:ext cx="3139311" cy="938695"/>
+            <a:off x="4648199" y="2879000"/>
+            <a:ext cx="3276601" cy="938695"/>
           </a:xfrm>
           <a:prstGeom prst="wedgeRoundRectCallout">
             <a:avLst>
@@ -11935,10 +12233,10 @@
         </p:nvGrpSpPr>
         <p:grpSpPr>
           <a:xfrm>
-            <a:off x="85635" y="1475509"/>
-            <a:ext cx="8972730" cy="5014191"/>
-            <a:chOff x="57926" y="1514943"/>
-            <a:chExt cx="8972730" cy="5001170"/>
+            <a:off x="76200" y="1477617"/>
+            <a:ext cx="8978853" cy="5012081"/>
+            <a:chOff x="57926" y="1517045"/>
+            <a:chExt cx="8978853" cy="4999068"/>
           </a:xfrm>
         </p:grpSpPr>
         <p:sp>
@@ -12040,8 +12338,8 @@
           </p:nvSpPr>
           <p:spPr>
             <a:xfrm>
-              <a:off x="57926" y="1514943"/>
-              <a:ext cx="8972730" cy="3077838"/>
+              <a:off x="64049" y="1517045"/>
+              <a:ext cx="8972730" cy="3077839"/>
             </a:xfrm>
             <a:prstGeom prst="rect">
               <a:avLst/>
@@ -12626,7 +12924,7 @@
           <p:nvPr/>
         </p:nvPicPr>
         <p:blipFill rotWithShape="1">
-          <a:blip r:embed="rId2">
+          <a:blip r:embed="rId2" cstate="print">
             <a:extLst>
               <a:ext uri="{28A0092B-C50C-407E-A947-70E740481C1C}">
                 <a14:useLocalDpi xmlns:a14="http://schemas.microsoft.com/office/drawing/2010/main" xmlns="" val="0"/>
@@ -12665,7 +12963,7 @@
           <p:nvPr/>
         </p:nvPicPr>
         <p:blipFill rotWithShape="1">
-          <a:blip r:embed="rId3">
+          <a:blip r:embed="rId3" cstate="print">
             <a:extLst>
               <a:ext uri="{28A0092B-C50C-407E-A947-70E740481C1C}">
                 <a14:useLocalDpi xmlns:a14="http://schemas.microsoft.com/office/drawing/2010/main" xmlns="" val="0"/>
@@ -14205,11 +14503,23 @@
             </a:pPr>
             <a:r>
               <a:rPr lang="hu-HU" b="1" dirty="0" smtClean="0"/>
-              <a:t>Folyamantos és Inkrementális</a:t>
-            </a:r>
-            <a:r>
-              <a:rPr lang="hu-HU" dirty="0" smtClean="0"/>
-              <a:t> szinkronizáció</a:t>
+              <a:t>Folyamantos és </a:t>
+            </a:r>
+            <a:r>
+              <a:rPr lang="en-US" b="1" dirty="0" err="1" smtClean="0"/>
+              <a:t>i</a:t>
+            </a:r>
+            <a:r>
+              <a:rPr lang="hu-HU" b="1" dirty="0" err="1" smtClean="0"/>
+              <a:t>nkrementális</a:t>
+            </a:r>
+            <a:r>
+              <a:rPr lang="hu-HU" dirty="0" smtClean="0"/>
+              <a:t> </a:t>
+            </a:r>
+            <a:r>
+              <a:rPr lang="hu-HU" dirty="0" smtClean="0"/>
+              <a:t>szinkronizáció</a:t>
             </a:r>
           </a:p>
         </p:txBody>

</xml_diff>

<commit_message>
custom sw explanation added
</commit_message>
<xml_diff>
--- a/incquery-deps-thesis/presentation/zv_csikos_donat.pptx
+++ b/incquery-deps-thesis/presentation/zv_csikos_donat.pptx
@@ -5,18 +5,18 @@
     <p:sldMasterId id="2147483648" r:id="rId1"/>
   </p:sldMasterIdLst>
   <p:notesMasterIdLst>
-    <p:notesMasterId r:id="rId25"/>
+    <p:notesMasterId r:id="rId24"/>
   </p:notesMasterIdLst>
   <p:sldIdLst>
     <p:sldId id="256" r:id="rId2"/>
     <p:sldId id="284" r:id="rId3"/>
     <p:sldId id="285" r:id="rId4"/>
-    <p:sldId id="262" r:id="rId5"/>
-    <p:sldId id="264" r:id="rId6"/>
-    <p:sldId id="289" r:id="rId7"/>
-    <p:sldId id="267" r:id="rId8"/>
-    <p:sldId id="270" r:id="rId9"/>
-    <p:sldId id="275" r:id="rId10"/>
+    <p:sldId id="296" r:id="rId5"/>
+    <p:sldId id="262" r:id="rId6"/>
+    <p:sldId id="264" r:id="rId7"/>
+    <p:sldId id="289" r:id="rId8"/>
+    <p:sldId id="267" r:id="rId9"/>
+    <p:sldId id="270" r:id="rId10"/>
     <p:sldId id="288" r:id="rId11"/>
     <p:sldId id="263" r:id="rId12"/>
     <p:sldId id="276" r:id="rId13"/>
@@ -25,12 +25,11 @@
     <p:sldId id="271" r:id="rId16"/>
     <p:sldId id="272" r:id="rId17"/>
     <p:sldId id="290" r:id="rId18"/>
-    <p:sldId id="273" r:id="rId19"/>
-    <p:sldId id="291" r:id="rId20"/>
-    <p:sldId id="292" r:id="rId21"/>
-    <p:sldId id="293" r:id="rId22"/>
-    <p:sldId id="294" r:id="rId23"/>
-    <p:sldId id="295" r:id="rId24"/>
+    <p:sldId id="291" r:id="rId19"/>
+    <p:sldId id="292" r:id="rId20"/>
+    <p:sldId id="293" r:id="rId21"/>
+    <p:sldId id="294" r:id="rId22"/>
+    <p:sldId id="295" r:id="rId23"/>
   </p:sldIdLst>
   <p:sldSz cx="9144000" cy="6858000" type="screen4x3"/>
   <p:notesSz cx="6858000" cy="9144000"/>
@@ -163,9 +162,9 @@
           <c:xMode val="edge"/>
           <c:yMode val="edge"/>
           <c:x val="9.2949199107120961E-2"/>
-          <c:y val="0.17004210411198609"/>
-          <c:w val="0.8881781617575577"/>
-          <c:h val="0.63050757768182231"/>
+          <c:y val="0.17004210411198614"/>
+          <c:w val="0.88817816175755759"/>
+          <c:h val="0.63050757768182253"/>
         </c:manualLayout>
       </c:layout>
       <c:lineChart>
@@ -288,11 +287,11 @@
           </c:val>
         </c:ser>
         <c:marker val="1"/>
-        <c:axId val="64293120"/>
-        <c:axId val="35086720"/>
+        <c:axId val="61610240"/>
+        <c:axId val="62288256"/>
       </c:lineChart>
       <c:catAx>
-        <c:axId val="64293120"/>
+        <c:axId val="61610240"/>
         <c:scaling>
           <c:orientation val="minMax"/>
         </c:scaling>
@@ -332,7 +331,7 @@
             <a:endParaRPr lang="en-US"/>
           </a:p>
         </c:txPr>
-        <c:crossAx val="35086720"/>
+        <c:crossAx val="62288256"/>
         <c:crosses val="autoZero"/>
         <c:lblAlgn val="ctr"/>
         <c:lblOffset val="0"/>
@@ -340,7 +339,7 @@
         <c:tickMarkSkip val="10"/>
       </c:catAx>
       <c:valAx>
-        <c:axId val="35086720"/>
+        <c:axId val="62288256"/>
         <c:scaling>
           <c:orientation val="minMax"/>
         </c:scaling>
@@ -377,7 +376,7 @@
             <a:endParaRPr lang="en-US"/>
           </a:p>
         </c:txPr>
-        <c:crossAx val="64293120"/>
+        <c:crossAx val="61610240"/>
         <c:crosses val="autoZero"/>
         <c:crossBetween val="between"/>
       </c:valAx>
@@ -391,6 +390,7 @@
 
 <file path=ppt/charts/chart2.xml><?xml version="1.0" encoding="utf-8"?>
 <c:chartSpace xmlns:c="http://schemas.openxmlformats.org/drawingml/2006/chart" xmlns:a="http://schemas.openxmlformats.org/drawingml/2006/main" xmlns:r="http://schemas.openxmlformats.org/officeDocument/2006/relationships">
+  <c:date1904 val="1"/>
   <c:lang val="en-US"/>
   <c:chart>
     <c:title>
@@ -474,11 +474,11 @@
           </c:val>
         </c:ser>
         <c:marker val="1"/>
-        <c:axId val="35105408"/>
-        <c:axId val="64439040"/>
+        <c:axId val="62298752"/>
+        <c:axId val="61805312"/>
       </c:lineChart>
       <c:catAx>
-        <c:axId val="35105408"/>
+        <c:axId val="62298752"/>
         <c:scaling>
           <c:orientation val="minMax"/>
         </c:scaling>
@@ -518,14 +518,14 @@
             <a:endParaRPr lang="en-US"/>
           </a:p>
         </c:txPr>
-        <c:crossAx val="64439040"/>
+        <c:crossAx val="61805312"/>
         <c:crosses val="autoZero"/>
         <c:auto val="1"/>
         <c:lblAlgn val="ctr"/>
         <c:lblOffset val="100"/>
       </c:catAx>
       <c:valAx>
-        <c:axId val="64439040"/>
+        <c:axId val="61805312"/>
         <c:scaling>
           <c:orientation val="minMax"/>
         </c:scaling>
@@ -562,7 +562,7 @@
             <a:endParaRPr lang="en-US"/>
           </a:p>
         </c:txPr>
-        <c:crossAx val="35105408"/>
+        <c:crossAx val="62298752"/>
         <c:crosses val="autoZero"/>
         <c:crossBetween val="between"/>
       </c:valAx>
@@ -660,11 +660,11 @@
           </c:val>
         </c:ser>
         <c:marker val="1"/>
-        <c:axId val="64968192"/>
-        <c:axId val="64970112"/>
+        <c:axId val="61826560"/>
+        <c:axId val="61828480"/>
       </c:lineChart>
       <c:catAx>
-        <c:axId val="64968192"/>
+        <c:axId val="61826560"/>
         <c:scaling>
           <c:orientation val="minMax"/>
         </c:scaling>
@@ -704,14 +704,14 @@
             <a:endParaRPr lang="en-US"/>
           </a:p>
         </c:txPr>
-        <c:crossAx val="64970112"/>
+        <c:crossAx val="61828480"/>
         <c:crosses val="autoZero"/>
         <c:auto val="1"/>
         <c:lblAlgn val="ctr"/>
         <c:lblOffset val="100"/>
       </c:catAx>
       <c:valAx>
-        <c:axId val="64970112"/>
+        <c:axId val="61828480"/>
         <c:scaling>
           <c:orientation val="minMax"/>
         </c:scaling>
@@ -748,7 +748,7 @@
             <a:endParaRPr lang="en-US"/>
           </a:p>
         </c:txPr>
-        <c:crossAx val="64968192"/>
+        <c:crossAx val="61826560"/>
         <c:crosses val="autoZero"/>
         <c:crossBetween val="between"/>
       </c:valAx>
@@ -843,7 +843,7 @@
             <a:fld id="{B6BB6350-B212-4879-B209-4DF49D0B4F10}" type="datetimeFigureOut">
               <a:rPr lang="en-US" smtClean="0"/>
               <a:pPr/>
-              <a:t>1/20/2013</a:t>
+              <a:t>1/21/2013</a:t>
             </a:fld>
             <a:endParaRPr lang="en-US"/>
           </a:p>
@@ -1238,6 +1238,172 @@
           <a:bodyPr/>
           <a:lstStyle/>
           <a:p>
+            <a:pPr marL="0" marR="0" indent="0" algn="l" defTabSz="914400" rtl="0" eaLnBrk="1" fontAlgn="auto" latinLnBrk="0" hangingPunct="1">
+              <a:lnSpc>
+                <a:spcPct val="100000"/>
+              </a:lnSpc>
+              <a:spcBef>
+                <a:spcPts val="0"/>
+              </a:spcBef>
+              <a:spcAft>
+                <a:spcPts val="0"/>
+              </a:spcAft>
+              <a:buClrTx/>
+              <a:buSzTx/>
+              <a:buFontTx/>
+              <a:buNone/>
+              <a:tabLst/>
+              <a:defRPr/>
+            </a:pPr>
+            <a:r>
+              <a:rPr lang="en-US" dirty="0" err="1" smtClean="0"/>
+              <a:t>Sokszor</a:t>
+            </a:r>
+            <a:r>
+              <a:rPr lang="en-US" baseline="0" dirty="0" smtClean="0"/>
+              <a:t> (</a:t>
+            </a:r>
+            <a:r>
+              <a:rPr lang="en-US" baseline="0" dirty="0" err="1" smtClean="0"/>
+              <a:t>itt</a:t>
+            </a:r>
+            <a:r>
+              <a:rPr lang="en-US" baseline="0" dirty="0" smtClean="0"/>
+              <a:t> is) </a:t>
+            </a:r>
+            <a:r>
+              <a:rPr lang="en-US" baseline="0" dirty="0" err="1" smtClean="0"/>
+              <a:t>csak</a:t>
+            </a:r>
+            <a:r>
+              <a:rPr lang="en-US" baseline="0" dirty="0" smtClean="0"/>
+              <a:t> a </a:t>
+            </a:r>
+            <a:r>
+              <a:rPr lang="en-US" baseline="0" dirty="0" err="1" smtClean="0"/>
+              <a:t>dián</a:t>
+            </a:r>
+            <a:r>
+              <a:rPr lang="en-US" baseline="0" dirty="0" smtClean="0"/>
+              <a:t> </a:t>
+            </a:r>
+            <a:r>
+              <a:rPr lang="en-US" baseline="0" dirty="0" err="1" smtClean="0"/>
+              <a:t>szereplő</a:t>
+            </a:r>
+            <a:r>
+              <a:rPr lang="en-US" baseline="0" dirty="0" smtClean="0"/>
+              <a:t> </a:t>
+            </a:r>
+            <a:r>
+              <a:rPr lang="en-US" baseline="0" dirty="0" err="1" smtClean="0"/>
+              <a:t>adatok</a:t>
+            </a:r>
+            <a:r>
+              <a:rPr lang="en-US" baseline="0" dirty="0" smtClean="0"/>
+              <a:t> </a:t>
+            </a:r>
+            <a:r>
+              <a:rPr lang="en-US" baseline="0" dirty="0" err="1" smtClean="0"/>
+              <a:t>töredékét</a:t>
+            </a:r>
+            <a:r>
+              <a:rPr lang="en-US" baseline="0" dirty="0" smtClean="0"/>
+              <a:t> </a:t>
+            </a:r>
+            <a:r>
+              <a:rPr lang="en-US" baseline="0" dirty="0" err="1" smtClean="0"/>
+              <a:t>mondtam</a:t>
+            </a:r>
+            <a:r>
+              <a:rPr lang="en-US" baseline="0" dirty="0" smtClean="0"/>
+              <a:t> el.</a:t>
+            </a:r>
+            <a:endParaRPr lang="en-US" dirty="0"/>
+          </a:p>
+        </p:txBody>
+      </p:sp>
+      <p:sp>
+        <p:nvSpPr>
+          <p:cNvPr id="4" name="Slide Number Placeholder 3"/>
+          <p:cNvSpPr>
+            <a:spLocks noGrp="1"/>
+          </p:cNvSpPr>
+          <p:nvPr>
+            <p:ph type="sldNum" sz="quarter" idx="10"/>
+          </p:nvPr>
+        </p:nvSpPr>
+        <p:spPr/>
+        <p:txBody>
+          <a:bodyPr/>
+          <a:lstStyle/>
+          <a:p>
+            <a:fld id="{660D7955-1178-45C7-88EB-DB10C946F729}" type="slidenum">
+              <a:rPr lang="en-US" smtClean="0"/>
+              <a:pPr/>
+              <a:t>13</a:t>
+            </a:fld>
+            <a:endParaRPr lang="en-US"/>
+          </a:p>
+        </p:txBody>
+      </p:sp>
+    </p:spTree>
+    <p:extLst>
+      <p:ext uri="{BB962C8B-B14F-4D97-AF65-F5344CB8AC3E}">
+        <p14:creationId xmlns:p14="http://schemas.microsoft.com/office/powerpoint/2010/main" xmlns="" val="1319460358"/>
+      </p:ext>
+    </p:extLst>
+  </p:cSld>
+  <p:clrMapOvr>
+    <a:masterClrMapping/>
+  </p:clrMapOvr>
+</p:notes>
+</file>
+
+<file path=ppt/notesSlides/notesSlide11.xml><?xml version="1.0" encoding="utf-8"?>
+<p:notes xmlns:a="http://schemas.openxmlformats.org/drawingml/2006/main" xmlns:r="http://schemas.openxmlformats.org/officeDocument/2006/relationships" xmlns:p="http://schemas.openxmlformats.org/presentationml/2006/main">
+  <p:cSld>
+    <p:spTree>
+      <p:nvGrpSpPr>
+        <p:cNvPr id="1" name=""/>
+        <p:cNvGrpSpPr/>
+        <p:nvPr/>
+      </p:nvGrpSpPr>
+      <p:grpSpPr>
+        <a:xfrm>
+          <a:off x="0" y="0"/>
+          <a:ext cx="0" cy="0"/>
+          <a:chOff x="0" y="0"/>
+          <a:chExt cx="0" cy="0"/>
+        </a:xfrm>
+      </p:grpSpPr>
+      <p:sp>
+        <p:nvSpPr>
+          <p:cNvPr id="2" name="Slide Image Placeholder 1"/>
+          <p:cNvSpPr>
+            <a:spLocks noGrp="1" noRot="1" noChangeAspect="1"/>
+          </p:cNvSpPr>
+          <p:nvPr>
+            <p:ph type="sldImg"/>
+          </p:nvPr>
+        </p:nvSpPr>
+        <p:spPr/>
+      </p:sp>
+      <p:sp>
+        <p:nvSpPr>
+          <p:cNvPr id="3" name="Notes Placeholder 2"/>
+          <p:cNvSpPr>
+            <a:spLocks noGrp="1"/>
+          </p:cNvSpPr>
+          <p:nvPr>
+            <p:ph type="body" idx="1"/>
+          </p:nvPr>
+        </p:nvSpPr>
+        <p:spPr/>
+        <p:txBody>
+          <a:bodyPr/>
+          <a:lstStyle/>
+          <a:p>
             <a:endParaRPr lang="en-US" dirty="0"/>
           </a:p>
         </p:txBody>
@@ -1409,6 +1575,174 @@
       </p:grpSpPr>
       <p:sp>
         <p:nvSpPr>
+          <p:cNvPr id="2" name="Diakép helye 1"/>
+          <p:cNvSpPr>
+            <a:spLocks noGrp="1" noRot="1" noChangeAspect="1"/>
+          </p:cNvSpPr>
+          <p:nvPr>
+            <p:ph type="sldImg"/>
+          </p:nvPr>
+        </p:nvSpPr>
+        <p:spPr/>
+      </p:sp>
+      <p:sp>
+        <p:nvSpPr>
+          <p:cNvPr id="3" name="Jegyzetek helye 2"/>
+          <p:cNvSpPr>
+            <a:spLocks noGrp="1"/>
+          </p:cNvSpPr>
+          <p:nvPr>
+            <p:ph type="body" idx="1"/>
+          </p:nvPr>
+        </p:nvSpPr>
+        <p:spPr/>
+        <p:txBody>
+          <a:bodyPr>
+            <a:normAutofit/>
+          </a:bodyPr>
+          <a:lstStyle/>
+          <a:p>
+            <a:endParaRPr lang="en-US" dirty="0"/>
+          </a:p>
+        </p:txBody>
+      </p:sp>
+      <p:sp>
+        <p:nvSpPr>
+          <p:cNvPr id="4" name="Dia számának helye 3"/>
+          <p:cNvSpPr>
+            <a:spLocks noGrp="1"/>
+          </p:cNvSpPr>
+          <p:nvPr>
+            <p:ph type="sldNum" sz="quarter" idx="10"/>
+          </p:nvPr>
+        </p:nvSpPr>
+        <p:spPr/>
+        <p:txBody>
+          <a:bodyPr/>
+          <a:lstStyle/>
+          <a:p>
+            <a:fld id="{E7AA0654-642B-4EC6-9896-06614A0153EC}" type="slidenum">
+              <a:rPr lang="en-US" smtClean="0"/>
+              <a:pPr/>
+              <a:t>3</a:t>
+            </a:fld>
+            <a:endParaRPr lang="en-US"/>
+          </a:p>
+        </p:txBody>
+      </p:sp>
+    </p:spTree>
+  </p:cSld>
+  <p:clrMapOvr>
+    <a:masterClrMapping/>
+  </p:clrMapOvr>
+</p:notes>
+</file>
+
+<file path=ppt/notesSlides/notesSlide4.xml><?xml version="1.0" encoding="utf-8"?>
+<p:notes xmlns:a="http://schemas.openxmlformats.org/drawingml/2006/main" xmlns:r="http://schemas.openxmlformats.org/officeDocument/2006/relationships" xmlns:p="http://schemas.openxmlformats.org/presentationml/2006/main">
+  <p:cSld>
+    <p:spTree>
+      <p:nvGrpSpPr>
+        <p:cNvPr id="1" name=""/>
+        <p:cNvGrpSpPr/>
+        <p:nvPr/>
+      </p:nvGrpSpPr>
+      <p:grpSpPr>
+        <a:xfrm>
+          <a:off x="0" y="0"/>
+          <a:ext cx="0" cy="0"/>
+          <a:chOff x="0" y="0"/>
+          <a:chExt cx="0" cy="0"/>
+        </a:xfrm>
+      </p:grpSpPr>
+      <p:sp>
+        <p:nvSpPr>
+          <p:cNvPr id="2" name="Diakép helye 1"/>
+          <p:cNvSpPr>
+            <a:spLocks noGrp="1" noRot="1" noChangeAspect="1"/>
+          </p:cNvSpPr>
+          <p:nvPr>
+            <p:ph type="sldImg"/>
+          </p:nvPr>
+        </p:nvSpPr>
+        <p:spPr/>
+      </p:sp>
+      <p:sp>
+        <p:nvSpPr>
+          <p:cNvPr id="3" name="Jegyzetek helye 2"/>
+          <p:cNvSpPr>
+            <a:spLocks noGrp="1"/>
+          </p:cNvSpPr>
+          <p:nvPr>
+            <p:ph type="body" idx="1"/>
+          </p:nvPr>
+        </p:nvSpPr>
+        <p:spPr/>
+        <p:txBody>
+          <a:bodyPr>
+            <a:normAutofit/>
+          </a:bodyPr>
+          <a:lstStyle/>
+          <a:p>
+            <a:r>
+              <a:rPr lang="en-US" smtClean="0"/>
+              <a:t>A </a:t>
+            </a:r>
+            <a:endParaRPr lang="en-US" dirty="0"/>
+          </a:p>
+        </p:txBody>
+      </p:sp>
+      <p:sp>
+        <p:nvSpPr>
+          <p:cNvPr id="4" name="Dia számának helye 3"/>
+          <p:cNvSpPr>
+            <a:spLocks noGrp="1"/>
+          </p:cNvSpPr>
+          <p:nvPr>
+            <p:ph type="sldNum" sz="quarter" idx="10"/>
+          </p:nvPr>
+        </p:nvSpPr>
+        <p:spPr/>
+        <p:txBody>
+          <a:bodyPr/>
+          <a:lstStyle/>
+          <a:p>
+            <a:fld id="{E7AA0654-642B-4EC6-9896-06614A0153EC}" type="slidenum">
+              <a:rPr lang="en-US" smtClean="0"/>
+              <a:pPr/>
+              <a:t>4</a:t>
+            </a:fld>
+            <a:endParaRPr lang="en-US"/>
+          </a:p>
+        </p:txBody>
+      </p:sp>
+    </p:spTree>
+  </p:cSld>
+  <p:clrMapOvr>
+    <a:masterClrMapping/>
+  </p:clrMapOvr>
+</p:notes>
+</file>
+
+<file path=ppt/notesSlides/notesSlide5.xml><?xml version="1.0" encoding="utf-8"?>
+<p:notes xmlns:a="http://schemas.openxmlformats.org/drawingml/2006/main" xmlns:r="http://schemas.openxmlformats.org/officeDocument/2006/relationships" xmlns:p="http://schemas.openxmlformats.org/presentationml/2006/main">
+  <p:cSld>
+    <p:spTree>
+      <p:nvGrpSpPr>
+        <p:cNvPr id="1" name=""/>
+        <p:cNvGrpSpPr/>
+        <p:nvPr/>
+      </p:nvGrpSpPr>
+      <p:grpSpPr>
+        <a:xfrm>
+          <a:off x="0" y="0"/>
+          <a:ext cx="0" cy="0"/>
+          <a:chOff x="0" y="0"/>
+          <a:chExt cx="0" cy="0"/>
+        </a:xfrm>
+      </p:grpSpPr>
+      <p:sp>
+        <p:nvSpPr>
           <p:cNvPr id="2" name="Slide Image Placeholder 1"/>
           <p:cNvSpPr>
             <a:spLocks noGrp="1" noRot="1" noChangeAspect="1"/>
@@ -1481,7 +1815,7 @@
             <a:fld id="{E7AA0654-642B-4EC6-9896-06614A0153EC}" type="slidenum">
               <a:rPr lang="en-US" smtClean="0"/>
               <a:pPr/>
-              <a:t>4</a:t>
+              <a:t>5</a:t>
             </a:fld>
             <a:endParaRPr lang="en-US"/>
           </a:p>
@@ -1491,179 +1825,6 @@
     <p:extLst>
       <p:ext uri="{BB962C8B-B14F-4D97-AF65-F5344CB8AC3E}">
         <p14:creationId xmlns:p14="http://schemas.microsoft.com/office/powerpoint/2010/main" xmlns="" val="212778437"/>
-      </p:ext>
-    </p:extLst>
-  </p:cSld>
-  <p:clrMapOvr>
-    <a:masterClrMapping/>
-  </p:clrMapOvr>
-</p:notes>
-</file>
-
-<file path=ppt/notesSlides/notesSlide4.xml><?xml version="1.0" encoding="utf-8"?>
-<p:notes xmlns:a="http://schemas.openxmlformats.org/drawingml/2006/main" xmlns:r="http://schemas.openxmlformats.org/officeDocument/2006/relationships" xmlns:p="http://schemas.openxmlformats.org/presentationml/2006/main">
-  <p:cSld>
-    <p:spTree>
-      <p:nvGrpSpPr>
-        <p:cNvPr id="1" name=""/>
-        <p:cNvGrpSpPr/>
-        <p:nvPr/>
-      </p:nvGrpSpPr>
-      <p:grpSpPr>
-        <a:xfrm>
-          <a:off x="0" y="0"/>
-          <a:ext cx="0" cy="0"/>
-          <a:chOff x="0" y="0"/>
-          <a:chExt cx="0" cy="0"/>
-        </a:xfrm>
-      </p:grpSpPr>
-      <p:sp>
-        <p:nvSpPr>
-          <p:cNvPr id="2" name="Slide Image Placeholder 1"/>
-          <p:cNvSpPr>
-            <a:spLocks noGrp="1" noRot="1" noChangeAspect="1"/>
-          </p:cNvSpPr>
-          <p:nvPr>
-            <p:ph type="sldImg"/>
-          </p:nvPr>
-        </p:nvSpPr>
-        <p:spPr/>
-      </p:sp>
-      <p:sp>
-        <p:nvSpPr>
-          <p:cNvPr id="3" name="Notes Placeholder 2"/>
-          <p:cNvSpPr>
-            <a:spLocks noGrp="1"/>
-          </p:cNvSpPr>
-          <p:nvPr>
-            <p:ph type="body" idx="1"/>
-          </p:nvPr>
-        </p:nvSpPr>
-        <p:spPr/>
-        <p:txBody>
-          <a:bodyPr/>
-          <a:lstStyle/>
-          <a:p>
-            <a:endParaRPr lang="en-US" dirty="0"/>
-          </a:p>
-        </p:txBody>
-      </p:sp>
-      <p:sp>
-        <p:nvSpPr>
-          <p:cNvPr id="4" name="Slide Number Placeholder 3"/>
-          <p:cNvSpPr>
-            <a:spLocks noGrp="1"/>
-          </p:cNvSpPr>
-          <p:nvPr>
-            <p:ph type="sldNum" sz="quarter" idx="10"/>
-          </p:nvPr>
-        </p:nvSpPr>
-        <p:spPr/>
-        <p:txBody>
-          <a:bodyPr/>
-          <a:lstStyle/>
-          <a:p>
-            <a:fld id="{E7AA0654-642B-4EC6-9896-06614A0153EC}" type="slidenum">
-              <a:rPr lang="en-US" smtClean="0"/>
-              <a:pPr/>
-              <a:t>5</a:t>
-            </a:fld>
-            <a:endParaRPr lang="en-US"/>
-          </a:p>
-        </p:txBody>
-      </p:sp>
-    </p:spTree>
-    <p:extLst>
-      <p:ext uri="{BB962C8B-B14F-4D97-AF65-F5344CB8AC3E}">
-        <p14:creationId xmlns:p14="http://schemas.microsoft.com/office/powerpoint/2010/main" xmlns="" val="1846358032"/>
-      </p:ext>
-    </p:extLst>
-  </p:cSld>
-  <p:clrMapOvr>
-    <a:masterClrMapping/>
-  </p:clrMapOvr>
-</p:notes>
-</file>
-
-<file path=ppt/notesSlides/notesSlide5.xml><?xml version="1.0" encoding="utf-8"?>
-<p:notes xmlns:a="http://schemas.openxmlformats.org/drawingml/2006/main" xmlns:r="http://schemas.openxmlformats.org/officeDocument/2006/relationships" xmlns:p="http://schemas.openxmlformats.org/presentationml/2006/main">
-  <p:cSld>
-    <p:spTree>
-      <p:nvGrpSpPr>
-        <p:cNvPr id="1" name=""/>
-        <p:cNvGrpSpPr/>
-        <p:nvPr/>
-      </p:nvGrpSpPr>
-      <p:grpSpPr>
-        <a:xfrm>
-          <a:off x="0" y="0"/>
-          <a:ext cx="0" cy="0"/>
-          <a:chOff x="0" y="0"/>
-          <a:chExt cx="0" cy="0"/>
-        </a:xfrm>
-      </p:grpSpPr>
-      <p:sp>
-        <p:nvSpPr>
-          <p:cNvPr id="2" name="Slide Image Placeholder 1"/>
-          <p:cNvSpPr>
-            <a:spLocks noGrp="1" noRot="1" noChangeAspect="1"/>
-          </p:cNvSpPr>
-          <p:nvPr>
-            <p:ph type="sldImg"/>
-          </p:nvPr>
-        </p:nvSpPr>
-        <p:spPr/>
-      </p:sp>
-      <p:sp>
-        <p:nvSpPr>
-          <p:cNvPr id="3" name="Notes Placeholder 2"/>
-          <p:cNvSpPr>
-            <a:spLocks noGrp="1"/>
-          </p:cNvSpPr>
-          <p:nvPr>
-            <p:ph type="body" idx="1"/>
-          </p:nvPr>
-        </p:nvSpPr>
-        <p:spPr/>
-        <p:txBody>
-          <a:bodyPr/>
-          <a:lstStyle/>
-          <a:p>
-            <a:endParaRPr lang="hu-HU" dirty="0" smtClean="0"/>
-          </a:p>
-          <a:p>
-            <a:endParaRPr lang="en-US" dirty="0"/>
-          </a:p>
-        </p:txBody>
-      </p:sp>
-      <p:sp>
-        <p:nvSpPr>
-          <p:cNvPr id="4" name="Slide Number Placeholder 3"/>
-          <p:cNvSpPr>
-            <a:spLocks noGrp="1"/>
-          </p:cNvSpPr>
-          <p:nvPr>
-            <p:ph type="sldNum" sz="quarter" idx="10"/>
-          </p:nvPr>
-        </p:nvSpPr>
-        <p:spPr/>
-        <p:txBody>
-          <a:bodyPr/>
-          <a:lstStyle/>
-          <a:p>
-            <a:fld id="{E7AA0654-642B-4EC6-9896-06614A0153EC}" type="slidenum">
-              <a:rPr lang="en-US" smtClean="0"/>
-              <a:pPr/>
-              <a:t>7</a:t>
-            </a:fld>
-            <a:endParaRPr lang="en-US"/>
-          </a:p>
-        </p:txBody>
-      </p:sp>
-    </p:spTree>
-    <p:extLst>
-      <p:ext uri="{BB962C8B-B14F-4D97-AF65-F5344CB8AC3E}">
-        <p14:creationId xmlns:p14="http://schemas.microsoft.com/office/powerpoint/2010/main" xmlns="" val="2696810295"/>
       </p:ext>
     </p:extLst>
   </p:cSld>
@@ -1717,16 +1878,6 @@
           <a:bodyPr/>
           <a:lstStyle/>
           <a:p>
-            <a:r>
-              <a:rPr lang="hu-HU" dirty="0" smtClean="0"/>
-              <a:t>Ami boldface,</a:t>
-            </a:r>
-            <a:r>
-              <a:rPr lang="hu-HU" baseline="0" dirty="0" smtClean="0"/>
-              <a:t> azt hangsúlyozni is!!!</a:t>
-            </a:r>
-          </a:p>
-          <a:p>
             <a:endParaRPr lang="en-US" dirty="0"/>
           </a:p>
         </p:txBody>
@@ -1749,7 +1900,7 @@
             <a:fld id="{E7AA0654-642B-4EC6-9896-06614A0153EC}" type="slidenum">
               <a:rPr lang="en-US" smtClean="0"/>
               <a:pPr/>
-              <a:t>8</a:t>
+              <a:t>6</a:t>
             </a:fld>
             <a:endParaRPr lang="en-US"/>
           </a:p>
@@ -1758,7 +1909,7 @@
     </p:spTree>
     <p:extLst>
       <p:ext uri="{BB962C8B-B14F-4D97-AF65-F5344CB8AC3E}">
-        <p14:creationId xmlns:p14="http://schemas.microsoft.com/office/powerpoint/2010/main" xmlns="" val="3679442458"/>
+        <p14:creationId xmlns:p14="http://schemas.microsoft.com/office/powerpoint/2010/main" xmlns="" val="1846358032"/>
       </p:ext>
     </p:extLst>
   </p:cSld>
@@ -1812,15 +1963,6 @@
           <a:bodyPr/>
           <a:lstStyle/>
           <a:p>
-            <a:pPr lvl="1"/>
-            <a:r>
-              <a:rPr lang="hu-HU" dirty="0" smtClean="0"/>
-              <a:t>Esetleg:</a:t>
-            </a:r>
-            <a:r>
-              <a:rPr lang="hu-HU" baseline="0" dirty="0" smtClean="0"/>
-              <a:t> függőségi modell és forráskód modell alulra!</a:t>
-            </a:r>
             <a:endParaRPr lang="hu-HU" dirty="0" smtClean="0"/>
           </a:p>
           <a:p>
@@ -1843,10 +1985,10 @@
           <a:bodyPr/>
           <a:lstStyle/>
           <a:p>
-            <a:fld id="{660D7955-1178-45C7-88EB-DB10C946F729}" type="slidenum">
+            <a:fld id="{E7AA0654-642B-4EC6-9896-06614A0153EC}" type="slidenum">
               <a:rPr lang="en-US" smtClean="0"/>
               <a:pPr/>
-              <a:t>9</a:t>
+              <a:t>8</a:t>
             </a:fld>
             <a:endParaRPr lang="en-US"/>
           </a:p>
@@ -1855,7 +1997,7 @@
     </p:spTree>
     <p:extLst>
       <p:ext uri="{BB962C8B-B14F-4D97-AF65-F5344CB8AC3E}">
-        <p14:creationId xmlns:p14="http://schemas.microsoft.com/office/powerpoint/2010/main" xmlns="" val="2603194435"/>
+        <p14:creationId xmlns:p14="http://schemas.microsoft.com/office/powerpoint/2010/main" xmlns="" val="2696810295"/>
       </p:ext>
     </p:extLst>
   </p:cSld>
@@ -1909,6 +2051,16 @@
           <a:bodyPr/>
           <a:lstStyle/>
           <a:p>
+            <a:r>
+              <a:rPr lang="hu-HU" dirty="0" smtClean="0"/>
+              <a:t>Ami boldface,</a:t>
+            </a:r>
+            <a:r>
+              <a:rPr lang="hu-HU" baseline="0" dirty="0" smtClean="0"/>
+              <a:t> azt hangsúlyozni is!!!</a:t>
+            </a:r>
+          </a:p>
+          <a:p>
             <a:endParaRPr lang="en-US" dirty="0"/>
           </a:p>
         </p:txBody>
@@ -1931,7 +2083,7 @@
             <a:fld id="{E7AA0654-642B-4EC6-9896-06614A0153EC}" type="slidenum">
               <a:rPr lang="en-US" smtClean="0"/>
               <a:pPr/>
-              <a:t>11</a:t>
+              <a:t>9</a:t>
             </a:fld>
             <a:endParaRPr lang="en-US"/>
           </a:p>
@@ -1940,7 +2092,7 @@
     </p:spTree>
     <p:extLst>
       <p:ext uri="{BB962C8B-B14F-4D97-AF65-F5344CB8AC3E}">
-        <p14:creationId xmlns:p14="http://schemas.microsoft.com/office/powerpoint/2010/main" xmlns="" val="3832885243"/>
+        <p14:creationId xmlns:p14="http://schemas.microsoft.com/office/powerpoint/2010/main" xmlns="" val="3679442458"/>
       </p:ext>
     </p:extLst>
   </p:cSld>
@@ -2013,10 +2165,10 @@
           <a:bodyPr/>
           <a:lstStyle/>
           <a:p>
-            <a:fld id="{660D7955-1178-45C7-88EB-DB10C946F729}" type="slidenum">
+            <a:fld id="{E7AA0654-642B-4EC6-9896-06614A0153EC}" type="slidenum">
               <a:rPr lang="en-US" smtClean="0"/>
               <a:pPr/>
-              <a:t>13</a:t>
+              <a:t>11</a:t>
             </a:fld>
             <a:endParaRPr lang="en-US"/>
           </a:p>
@@ -2025,7 +2177,7 @@
     </p:spTree>
     <p:extLst>
       <p:ext uri="{BB962C8B-B14F-4D97-AF65-F5344CB8AC3E}">
-        <p14:creationId xmlns:p14="http://schemas.microsoft.com/office/powerpoint/2010/main" xmlns="" val="1319460358"/>
+        <p14:creationId xmlns:p14="http://schemas.microsoft.com/office/powerpoint/2010/main" xmlns="" val="3832885243"/>
       </p:ext>
     </p:extLst>
   </p:cSld>
@@ -2245,7 +2397,7 @@
             <a:fld id="{988E2377-5A2B-4430-898A-9BDF4D4B2C89}" type="datetime1">
               <a:rPr lang="hu-HU" smtClean="0"/>
               <a:pPr/>
-              <a:t>2013. 01. 20.</a:t>
+              <a:t>2013. 01. 21.</a:t>
             </a:fld>
             <a:endParaRPr lang="en-US" dirty="0"/>
           </a:p>
@@ -2489,7 +2641,7 @@
             <a:fld id="{7B864028-9744-478B-88E3-26F084497025}" type="datetime1">
               <a:rPr lang="en-US" smtClean="0"/>
               <a:pPr/>
-              <a:t>1/20/2013</a:t>
+              <a:t>1/21/2013</a:t>
             </a:fld>
             <a:endParaRPr lang="en-US"/>
           </a:p>
@@ -2661,7 +2813,7 @@
             <a:fld id="{EBB51852-6F03-4A13-AA91-55B0596808AB}" type="datetime1">
               <a:rPr lang="en-US" smtClean="0"/>
               <a:pPr/>
-              <a:t>1/20/2013</a:t>
+              <a:t>1/21/2013</a:t>
             </a:fld>
             <a:endParaRPr lang="en-US"/>
           </a:p>
@@ -2843,7 +2995,7 @@
             <a:fld id="{AEC4224A-B86D-480C-80D3-0B1F736D6B50}" type="datetime1">
               <a:rPr lang="en-US" smtClean="0"/>
               <a:pPr/>
-              <a:t>1/20/2013</a:t>
+              <a:t>1/21/2013</a:t>
             </a:fld>
             <a:endParaRPr lang="en-US"/>
           </a:p>
@@ -3015,7 +3167,7 @@
             <a:fld id="{FC89F6FF-6983-47B6-896B-DFAD3FEC5404}" type="datetime1">
               <a:rPr lang="en-US" smtClean="0"/>
               <a:pPr/>
-              <a:t>1/20/2013</a:t>
+              <a:t>1/21/2013</a:t>
             </a:fld>
             <a:endParaRPr lang="en-US"/>
           </a:p>
@@ -3203,7 +3355,7 @@
             <a:fld id="{FC89F6FF-6983-47B6-896B-DFAD3FEC5404}" type="datetime1">
               <a:rPr lang="en-US" smtClean="0"/>
               <a:pPr/>
-              <a:t>1/20/2013</a:t>
+              <a:t>1/21/2013</a:t>
             </a:fld>
             <a:endParaRPr lang="en-US"/>
           </a:p>
@@ -3451,7 +3603,7 @@
             <a:fld id="{4FD5BFFF-D6A7-404D-B75B-FD402B77D341}" type="datetime1">
               <a:rPr lang="en-US" smtClean="0"/>
               <a:pPr/>
-              <a:t>1/20/2013</a:t>
+              <a:t>1/21/2013</a:t>
             </a:fld>
             <a:endParaRPr lang="en-US"/>
           </a:p>
@@ -3741,7 +3893,7 @@
             <a:fld id="{675379F5-84BC-483B-951E-F251080202DB}" type="datetime1">
               <a:rPr lang="en-US" smtClean="0"/>
               <a:pPr/>
-              <a:t>1/20/2013</a:t>
+              <a:t>1/21/2013</a:t>
             </a:fld>
             <a:endParaRPr lang="en-US"/>
           </a:p>
@@ -4165,7 +4317,7 @@
             <a:fld id="{7C24BFC6-6DC7-44C8-975D-44F36F89785D}" type="datetime1">
               <a:rPr lang="en-US" smtClean="0"/>
               <a:pPr/>
-              <a:t>1/20/2013</a:t>
+              <a:t>1/21/2013</a:t>
             </a:fld>
             <a:endParaRPr lang="en-US"/>
           </a:p>
@@ -4285,7 +4437,7 @@
             <a:fld id="{D603358A-7423-4A08-AD10-C1AABD3EC89A}" type="datetime1">
               <a:rPr lang="en-US" smtClean="0"/>
               <a:pPr/>
-              <a:t>1/20/2013</a:t>
+              <a:t>1/21/2013</a:t>
             </a:fld>
             <a:endParaRPr lang="en-US"/>
           </a:p>
@@ -4382,7 +4534,7 @@
             <a:fld id="{7C8EBF4A-BDC5-4ACC-A8F9-3185B72C1A00}" type="datetime1">
               <a:rPr lang="en-US" smtClean="0"/>
               <a:pPr/>
-              <a:t>1/20/2013</a:t>
+              <a:t>1/21/2013</a:t>
             </a:fld>
             <a:endParaRPr lang="en-US"/>
           </a:p>
@@ -4661,7 +4813,7 @@
             <a:fld id="{381D60EE-3D79-455C-ACAD-DB08D31B7304}" type="datetime1">
               <a:rPr lang="en-US" smtClean="0"/>
               <a:pPr/>
-              <a:t>1/20/2013</a:t>
+              <a:t>1/21/2013</a:t>
             </a:fld>
             <a:endParaRPr lang="en-US"/>
           </a:p>
@@ -4897,7 +5049,7 @@
             <a:fld id="{9C3E8280-08C7-4D0C-A667-EBCDF03AF467}" type="datetime1">
               <a:rPr lang="en-US" smtClean="0"/>
               <a:pPr/>
-              <a:t>1/20/2013</a:t>
+              <a:t>1/21/2013</a:t>
             </a:fld>
             <a:endParaRPr lang="en-US"/>
           </a:p>
@@ -7171,7 +7323,7 @@
       </p:grpSpPr>
       <p:sp>
         <p:nvSpPr>
-          <p:cNvPr id="2" name="Title 1"/>
+          <p:cNvPr id="8" name="Title 7"/>
           <p:cNvSpPr>
             <a:spLocks noGrp="1"/>
           </p:cNvSpPr>
@@ -7185,8 +7337,16 @@
           <a:lstStyle/>
           <a:p>
             <a:r>
-              <a:rPr lang="hu-HU" dirty="0" smtClean="0"/>
-              <a:t>Távlati célok</a:t>
+              <a:rPr lang="hu-HU" dirty="0"/>
+              <a:t>Válaszok a </a:t>
+            </a:r>
+            <a:r>
+              <a:rPr lang="hu-HU" dirty="0" smtClean="0"/>
+              <a:t>bírálóK </a:t>
+            </a:r>
+            <a:r>
+              <a:rPr lang="hu-HU" dirty="0"/>
+              <a:t>kérdéseire</a:t>
             </a:r>
             <a:endParaRPr lang="en-US" dirty="0"/>
           </a:p>
@@ -7194,12 +7354,12 @@
       </p:sp>
       <p:sp>
         <p:nvSpPr>
-          <p:cNvPr id="3" name="Content Placeholder 2"/>
+          <p:cNvPr id="9" name="Text Placeholder 8"/>
           <p:cNvSpPr>
             <a:spLocks noGrp="1"/>
           </p:cNvSpPr>
           <p:nvPr>
-            <p:ph idx="1"/>
+            <p:ph type="body" idx="1"/>
           </p:nvPr>
         </p:nvSpPr>
         <p:spPr/>
@@ -7207,52 +7367,7 @@
           <a:bodyPr/>
           <a:lstStyle/>
           <a:p>
-            <a:r>
-              <a:rPr lang="hu-HU" dirty="0"/>
-              <a:t>F</a:t>
-            </a:r>
-            <a:r>
-              <a:rPr lang="hu-HU" dirty="0" smtClean="0"/>
-              <a:t>elhasználói felület integráció kiterjesztése</a:t>
-            </a:r>
-          </a:p>
-          <a:p>
-            <a:pPr lvl="1"/>
-            <a:r>
-              <a:rPr lang="hu-HU" dirty="0" smtClean="0"/>
-              <a:t>Eclipse-be épített függőségi keresés kiváltása</a:t>
-            </a:r>
-          </a:p>
-          <a:p>
-            <a:r>
-              <a:rPr lang="hu-HU" dirty="0" smtClean="0"/>
-              <a:t>Kiterjeszés C/C++ szoftverekre</a:t>
-            </a:r>
-          </a:p>
-          <a:p>
-            <a:pPr lvl="1"/>
-            <a:r>
-              <a:rPr lang="hu-HU" dirty="0" smtClean="0"/>
-              <a:t>Eclipse CDT alapján</a:t>
-            </a:r>
-          </a:p>
-          <a:p>
-            <a:r>
-              <a:rPr lang="hu-HU" dirty="0" smtClean="0"/>
-              <a:t>Szoftvermetrikák azonnali ellenőrzése</a:t>
-            </a:r>
-          </a:p>
-          <a:p>
-            <a:pPr lvl="1"/>
-            <a:r>
-              <a:rPr lang="en-US" dirty="0" smtClean="0"/>
-              <a:t>G</a:t>
-            </a:r>
-            <a:r>
-              <a:rPr lang="hu-HU" dirty="0" smtClean="0"/>
-              <a:t>ráfminták kiterjesztése metrikákra</a:t>
-            </a:r>
-            <a:endParaRPr lang="en-US" dirty="0"/>
+            <a:endParaRPr lang="en-US"/>
           </a:p>
         </p:txBody>
       </p:sp>
@@ -7283,21 +7398,13 @@
     </p:spTree>
     <p:extLst>
       <p:ext uri="{BB962C8B-B14F-4D97-AF65-F5344CB8AC3E}">
-        <p14:creationId xmlns:p14="http://schemas.microsoft.com/office/powerpoint/2010/main" xmlns="" val="1048539272"/>
+        <p14:creationId xmlns:p14="http://schemas.microsoft.com/office/powerpoint/2010/main" xmlns="" val="1797703964"/>
       </p:ext>
     </p:extLst>
   </p:cSld>
   <p:clrMapOvr>
     <a:masterClrMapping/>
   </p:clrMapOvr>
-  <mc:AlternateContent xmlns:mc="http://schemas.openxmlformats.org/markup-compatibility/2006">
-    <mc:Choice xmlns:p14="http://schemas.microsoft.com/office/powerpoint/2010/main" xmlns="" Requires="p14">
-      <p:transition spd="slow" p14:dur="2000"/>
-    </mc:Choice>
-    <mc:Fallback>
-      <p:transition spd="slow"/>
-    </mc:Fallback>
-  </mc:AlternateContent>
   <p:timing>
     <p:tnLst>
       <p:par>
@@ -7337,41 +7444,73 @@
         </p:nvSpPr>
         <p:spPr/>
         <p:txBody>
-          <a:bodyPr/>
-          <a:lstStyle/>
-          <a:p>
-            <a:r>
-              <a:rPr lang="hu-HU" dirty="0"/>
-              <a:t>Válaszok a </a:t>
-            </a:r>
-            <a:r>
-              <a:rPr lang="hu-HU" dirty="0" smtClean="0"/>
-              <a:t>bírálóK </a:t>
-            </a:r>
-            <a:r>
-              <a:rPr lang="hu-HU" dirty="0"/>
-              <a:t>kérdéseire</a:t>
-            </a:r>
-            <a:endParaRPr lang="en-US" dirty="0"/>
-          </a:p>
-        </p:txBody>
-      </p:sp>
-      <p:sp>
-        <p:nvSpPr>
-          <p:cNvPr id="9" name="Text Placeholder 8"/>
+          <a:bodyPr>
+            <a:noAutofit/>
+          </a:bodyPr>
+          <a:lstStyle/>
+          <a:p>
+            <a:r>
+              <a:rPr lang="hu-HU" sz="2800" i="1" dirty="0" smtClean="0"/>
+              <a:t>“Hogyan kezeli a rendszer a </a:t>
+            </a:r>
+            <a:r>
+              <a:rPr lang="hu-HU" sz="2800" i="1" dirty="0" err="1" smtClean="0"/>
+              <a:t>product-ok</a:t>
+            </a:r>
+            <a:r>
+              <a:rPr lang="hu-HU" sz="2800" i="1" dirty="0" smtClean="0"/>
+              <a:t> különböző verzióit? A régi verzióka</a:t>
+            </a:r>
+            <a:r>
+              <a:rPr lang="hu-HU" sz="2800" dirty="0" smtClean="0"/>
+              <a:t>t milyen szabály szerint tünteti el a rendszer?”</a:t>
+            </a:r>
+            <a:endParaRPr lang="hu-HU" sz="2800" i="1" dirty="0" smtClean="0"/>
+          </a:p>
+        </p:txBody>
+      </p:sp>
+      <p:sp>
+        <p:nvSpPr>
+          <p:cNvPr id="5" name="Tartalom helye 4"/>
           <p:cNvSpPr>
             <a:spLocks noGrp="1"/>
           </p:cNvSpPr>
           <p:nvPr>
-            <p:ph type="body" idx="1"/>
+            <p:ph idx="1"/>
           </p:nvPr>
         </p:nvSpPr>
         <p:spPr/>
         <p:txBody>
-          <a:bodyPr/>
-          <a:lstStyle/>
-          <a:p>
-            <a:endParaRPr lang="en-US"/>
+          <a:bodyPr>
+            <a:normAutofit/>
+          </a:bodyPr>
+          <a:lstStyle/>
+          <a:p>
+            <a:r>
+              <a:rPr lang="hu-HU" dirty="0" smtClean="0"/>
+              <a:t>Verziószám-lista minden objektumhoz</a:t>
+            </a:r>
+          </a:p>
+          <a:p>
+            <a:pPr lvl="1"/>
+            <a:r>
+              <a:rPr lang="hu-HU" dirty="0" smtClean="0"/>
+              <a:t>Már létező objektum → csak ez a lista frissül</a:t>
+            </a:r>
+          </a:p>
+          <a:p>
+            <a:r>
+              <a:rPr lang="hu-HU" dirty="0" smtClean="0"/>
+              <a:t> Nincs szükség eltávolításra</a:t>
+            </a:r>
+          </a:p>
+          <a:p>
+            <a:pPr lvl="1"/>
+            <a:r>
+              <a:rPr lang="hu-HU" dirty="0" smtClean="0"/>
+              <a:t>Szerver folyamat: összes projekt összes verzióját felderíti egy kijelölt időponttól</a:t>
+            </a:r>
+            <a:endParaRPr lang="hu-HU" dirty="0"/>
           </a:p>
         </p:txBody>
       </p:sp>
@@ -9576,21 +9715,16 @@
           <a:p>
             <a:r>
               <a:rPr lang="hu-HU" sz="2800" i="1" dirty="0" smtClean="0"/>
-              <a:t>“Hogyan kezeli a rendszer a </a:t>
-            </a:r>
-            <a:r>
-              <a:rPr lang="hu-HU" sz="2800" i="1" dirty="0" err="1" smtClean="0"/>
-              <a:t>product-ok</a:t>
+              <a:t>“A projekt tapasztalatai alapján van-e olyan aspektus, amit jobban támogathatna a Java programozási nyelv – statikus elemezhetőség szempontjából</a:t>
+            </a:r>
+            <a:r>
+              <a:rPr lang="hu-HU" sz="2800" dirty="0" smtClean="0"/>
+              <a:t>?</a:t>
             </a:r>
             <a:r>
               <a:rPr lang="hu-HU" sz="2800" i="1" dirty="0" smtClean="0"/>
-              <a:t> különböző verzióit? A régi verzióka</a:t>
-            </a:r>
-            <a:r>
-              <a:rPr lang="hu-HU" sz="2800" dirty="0" smtClean="0"/>
-              <a:t>t milyen szabály szerint tünteti el a rendszer?”</a:t>
-            </a:r>
-            <a:endParaRPr lang="hu-HU" sz="2800" i="1" dirty="0" smtClean="0"/>
+              <a:t>”</a:t>
+            </a:r>
           </a:p>
         </p:txBody>
       </p:sp>
@@ -9613,7 +9747,11 @@
           <a:p>
             <a:r>
               <a:rPr lang="hu-HU" dirty="0" smtClean="0"/>
-              <a:t>Verziószám-lista minden objektumhoz</a:t>
+              <a:t>Nem létezik a "komponens" fogalma </a:t>
+            </a:r>
+            <a:r>
+              <a:rPr lang="hu-HU" dirty="0" err="1" smtClean="0"/>
+              <a:t>Java-ban</a:t>
             </a:r>
             <a:endParaRPr lang="hu-HU" dirty="0" smtClean="0"/>
           </a:p>
@@ -9621,36 +9759,41 @@
             <a:pPr lvl="1"/>
             <a:r>
               <a:rPr lang="hu-HU" dirty="0" smtClean="0"/>
-              <a:t>Már létező objektum</a:t>
-            </a:r>
-            <a:r>
-              <a:rPr lang="hu-HU" dirty="0" smtClean="0"/>
-              <a:t> → csak ez a lista frissül</a:t>
-            </a:r>
-            <a:endParaRPr lang="hu-HU" dirty="0" smtClean="0"/>
-          </a:p>
-          <a:p>
-            <a:r>
-              <a:rPr lang="hu-HU" dirty="0" smtClean="0"/>
-              <a:t> Nincs szükség eltávolításra</a:t>
-            </a:r>
-            <a:endParaRPr lang="hu-HU" dirty="0" smtClean="0"/>
+              <a:t>Csak magasabb szinten van rá implementáció (Pl. </a:t>
+            </a:r>
+            <a:r>
+              <a:rPr lang="hu-HU" dirty="0" err="1" smtClean="0"/>
+              <a:t>OSGi</a:t>
+            </a:r>
+            <a:r>
+              <a:rPr lang="hu-HU" dirty="0" smtClean="0"/>
+              <a:t>)</a:t>
+            </a:r>
           </a:p>
           <a:p>
             <a:pPr lvl="1"/>
             <a:r>
               <a:rPr lang="hu-HU" dirty="0" smtClean="0"/>
-              <a:t>Szerver </a:t>
-            </a:r>
-            <a:r>
-              <a:rPr lang="hu-HU" dirty="0" smtClean="0"/>
-              <a:t>folyamat: összes projekt összes verzióját felderíti egy kijelölt </a:t>
-            </a:r>
-            <a:r>
-              <a:rPr lang="hu-HU" dirty="0" smtClean="0"/>
-              <a:t>időponttól</a:t>
-            </a:r>
-            <a:endParaRPr lang="hu-HU" dirty="0"/>
+              <a:t>Implementáció kereséssel oldja fel az import deklarációkat</a:t>
+            </a:r>
+          </a:p>
+          <a:p>
+            <a:pPr marL="342900" lvl="1" indent="-342900">
+              <a:buFont typeface="Arial" pitchFamily="34" charset="0"/>
+              <a:buChar char="•"/>
+            </a:pPr>
+            <a:r>
+              <a:rPr lang="hu-HU" dirty="0" smtClean="0"/>
+              <a:t>Megoldás Java 8-ban (Project </a:t>
+            </a:r>
+            <a:r>
+              <a:rPr lang="hu-HU" dirty="0" err="1" smtClean="0"/>
+              <a:t>Jigsaw</a:t>
+            </a:r>
+            <a:r>
+              <a:rPr lang="hu-HU" dirty="0" smtClean="0"/>
+              <a:t>)</a:t>
+            </a:r>
           </a:p>
         </p:txBody>
       </p:sp>
@@ -9733,18 +9876,77 @@
           <a:lstStyle/>
           <a:p>
             <a:r>
-              <a:rPr lang="hu-HU" sz="2800" i="1" dirty="0" smtClean="0"/>
-              <a:t>“A projekt tapasztalatai alapján van-e olyan aspektus, amit jobban támogathatna a Java programozási nyelv – statikus elemezhetőség szempontjából</a:t>
-            </a:r>
-            <a:r>
-              <a:rPr lang="hu-HU" sz="2800" dirty="0" smtClean="0"/>
-              <a:t>?</a:t>
-            </a:r>
-            <a:r>
-              <a:rPr lang="hu-HU" sz="2800" i="1" dirty="0" smtClean="0"/>
+              <a:rPr lang="hu-HU" sz="2400" i="1" dirty="0" smtClean="0"/>
+              <a:t>“</a:t>
+            </a:r>
+            <a:r>
+              <a:rPr lang="hu-HU" sz="2400" i="1" u="sng" dirty="0" smtClean="0"/>
+              <a:t>Meg lehetett-e volna oldani</a:t>
+            </a:r>
+            <a:r>
+              <a:rPr lang="hu-HU" sz="2400" dirty="0" smtClean="0"/>
+              <a:t>, hogy a </a:t>
+            </a:r>
+            <a:r>
+              <a:rPr lang="hu-HU" sz="2400" dirty="0" err="1" smtClean="0"/>
+              <a:t>Workspace</a:t>
+            </a:r>
+            <a:r>
+              <a:rPr lang="hu-HU" sz="2400" dirty="0" smtClean="0"/>
+              <a:t> </a:t>
+            </a:r>
+            <a:r>
+              <a:rPr lang="hu-HU" sz="2400" dirty="0" err="1" smtClean="0"/>
+              <a:t>model</a:t>
+            </a:r>
+            <a:r>
+              <a:rPr lang="hu-HU" sz="2400" dirty="0" smtClean="0"/>
+              <a:t> </a:t>
+            </a:r>
+            <a:r>
+              <a:rPr lang="hu-HU" sz="2400" dirty="0" err="1" smtClean="0"/>
+              <a:t>generator</a:t>
+            </a:r>
+            <a:r>
+              <a:rPr lang="hu-HU" sz="2400" dirty="0" smtClean="0"/>
+              <a:t> komponens az </a:t>
+            </a:r>
+            <a:r>
+              <a:rPr lang="hu-HU" sz="2400" dirty="0" err="1" smtClean="0"/>
+              <a:t>Eclipse</a:t>
+            </a:r>
+            <a:r>
+              <a:rPr lang="hu-HU" sz="2400" dirty="0" smtClean="0"/>
+              <a:t> által fordított </a:t>
+            </a:r>
+            <a:r>
+              <a:rPr lang="hu-HU" sz="2400" dirty="0" err="1" smtClean="0"/>
+              <a:t>class</a:t>
+            </a:r>
+            <a:r>
+              <a:rPr lang="hu-HU" sz="2400" dirty="0" smtClean="0"/>
+              <a:t> fájlokból induljon ki? (Ezáltal </a:t>
+            </a:r>
+            <a:r>
+              <a:rPr lang="hu-HU" sz="2400" u="sng" dirty="0" smtClean="0"/>
+              <a:t>ugyanazon komponenst használná a szerver és a kliens oldal a modell építésére</a:t>
+            </a:r>
+            <a:r>
+              <a:rPr lang="hu-HU" sz="2400" dirty="0" smtClean="0"/>
+              <a:t>. Így nem kellett volna két különböző komponenst írni.) Mitől jobb a JDT megközelítés, mint az </a:t>
+            </a:r>
+            <a:r>
+              <a:rPr lang="hu-HU" sz="2400" dirty="0" err="1" smtClean="0"/>
+              <a:t>Apache</a:t>
+            </a:r>
+            <a:r>
+              <a:rPr lang="hu-HU" sz="2400" dirty="0" smtClean="0"/>
+              <a:t> BCEL?</a:t>
+            </a:r>
+            <a:r>
+              <a:rPr lang="hu-HU" sz="2400" i="1" dirty="0" smtClean="0"/>
               <a:t>”</a:t>
             </a:r>
-            <a:endParaRPr lang="hu-HU" sz="2800" i="1" dirty="0" smtClean="0"/>
           </a:p>
         </p:txBody>
       </p:sp>
@@ -9761,85 +9963,87 @@
         <p:spPr/>
         <p:txBody>
           <a:bodyPr>
-            <a:normAutofit/>
+            <a:normAutofit fontScale="92500" lnSpcReduction="10000"/>
           </a:bodyPr>
           <a:lstStyle/>
           <a:p>
             <a:r>
               <a:rPr lang="hu-HU" dirty="0" smtClean="0"/>
-              <a:t>Nem létezik a "komponens" fogalma </a:t>
+              <a:t>Megoldható, de</a:t>
+            </a:r>
+          </a:p>
+          <a:p>
+            <a:pPr lvl="1"/>
+            <a:r>
+              <a:rPr lang="hu-HU" dirty="0" smtClean="0"/>
+              <a:t>BCEL: egész </a:t>
             </a:r>
             <a:r>
               <a:rPr lang="hu-HU" dirty="0" err="1" smtClean="0"/>
-              <a:t>Java-ban</a:t>
-            </a:r>
-            <a:endParaRPr lang="hu-HU" dirty="0" smtClean="0"/>
+              <a:t>class</a:t>
+            </a:r>
+            <a:r>
+              <a:rPr lang="hu-HU" dirty="0" smtClean="0"/>
+              <a:t> állományok feldolgozása</a:t>
+            </a:r>
+          </a:p>
+          <a:p>
+            <a:pPr lvl="3"/>
+            <a:r>
+              <a:rPr lang="hu-HU" dirty="0" smtClean="0"/>
+              <a:t>Számítás-intenzív</a:t>
+            </a:r>
+          </a:p>
+          <a:p>
+            <a:pPr lvl="3"/>
+            <a:r>
+              <a:rPr lang="hu-HU" dirty="0" smtClean="0"/>
+              <a:t>Bináris → forráskód konverzió</a:t>
+            </a:r>
+          </a:p>
+          <a:p>
+            <a:pPr lvl="3"/>
+            <a:r>
+              <a:rPr lang="hu-HU" dirty="0" smtClean="0"/>
+              <a:t>Méretfüggő</a:t>
+            </a:r>
           </a:p>
           <a:p>
             <a:pPr lvl="1"/>
             <a:r>
               <a:rPr lang="hu-HU" dirty="0" smtClean="0"/>
-              <a:t>Csak </a:t>
-            </a:r>
-            <a:r>
-              <a:rPr lang="hu-HU" dirty="0" smtClean="0"/>
-              <a:t>magasabb szinten van </a:t>
-            </a:r>
-            <a:r>
-              <a:rPr lang="hu-HU" dirty="0" smtClean="0"/>
-              <a:t>rá </a:t>
-            </a:r>
-            <a:r>
-              <a:rPr lang="hu-HU" dirty="0" smtClean="0"/>
-              <a:t>implementáció (Pl. </a:t>
+              <a:t>JDT ezzel szemben</a:t>
+            </a:r>
+          </a:p>
+          <a:p>
+            <a:pPr lvl="2"/>
+            <a:r>
+              <a:rPr lang="hu-HU" dirty="0" smtClean="0"/>
+              <a:t>Gazdag, </a:t>
             </a:r>
             <a:r>
               <a:rPr lang="hu-HU" dirty="0" err="1" smtClean="0"/>
-              <a:t>OSGi</a:t>
-            </a:r>
-            <a:r>
-              <a:rPr lang="hu-HU" dirty="0" smtClean="0"/>
-              <a:t>)</a:t>
-            </a:r>
-          </a:p>
-          <a:p>
-            <a:pPr lvl="1"/>
-            <a:r>
-              <a:rPr lang="hu-HU" dirty="0" smtClean="0"/>
-              <a:t>Implementáció kereséssel oldja fel az import deklarációkat</a:t>
-            </a:r>
-            <a:endParaRPr lang="hu-HU" dirty="0" smtClean="0"/>
-          </a:p>
-          <a:p>
-            <a:pPr marL="342900" lvl="1" indent="-342900">
-              <a:buFont typeface="Arial" pitchFamily="34" charset="0"/>
-              <a:buChar char="•"/>
-            </a:pPr>
-            <a:r>
-              <a:rPr lang="hu-HU" dirty="0" smtClean="0"/>
-              <a:t>Megoldás </a:t>
-            </a:r>
-            <a:r>
-              <a:rPr lang="hu-HU" dirty="0" smtClean="0"/>
-              <a:t>Java </a:t>
-            </a:r>
-            <a:r>
-              <a:rPr lang="hu-HU" dirty="0" smtClean="0"/>
-              <a:t>8-ban (</a:t>
-            </a:r>
-            <a:r>
-              <a:rPr lang="hu-HU" dirty="0" smtClean="0"/>
-              <a:t>Project </a:t>
-            </a:r>
-            <a:r>
-              <a:rPr lang="hu-HU" dirty="0" err="1" smtClean="0"/>
-              <a:t>Jigsaw</a:t>
-            </a:r>
-            <a:r>
-              <a:rPr lang="hu-HU" dirty="0" smtClean="0"/>
-              <a:t>)</a:t>
-            </a:r>
-            <a:endParaRPr lang="hu-HU" dirty="0" smtClean="0"/>
+              <a:t>in-memory</a:t>
+            </a:r>
+            <a:r>
+              <a:rPr lang="hu-HU" dirty="0" smtClean="0"/>
+              <a:t> modell </a:t>
+            </a:r>
+          </a:p>
+          <a:p>
+            <a:pPr lvl="2"/>
+            <a:r>
+              <a:rPr lang="hu-HU" dirty="0" smtClean="0"/>
+              <a:t>Függőségek lekérdezése elérhető</a:t>
+            </a:r>
+          </a:p>
+          <a:p>
+            <a:pPr lvl="2"/>
+            <a:r>
+              <a:rPr lang="hu-HU" dirty="0" smtClean="0"/>
+              <a:t>Forráskód–UI kötés: egyszerű integráció</a:t>
+            </a:r>
+            <a:endParaRPr lang="hu-HU" dirty="0"/>
           </a:p>
         </p:txBody>
       </p:sp>
@@ -9922,78 +10126,17 @@
           <a:lstStyle/>
           <a:p>
             <a:r>
-              <a:rPr lang="hu-HU" sz="2400" i="1" dirty="0" smtClean="0"/>
-              <a:t>“</a:t>
-            </a:r>
-            <a:r>
-              <a:rPr lang="hu-HU" sz="2400" i="1" u="sng" dirty="0" smtClean="0"/>
-              <a:t>Meg lehetett-e volna oldani</a:t>
-            </a:r>
-            <a:r>
-              <a:rPr lang="hu-HU" sz="2400" dirty="0" smtClean="0"/>
-              <a:t>, hogy a </a:t>
-            </a:r>
-            <a:r>
-              <a:rPr lang="hu-HU" sz="2400" dirty="0" err="1" smtClean="0"/>
-              <a:t>Workspace</a:t>
-            </a:r>
-            <a:r>
-              <a:rPr lang="hu-HU" sz="2400" dirty="0" smtClean="0"/>
-              <a:t> </a:t>
-            </a:r>
-            <a:r>
-              <a:rPr lang="hu-HU" sz="2400" dirty="0" err="1" smtClean="0"/>
-              <a:t>model</a:t>
-            </a:r>
-            <a:r>
-              <a:rPr lang="hu-HU" sz="2400" dirty="0" smtClean="0"/>
-              <a:t> </a:t>
-            </a:r>
-            <a:r>
-              <a:rPr lang="hu-HU" sz="2400" dirty="0" err="1" smtClean="0"/>
-              <a:t>generator</a:t>
-            </a:r>
-            <a:r>
-              <a:rPr lang="hu-HU" sz="2400" dirty="0" smtClean="0"/>
-              <a:t> komponens az </a:t>
-            </a:r>
-            <a:r>
-              <a:rPr lang="hu-HU" sz="2400" dirty="0" err="1" smtClean="0"/>
-              <a:t>Eclipse</a:t>
-            </a:r>
-            <a:r>
-              <a:rPr lang="hu-HU" sz="2400" dirty="0" smtClean="0"/>
-              <a:t> által fordított </a:t>
-            </a:r>
-            <a:r>
-              <a:rPr lang="hu-HU" sz="2400" dirty="0" err="1" smtClean="0"/>
-              <a:t>class</a:t>
-            </a:r>
-            <a:r>
-              <a:rPr lang="hu-HU" sz="2400" dirty="0" smtClean="0"/>
-              <a:t> fájlokból induljon ki? (Ezáltal </a:t>
-            </a:r>
-            <a:r>
-              <a:rPr lang="hu-HU" sz="2400" u="sng" dirty="0" smtClean="0"/>
-              <a:t>ugyanazon komponenst használná a szerver és a kliens oldal a modell építésére</a:t>
-            </a:r>
-            <a:r>
-              <a:rPr lang="hu-HU" sz="2400" dirty="0" smtClean="0"/>
-              <a:t>. Így nem kellett volna két különböző komponenst írni.) Mitől jobb a JDT megközelítés, mint az </a:t>
-            </a:r>
-            <a:r>
-              <a:rPr lang="hu-HU" sz="2400" dirty="0" err="1" smtClean="0"/>
-              <a:t>Apache</a:t>
-            </a:r>
-            <a:r>
-              <a:rPr lang="hu-HU" sz="2400" dirty="0" smtClean="0"/>
-              <a:t> BCEL?</a:t>
-            </a:r>
-            <a:r>
-              <a:rPr lang="hu-HU" sz="2400" i="1" dirty="0" smtClean="0"/>
-              <a:t>”</a:t>
-            </a:r>
-            <a:endParaRPr lang="hu-HU" sz="2400" i="1" dirty="0" smtClean="0"/>
+              <a:rPr lang="hu-HU" sz="2800" i="1" dirty="0" smtClean="0"/>
+              <a:t>“…  A nagyméretű</a:t>
+            </a:r>
+            <a:r>
+              <a:rPr lang="hu-HU" sz="2800" dirty="0" smtClean="0"/>
+              <a:t>, automatikusan </a:t>
+            </a:r>
+            <a:r>
+              <a:rPr lang="hu-HU" sz="2800" i="1" dirty="0" smtClean="0"/>
+              <a:t>generált forráskód valóban kizárja a forráskód alapján történő analízist?”</a:t>
+            </a:r>
           </a:p>
         </p:txBody>
       </p:sp>
@@ -10010,53 +10153,42 @@
         <p:spPr/>
         <p:txBody>
           <a:bodyPr>
-            <a:normAutofit fontScale="92500" lnSpcReduction="10000"/>
+            <a:normAutofit lnSpcReduction="10000"/>
           </a:bodyPr>
           <a:lstStyle/>
           <a:p>
             <a:r>
               <a:rPr lang="hu-HU" dirty="0" smtClean="0"/>
-              <a:t>Megoldható, </a:t>
-            </a:r>
-            <a:r>
-              <a:rPr lang="hu-HU" dirty="0" smtClean="0"/>
-              <a:t>de</a:t>
-            </a:r>
+              <a:t>Nem, ha a forráskód elérhető</a:t>
+            </a:r>
+          </a:p>
+          <a:p>
+            <a:r>
+              <a:rPr lang="hu-HU" dirty="0" err="1" smtClean="0"/>
+              <a:t>CERN-specifikus</a:t>
+            </a:r>
+            <a:r>
+              <a:rPr lang="hu-HU" dirty="0" smtClean="0"/>
+              <a:t> követelmény</a:t>
+            </a:r>
+            <a:endParaRPr lang="hu-HU" dirty="0" smtClean="0"/>
           </a:p>
           <a:p>
             <a:pPr lvl="1"/>
             <a:r>
               <a:rPr lang="hu-HU" dirty="0" smtClean="0"/>
-              <a:t>BCEL: egész </a:t>
+              <a:t>Egyedi esetek, sokféle szoftver a tárolókban</a:t>
+            </a:r>
+          </a:p>
+          <a:p>
+            <a:pPr lvl="2"/>
+            <a:r>
+              <a:rPr lang="hu-HU" dirty="0" smtClean="0"/>
+              <a:t>Nem garantált, hogy minden elem az </a:t>
             </a:r>
             <a:r>
               <a:rPr lang="hu-HU" dirty="0" err="1" smtClean="0"/>
-              <a:t>class</a:t>
-            </a:r>
-            <a:r>
-              <a:rPr lang="hu-HU" dirty="0" smtClean="0"/>
-              <a:t> állományok feldolgozása</a:t>
-            </a:r>
-          </a:p>
-          <a:p>
-            <a:pPr lvl="3"/>
-            <a:r>
-              <a:rPr lang="hu-HU" dirty="0" smtClean="0"/>
-              <a:t>Számítás-intenzív</a:t>
-            </a:r>
-          </a:p>
-          <a:p>
-            <a:pPr lvl="3"/>
-            <a:r>
-              <a:rPr lang="hu-HU" dirty="0" smtClean="0"/>
-              <a:t>Bináris → forráskód konverzió</a:t>
-            </a:r>
-          </a:p>
-          <a:p>
-            <a:pPr lvl="3"/>
-            <a:r>
-              <a:rPr lang="hu-HU" dirty="0" smtClean="0"/>
-              <a:t>Méretfüggő</a:t>
+              <a:t>SVN-ben</a:t>
             </a:r>
             <a:endParaRPr lang="hu-HU" dirty="0" smtClean="0"/>
           </a:p>
@@ -10064,47 +10196,31 @@
             <a:pPr lvl="1"/>
             <a:r>
               <a:rPr lang="hu-HU" dirty="0" smtClean="0"/>
-              <a:t>JDT ezzel szemben</a:t>
+              <a:t>Közös pont: </a:t>
+            </a:r>
+            <a:r>
+              <a:rPr lang="hu-HU" dirty="0" smtClean="0"/>
+              <a:t>egységes bináris tároló</a:t>
             </a:r>
           </a:p>
           <a:p>
             <a:pPr lvl="2"/>
             <a:r>
               <a:rPr lang="hu-HU" dirty="0" smtClean="0"/>
-              <a:t>Gazdag, </a:t>
+              <a:t>Minden szoftvert tartalmaz</a:t>
+            </a:r>
+          </a:p>
+          <a:p>
+            <a:pPr lvl="2"/>
+            <a:r>
+              <a:rPr lang="hu-HU" dirty="0" smtClean="0"/>
+              <a:t>Konzisztens + </a:t>
             </a:r>
             <a:r>
               <a:rPr lang="hu-HU" dirty="0" err="1" smtClean="0"/>
-              <a:t>in-memory</a:t>
-            </a:r>
-            <a:r>
-              <a:rPr lang="hu-HU" dirty="0" smtClean="0"/>
-              <a:t> modell </a:t>
+              <a:t>metainformációk</a:t>
             </a:r>
             <a:endParaRPr lang="hu-HU" dirty="0" smtClean="0"/>
-          </a:p>
-          <a:p>
-            <a:pPr lvl="2"/>
-            <a:r>
-              <a:rPr lang="hu-HU" dirty="0" smtClean="0"/>
-              <a:t>Függőségek </a:t>
-            </a:r>
-            <a:r>
-              <a:rPr lang="hu-HU" dirty="0" smtClean="0"/>
-              <a:t>lekérdezése </a:t>
-            </a:r>
-            <a:r>
-              <a:rPr lang="hu-HU" dirty="0" smtClean="0"/>
-              <a:t>elérhető</a:t>
-            </a:r>
-          </a:p>
-          <a:p>
-            <a:pPr lvl="2"/>
-            <a:r>
-              <a:rPr lang="hu-HU" dirty="0" smtClean="0"/>
-              <a:t>Forráskód–UI kötés: egyszerű integráció</a:t>
-            </a:r>
-            <a:endParaRPr lang="hu-HU" dirty="0"/>
           </a:p>
         </p:txBody>
       </p:sp>
@@ -10127,322 +10243,6 @@
               <a:rPr lang="en-US" smtClean="0"/>
               <a:pPr/>
               <a:t>22</a:t>
-            </a:fld>
-            <a:endParaRPr lang="en-US"/>
-          </a:p>
-        </p:txBody>
-      </p:sp>
-    </p:spTree>
-    <p:extLst>
-      <p:ext uri="{BB962C8B-B14F-4D97-AF65-F5344CB8AC3E}">
-        <p14:creationId xmlns:p14="http://schemas.microsoft.com/office/powerpoint/2010/main" xmlns="" val="1797703964"/>
-      </p:ext>
-    </p:extLst>
-  </p:cSld>
-  <p:clrMapOvr>
-    <a:masterClrMapping/>
-  </p:clrMapOvr>
-  <p:timing>
-    <p:tnLst>
-      <p:par>
-        <p:cTn id="1" dur="indefinite" restart="never" nodeType="tmRoot"/>
-      </p:par>
-    </p:tnLst>
-  </p:timing>
-</p:sld>
-</file>
-
-<file path=ppt/slides/slide23.xml><?xml version="1.0" encoding="utf-8"?>
-<p:sld xmlns:a="http://schemas.openxmlformats.org/drawingml/2006/main" xmlns:r="http://schemas.openxmlformats.org/officeDocument/2006/relationships" xmlns:p="http://schemas.openxmlformats.org/presentationml/2006/main">
-  <p:cSld>
-    <p:spTree>
-      <p:nvGrpSpPr>
-        <p:cNvPr id="1" name=""/>
-        <p:cNvGrpSpPr/>
-        <p:nvPr/>
-      </p:nvGrpSpPr>
-      <p:grpSpPr>
-        <a:xfrm>
-          <a:off x="0" y="0"/>
-          <a:ext cx="0" cy="0"/>
-          <a:chOff x="0" y="0"/>
-          <a:chExt cx="0" cy="0"/>
-        </a:xfrm>
-      </p:grpSpPr>
-      <p:sp>
-        <p:nvSpPr>
-          <p:cNvPr id="8" name="Title 7"/>
-          <p:cNvSpPr>
-            <a:spLocks noGrp="1"/>
-          </p:cNvSpPr>
-          <p:nvPr>
-            <p:ph type="title"/>
-          </p:nvPr>
-        </p:nvSpPr>
-        <p:spPr/>
-        <p:txBody>
-          <a:bodyPr>
-            <a:noAutofit/>
-          </a:bodyPr>
-          <a:lstStyle/>
-          <a:p>
-            <a:r>
-              <a:rPr lang="hu-HU" sz="2800" i="1" dirty="0" smtClean="0"/>
-              <a:t>“…  A nagyméretű</a:t>
-            </a:r>
-            <a:r>
-              <a:rPr lang="hu-HU" sz="2800" dirty="0" smtClean="0"/>
-              <a:t>, automatikusan </a:t>
-            </a:r>
-            <a:r>
-              <a:rPr lang="hu-HU" sz="2800" i="1" dirty="0" smtClean="0"/>
-              <a:t>generált </a:t>
-            </a:r>
-            <a:r>
-              <a:rPr lang="hu-HU" sz="2800" i="1" dirty="0" smtClean="0"/>
-              <a:t>forráskód valóban kizárja a forráskód alapján történő analízist?”</a:t>
-            </a:r>
-          </a:p>
-        </p:txBody>
-      </p:sp>
-      <p:sp>
-        <p:nvSpPr>
-          <p:cNvPr id="5" name="Tartalom helye 4"/>
-          <p:cNvSpPr>
-            <a:spLocks noGrp="1"/>
-          </p:cNvSpPr>
-          <p:nvPr>
-            <p:ph idx="1"/>
-          </p:nvPr>
-        </p:nvSpPr>
-        <p:spPr/>
-        <p:txBody>
-          <a:bodyPr>
-            <a:normAutofit lnSpcReduction="10000"/>
-          </a:bodyPr>
-          <a:lstStyle/>
-          <a:p>
-            <a:r>
-              <a:rPr lang="en-US" dirty="0" err="1" smtClean="0"/>
-              <a:t>Nem</a:t>
-            </a:r>
-            <a:r>
-              <a:rPr lang="en-US" dirty="0" smtClean="0"/>
-              <a:t>, ha a </a:t>
-            </a:r>
-            <a:r>
-              <a:rPr lang="en-US" dirty="0" err="1" smtClean="0"/>
-              <a:t>forráskód</a:t>
-            </a:r>
-            <a:r>
-              <a:rPr lang="en-US" dirty="0" smtClean="0"/>
-              <a:t> </a:t>
-            </a:r>
-            <a:r>
-              <a:rPr lang="en-US" dirty="0" err="1" smtClean="0"/>
-              <a:t>elérhető</a:t>
-            </a:r>
-            <a:endParaRPr lang="en-US" dirty="0" smtClean="0"/>
-          </a:p>
-          <a:p>
-            <a:r>
-              <a:rPr lang="hu-HU" dirty="0" smtClean="0"/>
-              <a:t>CE</a:t>
-            </a:r>
-            <a:r>
-              <a:rPr lang="en-US" dirty="0" smtClean="0"/>
-              <a:t>R</a:t>
-            </a:r>
-            <a:r>
-              <a:rPr lang="hu-HU" dirty="0" smtClean="0"/>
-              <a:t>N-specifikus</a:t>
-            </a:r>
-            <a:r>
-              <a:rPr lang="en-US" dirty="0" smtClean="0"/>
-              <a:t> </a:t>
-            </a:r>
-            <a:r>
-              <a:rPr lang="en-US" dirty="0" err="1" smtClean="0"/>
-              <a:t>követelmény</a:t>
-            </a:r>
-            <a:endParaRPr lang="hu-HU" dirty="0" smtClean="0"/>
-          </a:p>
-          <a:p>
-            <a:pPr lvl="1"/>
-            <a:r>
-              <a:rPr lang="en-US" dirty="0" err="1" smtClean="0"/>
-              <a:t>Egyedi</a:t>
-            </a:r>
-            <a:r>
-              <a:rPr lang="en-US" dirty="0" smtClean="0"/>
-              <a:t> </a:t>
-            </a:r>
-            <a:r>
-              <a:rPr lang="en-US" dirty="0" err="1" smtClean="0"/>
-              <a:t>esetek</a:t>
-            </a:r>
-            <a:r>
-              <a:rPr lang="en-US" dirty="0" smtClean="0"/>
-              <a:t>, </a:t>
-            </a:r>
-            <a:r>
-              <a:rPr lang="en-US" dirty="0" err="1" smtClean="0"/>
-              <a:t>sokféle</a:t>
-            </a:r>
-            <a:r>
-              <a:rPr lang="en-US" dirty="0" smtClean="0"/>
-              <a:t> </a:t>
-            </a:r>
-            <a:r>
-              <a:rPr lang="en-US" dirty="0" err="1" smtClean="0"/>
-              <a:t>szoftver</a:t>
-            </a:r>
-            <a:r>
-              <a:rPr lang="en-US" dirty="0" smtClean="0"/>
-              <a:t> a </a:t>
-            </a:r>
-            <a:r>
-              <a:rPr lang="en-US" dirty="0" err="1" smtClean="0"/>
-              <a:t>tárolókban</a:t>
-            </a:r>
-            <a:endParaRPr lang="en-US" dirty="0" smtClean="0"/>
-          </a:p>
-          <a:p>
-            <a:pPr lvl="2"/>
-            <a:r>
-              <a:rPr lang="en-US" dirty="0" err="1" smtClean="0"/>
-              <a:t>Nem</a:t>
-            </a:r>
-            <a:r>
-              <a:rPr lang="en-US" dirty="0" smtClean="0"/>
-              <a:t> </a:t>
-            </a:r>
-            <a:r>
-              <a:rPr lang="en-US" dirty="0" err="1" smtClean="0"/>
-              <a:t>garantált</a:t>
-            </a:r>
-            <a:r>
-              <a:rPr lang="en-US" dirty="0" smtClean="0"/>
-              <a:t>, </a:t>
-            </a:r>
-            <a:r>
-              <a:rPr lang="en-US" dirty="0" err="1" smtClean="0"/>
-              <a:t>hogy</a:t>
-            </a:r>
-            <a:r>
-              <a:rPr lang="en-US" dirty="0" smtClean="0"/>
-              <a:t> </a:t>
-            </a:r>
-            <a:r>
-              <a:rPr lang="en-US" dirty="0" err="1" smtClean="0"/>
-              <a:t>minden</a:t>
-            </a:r>
-            <a:r>
-              <a:rPr lang="en-US" dirty="0" smtClean="0"/>
-              <a:t> </a:t>
-            </a:r>
-            <a:r>
-              <a:rPr lang="en-US" dirty="0" err="1" smtClean="0"/>
-              <a:t>elem</a:t>
-            </a:r>
-            <a:r>
-              <a:rPr lang="en-US" dirty="0" smtClean="0"/>
-              <a:t> </a:t>
-            </a:r>
-            <a:r>
-              <a:rPr lang="en-US" dirty="0" err="1" smtClean="0"/>
-              <a:t>az</a:t>
-            </a:r>
-            <a:r>
-              <a:rPr lang="en-US" dirty="0" smtClean="0"/>
-              <a:t> SVN-</a:t>
-            </a:r>
-            <a:r>
-              <a:rPr lang="en-US" dirty="0" err="1" smtClean="0"/>
-              <a:t>ben</a:t>
-            </a:r>
-            <a:endParaRPr lang="hu-HU" dirty="0" smtClean="0"/>
-          </a:p>
-          <a:p>
-            <a:pPr lvl="1"/>
-            <a:r>
-              <a:rPr lang="en-US" dirty="0" err="1" smtClean="0"/>
-              <a:t>Közös</a:t>
-            </a:r>
-            <a:r>
-              <a:rPr lang="en-US" dirty="0" smtClean="0"/>
-              <a:t> </a:t>
-            </a:r>
-            <a:r>
-              <a:rPr lang="en-US" dirty="0" err="1" smtClean="0"/>
-              <a:t>pont</a:t>
-            </a:r>
-            <a:r>
-              <a:rPr lang="hu-HU" dirty="0" smtClean="0"/>
-              <a:t>: </a:t>
-            </a:r>
-            <a:r>
-              <a:rPr lang="hu-HU" dirty="0" smtClean="0"/>
-              <a:t>egységes bináris tároló</a:t>
-            </a:r>
-          </a:p>
-          <a:p>
-            <a:pPr lvl="2"/>
-            <a:r>
-              <a:rPr lang="en-US" dirty="0" smtClean="0"/>
-              <a:t>Minden </a:t>
-            </a:r>
-            <a:r>
-              <a:rPr lang="en-US" dirty="0" err="1" smtClean="0"/>
-              <a:t>szoftvert</a:t>
-            </a:r>
-            <a:r>
-              <a:rPr lang="en-US" dirty="0" smtClean="0"/>
-              <a:t> </a:t>
-            </a:r>
-            <a:r>
-              <a:rPr lang="en-US" dirty="0" err="1" smtClean="0"/>
-              <a:t>tartalmaz</a:t>
-            </a:r>
-            <a:endParaRPr lang="en-US" dirty="0" smtClean="0"/>
-          </a:p>
-          <a:p>
-            <a:pPr lvl="2"/>
-            <a:r>
-              <a:rPr lang="en-US" dirty="0" err="1" smtClean="0"/>
-              <a:t>Konzisztens</a:t>
-            </a:r>
-            <a:r>
-              <a:rPr lang="en-US" dirty="0" smtClean="0"/>
-              <a:t> + </a:t>
-            </a:r>
-            <a:r>
-              <a:rPr lang="en-US" dirty="0" err="1" smtClean="0"/>
-              <a:t>metainformációk</a:t>
-            </a:r>
-            <a:endParaRPr lang="hu-HU" dirty="0" smtClean="0"/>
-          </a:p>
-        </p:txBody>
-      </p:sp>
-      <p:sp>
-        <p:nvSpPr>
-          <p:cNvPr id="4" name="Slide Number Placeholder 3"/>
-          <p:cNvSpPr>
-            <a:spLocks noGrp="1"/>
-          </p:cNvSpPr>
-          <p:nvPr>
-            <p:ph type="sldNum" sz="quarter" idx="12"/>
-          </p:nvPr>
-        </p:nvSpPr>
-        <p:spPr/>
-        <p:txBody>
-          <a:bodyPr/>
-          <a:lstStyle/>
-          <a:p>
-            <a:fld id="{E5B09FA9-A177-4256-9C7F-5CF31ABA7234}" type="slidenum">
-              <a:rPr lang="en-US" smtClean="0"/>
-              <a:pPr/>
-              <a:t>23</a:t>
             </a:fld>
             <a:endParaRPr lang="en-US"/>
           </a:p>
@@ -10543,7 +10343,7 @@
           <p:nvPr/>
         </p:nvPicPr>
         <p:blipFill>
-          <a:blip r:embed="rId2" cstate="print"/>
+          <a:blip r:embed="rId3" cstate="print"/>
           <a:stretch>
             <a:fillRect/>
           </a:stretch>
@@ -10845,7 +10645,11 @@
             </a:r>
             <a:r>
               <a:rPr lang="hu-HU" sz="2000" dirty="0"/>
-              <a:t> szoftverinfrastruktúrán (komponensek, verziók)</a:t>
+              <a:t> szoftverinfrastruktúrán (komponensek, </a:t>
+            </a:r>
+            <a:r>
+              <a:rPr lang="hu-HU" sz="2000" dirty="0" smtClean="0"/>
+              <a:t>verziók)</a:t>
             </a:r>
           </a:p>
           <a:p>
@@ -10854,7 +10658,7 @@
               <a:buChar char="•"/>
             </a:pPr>
             <a:r>
-              <a:rPr lang="hu-HU" sz="2000" dirty="0"/>
+              <a:rPr lang="hu-HU" sz="2000" dirty="0" smtClean="0"/>
               <a:t>Kiszámítható a változtatások potenciális hatása</a:t>
             </a:r>
           </a:p>
@@ -10865,7 +10669,11 @@
             </a:pPr>
             <a:r>
               <a:rPr lang="hu-HU" sz="2000" i="1" dirty="0" smtClean="0"/>
-              <a:t>→Mit </a:t>
+              <a:t>→</a:t>
+            </a:r>
+            <a:r>
+              <a:rPr lang="hu-HU" sz="2000" i="1" dirty="0" smtClean="0"/>
+              <a:t>Mit </a:t>
             </a:r>
             <a:r>
               <a:rPr lang="hu-HU" sz="2000" i="1" dirty="0"/>
@@ -11121,6 +10929,157 @@
       </p:grpSpPr>
       <p:sp>
         <p:nvSpPr>
+          <p:cNvPr id="2" name="Cím 1"/>
+          <p:cNvSpPr>
+            <a:spLocks noGrp="1"/>
+          </p:cNvSpPr>
+          <p:nvPr>
+            <p:ph type="title"/>
+          </p:nvPr>
+        </p:nvSpPr>
+        <p:spPr/>
+        <p:txBody>
+          <a:bodyPr/>
+          <a:lstStyle/>
+          <a:p>
+            <a:r>
+              <a:rPr lang="hu-HU" dirty="0" smtClean="0"/>
+              <a:t>Miért kell erre külön eszköz?</a:t>
+            </a:r>
+            <a:endParaRPr lang="hu-HU" dirty="0"/>
+          </a:p>
+        </p:txBody>
+      </p:sp>
+      <p:sp>
+        <p:nvSpPr>
+          <p:cNvPr id="3" name="Tartalom helye 2"/>
+          <p:cNvSpPr>
+            <a:spLocks noGrp="1"/>
+          </p:cNvSpPr>
+          <p:nvPr>
+            <p:ph idx="1"/>
+          </p:nvPr>
+        </p:nvSpPr>
+        <p:spPr/>
+        <p:txBody>
+          <a:bodyPr>
+            <a:normAutofit/>
+          </a:bodyPr>
+          <a:lstStyle/>
+          <a:p>
+            <a:r>
+              <a:rPr lang="hu-HU" dirty="0" smtClean="0"/>
+              <a:t>Másképp is megoldató (pl. verziókezelés), de</a:t>
+            </a:r>
+          </a:p>
+          <a:p>
+            <a:r>
+              <a:rPr lang="hu-HU" dirty="0" smtClean="0"/>
+              <a:t>Komplex rendszerek üzemeltetése</a:t>
+            </a:r>
+          </a:p>
+          <a:p>
+            <a:pPr lvl="1"/>
+            <a:r>
+              <a:rPr lang="hu-HU" dirty="0" smtClean="0"/>
+              <a:t>Nagy rendelkezésre állás</a:t>
+            </a:r>
+          </a:p>
+          <a:p>
+            <a:pPr lvl="2"/>
+            <a:r>
+              <a:rPr lang="hu-HU" dirty="0" smtClean="0"/>
+              <a:t>Javítások propagálása a szoftverkönyvtár oldalról</a:t>
+            </a:r>
+          </a:p>
+          <a:p>
+            <a:pPr lvl="2"/>
+            <a:r>
+              <a:rPr lang="hu-HU" dirty="0" smtClean="0"/>
+              <a:t>Minimális </a:t>
+            </a:r>
+            <a:r>
+              <a:rPr lang="hu-HU" dirty="0" err="1" smtClean="0"/>
+              <a:t>szinkronizáció</a:t>
+            </a:r>
+            <a:r>
+              <a:rPr lang="hu-HU" dirty="0" smtClean="0"/>
+              <a:t> a fejlesztők között</a:t>
+            </a:r>
+          </a:p>
+          <a:p>
+            <a:r>
+              <a:rPr lang="hu-HU" dirty="0" smtClean="0"/>
+              <a:t>CERN labor sajátosságai:</a:t>
+            </a:r>
+          </a:p>
+          <a:p>
+            <a:pPr lvl="1"/>
+            <a:r>
+              <a:rPr lang="hu-HU" dirty="0" smtClean="0"/>
+              <a:t>Kötött technológiai és szervezési feltételek</a:t>
+            </a:r>
+          </a:p>
+          <a:p>
+            <a:pPr lvl="1"/>
+            <a:r>
+              <a:rPr lang="hu-HU" dirty="0" smtClean="0"/>
+              <a:t>Egyedi szoftvere, csak bináris tároló konzisztens</a:t>
+            </a:r>
+          </a:p>
+        </p:txBody>
+      </p:sp>
+      <p:sp>
+        <p:nvSpPr>
+          <p:cNvPr id="4" name="Dia számának helye 3"/>
+          <p:cNvSpPr>
+            <a:spLocks noGrp="1"/>
+          </p:cNvSpPr>
+          <p:nvPr>
+            <p:ph type="sldNum" sz="quarter" idx="12"/>
+          </p:nvPr>
+        </p:nvSpPr>
+        <p:spPr/>
+        <p:txBody>
+          <a:bodyPr/>
+          <a:lstStyle/>
+          <a:p>
+            <a:fld id="{E5B09FA9-A177-4256-9C7F-5CF31ABA7234}" type="slidenum">
+              <a:rPr lang="en-US" smtClean="0"/>
+              <a:pPr/>
+              <a:t>4</a:t>
+            </a:fld>
+            <a:endParaRPr lang="en-US"/>
+          </a:p>
+        </p:txBody>
+      </p:sp>
+    </p:spTree>
+  </p:cSld>
+  <p:clrMapOvr>
+    <a:masterClrMapping/>
+  </p:clrMapOvr>
+</p:sld>
+</file>
+
+<file path=ppt/slides/slide5.xml><?xml version="1.0" encoding="utf-8"?>
+<p:sld xmlns:a="http://schemas.openxmlformats.org/drawingml/2006/main" xmlns:r="http://schemas.openxmlformats.org/officeDocument/2006/relationships" xmlns:p="http://schemas.openxmlformats.org/presentationml/2006/main">
+  <p:cSld>
+    <p:spTree>
+      <p:nvGrpSpPr>
+        <p:cNvPr id="1" name=""/>
+        <p:cNvGrpSpPr/>
+        <p:nvPr/>
+      </p:nvGrpSpPr>
+      <p:grpSpPr>
+        <a:xfrm>
+          <a:off x="0" y="0"/>
+          <a:ext cx="0" cy="0"/>
+          <a:chOff x="0" y="0"/>
+          <a:chExt cx="0" cy="0"/>
+        </a:xfrm>
+      </p:grpSpPr>
+      <p:sp>
+        <p:nvSpPr>
           <p:cNvPr id="5" name="Title 4"/>
           <p:cNvSpPr>
             <a:spLocks noGrp="1"/>
@@ -11186,7 +11145,7 @@
             <a:fld id="{E5B09FA9-A177-4256-9C7F-5CF31ABA7234}" type="slidenum">
               <a:rPr lang="en-US" smtClean="0"/>
               <a:pPr/>
-              <a:t>4</a:t>
+              <a:t>5</a:t>
             </a:fld>
             <a:endParaRPr lang="en-US"/>
           </a:p>
@@ -11212,7 +11171,7 @@
 </p:sld>
 </file>
 
-<file path=ppt/slides/slide5.xml><?xml version="1.0" encoding="utf-8"?>
+<file path=ppt/slides/slide6.xml><?xml version="1.0" encoding="utf-8"?>
 <p:sld xmlns:a="http://schemas.openxmlformats.org/drawingml/2006/main" xmlns:r="http://schemas.openxmlformats.org/officeDocument/2006/relationships" xmlns:p="http://schemas.openxmlformats.org/presentationml/2006/main">
   <p:cSld>
     <p:spTree>
@@ -11845,11 +11804,7 @@
             </a:r>
             <a:r>
               <a:rPr lang="hu-HU" dirty="0" smtClean="0"/>
-              <a:t> </a:t>
-            </a:r>
-            <a:r>
-              <a:rPr lang="hu-HU" dirty="0" smtClean="0"/>
-              <a:t>a </a:t>
+              <a:t> a </a:t>
             </a:r>
             <a:r>
               <a:rPr lang="en-US" dirty="0" smtClean="0"/>
@@ -12219,7 +12174,7 @@
             <a:fld id="{E5B09FA9-A177-4256-9C7F-5CF31ABA7234}" type="slidenum">
               <a:rPr lang="en-US" smtClean="0"/>
               <a:pPr/>
-              <a:t>5</a:t>
+              <a:t>6</a:t>
             </a:fld>
             <a:endParaRPr lang="en-US"/>
           </a:p>
@@ -12851,7 +12806,7 @@
 </p:sld>
 </file>
 
-<file path=ppt/slides/slide6.xml><?xml version="1.0" encoding="utf-8"?>
+<file path=ppt/slides/slide7.xml><?xml version="1.0" encoding="utf-8"?>
 <p:sld xmlns:a="http://schemas.openxmlformats.org/drawingml/2006/main" xmlns:r="http://schemas.openxmlformats.org/officeDocument/2006/relationships" xmlns:p="http://schemas.openxmlformats.org/presentationml/2006/main">
   <p:cSld>
     <p:spTree>
@@ -12909,7 +12864,7 @@
             <a:fld id="{E5B09FA9-A177-4256-9C7F-5CF31ABA7234}" type="slidenum">
               <a:rPr lang="en-US" smtClean="0"/>
               <a:pPr/>
-              <a:t>6</a:t>
+              <a:t>7</a:t>
             </a:fld>
             <a:endParaRPr lang="en-US"/>
           </a:p>
@@ -13013,7 +12968,7 @@
 </p:sld>
 </file>
 
-<file path=ppt/slides/slide7.xml><?xml version="1.0" encoding="utf-8"?>
+<file path=ppt/slides/slide8.xml><?xml version="1.0" encoding="utf-8"?>
 <p:sld xmlns:a="http://schemas.openxmlformats.org/drawingml/2006/main" xmlns:r="http://schemas.openxmlformats.org/officeDocument/2006/relationships" xmlns:p="http://schemas.openxmlformats.org/presentationml/2006/main">
   <p:cSld>
     <p:spTree>
@@ -13212,7 +13167,7 @@
             <a:fld id="{E5B09FA9-A177-4256-9C7F-5CF31ABA7234}" type="slidenum">
               <a:rPr lang="en-US" smtClean="0"/>
               <a:pPr/>
-              <a:t>7</a:t>
+              <a:t>8</a:t>
             </a:fld>
             <a:endParaRPr lang="en-US"/>
           </a:p>
@@ -13238,7 +13193,7 @@
 </p:sld>
 </file>
 
-<file path=ppt/slides/slide8.xml><?xml version="1.0" encoding="utf-8"?>
+<file path=ppt/slides/slide9.xml><?xml version="1.0" encoding="utf-8"?>
 <p:sld xmlns:a="http://schemas.openxmlformats.org/drawingml/2006/main" xmlns:r="http://schemas.openxmlformats.org/officeDocument/2006/relationships" xmlns:p="http://schemas.openxmlformats.org/presentationml/2006/main">
   <p:cSld>
     <p:spTree>
@@ -14515,11 +14470,7 @@
             </a:r>
             <a:r>
               <a:rPr lang="hu-HU" dirty="0" smtClean="0"/>
-              <a:t> </a:t>
-            </a:r>
-            <a:r>
-              <a:rPr lang="hu-HU" dirty="0" smtClean="0"/>
-              <a:t>szinkronizáció</a:t>
+              <a:t> szinkronizáció</a:t>
             </a:r>
           </a:p>
         </p:txBody>
@@ -14542,7 +14493,7 @@
             <a:fld id="{E5B09FA9-A177-4256-9C7F-5CF31ABA7234}" type="slidenum">
               <a:rPr lang="en-US" smtClean="0"/>
               <a:pPr/>
-              <a:t>8</a:t>
+              <a:t>9</a:t>
             </a:fld>
             <a:endParaRPr lang="en-US"/>
           </a:p>
@@ -15200,1704 +15151,6 @@
 </p:sld>
 </file>
 
-<file path=ppt/slides/slide9.xml><?xml version="1.0" encoding="utf-8"?>
-<p:sld xmlns:a="http://schemas.openxmlformats.org/drawingml/2006/main" xmlns:r="http://schemas.openxmlformats.org/officeDocument/2006/relationships" xmlns:p="http://schemas.openxmlformats.org/presentationml/2006/main">
-  <p:cSld>
-    <p:spTree>
-      <p:nvGrpSpPr>
-        <p:cNvPr id="1" name=""/>
-        <p:cNvGrpSpPr/>
-        <p:nvPr/>
-      </p:nvGrpSpPr>
-      <p:grpSpPr>
-        <a:xfrm>
-          <a:off x="0" y="0"/>
-          <a:ext cx="0" cy="0"/>
-          <a:chOff x="0" y="0"/>
-          <a:chExt cx="0" cy="0"/>
-        </a:xfrm>
-      </p:grpSpPr>
-      <p:sp>
-        <p:nvSpPr>
-          <p:cNvPr id="24" name="Rectangle 23"/>
-          <p:cNvSpPr/>
-          <p:nvPr/>
-        </p:nvSpPr>
-        <p:spPr>
-          <a:xfrm>
-            <a:off x="6841867" y="4338258"/>
-            <a:ext cx="1644134" cy="533400"/>
-          </a:xfrm>
-          <a:prstGeom prst="rect">
-            <a:avLst/>
-          </a:prstGeom>
-        </p:spPr>
-        <p:style>
-          <a:lnRef idx="2">
-            <a:schemeClr val="accent5"/>
-          </a:lnRef>
-          <a:fillRef idx="1">
-            <a:schemeClr val="lt1"/>
-          </a:fillRef>
-          <a:effectRef idx="0">
-            <a:schemeClr val="accent5"/>
-          </a:effectRef>
-          <a:fontRef idx="minor">
-            <a:schemeClr val="dk1"/>
-          </a:fontRef>
-        </p:style>
-        <p:txBody>
-          <a:bodyPr rtlCol="0" anchor="ctr"/>
-          <a:lstStyle/>
-          <a:p>
-            <a:pPr algn="ctr"/>
-            <a:r>
-              <a:rPr lang="hu-HU" dirty="0" smtClean="0"/>
-              <a:t>NewClass:</a:t>
-            </a:r>
-          </a:p>
-          <a:p>
-            <a:pPr algn="ctr"/>
-            <a:r>
-              <a:rPr lang="hu-HU" dirty="0" smtClean="0"/>
-              <a:t>SClass</a:t>
-            </a:r>
-            <a:endParaRPr lang="en-US" dirty="0"/>
-          </a:p>
-        </p:txBody>
-      </p:sp>
-      <p:sp>
-        <p:nvSpPr>
-          <p:cNvPr id="2" name="Title 1"/>
-          <p:cNvSpPr>
-            <a:spLocks noGrp="1"/>
-          </p:cNvSpPr>
-          <p:nvPr>
-            <p:ph type="title"/>
-          </p:nvPr>
-        </p:nvSpPr>
-        <p:spPr>
-          <a:xfrm>
-            <a:off x="457200" y="0"/>
-            <a:ext cx="8229600" cy="1143000"/>
-          </a:xfrm>
-        </p:spPr>
-        <p:txBody>
-          <a:bodyPr>
-            <a:normAutofit fontScale="90000"/>
-          </a:bodyPr>
-          <a:lstStyle/>
-          <a:p>
-            <a:r>
-              <a:rPr lang="hu-HU" dirty="0" smtClean="0"/>
-              <a:t>Inkrementális lekérdezések</a:t>
-            </a:r>
-            <a:br>
-              <a:rPr lang="hu-HU" dirty="0" smtClean="0"/>
-            </a:br>
-            <a:r>
-              <a:rPr lang="hu-HU" dirty="0" smtClean="0"/>
-              <a:t>gráfminták alapján</a:t>
-            </a:r>
-            <a:endParaRPr lang="en-US" dirty="0"/>
-          </a:p>
-        </p:txBody>
-      </p:sp>
-      <p:sp>
-        <p:nvSpPr>
-          <p:cNvPr id="3" name="Content Placeholder 2"/>
-          <p:cNvSpPr>
-            <a:spLocks noGrp="1"/>
-          </p:cNvSpPr>
-          <p:nvPr>
-            <p:ph idx="1"/>
-          </p:nvPr>
-        </p:nvSpPr>
-        <p:spPr>
-          <a:xfrm>
-            <a:off x="457200" y="1341437"/>
-            <a:ext cx="8229600" cy="4525963"/>
-          </a:xfrm>
-        </p:spPr>
-        <p:txBody>
-          <a:bodyPr>
-            <a:normAutofit/>
-          </a:bodyPr>
-          <a:lstStyle/>
-          <a:p>
-            <a:r>
-              <a:rPr lang="hu-HU" sz="2400" dirty="0" smtClean="0"/>
-              <a:t>EMF-IncQuery deklaratív modell-lekérdezések</a:t>
-            </a:r>
-          </a:p>
-          <a:p>
-            <a:r>
-              <a:rPr lang="hu-HU" sz="2400" dirty="0" smtClean="0"/>
-              <a:t>A függőségi- és forráskód modellek logikai összekapcsolásával</a:t>
-            </a:r>
-          </a:p>
-          <a:p>
-            <a:r>
-              <a:rPr lang="hu-HU" sz="2400" dirty="0" smtClean="0"/>
-              <a:t>Inkrementális kiértékelés = eredmény + eredmény változásai</a:t>
-            </a:r>
-          </a:p>
-        </p:txBody>
-      </p:sp>
-      <p:sp>
-        <p:nvSpPr>
-          <p:cNvPr id="5" name="Rectangle 4"/>
-          <p:cNvSpPr/>
-          <p:nvPr/>
-        </p:nvSpPr>
-        <p:spPr>
-          <a:xfrm>
-            <a:off x="609600" y="2803525"/>
-            <a:ext cx="3842266" cy="3810000"/>
-          </a:xfrm>
-          <a:prstGeom prst="rect">
-            <a:avLst/>
-          </a:prstGeom>
-          <a:noFill/>
-          <a:ln w="9525">
-            <a:prstDash val="dash"/>
-          </a:ln>
-        </p:spPr>
-        <p:style>
-          <a:lnRef idx="2">
-            <a:schemeClr val="dk1"/>
-          </a:lnRef>
-          <a:fillRef idx="1">
-            <a:schemeClr val="lt1"/>
-          </a:fillRef>
-          <a:effectRef idx="0">
-            <a:schemeClr val="dk1"/>
-          </a:effectRef>
-          <a:fontRef idx="minor">
-            <a:schemeClr val="dk1"/>
-          </a:fontRef>
-        </p:style>
-        <p:txBody>
-          <a:bodyPr rtlCol="0" anchor="ctr"/>
-          <a:lstStyle/>
-          <a:p>
-            <a:pPr algn="ctr"/>
-            <a:endParaRPr lang="en-US"/>
-          </a:p>
-        </p:txBody>
-      </p:sp>
-      <p:sp>
-        <p:nvSpPr>
-          <p:cNvPr id="6" name="TextBox 5"/>
-          <p:cNvSpPr txBox="1"/>
-          <p:nvPr/>
-        </p:nvSpPr>
-        <p:spPr>
-          <a:xfrm>
-            <a:off x="609600" y="6244193"/>
-            <a:ext cx="3842265" cy="369332"/>
-          </a:xfrm>
-          <a:prstGeom prst="rect">
-            <a:avLst/>
-          </a:prstGeom>
-          <a:noFill/>
-        </p:spPr>
-        <p:txBody>
-          <a:bodyPr wrap="square" rtlCol="0">
-            <a:spAutoFit/>
-          </a:bodyPr>
-          <a:lstStyle/>
-          <a:p>
-            <a:pPr algn="ctr"/>
-            <a:r>
-              <a:rPr lang="hu-HU" dirty="0" smtClean="0"/>
-              <a:t>Függőségi </a:t>
-            </a:r>
-            <a:r>
-              <a:rPr lang="en-US" dirty="0" err="1" smtClean="0"/>
-              <a:t>modell</a:t>
-            </a:r>
-            <a:endParaRPr lang="en-US" dirty="0"/>
-          </a:p>
-        </p:txBody>
-      </p:sp>
-      <p:sp>
-        <p:nvSpPr>
-          <p:cNvPr id="7" name="Rectangle 6"/>
-          <p:cNvSpPr/>
-          <p:nvPr/>
-        </p:nvSpPr>
-        <p:spPr>
-          <a:xfrm>
-            <a:off x="4800600" y="2803525"/>
-            <a:ext cx="3810000" cy="3810000"/>
-          </a:xfrm>
-          <a:prstGeom prst="rect">
-            <a:avLst/>
-          </a:prstGeom>
-          <a:noFill/>
-          <a:ln w="9525">
-            <a:prstDash val="dash"/>
-          </a:ln>
-        </p:spPr>
-        <p:style>
-          <a:lnRef idx="2">
-            <a:schemeClr val="dk1"/>
-          </a:lnRef>
-          <a:fillRef idx="1">
-            <a:schemeClr val="lt1"/>
-          </a:fillRef>
-          <a:effectRef idx="0">
-            <a:schemeClr val="dk1"/>
-          </a:effectRef>
-          <a:fontRef idx="minor">
-            <a:schemeClr val="dk1"/>
-          </a:fontRef>
-        </p:style>
-        <p:txBody>
-          <a:bodyPr rtlCol="0" anchor="ctr"/>
-          <a:lstStyle/>
-          <a:p>
-            <a:pPr algn="ctr"/>
-            <a:endParaRPr lang="en-US"/>
-          </a:p>
-        </p:txBody>
-      </p:sp>
-      <p:sp>
-        <p:nvSpPr>
-          <p:cNvPr id="8" name="Rectangle 7"/>
-          <p:cNvSpPr/>
-          <p:nvPr/>
-        </p:nvSpPr>
-        <p:spPr>
-          <a:xfrm>
-            <a:off x="1708666" y="3080958"/>
-            <a:ext cx="1644134" cy="533400"/>
-          </a:xfrm>
-          <a:prstGeom prst="rect">
-            <a:avLst/>
-          </a:prstGeom>
-        </p:spPr>
-        <p:style>
-          <a:lnRef idx="2">
-            <a:schemeClr val="accent1"/>
-          </a:lnRef>
-          <a:fillRef idx="1">
-            <a:schemeClr val="lt1"/>
-          </a:fillRef>
-          <a:effectRef idx="0">
-            <a:schemeClr val="accent1"/>
-          </a:effectRef>
-          <a:fontRef idx="minor">
-            <a:schemeClr val="dk1"/>
-          </a:fontRef>
-        </p:style>
-        <p:txBody>
-          <a:bodyPr rtlCol="0" anchor="ctr"/>
-          <a:lstStyle/>
-          <a:p>
-            <a:pPr algn="ctr"/>
-            <a:r>
-              <a:rPr lang="en-US" dirty="0" smtClean="0"/>
-              <a:t>A</a:t>
-            </a:r>
-            <a:r>
-              <a:rPr lang="hu-HU" dirty="0" smtClean="0"/>
-              <a:t>:</a:t>
-            </a:r>
-          </a:p>
-          <a:p>
-            <a:pPr algn="ctr"/>
-            <a:r>
-              <a:rPr lang="hu-HU" dirty="0" smtClean="0"/>
-              <a:t>DJar</a:t>
-            </a:r>
-            <a:endParaRPr lang="en-US" dirty="0"/>
-          </a:p>
-        </p:txBody>
-      </p:sp>
-      <p:sp>
-        <p:nvSpPr>
-          <p:cNvPr id="9" name="Rectangle 8"/>
-          <p:cNvSpPr/>
-          <p:nvPr/>
-        </p:nvSpPr>
-        <p:spPr>
-          <a:xfrm>
-            <a:off x="762000" y="4284732"/>
-            <a:ext cx="1644134" cy="533400"/>
-          </a:xfrm>
-          <a:prstGeom prst="rect">
-            <a:avLst/>
-          </a:prstGeom>
-        </p:spPr>
-        <p:style>
-          <a:lnRef idx="2">
-            <a:schemeClr val="accent1"/>
-          </a:lnRef>
-          <a:fillRef idx="1">
-            <a:schemeClr val="lt1"/>
-          </a:fillRef>
-          <a:effectRef idx="0">
-            <a:schemeClr val="accent1"/>
-          </a:effectRef>
-          <a:fontRef idx="minor">
-            <a:schemeClr val="dk1"/>
-          </a:fontRef>
-        </p:style>
-        <p:txBody>
-          <a:bodyPr rtlCol="0" anchor="ctr"/>
-          <a:lstStyle/>
-          <a:p>
-            <a:pPr algn="ctr"/>
-            <a:r>
-              <a:rPr lang="hu-HU" dirty="0" smtClean="0"/>
-              <a:t>Service: </a:t>
-            </a:r>
-          </a:p>
-          <a:p>
-            <a:pPr algn="ctr"/>
-            <a:r>
-              <a:rPr lang="hu-HU" dirty="0" smtClean="0"/>
-              <a:t>DClass</a:t>
-            </a:r>
-            <a:endParaRPr lang="en-US" dirty="0"/>
-          </a:p>
-        </p:txBody>
-      </p:sp>
-      <p:sp>
-        <p:nvSpPr>
-          <p:cNvPr id="11" name="Rectangle 10"/>
-          <p:cNvSpPr/>
-          <p:nvPr/>
-        </p:nvSpPr>
-        <p:spPr>
-          <a:xfrm>
-            <a:off x="762000" y="5508625"/>
-            <a:ext cx="1143000" cy="533400"/>
-          </a:xfrm>
-          <a:prstGeom prst="rect">
-            <a:avLst/>
-          </a:prstGeom>
-        </p:spPr>
-        <p:style>
-          <a:lnRef idx="2">
-            <a:schemeClr val="accent1"/>
-          </a:lnRef>
-          <a:fillRef idx="1">
-            <a:schemeClr val="lt1"/>
-          </a:fillRef>
-          <a:effectRef idx="0">
-            <a:schemeClr val="accent1"/>
-          </a:effectRef>
-          <a:fontRef idx="minor">
-            <a:schemeClr val="dk1"/>
-          </a:fontRef>
-        </p:style>
-        <p:txBody>
-          <a:bodyPr rtlCol="0" anchor="ctr"/>
-          <a:lstStyle/>
-          <a:p>
-            <a:pPr algn="ctr"/>
-            <a:r>
-              <a:rPr lang="hu-HU" dirty="0" smtClean="0"/>
-              <a:t>Serve: DMethod</a:t>
-            </a:r>
-            <a:endParaRPr lang="en-US" dirty="0"/>
-          </a:p>
-        </p:txBody>
-      </p:sp>
-      <p:sp>
-        <p:nvSpPr>
-          <p:cNvPr id="12" name="Rectangle 11"/>
-          <p:cNvSpPr/>
-          <p:nvPr/>
-        </p:nvSpPr>
-        <p:spPr>
-          <a:xfrm>
-            <a:off x="2667000" y="5508625"/>
-            <a:ext cx="1143000" cy="533400"/>
-          </a:xfrm>
-          <a:prstGeom prst="rect">
-            <a:avLst/>
-          </a:prstGeom>
-        </p:spPr>
-        <p:style>
-          <a:lnRef idx="2">
-            <a:schemeClr val="accent1"/>
-          </a:lnRef>
-          <a:fillRef idx="1">
-            <a:schemeClr val="lt1"/>
-          </a:fillRef>
-          <a:effectRef idx="0">
-            <a:schemeClr val="accent1"/>
-          </a:effectRef>
-          <a:fontRef idx="minor">
-            <a:schemeClr val="dk1"/>
-          </a:fontRef>
-        </p:style>
-        <p:txBody>
-          <a:bodyPr rtlCol="0" anchor="ctr"/>
-          <a:lstStyle/>
-          <a:p>
-            <a:pPr algn="ctr"/>
-            <a:r>
-              <a:rPr lang="hu-HU" dirty="0" smtClean="0"/>
-              <a:t>doWork: DMethod</a:t>
-            </a:r>
-            <a:endParaRPr lang="en-US" dirty="0"/>
-          </a:p>
-        </p:txBody>
-      </p:sp>
-      <p:cxnSp>
-        <p:nvCxnSpPr>
-          <p:cNvPr id="17" name="Straight Arrow Connector 16"/>
-          <p:cNvCxnSpPr>
-            <a:stCxn id="8" idx="2"/>
-            <a:endCxn id="9" idx="0"/>
-          </p:cNvCxnSpPr>
-          <p:nvPr/>
-        </p:nvCxnSpPr>
-        <p:spPr>
-          <a:xfrm flipH="1">
-            <a:off x="1584067" y="3614358"/>
-            <a:ext cx="946666" cy="670374"/>
-          </a:xfrm>
-          <a:prstGeom prst="straightConnector1">
-            <a:avLst/>
-          </a:prstGeom>
-          <a:ln>
-            <a:tailEnd type="arrow"/>
-          </a:ln>
-        </p:spPr>
-        <p:style>
-          <a:lnRef idx="2">
-            <a:schemeClr val="accent1"/>
-          </a:lnRef>
-          <a:fillRef idx="1">
-            <a:schemeClr val="lt1"/>
-          </a:fillRef>
-          <a:effectRef idx="0">
-            <a:schemeClr val="accent1"/>
-          </a:effectRef>
-          <a:fontRef idx="minor">
-            <a:schemeClr val="dk1"/>
-          </a:fontRef>
-        </p:style>
-      </p:cxnSp>
-      <p:cxnSp>
-        <p:nvCxnSpPr>
-          <p:cNvPr id="21" name="Straight Arrow Connector 20"/>
-          <p:cNvCxnSpPr>
-            <a:stCxn id="12" idx="1"/>
-            <a:endCxn id="11" idx="3"/>
-          </p:cNvCxnSpPr>
-          <p:nvPr/>
-        </p:nvCxnSpPr>
-        <p:spPr>
-          <a:xfrm flipH="1">
-            <a:off x="1905000" y="5775325"/>
-            <a:ext cx="762000" cy="0"/>
-          </a:xfrm>
-          <a:prstGeom prst="straightConnector1">
-            <a:avLst/>
-          </a:prstGeom>
-          <a:ln>
-            <a:tailEnd type="arrow"/>
-          </a:ln>
-        </p:spPr>
-        <p:style>
-          <a:lnRef idx="2">
-            <a:schemeClr val="dk1"/>
-          </a:lnRef>
-          <a:fillRef idx="0">
-            <a:schemeClr val="dk1"/>
-          </a:fillRef>
-          <a:effectRef idx="1">
-            <a:schemeClr val="dk1"/>
-          </a:effectRef>
-          <a:fontRef idx="minor">
-            <a:schemeClr val="tx1"/>
-          </a:fontRef>
-        </p:style>
-      </p:cxnSp>
-      <p:sp>
-        <p:nvSpPr>
-          <p:cNvPr id="22" name="Rectangle 21"/>
-          <p:cNvSpPr/>
-          <p:nvPr/>
-        </p:nvSpPr>
-        <p:spPr>
-          <a:xfrm>
-            <a:off x="5883533" y="3129791"/>
-            <a:ext cx="1644134" cy="533400"/>
-          </a:xfrm>
-          <a:prstGeom prst="rect">
-            <a:avLst/>
-          </a:prstGeom>
-        </p:spPr>
-        <p:style>
-          <a:lnRef idx="2">
-            <a:schemeClr val="accent5"/>
-          </a:lnRef>
-          <a:fillRef idx="1">
-            <a:schemeClr val="lt1"/>
-          </a:fillRef>
-          <a:effectRef idx="0">
-            <a:schemeClr val="accent5"/>
-          </a:effectRef>
-          <a:fontRef idx="minor">
-            <a:schemeClr val="dk1"/>
-          </a:fontRef>
-        </p:style>
-        <p:txBody>
-          <a:bodyPr rtlCol="0" anchor="ctr"/>
-          <a:lstStyle/>
-          <a:p>
-            <a:pPr algn="ctr"/>
-            <a:r>
-              <a:rPr lang="en-US" dirty="0" smtClean="0"/>
-              <a:t>A</a:t>
-            </a:r>
-            <a:r>
-              <a:rPr lang="hu-HU" dirty="0" smtClean="0"/>
-              <a:t>:</a:t>
-            </a:r>
-          </a:p>
-          <a:p>
-            <a:pPr algn="ctr"/>
-            <a:r>
-              <a:rPr lang="hu-HU" dirty="0" smtClean="0"/>
-              <a:t>SJar</a:t>
-            </a:r>
-            <a:endParaRPr lang="en-US" dirty="0"/>
-          </a:p>
-        </p:txBody>
-      </p:sp>
-      <p:sp>
-        <p:nvSpPr>
-          <p:cNvPr id="23" name="Rectangle 22"/>
-          <p:cNvSpPr/>
-          <p:nvPr/>
-        </p:nvSpPr>
-        <p:spPr>
-          <a:xfrm>
-            <a:off x="4936867" y="4333565"/>
-            <a:ext cx="1644134" cy="533400"/>
-          </a:xfrm>
-          <a:prstGeom prst="rect">
-            <a:avLst/>
-          </a:prstGeom>
-        </p:spPr>
-        <p:style>
-          <a:lnRef idx="2">
-            <a:schemeClr val="accent5"/>
-          </a:lnRef>
-          <a:fillRef idx="1">
-            <a:schemeClr val="lt1"/>
-          </a:fillRef>
-          <a:effectRef idx="0">
-            <a:schemeClr val="accent5"/>
-          </a:effectRef>
-          <a:fontRef idx="minor">
-            <a:schemeClr val="dk1"/>
-          </a:fontRef>
-        </p:style>
-        <p:txBody>
-          <a:bodyPr rtlCol="0" anchor="ctr"/>
-          <a:lstStyle/>
-          <a:p>
-            <a:pPr algn="ctr"/>
-            <a:r>
-              <a:rPr lang="hu-HU" dirty="0" smtClean="0"/>
-              <a:t>Service:</a:t>
-            </a:r>
-          </a:p>
-          <a:p>
-            <a:pPr algn="ctr"/>
-            <a:r>
-              <a:rPr lang="hu-HU" dirty="0" smtClean="0"/>
-              <a:t>SClass</a:t>
-            </a:r>
-            <a:endParaRPr lang="en-US" dirty="0"/>
-          </a:p>
-        </p:txBody>
-      </p:sp>
-      <p:sp>
-        <p:nvSpPr>
-          <p:cNvPr id="25" name="Rectangle 24"/>
-          <p:cNvSpPr/>
-          <p:nvPr/>
-        </p:nvSpPr>
-        <p:spPr>
-          <a:xfrm>
-            <a:off x="5293667" y="5510857"/>
-            <a:ext cx="1183333" cy="533400"/>
-          </a:xfrm>
-          <a:prstGeom prst="rect">
-            <a:avLst/>
-          </a:prstGeom>
-        </p:spPr>
-        <p:style>
-          <a:lnRef idx="2">
-            <a:schemeClr val="accent5"/>
-          </a:lnRef>
-          <a:fillRef idx="1">
-            <a:schemeClr val="lt1"/>
-          </a:fillRef>
-          <a:effectRef idx="0">
-            <a:schemeClr val="accent5"/>
-          </a:effectRef>
-          <a:fontRef idx="minor">
-            <a:schemeClr val="dk1"/>
-          </a:fontRef>
-        </p:style>
-        <p:txBody>
-          <a:bodyPr rtlCol="0" anchor="ctr"/>
-          <a:lstStyle/>
-          <a:p>
-            <a:pPr algn="ctr"/>
-            <a:r>
-              <a:rPr lang="hu-HU" dirty="0" smtClean="0"/>
-              <a:t>Serve:</a:t>
-            </a:r>
-          </a:p>
-          <a:p>
-            <a:pPr algn="ctr"/>
-            <a:r>
-              <a:rPr lang="hu-HU" dirty="0" smtClean="0"/>
-              <a:t>SMethod</a:t>
-            </a:r>
-            <a:endParaRPr lang="en-US" dirty="0"/>
-          </a:p>
-        </p:txBody>
-      </p:sp>
-      <p:cxnSp>
-        <p:nvCxnSpPr>
-          <p:cNvPr id="27" name="Straight Arrow Connector 26"/>
-          <p:cNvCxnSpPr>
-            <a:stCxn id="22" idx="2"/>
-            <a:endCxn id="23" idx="0"/>
-          </p:cNvCxnSpPr>
-          <p:nvPr/>
-        </p:nvCxnSpPr>
-        <p:spPr>
-          <a:xfrm flipH="1">
-            <a:off x="5758934" y="3663191"/>
-            <a:ext cx="946666" cy="670374"/>
-          </a:xfrm>
-          <a:prstGeom prst="straightConnector1">
-            <a:avLst/>
-          </a:prstGeom>
-          <a:ln>
-            <a:tailEnd type="arrow"/>
-          </a:ln>
-        </p:spPr>
-        <p:style>
-          <a:lnRef idx="2">
-            <a:schemeClr val="accent5"/>
-          </a:lnRef>
-          <a:fillRef idx="1">
-            <a:schemeClr val="lt1"/>
-          </a:fillRef>
-          <a:effectRef idx="0">
-            <a:schemeClr val="accent5"/>
-          </a:effectRef>
-          <a:fontRef idx="minor">
-            <a:schemeClr val="dk1"/>
-          </a:fontRef>
-        </p:style>
-      </p:cxnSp>
-      <p:cxnSp>
-        <p:nvCxnSpPr>
-          <p:cNvPr id="28" name="Straight Arrow Connector 27"/>
-          <p:cNvCxnSpPr>
-            <a:stCxn id="22" idx="2"/>
-            <a:endCxn id="24" idx="0"/>
-          </p:cNvCxnSpPr>
-          <p:nvPr/>
-        </p:nvCxnSpPr>
-        <p:spPr>
-          <a:xfrm>
-            <a:off x="6705600" y="3663191"/>
-            <a:ext cx="958334" cy="675067"/>
-          </a:xfrm>
-          <a:prstGeom prst="straightConnector1">
-            <a:avLst/>
-          </a:prstGeom>
-          <a:ln>
-            <a:tailEnd type="arrow"/>
-          </a:ln>
-        </p:spPr>
-        <p:style>
-          <a:lnRef idx="2">
-            <a:schemeClr val="accent5"/>
-          </a:lnRef>
-          <a:fillRef idx="1">
-            <a:schemeClr val="lt1"/>
-          </a:fillRef>
-          <a:effectRef idx="0">
-            <a:schemeClr val="accent5"/>
-          </a:effectRef>
-          <a:fontRef idx="minor">
-            <a:schemeClr val="dk1"/>
-          </a:fontRef>
-        </p:style>
-      </p:cxnSp>
-      <p:cxnSp>
-        <p:nvCxnSpPr>
-          <p:cNvPr id="30" name="Straight Arrow Connector 29"/>
-          <p:cNvCxnSpPr>
-            <a:stCxn id="9" idx="2"/>
-            <a:endCxn id="11" idx="0"/>
-          </p:cNvCxnSpPr>
-          <p:nvPr/>
-        </p:nvCxnSpPr>
-        <p:spPr>
-          <a:xfrm flipH="1">
-            <a:off x="1333500" y="4818132"/>
-            <a:ext cx="250567" cy="690493"/>
-          </a:xfrm>
-          <a:prstGeom prst="straightConnector1">
-            <a:avLst/>
-          </a:prstGeom>
-          <a:ln>
-            <a:tailEnd type="arrow"/>
-          </a:ln>
-        </p:spPr>
-        <p:style>
-          <a:lnRef idx="2">
-            <a:schemeClr val="accent1"/>
-          </a:lnRef>
-          <a:fillRef idx="1">
-            <a:schemeClr val="lt1"/>
-          </a:fillRef>
-          <a:effectRef idx="0">
-            <a:schemeClr val="accent1"/>
-          </a:effectRef>
-          <a:fontRef idx="minor">
-            <a:schemeClr val="dk1"/>
-          </a:fontRef>
-        </p:style>
-      </p:cxnSp>
-      <p:cxnSp>
-        <p:nvCxnSpPr>
-          <p:cNvPr id="33" name="Straight Arrow Connector 32"/>
-          <p:cNvCxnSpPr>
-            <a:stCxn id="23" idx="2"/>
-            <a:endCxn id="25" idx="0"/>
-          </p:cNvCxnSpPr>
-          <p:nvPr/>
-        </p:nvCxnSpPr>
-        <p:spPr>
-          <a:xfrm>
-            <a:off x="5758934" y="4866965"/>
-            <a:ext cx="126400" cy="643892"/>
-          </a:xfrm>
-          <a:prstGeom prst="straightConnector1">
-            <a:avLst/>
-          </a:prstGeom>
-          <a:ln>
-            <a:tailEnd type="arrow"/>
-          </a:ln>
-        </p:spPr>
-        <p:style>
-          <a:lnRef idx="2">
-            <a:schemeClr val="accent5"/>
-          </a:lnRef>
-          <a:fillRef idx="1">
-            <a:schemeClr val="lt1"/>
-          </a:fillRef>
-          <a:effectRef idx="0">
-            <a:schemeClr val="accent5"/>
-          </a:effectRef>
-          <a:fontRef idx="minor">
-            <a:schemeClr val="dk1"/>
-          </a:fontRef>
-        </p:style>
-      </p:cxnSp>
-      <p:sp>
-        <p:nvSpPr>
-          <p:cNvPr id="37" name="TextBox 36"/>
-          <p:cNvSpPr txBox="1"/>
-          <p:nvPr/>
-        </p:nvSpPr>
-        <p:spPr>
-          <a:xfrm>
-            <a:off x="4800601" y="6244193"/>
-            <a:ext cx="3810000" cy="369332"/>
-          </a:xfrm>
-          <a:prstGeom prst="rect">
-            <a:avLst/>
-          </a:prstGeom>
-          <a:noFill/>
-        </p:spPr>
-        <p:txBody>
-          <a:bodyPr wrap="square" rtlCol="0">
-            <a:spAutoFit/>
-          </a:bodyPr>
-          <a:lstStyle/>
-          <a:p>
-            <a:pPr algn="ctr"/>
-            <a:r>
-              <a:rPr lang="hu-HU" dirty="0" smtClean="0"/>
-              <a:t>Forráskód</a:t>
-            </a:r>
-            <a:r>
-              <a:rPr lang="en-US" dirty="0" smtClean="0"/>
-              <a:t> </a:t>
-            </a:r>
-            <a:r>
-              <a:rPr lang="en-US" dirty="0" err="1" smtClean="0"/>
-              <a:t>modell</a:t>
-            </a:r>
-            <a:endParaRPr lang="en-US" dirty="0"/>
-          </a:p>
-        </p:txBody>
-      </p:sp>
-      <p:grpSp>
-        <p:nvGrpSpPr>
-          <p:cNvPr id="50" name="Group 49"/>
-          <p:cNvGrpSpPr/>
-          <p:nvPr/>
-        </p:nvGrpSpPr>
-        <p:grpSpPr>
-          <a:xfrm>
-            <a:off x="1524000" y="2879725"/>
-            <a:ext cx="6139934" cy="935866"/>
-            <a:chOff x="1524000" y="2797934"/>
-            <a:chExt cx="6139934" cy="935866"/>
-          </a:xfrm>
-        </p:grpSpPr>
-        <p:sp>
-          <p:nvSpPr>
-            <p:cNvPr id="38" name="Rectangle 37"/>
-            <p:cNvSpPr/>
-            <p:nvPr/>
-          </p:nvSpPr>
-          <p:spPr>
-            <a:xfrm>
-              <a:off x="1524000" y="2797934"/>
-              <a:ext cx="6139934" cy="935866"/>
-            </a:xfrm>
-            <a:prstGeom prst="rect">
-              <a:avLst/>
-            </a:prstGeom>
-            <a:noFill/>
-            <a:ln>
-              <a:solidFill>
-                <a:srgbClr val="FF0000"/>
-              </a:solidFill>
-            </a:ln>
-          </p:spPr>
-          <p:style>
-            <a:lnRef idx="2">
-              <a:schemeClr val="accent1">
-                <a:shade val="50000"/>
-              </a:schemeClr>
-            </a:lnRef>
-            <a:fillRef idx="1">
-              <a:schemeClr val="accent1"/>
-            </a:fillRef>
-            <a:effectRef idx="0">
-              <a:schemeClr val="accent1"/>
-            </a:effectRef>
-            <a:fontRef idx="minor">
-              <a:schemeClr val="lt1"/>
-            </a:fontRef>
-          </p:style>
-          <p:txBody>
-            <a:bodyPr rtlCol="0" anchor="ctr"/>
-            <a:lstStyle/>
-            <a:p>
-              <a:pPr algn="ctr"/>
-              <a:endParaRPr lang="en-US"/>
-            </a:p>
-          </p:txBody>
-        </p:sp>
-        <p:sp>
-          <p:nvSpPr>
-            <p:cNvPr id="39" name="Rectangle 38"/>
-            <p:cNvSpPr/>
-            <p:nvPr/>
-          </p:nvSpPr>
-          <p:spPr>
-            <a:xfrm>
-              <a:off x="1708665" y="2999167"/>
-              <a:ext cx="1644134" cy="533400"/>
-            </a:xfrm>
-            <a:prstGeom prst="rect">
-              <a:avLst/>
-            </a:prstGeom>
-            <a:noFill/>
-            <a:ln>
-              <a:solidFill>
-                <a:srgbClr val="FF0000"/>
-              </a:solidFill>
-            </a:ln>
-          </p:spPr>
-          <p:style>
-            <a:lnRef idx="2">
-              <a:schemeClr val="accent1"/>
-            </a:lnRef>
-            <a:fillRef idx="1">
-              <a:schemeClr val="lt1"/>
-            </a:fillRef>
-            <a:effectRef idx="0">
-              <a:schemeClr val="accent1"/>
-            </a:effectRef>
-            <a:fontRef idx="minor">
-              <a:schemeClr val="dk1"/>
-            </a:fontRef>
-          </p:style>
-          <p:txBody>
-            <a:bodyPr rtlCol="0" anchor="ctr"/>
-            <a:lstStyle/>
-            <a:p>
-              <a:pPr algn="ctr"/>
-              <a:endParaRPr lang="en-US" dirty="0"/>
-            </a:p>
-          </p:txBody>
-        </p:sp>
-        <p:sp>
-          <p:nvSpPr>
-            <p:cNvPr id="43" name="Rectangle 42"/>
-            <p:cNvSpPr/>
-            <p:nvPr/>
-          </p:nvSpPr>
-          <p:spPr>
-            <a:xfrm>
-              <a:off x="5883533" y="3048000"/>
-              <a:ext cx="1644134" cy="533400"/>
-            </a:xfrm>
-            <a:prstGeom prst="rect">
-              <a:avLst/>
-            </a:prstGeom>
-            <a:noFill/>
-            <a:ln>
-              <a:solidFill>
-                <a:srgbClr val="FF0000"/>
-              </a:solidFill>
-            </a:ln>
-          </p:spPr>
-          <p:style>
-            <a:lnRef idx="2">
-              <a:schemeClr val="accent1"/>
-            </a:lnRef>
-            <a:fillRef idx="1">
-              <a:schemeClr val="lt1"/>
-            </a:fillRef>
-            <a:effectRef idx="0">
-              <a:schemeClr val="accent1"/>
-            </a:effectRef>
-            <a:fontRef idx="minor">
-              <a:schemeClr val="dk1"/>
-            </a:fontRef>
-          </p:style>
-          <p:txBody>
-            <a:bodyPr rtlCol="0" anchor="ctr"/>
-            <a:lstStyle/>
-            <a:p>
-              <a:pPr algn="ctr"/>
-              <a:endParaRPr lang="en-US" dirty="0"/>
-            </a:p>
-          </p:txBody>
-        </p:sp>
-        <p:sp>
-          <p:nvSpPr>
-            <p:cNvPr id="49" name="TextBox 48"/>
-            <p:cNvSpPr txBox="1"/>
-            <p:nvPr/>
-          </p:nvSpPr>
-          <p:spPr>
-            <a:xfrm>
-              <a:off x="4157491" y="3414082"/>
-              <a:ext cx="1286217" cy="307777"/>
-            </a:xfrm>
-            <a:prstGeom prst="rect">
-              <a:avLst/>
-            </a:prstGeom>
-            <a:noFill/>
-          </p:spPr>
-          <p:txBody>
-            <a:bodyPr wrap="square" rtlCol="0">
-              <a:spAutoFit/>
-            </a:bodyPr>
-            <a:lstStyle/>
-            <a:p>
-              <a:pPr algn="just"/>
-              <a:r>
-                <a:rPr lang="hu-HU" sz="1400" dirty="0" smtClean="0">
-                  <a:solidFill>
-                    <a:srgbClr val="FF0000"/>
-                  </a:solidFill>
-                </a:rPr>
-                <a:t>joinProject</a:t>
-              </a:r>
-              <a:endParaRPr lang="en-US" sz="2000" dirty="0">
-                <a:solidFill>
-                  <a:srgbClr val="FF0000"/>
-                </a:solidFill>
-              </a:endParaRPr>
-            </a:p>
-          </p:txBody>
-        </p:sp>
-      </p:grpSp>
-      <p:grpSp>
-        <p:nvGrpSpPr>
-          <p:cNvPr id="51" name="Group 50"/>
-          <p:cNvGrpSpPr/>
-          <p:nvPr/>
-        </p:nvGrpSpPr>
-        <p:grpSpPr>
-          <a:xfrm>
-            <a:off x="2482932" y="4090608"/>
-            <a:ext cx="6139934" cy="1004029"/>
-            <a:chOff x="1524000" y="2797934"/>
-            <a:chExt cx="6139934" cy="1004029"/>
-          </a:xfrm>
-        </p:grpSpPr>
-        <p:sp>
-          <p:nvSpPr>
-            <p:cNvPr id="52" name="Rectangle 51"/>
-            <p:cNvSpPr/>
-            <p:nvPr/>
-          </p:nvSpPr>
-          <p:spPr>
-            <a:xfrm>
-              <a:off x="1524000" y="2797934"/>
-              <a:ext cx="6139934" cy="935866"/>
-            </a:xfrm>
-            <a:prstGeom prst="rect">
-              <a:avLst/>
-            </a:prstGeom>
-            <a:noFill/>
-            <a:ln>
-              <a:solidFill>
-                <a:srgbClr val="FF0000"/>
-              </a:solidFill>
-            </a:ln>
-          </p:spPr>
-          <p:style>
-            <a:lnRef idx="2">
-              <a:schemeClr val="accent1">
-                <a:shade val="50000"/>
-              </a:schemeClr>
-            </a:lnRef>
-            <a:fillRef idx="1">
-              <a:schemeClr val="accent1"/>
-            </a:fillRef>
-            <a:effectRef idx="0">
-              <a:schemeClr val="accent1"/>
-            </a:effectRef>
-            <a:fontRef idx="minor">
-              <a:schemeClr val="lt1"/>
-            </a:fontRef>
-          </p:style>
-          <p:txBody>
-            <a:bodyPr rtlCol="0" anchor="ctr"/>
-            <a:lstStyle/>
-            <a:p>
-              <a:pPr algn="ctr"/>
-              <a:endParaRPr lang="en-US"/>
-            </a:p>
-          </p:txBody>
-        </p:sp>
-        <p:sp>
-          <p:nvSpPr>
-            <p:cNvPr id="53" name="Rectangle 52"/>
-            <p:cNvSpPr/>
-            <p:nvPr/>
-          </p:nvSpPr>
-          <p:spPr>
-            <a:xfrm>
-              <a:off x="1708665" y="2999167"/>
-              <a:ext cx="1644134" cy="533400"/>
-            </a:xfrm>
-            <a:prstGeom prst="rect">
-              <a:avLst/>
-            </a:prstGeom>
-            <a:noFill/>
-            <a:ln>
-              <a:solidFill>
-                <a:srgbClr val="FF0000"/>
-              </a:solidFill>
-              <a:prstDash val="dash"/>
-            </a:ln>
-          </p:spPr>
-          <p:style>
-            <a:lnRef idx="2">
-              <a:schemeClr val="accent1"/>
-            </a:lnRef>
-            <a:fillRef idx="1">
-              <a:schemeClr val="lt1"/>
-            </a:fillRef>
-            <a:effectRef idx="0">
-              <a:schemeClr val="accent1"/>
-            </a:effectRef>
-            <a:fontRef idx="minor">
-              <a:schemeClr val="dk1"/>
-            </a:fontRef>
-          </p:style>
-          <p:txBody>
-            <a:bodyPr rtlCol="0" anchor="ctr"/>
-            <a:lstStyle/>
-            <a:p>
-              <a:pPr algn="ctr"/>
-              <a:endParaRPr lang="en-US" dirty="0"/>
-            </a:p>
-          </p:txBody>
-        </p:sp>
-        <p:sp>
-          <p:nvSpPr>
-            <p:cNvPr id="54" name="Rectangle 53"/>
-            <p:cNvSpPr/>
-            <p:nvPr/>
-          </p:nvSpPr>
-          <p:spPr>
-            <a:xfrm>
-              <a:off x="5883533" y="3048000"/>
-              <a:ext cx="1644134" cy="533400"/>
-            </a:xfrm>
-            <a:prstGeom prst="rect">
-              <a:avLst/>
-            </a:prstGeom>
-            <a:noFill/>
-            <a:ln>
-              <a:solidFill>
-                <a:srgbClr val="FF0000"/>
-              </a:solidFill>
-            </a:ln>
-          </p:spPr>
-          <p:style>
-            <a:lnRef idx="2">
-              <a:schemeClr val="accent1"/>
-            </a:lnRef>
-            <a:fillRef idx="1">
-              <a:schemeClr val="lt1"/>
-            </a:fillRef>
-            <a:effectRef idx="0">
-              <a:schemeClr val="accent1"/>
-            </a:effectRef>
-            <a:fontRef idx="minor">
-              <a:schemeClr val="dk1"/>
-            </a:fontRef>
-          </p:style>
-          <p:txBody>
-            <a:bodyPr rtlCol="0" anchor="ctr"/>
-            <a:lstStyle/>
-            <a:p>
-              <a:pPr algn="ctr"/>
-              <a:endParaRPr lang="en-US" dirty="0"/>
-            </a:p>
-          </p:txBody>
-        </p:sp>
-        <p:sp>
-          <p:nvSpPr>
-            <p:cNvPr id="55" name="TextBox 54"/>
-            <p:cNvSpPr txBox="1"/>
-            <p:nvPr/>
-          </p:nvSpPr>
-          <p:spPr>
-            <a:xfrm>
-              <a:off x="3155868" y="3494186"/>
-              <a:ext cx="1286217" cy="307777"/>
-            </a:xfrm>
-            <a:prstGeom prst="rect">
-              <a:avLst/>
-            </a:prstGeom>
-            <a:noFill/>
-          </p:spPr>
-          <p:txBody>
-            <a:bodyPr wrap="square" rtlCol="0">
-              <a:spAutoFit/>
-            </a:bodyPr>
-            <a:lstStyle/>
-            <a:p>
-              <a:pPr algn="just"/>
-              <a:r>
-                <a:rPr lang="hu-HU" sz="1400" dirty="0" smtClean="0">
-                  <a:solidFill>
-                    <a:srgbClr val="FF0000"/>
-                  </a:solidFill>
-                </a:rPr>
-                <a:t>addedClass</a:t>
-              </a:r>
-              <a:endParaRPr lang="en-US" dirty="0">
-                <a:solidFill>
-                  <a:srgbClr val="FF0000"/>
-                </a:solidFill>
-              </a:endParaRPr>
-            </a:p>
-          </p:txBody>
-        </p:sp>
-      </p:grpSp>
-      <p:grpSp>
-        <p:nvGrpSpPr>
-          <p:cNvPr id="56" name="Group 55"/>
-          <p:cNvGrpSpPr/>
-          <p:nvPr/>
-        </p:nvGrpSpPr>
-        <p:grpSpPr>
-          <a:xfrm>
-            <a:off x="701933" y="5291259"/>
-            <a:ext cx="6139934" cy="1007940"/>
-            <a:chOff x="1524000" y="2797934"/>
-            <a:chExt cx="6139934" cy="1007940"/>
-          </a:xfrm>
-        </p:grpSpPr>
-        <p:sp>
-          <p:nvSpPr>
-            <p:cNvPr id="57" name="Rectangle 56"/>
-            <p:cNvSpPr/>
-            <p:nvPr/>
-          </p:nvSpPr>
-          <p:spPr>
-            <a:xfrm>
-              <a:off x="1524000" y="2797934"/>
-              <a:ext cx="6139934" cy="935866"/>
-            </a:xfrm>
-            <a:prstGeom prst="rect">
-              <a:avLst/>
-            </a:prstGeom>
-            <a:noFill/>
-            <a:ln>
-              <a:solidFill>
-                <a:srgbClr val="FF0000"/>
-              </a:solidFill>
-            </a:ln>
-          </p:spPr>
-          <p:style>
-            <a:lnRef idx="2">
-              <a:schemeClr val="accent1">
-                <a:shade val="50000"/>
-              </a:schemeClr>
-            </a:lnRef>
-            <a:fillRef idx="1">
-              <a:schemeClr val="accent1"/>
-            </a:fillRef>
-            <a:effectRef idx="0">
-              <a:schemeClr val="accent1"/>
-            </a:effectRef>
-            <a:fontRef idx="minor">
-              <a:schemeClr val="lt1"/>
-            </a:fontRef>
-          </p:style>
-          <p:txBody>
-            <a:bodyPr rtlCol="0" anchor="ctr"/>
-            <a:lstStyle/>
-            <a:p>
-              <a:pPr algn="ctr"/>
-              <a:endParaRPr lang="en-US"/>
-            </a:p>
-          </p:txBody>
-        </p:sp>
-        <p:sp>
-          <p:nvSpPr>
-            <p:cNvPr id="58" name="Rectangle 57"/>
-            <p:cNvSpPr/>
-            <p:nvPr/>
-          </p:nvSpPr>
-          <p:spPr>
-            <a:xfrm>
-              <a:off x="3489067" y="3015299"/>
-              <a:ext cx="1143000" cy="533401"/>
-            </a:xfrm>
-            <a:prstGeom prst="rect">
-              <a:avLst/>
-            </a:prstGeom>
-            <a:noFill/>
-            <a:ln>
-              <a:solidFill>
-                <a:srgbClr val="FF0000"/>
-              </a:solidFill>
-              <a:prstDash val="solid"/>
-            </a:ln>
-          </p:spPr>
-          <p:style>
-            <a:lnRef idx="2">
-              <a:schemeClr val="accent1"/>
-            </a:lnRef>
-            <a:fillRef idx="1">
-              <a:schemeClr val="lt1"/>
-            </a:fillRef>
-            <a:effectRef idx="0">
-              <a:schemeClr val="accent1"/>
-            </a:effectRef>
-            <a:fontRef idx="minor">
-              <a:schemeClr val="dk1"/>
-            </a:fontRef>
-          </p:style>
-          <p:txBody>
-            <a:bodyPr rtlCol="0" anchor="ctr"/>
-            <a:lstStyle/>
-            <a:p>
-              <a:pPr algn="ctr"/>
-              <a:endParaRPr lang="en-US" dirty="0"/>
-            </a:p>
-          </p:txBody>
-        </p:sp>
-        <p:sp>
-          <p:nvSpPr>
-            <p:cNvPr id="59" name="Rectangle 58"/>
-            <p:cNvSpPr/>
-            <p:nvPr/>
-          </p:nvSpPr>
-          <p:spPr>
-            <a:xfrm>
-              <a:off x="6114275" y="3017532"/>
-              <a:ext cx="1184792" cy="531168"/>
-            </a:xfrm>
-            <a:prstGeom prst="rect">
-              <a:avLst/>
-            </a:prstGeom>
-            <a:noFill/>
-            <a:ln>
-              <a:solidFill>
-                <a:srgbClr val="FF0000"/>
-              </a:solidFill>
-            </a:ln>
-          </p:spPr>
-          <p:style>
-            <a:lnRef idx="2">
-              <a:schemeClr val="accent1"/>
-            </a:lnRef>
-            <a:fillRef idx="1">
-              <a:schemeClr val="lt1"/>
-            </a:fillRef>
-            <a:effectRef idx="0">
-              <a:schemeClr val="accent1"/>
-            </a:effectRef>
-            <a:fontRef idx="minor">
-              <a:schemeClr val="dk1"/>
-            </a:fontRef>
-          </p:style>
-          <p:txBody>
-            <a:bodyPr rtlCol="0" anchor="ctr"/>
-            <a:lstStyle/>
-            <a:p>
-              <a:pPr algn="ctr"/>
-              <a:endParaRPr lang="en-US" dirty="0"/>
-            </a:p>
-          </p:txBody>
-        </p:sp>
-        <p:sp>
-          <p:nvSpPr>
-            <p:cNvPr id="60" name="TextBox 59"/>
-            <p:cNvSpPr txBox="1"/>
-            <p:nvPr/>
-          </p:nvSpPr>
-          <p:spPr>
-            <a:xfrm>
-              <a:off x="4311731" y="3498097"/>
-              <a:ext cx="2127763" cy="307777"/>
-            </a:xfrm>
-            <a:prstGeom prst="rect">
-              <a:avLst/>
-            </a:prstGeom>
-            <a:noFill/>
-          </p:spPr>
-          <p:txBody>
-            <a:bodyPr wrap="square" rtlCol="0">
-              <a:spAutoFit/>
-            </a:bodyPr>
-            <a:lstStyle/>
-            <a:p>
-              <a:pPr algn="ctr"/>
-              <a:r>
-                <a:rPr lang="hu-HU" sz="1400" dirty="0" smtClean="0">
-                  <a:solidFill>
-                    <a:srgbClr val="FF0000"/>
-                  </a:solidFill>
-                </a:rPr>
-                <a:t>incomingM</a:t>
-              </a:r>
-              <a:r>
-                <a:rPr lang="en-US" sz="1400" dirty="0" err="1" smtClean="0">
-                  <a:solidFill>
-                    <a:srgbClr val="FF0000"/>
-                  </a:solidFill>
-                </a:rPr>
-                <a:t>ethod</a:t>
-              </a:r>
-              <a:r>
-                <a:rPr lang="hu-HU" sz="1400" dirty="0" smtClean="0">
-                  <a:solidFill>
-                    <a:srgbClr val="FF0000"/>
-                  </a:solidFill>
-                </a:rPr>
-                <a:t>Call</a:t>
-              </a:r>
-              <a:endParaRPr lang="en-US" sz="1400" dirty="0">
-                <a:solidFill>
-                  <a:srgbClr val="FF0000"/>
-                </a:solidFill>
-              </a:endParaRPr>
-            </a:p>
-          </p:txBody>
-        </p:sp>
-      </p:grpSp>
-      <p:sp>
-        <p:nvSpPr>
-          <p:cNvPr id="4" name="Slide Number Placeholder 3"/>
-          <p:cNvSpPr>
-            <a:spLocks noGrp="1"/>
-          </p:cNvSpPr>
-          <p:nvPr>
-            <p:ph type="sldNum" sz="quarter" idx="12"/>
-          </p:nvPr>
-        </p:nvSpPr>
-        <p:spPr>
-          <a:xfrm>
-            <a:off x="6553200" y="6492875"/>
-            <a:ext cx="2133600" cy="365125"/>
-          </a:xfrm>
-        </p:spPr>
-        <p:txBody>
-          <a:bodyPr/>
-          <a:lstStyle/>
-          <a:p>
-            <a:fld id="{E5B09FA9-A177-4256-9C7F-5CF31ABA7234}" type="slidenum">
-              <a:rPr lang="en-US" smtClean="0"/>
-              <a:pPr/>
-              <a:t>9</a:t>
-            </a:fld>
-            <a:endParaRPr lang="en-US"/>
-          </a:p>
-        </p:txBody>
-      </p:sp>
-    </p:spTree>
-    <p:extLst>
-      <p:ext uri="{BB962C8B-B14F-4D97-AF65-F5344CB8AC3E}">
-        <p14:creationId xmlns:p14="http://schemas.microsoft.com/office/powerpoint/2010/main" xmlns="" val="1158459625"/>
-      </p:ext>
-    </p:extLst>
-  </p:cSld>
-  <p:clrMapOvr>
-    <a:masterClrMapping/>
-  </p:clrMapOvr>
-  <p:timing>
-    <p:tnLst>
-      <p:par>
-        <p:cTn id="1" dur="indefinite" restart="never" nodeType="tmRoot">
-          <p:childTnLst>
-            <p:seq concurrent="1" nextAc="seek">
-              <p:cTn id="2" dur="indefinite" nodeType="mainSeq">
-                <p:childTnLst>
-                  <p:par>
-                    <p:cTn id="3" fill="hold">
-                      <p:stCondLst>
-                        <p:cond delay="indefinite"/>
-                      </p:stCondLst>
-                      <p:childTnLst>
-                        <p:par>
-                          <p:cTn id="4" fill="hold">
-                            <p:stCondLst>
-                              <p:cond delay="0"/>
-                            </p:stCondLst>
-                            <p:childTnLst>
-                              <p:par>
-                                <p:cTn id="5" presetID="1" presetClass="entr" presetSubtype="0" fill="hold" nodeType="clickEffect">
-                                  <p:stCondLst>
-                                    <p:cond delay="0"/>
-                                  </p:stCondLst>
-                                  <p:childTnLst>
-                                    <p:set>
-                                      <p:cBhvr>
-                                        <p:cTn id="6" dur="1" fill="hold">
-                                          <p:stCondLst>
-                                            <p:cond delay="0"/>
-                                          </p:stCondLst>
-                                        </p:cTn>
-                                        <p:tgtEl>
-                                          <p:spTgt spid="50"/>
-                                        </p:tgtEl>
-                                        <p:attrNameLst>
-                                          <p:attrName>style.visibility</p:attrName>
-                                        </p:attrNameLst>
-                                      </p:cBhvr>
-                                      <p:to>
-                                        <p:strVal val="visible"/>
-                                      </p:to>
-                                    </p:set>
-                                  </p:childTnLst>
-                                </p:cTn>
-                              </p:par>
-                            </p:childTnLst>
-                          </p:cTn>
-                        </p:par>
-                      </p:childTnLst>
-                    </p:cTn>
-                  </p:par>
-                  <p:par>
-                    <p:cTn id="7" fill="hold">
-                      <p:stCondLst>
-                        <p:cond delay="indefinite"/>
-                      </p:stCondLst>
-                      <p:childTnLst>
-                        <p:par>
-                          <p:cTn id="8" fill="hold">
-                            <p:stCondLst>
-                              <p:cond delay="0"/>
-                            </p:stCondLst>
-                            <p:childTnLst>
-                              <p:par>
-                                <p:cTn id="9" presetID="1" presetClass="exit" presetSubtype="0" fill="hold" nodeType="clickEffect">
-                                  <p:stCondLst>
-                                    <p:cond delay="0"/>
-                                  </p:stCondLst>
-                                  <p:childTnLst>
-                                    <p:set>
-                                      <p:cBhvr>
-                                        <p:cTn id="10" dur="1" fill="hold">
-                                          <p:stCondLst>
-                                            <p:cond delay="0"/>
-                                          </p:stCondLst>
-                                        </p:cTn>
-                                        <p:tgtEl>
-                                          <p:spTgt spid="50"/>
-                                        </p:tgtEl>
-                                        <p:attrNameLst>
-                                          <p:attrName>style.visibility</p:attrName>
-                                        </p:attrNameLst>
-                                      </p:cBhvr>
-                                      <p:to>
-                                        <p:strVal val="hidden"/>
-                                      </p:to>
-                                    </p:set>
-                                  </p:childTnLst>
-                                </p:cTn>
-                              </p:par>
-                              <p:par>
-                                <p:cTn id="11" presetID="1" presetClass="entr" presetSubtype="0" fill="hold" nodeType="withEffect">
-                                  <p:stCondLst>
-                                    <p:cond delay="0"/>
-                                  </p:stCondLst>
-                                  <p:childTnLst>
-                                    <p:set>
-                                      <p:cBhvr>
-                                        <p:cTn id="12" dur="1" fill="hold">
-                                          <p:stCondLst>
-                                            <p:cond delay="0"/>
-                                          </p:stCondLst>
-                                        </p:cTn>
-                                        <p:tgtEl>
-                                          <p:spTgt spid="51"/>
-                                        </p:tgtEl>
-                                        <p:attrNameLst>
-                                          <p:attrName>style.visibility</p:attrName>
-                                        </p:attrNameLst>
-                                      </p:cBhvr>
-                                      <p:to>
-                                        <p:strVal val="visible"/>
-                                      </p:to>
-                                    </p:set>
-                                  </p:childTnLst>
-                                </p:cTn>
-                              </p:par>
-                            </p:childTnLst>
-                          </p:cTn>
-                        </p:par>
-                      </p:childTnLst>
-                    </p:cTn>
-                  </p:par>
-                  <p:par>
-                    <p:cTn id="13" fill="hold">
-                      <p:stCondLst>
-                        <p:cond delay="indefinite"/>
-                      </p:stCondLst>
-                      <p:childTnLst>
-                        <p:par>
-                          <p:cTn id="14" fill="hold">
-                            <p:stCondLst>
-                              <p:cond delay="0"/>
-                            </p:stCondLst>
-                            <p:childTnLst>
-                              <p:par>
-                                <p:cTn id="15" presetID="1" presetClass="exit" presetSubtype="0" fill="hold" nodeType="clickEffect">
-                                  <p:stCondLst>
-                                    <p:cond delay="0"/>
-                                  </p:stCondLst>
-                                  <p:childTnLst>
-                                    <p:set>
-                                      <p:cBhvr>
-                                        <p:cTn id="16" dur="1" fill="hold">
-                                          <p:stCondLst>
-                                            <p:cond delay="0"/>
-                                          </p:stCondLst>
-                                        </p:cTn>
-                                        <p:tgtEl>
-                                          <p:spTgt spid="51"/>
-                                        </p:tgtEl>
-                                        <p:attrNameLst>
-                                          <p:attrName>style.visibility</p:attrName>
-                                        </p:attrNameLst>
-                                      </p:cBhvr>
-                                      <p:to>
-                                        <p:strVal val="hidden"/>
-                                      </p:to>
-                                    </p:set>
-                                  </p:childTnLst>
-                                </p:cTn>
-                              </p:par>
-                              <p:par>
-                                <p:cTn id="17" presetID="1" presetClass="entr" presetSubtype="0" fill="hold" nodeType="withEffect">
-                                  <p:stCondLst>
-                                    <p:cond delay="0"/>
-                                  </p:stCondLst>
-                                  <p:childTnLst>
-                                    <p:set>
-                                      <p:cBhvr>
-                                        <p:cTn id="18" dur="1" fill="hold">
-                                          <p:stCondLst>
-                                            <p:cond delay="0"/>
-                                          </p:stCondLst>
-                                        </p:cTn>
-                                        <p:tgtEl>
-                                          <p:spTgt spid="56"/>
-                                        </p:tgtEl>
-                                        <p:attrNameLst>
-                                          <p:attrName>style.visibility</p:attrName>
-                                        </p:attrNameLst>
-                                      </p:cBhvr>
-                                      <p:to>
-                                        <p:strVal val="visible"/>
-                                      </p:to>
-                                    </p:set>
-                                  </p:childTnLst>
-                                </p:cTn>
-                              </p:par>
-                            </p:childTnLst>
-                          </p:cTn>
-                        </p:par>
-                      </p:childTnLst>
-                    </p:cTn>
-                  </p:par>
-                </p:childTnLst>
-              </p:cTn>
-              <p:prevCondLst>
-                <p:cond evt="onPrev" delay="0">
-                  <p:tgtEl>
-                    <p:sldTgt/>
-                  </p:tgtEl>
-                </p:cond>
-              </p:prevCondLst>
-              <p:nextCondLst>
-                <p:cond evt="onNext" delay="0">
-                  <p:tgtEl>
-                    <p:sldTgt/>
-                  </p:tgtEl>
-                </p:cond>
-              </p:nextCondLst>
-            </p:seq>
-          </p:childTnLst>
-        </p:cTn>
-      </p:par>
-    </p:tnLst>
-  </p:timing>
-</p:sld>
-</file>
-
 <file path=ppt/theme/theme1.xml><?xml version="1.0" encoding="utf-8"?>
 <a:theme xmlns:a="http://schemas.openxmlformats.org/drawingml/2006/main" name="Office Theme">
   <a:themeElements>

</xml_diff>

<commit_message>
presentation practiced; minor tweaks
</commit_message>
<xml_diff>
--- a/incquery-deps-thesis/presentation/zv_csikos_donat.pptx
+++ b/incquery-deps-thesis/presentation/zv_csikos_donat.pptx
@@ -5596,8 +5596,20 @@
           <a:lstStyle/>
           <a:p>
             <a:r>
-              <a:rPr lang="hu-HU" dirty="0" smtClean="0"/>
-              <a:t>Inkrementális lekérdezések IDE integrációja</a:t>
+              <a:rPr lang="en-US" dirty="0" err="1" smtClean="0"/>
+              <a:t>Modell</a:t>
+            </a:r>
+            <a:r>
+              <a:rPr lang="en-US" dirty="0" smtClean="0"/>
+              <a:t>-</a:t>
+            </a:r>
+            <a:r>
+              <a:rPr lang="hu-HU" dirty="0" smtClean="0"/>
+              <a:t>lekérdezések </a:t>
+            </a:r>
+            <a:r>
+              <a:rPr lang="hu-HU" dirty="0" smtClean="0"/>
+              <a:t>IDE integrációja</a:t>
             </a:r>
             <a:endParaRPr lang="en-US" dirty="0"/>
           </a:p>
@@ -6143,7 +6155,7 @@
         </p:spPr>
         <p:txBody>
           <a:bodyPr vert="horz" lIns="91440" tIns="45720" rIns="91440" bIns="45720" rtlCol="0">
-            <a:normAutofit fontScale="92500" lnSpcReduction="20000"/>
+            <a:normAutofit fontScale="85000" lnSpcReduction="10000"/>
           </a:bodyPr>
           <a:lstStyle/>
           <a:p>
@@ -6204,8 +6216,24 @@
           </a:p>
           <a:p>
             <a:r>
-              <a:rPr lang="hu-HU" dirty="0" smtClean="0"/>
-              <a:t>Függőségi lekérdezés ideje egyetlen elemre: </a:t>
+              <a:rPr lang="en-US" dirty="0" smtClean="0"/>
+              <a:t>Explicit </a:t>
+            </a:r>
+            <a:r>
+              <a:rPr lang="en-US" dirty="0" smtClean="0"/>
+              <a:t>f</a:t>
+            </a:r>
+            <a:r>
+              <a:rPr lang="hu-HU" dirty="0" err="1" smtClean="0"/>
+              <a:t>üggőségi</a:t>
+            </a:r>
+            <a:r>
+              <a:rPr lang="hu-HU" dirty="0" smtClean="0"/>
+              <a:t> </a:t>
+            </a:r>
+            <a:r>
+              <a:rPr lang="hu-HU" dirty="0" smtClean="0"/>
+              <a:t>lekérdezés ideje egyetlen elemre: </a:t>
             </a:r>
             <a:r>
               <a:rPr lang="hu-HU" dirty="0"/>
@@ -7224,7 +7252,31 @@
             <a:pPr lvl="1"/>
             <a:r>
               <a:rPr lang="hu-HU" dirty="0" smtClean="0"/>
-              <a:t>Diplomaterv: komplex lekérdezések megvalósítása, inkrementális lekérdezések UI integrációja</a:t>
+              <a:t>Diplomaterv: </a:t>
+            </a:r>
+            <a:r>
+              <a:rPr lang="hu-HU" dirty="0" smtClean="0"/>
+              <a:t>komplex lekérdezések </a:t>
+            </a:r>
+            <a:r>
+              <a:rPr lang="hu-HU" dirty="0" smtClean="0"/>
+              <a:t>megvalósítása, </a:t>
+            </a:r>
+            <a:r>
+              <a:rPr lang="en-US" dirty="0" err="1" smtClean="0"/>
+              <a:t>modell</a:t>
+            </a:r>
+            <a:r>
+              <a:rPr lang="en-US" dirty="0" smtClean="0"/>
+              <a:t>-</a:t>
+            </a:r>
+            <a:r>
+              <a:rPr lang="hu-HU" dirty="0" smtClean="0"/>
+              <a:t>lekérdezések </a:t>
+            </a:r>
+            <a:r>
+              <a:rPr lang="hu-HU" dirty="0" smtClean="0"/>
+              <a:t>UI integrációja</a:t>
             </a:r>
           </a:p>
           <a:p>
@@ -9963,7 +10015,7 @@
         <p:spPr/>
         <p:txBody>
           <a:bodyPr>
-            <a:normAutofit fontScale="92500" lnSpcReduction="10000"/>
+            <a:normAutofit fontScale="92500" lnSpcReduction="20000"/>
           </a:bodyPr>
           <a:lstStyle/>
           <a:p>
@@ -9988,21 +10040,22 @@
             </a:r>
           </a:p>
           <a:p>
-            <a:pPr lvl="3"/>
+            <a:pPr lvl="2"/>
             <a:r>
               <a:rPr lang="hu-HU" dirty="0" smtClean="0"/>
               <a:t>Számítás-intenzív</a:t>
             </a:r>
-          </a:p>
-          <a:p>
-            <a:pPr lvl="3"/>
+            <a:endParaRPr lang="hu-HU" dirty="0" smtClean="0"/>
+          </a:p>
+          <a:p>
+            <a:pPr lvl="2"/>
             <a:r>
               <a:rPr lang="hu-HU" dirty="0" smtClean="0"/>
               <a:t>Bináris → forráskód konverzió</a:t>
             </a:r>
           </a:p>
           <a:p>
-            <a:pPr lvl="3"/>
+            <a:pPr lvl="2"/>
             <a:r>
               <a:rPr lang="hu-HU" dirty="0" smtClean="0"/>
               <a:t>Méretfüggő</a:t>
@@ -10943,8 +10996,36 @@
           <a:lstStyle/>
           <a:p>
             <a:r>
-              <a:rPr lang="hu-HU" dirty="0" smtClean="0"/>
-              <a:t>Miért kell erre külön eszköz?</a:t>
+              <a:rPr lang="en-US" dirty="0" err="1" smtClean="0"/>
+              <a:t>Kell</a:t>
+            </a:r>
+            <a:r>
+              <a:rPr lang="en-US" dirty="0" smtClean="0"/>
+              <a:t> </a:t>
+            </a:r>
+            <a:r>
+              <a:rPr lang="en-US" dirty="0" err="1" smtClean="0"/>
+              <a:t>ehhez</a:t>
+            </a:r>
+            <a:r>
+              <a:rPr lang="en-US" dirty="0" smtClean="0"/>
+              <a:t> </a:t>
+            </a:r>
+            <a:r>
+              <a:rPr lang="en-US" dirty="0" err="1" smtClean="0"/>
+              <a:t>külön</a:t>
+            </a:r>
+            <a:r>
+              <a:rPr lang="en-US" dirty="0" smtClean="0"/>
+              <a:t> </a:t>
+            </a:r>
+            <a:r>
+              <a:rPr lang="en-US" dirty="0" err="1" smtClean="0"/>
+              <a:t>eszköz</a:t>
+            </a:r>
+            <a:r>
+              <a:rPr lang="en-US" dirty="0" smtClean="0"/>
+              <a:t>?</a:t>
             </a:r>
             <a:endParaRPr lang="hu-HU" dirty="0"/>
           </a:p>
@@ -10984,13 +11065,41 @@
               <a:rPr lang="hu-HU" dirty="0" smtClean="0"/>
               <a:t>Nagy rendelkezésre állás</a:t>
             </a:r>
-          </a:p>
-          <a:p>
-            <a:pPr lvl="2"/>
-            <a:r>
-              <a:rPr lang="hu-HU" dirty="0" smtClean="0"/>
-              <a:t>Javítások propagálása a szoftverkönyvtár oldalról</a:t>
-            </a:r>
+            <a:r>
+              <a:rPr lang="en-US" dirty="0" smtClean="0"/>
+              <a:t> (</a:t>
+            </a:r>
+            <a:r>
+              <a:rPr lang="en-US" dirty="0" smtClean="0">
+                <a:latin typeface="Calibri"/>
+              </a:rPr>
+              <a:t>↔ </a:t>
+            </a:r>
+            <a:r>
+              <a:rPr lang="en-US" dirty="0" err="1" smtClean="0">
+                <a:latin typeface="Calibri"/>
+              </a:rPr>
+              <a:t>módosítás</a:t>
+            </a:r>
+            <a:r>
+              <a:rPr lang="en-US" dirty="0" smtClean="0">
+                <a:latin typeface="Calibri"/>
+              </a:rPr>
+              <a:t>, </a:t>
+            </a:r>
+            <a:r>
+              <a:rPr lang="en-US" dirty="0" err="1" smtClean="0">
+                <a:latin typeface="Calibri"/>
+              </a:rPr>
+              <a:t>javítás</a:t>
+            </a:r>
+            <a:r>
+              <a:rPr lang="en-US" dirty="0" smtClean="0">
+                <a:latin typeface="Calibri"/>
+              </a:rPr>
+              <a:t>)</a:t>
+            </a:r>
+            <a:endParaRPr lang="hu-HU" dirty="0" smtClean="0"/>
           </a:p>
           <a:p>
             <a:pPr lvl="2"/>
@@ -11004,8 +11113,33 @@
             </a:r>
             <a:r>
               <a:rPr lang="hu-HU" dirty="0" smtClean="0"/>
-              <a:t> a fejlesztők között</a:t>
-            </a:r>
+              <a:t> a fejlesztők </a:t>
+            </a:r>
+            <a:r>
+              <a:rPr lang="hu-HU" dirty="0" smtClean="0"/>
+              <a:t>között</a:t>
+            </a:r>
+            <a:endParaRPr lang="en-US" dirty="0" smtClean="0"/>
+          </a:p>
+          <a:p>
+            <a:pPr lvl="2"/>
+            <a:r>
+              <a:rPr lang="hu-HU" dirty="0" smtClean="0"/>
+              <a:t>Javítások </a:t>
+            </a:r>
+            <a:r>
+              <a:rPr lang="en-US" dirty="0" err="1" smtClean="0"/>
+              <a:t>újrafordítás</a:t>
+            </a:r>
+            <a:r>
+              <a:rPr lang="en-US" dirty="0" smtClean="0"/>
+              <a:t> </a:t>
+            </a:r>
+            <a:r>
+              <a:rPr lang="en-US" dirty="0" err="1" smtClean="0"/>
+              <a:t>nélkül</a:t>
+            </a:r>
+            <a:endParaRPr lang="hu-HU" dirty="0" smtClean="0"/>
           </a:p>
           <a:p>
             <a:r>
@@ -11024,7 +11158,15 @@
             <a:pPr lvl="1"/>
             <a:r>
               <a:rPr lang="hu-HU" dirty="0" smtClean="0"/>
-              <a:t>Egyedi szoftvere, csak bináris tároló konzisztens</a:t>
+              <a:t>Egyedi szoftvere</a:t>
+            </a:r>
+            <a:r>
+              <a:rPr lang="en-US" dirty="0" smtClean="0"/>
+              <a:t>k</a:t>
+            </a:r>
+            <a:r>
+              <a:rPr lang="hu-HU" dirty="0" smtClean="0"/>
+              <a:t>, csak bináris tároló konzisztens</a:t>
             </a:r>
           </a:p>
         </p:txBody>
@@ -11058,6 +11200,13 @@
   <p:clrMapOvr>
     <a:masterClrMapping/>
   </p:clrMapOvr>
+  <p:timing>
+    <p:tnLst>
+      <p:par>
+        <p:cTn id="1" dur="indefinite" restart="never" nodeType="tmRoot"/>
+      </p:par>
+    </p:tnLst>
+  </p:timing>
 </p:sld>
 </file>
 

</xml_diff>

<commit_message>
Last mod before the big day:)
</commit_message>
<xml_diff>
--- a/incquery-deps-thesis/presentation/zv_csikos_donat.pptx
+++ b/incquery-deps-thesis/presentation/zv_csikos_donat.pptx
@@ -1261,7 +1261,7 @@
           </a:bodyPr>
           <a:lstStyle/>
           <a:p>
-            <a:endParaRPr lang="en-US"/>
+            <a:endParaRPr lang="en-US" dirty="0"/>
           </a:p>
         </p:txBody>
       </p:sp>
@@ -1787,6 +1787,33 @@
           </a:bodyPr>
           <a:lstStyle/>
           <a:p>
+            <a:r>
+              <a:rPr lang="hu-HU" dirty="0" smtClean="0"/>
+              <a:t>Verziókezeléssel</a:t>
+            </a:r>
+          </a:p>
+          <a:p>
+            <a:endParaRPr lang="hu-HU" dirty="0" smtClean="0"/>
+          </a:p>
+          <a:p>
+            <a:r>
+              <a:rPr lang="hu-HU" dirty="0" smtClean="0"/>
+              <a:t>Szervezeti heterogenitás</a:t>
+            </a:r>
+            <a:r>
+              <a:rPr lang="hu-HU" baseline="0" dirty="0" smtClean="0"/>
+              <a:t>:  egységes követelménymenedzsment</a:t>
+            </a:r>
+          </a:p>
+          <a:p>
+            <a:r>
+              <a:rPr lang="hu-HU" baseline="0" dirty="0" smtClean="0"/>
+              <a:t>Technológiai </a:t>
+            </a:r>
+            <a:r>
+              <a:rPr lang="hu-HU" baseline="0" smtClean="0"/>
+              <a:t>heterogenitás:</a:t>
+            </a:r>
             <a:endParaRPr lang="en-US" dirty="0"/>
           </a:p>
         </p:txBody>
@@ -6054,7 +6081,11 @@
           <a:p>
             <a:r>
               <a:rPr lang="hu-HU" dirty="0" smtClean="0"/>
-              <a:t>Hatékonyság mérése – miért?</a:t>
+              <a:t>Hatékonyság </a:t>
+            </a:r>
+            <a:r>
+              <a:rPr lang="hu-HU" dirty="0" smtClean="0"/>
+              <a:t>mérése</a:t>
             </a:r>
             <a:endParaRPr lang="en-US" dirty="0"/>
           </a:p>
@@ -6073,7 +6104,7 @@
         <p:spPr/>
         <p:txBody>
           <a:bodyPr>
-            <a:normAutofit fontScale="92500" lnSpcReduction="20000"/>
+            <a:normAutofit fontScale="85000" lnSpcReduction="20000"/>
           </a:bodyPr>
           <a:lstStyle/>
           <a:p>
@@ -6099,8 +6130,13 @@
             <a:pPr lvl="2"/>
             <a:r>
               <a:rPr lang="hu-HU" dirty="0" smtClean="0"/>
-              <a:t>Bináris függőségi analízis gyors legyen (1300+ JAR)</a:t>
-            </a:r>
+              <a:t>Bináris függőségi analízis gyors legyen (1300+ </a:t>
+            </a:r>
+            <a:r>
+              <a:rPr lang="hu-HU" dirty="0" smtClean="0"/>
+              <a:t>jar)</a:t>
+            </a:r>
+            <a:endParaRPr lang="hu-HU" dirty="0" smtClean="0"/>
           </a:p>
           <a:p>
             <a:pPr lvl="2"/>
@@ -6120,22 +6156,43 @@
             <a:pPr lvl="2"/>
             <a:r>
               <a:rPr lang="hu-HU" dirty="0" smtClean="0"/>
-              <a:t>Azonnali függőségi analízis visszacsatolás a forráskód módosításával a teljes szoftverinfrastruktúrára!</a:t>
-            </a:r>
-            <a:br>
-              <a:rPr lang="hu-HU" dirty="0" smtClean="0"/>
-            </a:br>
-            <a:r>
-              <a:rPr lang="hu-HU" dirty="0" smtClean="0"/>
-              <a:t>(= tipikus lokális munkakörnyezet – 5-10 projekt – és a szoftverinfrastruktúra – 100+ projekt – </a:t>
-            </a:r>
-            <a:r>
-              <a:rPr lang="hu-HU" b="1" dirty="0" smtClean="0"/>
-              <a:t>együttesén</a:t>
-            </a:r>
-            <a:r>
-              <a:rPr lang="hu-HU" dirty="0" smtClean="0"/>
-              <a:t> működjön, erőforráskorlátos fejlesztői gépeken is)</a:t>
+              <a:t>Azonnali függőségi analízis visszacsatolás a forráskód módosításával a teljes </a:t>
+            </a:r>
+            <a:r>
+              <a:rPr lang="hu-HU" dirty="0" smtClean="0"/>
+              <a:t>szoftverinfrastruktúrára!</a:t>
+            </a:r>
+          </a:p>
+          <a:p>
+            <a:pPr lvl="2"/>
+            <a:r>
+              <a:rPr lang="hu-HU" dirty="0" smtClean="0"/>
+              <a:t>(Tipikus lokális munkakörnyezet)</a:t>
+            </a:r>
+          </a:p>
+          <a:p>
+            <a:pPr lvl="3"/>
+            <a:r>
+              <a:rPr lang="hu-HU" dirty="0" smtClean="0"/>
+              <a:t>5-10 betöltött projekt</a:t>
+            </a:r>
+          </a:p>
+          <a:p>
+            <a:pPr lvl="3"/>
+            <a:r>
+              <a:rPr lang="hu-HU" dirty="0"/>
+              <a:t>Kapcsolat 100+ </a:t>
+            </a:r>
+            <a:r>
+              <a:rPr lang="hu-HU" dirty="0" smtClean="0"/>
+              <a:t>másik projektel</a:t>
+            </a:r>
+          </a:p>
+          <a:p>
+            <a:pPr lvl="3"/>
+            <a:r>
+              <a:rPr lang="hu-HU" dirty="0" smtClean="0"/>
+              <a:t>Virtualizált, erőforráskorlátos fejlesztői gépek</a:t>
             </a:r>
             <a:endParaRPr lang="en-US" dirty="0"/>
           </a:p>
@@ -11060,36 +11117,8 @@
           <a:lstStyle/>
           <a:p>
             <a:r>
-              <a:rPr lang="en-US" dirty="0" err="1" smtClean="0"/>
-              <a:t>Kell</a:t>
-            </a:r>
-            <a:r>
-              <a:rPr lang="en-US" dirty="0" smtClean="0"/>
-              <a:t> </a:t>
-            </a:r>
-            <a:r>
-              <a:rPr lang="en-US" dirty="0" err="1" smtClean="0"/>
-              <a:t>ehhez</a:t>
-            </a:r>
-            <a:r>
-              <a:rPr lang="en-US" dirty="0" smtClean="0"/>
-              <a:t> </a:t>
-            </a:r>
-            <a:r>
-              <a:rPr lang="en-US" dirty="0" err="1" smtClean="0"/>
-              <a:t>külön</a:t>
-            </a:r>
-            <a:r>
-              <a:rPr lang="en-US" dirty="0" smtClean="0"/>
-              <a:t> </a:t>
-            </a:r>
-            <a:r>
-              <a:rPr lang="en-US" dirty="0" err="1" smtClean="0"/>
-              <a:t>eszköz</a:t>
-            </a:r>
-            <a:r>
-              <a:rPr lang="en-US" dirty="0" smtClean="0"/>
-              <a:t>?</a:t>
+              <a:rPr lang="hu-HU" dirty="0" smtClean="0"/>
+              <a:t>Kell ehhez külön eszköz?</a:t>
             </a:r>
             <a:endParaRPr lang="hu-HU" dirty="0"/>
           </a:p>
@@ -11108,75 +11137,65 @@
         <p:spPr/>
         <p:txBody>
           <a:bodyPr>
-            <a:normAutofit/>
+            <a:normAutofit fontScale="92500" lnSpcReduction="10000"/>
           </a:bodyPr>
           <a:lstStyle/>
           <a:p>
             <a:r>
               <a:rPr lang="hu-HU" dirty="0" smtClean="0"/>
-              <a:t>Másképp is megoldató (pl. verziókezelés), de</a:t>
-            </a:r>
-          </a:p>
-          <a:p>
-            <a:r>
-              <a:rPr lang="hu-HU" dirty="0" smtClean="0"/>
-              <a:t>Komplex rendszerek üzemeltetése</a:t>
+              <a:t>Nagyszámú komponens</a:t>
             </a:r>
           </a:p>
           <a:p>
             <a:pPr lvl="1"/>
             <a:r>
               <a:rPr lang="hu-HU" dirty="0" smtClean="0"/>
-              <a:t>Elosztott működés, együttműködő API-k</a:t>
-            </a:r>
-            <a:endParaRPr lang="en-US" dirty="0" smtClean="0"/>
+              <a:t>Nem tölthető be minden az Eclipse-be</a:t>
+            </a:r>
           </a:p>
           <a:p>
             <a:pPr lvl="1"/>
             <a:r>
               <a:rPr lang="hu-HU" dirty="0" smtClean="0"/>
-              <a:t>Nagy </a:t>
-            </a:r>
-            <a:r>
-              <a:rPr lang="hu-HU" dirty="0"/>
-              <a:t>rendelkezésre állás</a:t>
-            </a:r>
-            <a:r>
-              <a:rPr lang="en-US" dirty="0"/>
-              <a:t> </a:t>
-            </a:r>
-            <a:endParaRPr lang="hu-HU" dirty="0"/>
-          </a:p>
-          <a:p>
-            <a:r>
-              <a:rPr lang="hu-HU" dirty="0" smtClean="0"/>
-              <a:t>CERN </a:t>
-            </a:r>
-            <a:r>
-              <a:rPr lang="hu-HU" dirty="0" smtClean="0"/>
-              <a:t>labor sajátosságai:</a:t>
+              <a:t>Fejlesztés és üzemeltetés</a:t>
+            </a:r>
+            <a:endParaRPr lang="hu-HU" dirty="0" smtClean="0"/>
+          </a:p>
+          <a:p>
+            <a:r>
+              <a:rPr lang="hu-HU" dirty="0" smtClean="0"/>
+              <a:t>Heterogén környezet</a:t>
             </a:r>
           </a:p>
           <a:p>
             <a:pPr lvl="1"/>
             <a:r>
               <a:rPr lang="hu-HU" dirty="0" smtClean="0"/>
-              <a:t>Kötött technológiai és szervezési </a:t>
-            </a:r>
-            <a:r>
-              <a:rPr lang="hu-HU" dirty="0" smtClean="0"/>
-              <a:t>feltételek</a:t>
-            </a:r>
-          </a:p>
-          <a:p>
-            <a:pPr lvl="2"/>
+              <a:t>Szervezeti</a:t>
+            </a:r>
+          </a:p>
+          <a:p>
+            <a:pPr lvl="1"/>
+            <a:r>
+              <a:rPr lang="hu-HU" dirty="0" smtClean="0"/>
+              <a:t>Technológiai</a:t>
+            </a:r>
+          </a:p>
+          <a:p>
+            <a:r>
+              <a:rPr lang="hu-HU" dirty="0" smtClean="0"/>
+              <a:t>CERN Controls Systems sajátosságai</a:t>
+            </a:r>
+          </a:p>
+          <a:p>
+            <a:pPr lvl="1"/>
             <a:r>
               <a:rPr lang="hu-HU" dirty="0" smtClean="0"/>
               <a:t>Független teamek, minimális szinkronizáció</a:t>
             </a:r>
           </a:p>
           <a:p>
-            <a:pPr lvl="2"/>
+            <a:pPr lvl="1"/>
             <a:r>
               <a:rPr lang="hu-HU" dirty="0" smtClean="0"/>
               <a:t>Egyedi szoftvere</a:t>
@@ -11186,13 +11205,19 @@
               <a:t>k</a:t>
             </a:r>
             <a:r>
-              <a:rPr lang="hu-HU" dirty="0"/>
-              <a:t>;</a:t>
-            </a:r>
-            <a:r>
-              <a:rPr lang="hu-HU" dirty="0" smtClean="0"/>
-              <a:t> csak a bináris tároló konzisztens</a:t>
-            </a:r>
+              <a:rPr lang="hu-HU" dirty="0" smtClean="0"/>
+              <a:t>, 24/7 üzemidő</a:t>
+            </a:r>
+          </a:p>
+          <a:p>
+            <a:pPr lvl="2"/>
+            <a:r>
+              <a:rPr lang="hu-HU" dirty="0" smtClean="0"/>
+              <a:t>Bevatkozás sebessége létfontosságú</a:t>
+            </a:r>
+          </a:p>
+          <a:p>
+            <a:pPr lvl="2"/>
             <a:endParaRPr lang="hu-HU" dirty="0" smtClean="0"/>
           </a:p>
         </p:txBody>
@@ -12454,7 +12479,15 @@
               </a:pPr>
               <a:r>
                 <a:rPr lang="hu-HU" sz="2800" dirty="0" smtClean="0"/>
-                <a:t>Függőségi  modell karbantartása új </a:t>
+                <a:t>Függőségi </a:t>
+              </a:r>
+              <a:r>
+                <a:rPr lang="hu-HU" sz="2800" dirty="0" smtClean="0"/>
+                <a:t>modell </a:t>
+              </a:r>
+              <a:r>
+                <a:rPr lang="hu-HU" sz="2800" dirty="0" smtClean="0"/>
+                <a:t>karbantartása új </a:t>
               </a:r>
               <a:r>
                 <a:rPr lang="en-US" sz="2800" dirty="0" err="1" smtClean="0"/>
@@ -12994,7 +13027,7 @@
 </file>
 
 <file path=ppt/slides/slide7.xml><?xml version="1.0" encoding="utf-8"?>
-<p:sld xmlns:a="http://schemas.openxmlformats.org/drawingml/2006/main" xmlns:r="http://schemas.openxmlformats.org/officeDocument/2006/relationships" xmlns:p="http://schemas.openxmlformats.org/presentationml/2006/main">
+<p:sld xmlns:a="http://schemas.openxmlformats.org/drawingml/2006/main" xmlns:r="http://schemas.openxmlformats.org/officeDocument/2006/relationships" xmlns:p="http://schemas.openxmlformats.org/presentationml/2006/main" show="0">
   <p:cSld>
     <p:spTree>
       <p:nvGrpSpPr>
@@ -13145,6 +13178,14 @@
   <p:clrMapOvr>
     <a:masterClrMapping/>
   </p:clrMapOvr>
+  <mc:AlternateContent xmlns:mc="http://schemas.openxmlformats.org/markup-compatibility/2006">
+    <mc:Choice xmlns:p14="http://schemas.microsoft.com/office/powerpoint/2010/main" Requires="p14">
+      <p:transition spd="slow" p14:dur="2000"/>
+    </mc:Choice>
+    <mc:Fallback>
+      <p:transition spd="slow"/>
+    </mc:Fallback>
+  </mc:AlternateContent>
   <p:timing>
     <p:tnLst>
       <p:par>
@@ -13184,12 +13225,18 @@
         </p:nvSpPr>
         <p:spPr/>
         <p:txBody>
-          <a:bodyPr/>
-          <a:lstStyle/>
-          <a:p>
-            <a:r>
-              <a:rPr lang="hu-HU" dirty="0" smtClean="0"/>
-              <a:t>Hibrid függőségi analízis</a:t>
+          <a:bodyPr>
+            <a:normAutofit fontScale="90000"/>
+          </a:bodyPr>
+          <a:lstStyle/>
+          <a:p>
+            <a:r>
+              <a:rPr lang="hu-HU" dirty="0" smtClean="0"/>
+              <a:t>Kiterjesztés: hibrid </a:t>
+            </a:r>
+            <a:r>
+              <a:rPr lang="hu-HU" dirty="0" smtClean="0"/>
+              <a:t>függőségi analízis</a:t>
             </a:r>
             <a:endParaRPr lang="en-US" dirty="0"/>
           </a:p>
@@ -13214,7 +13261,11 @@
           <a:p>
             <a:r>
               <a:rPr lang="hu-HU" dirty="0" smtClean="0"/>
-              <a:t>Lokális forráskód-projektek felhasználása</a:t>
+              <a:t>Lokális </a:t>
+            </a:r>
+            <a:r>
+              <a:rPr lang="hu-HU" dirty="0" smtClean="0"/>
+              <a:t>forráskód-projektek felhasználása</a:t>
             </a:r>
           </a:p>
           <a:p>
@@ -13244,18 +13295,24 @@
               <a:t>a változás a </a:t>
             </a:r>
             <a:r>
-              <a:rPr lang="hu-HU" i="1" dirty="0"/>
-              <a:t>ráépülő projektekre</a:t>
-            </a:r>
-            <a:r>
               <a:rPr lang="hu-HU" i="1" dirty="0" smtClean="0"/>
-              <a:t>?</a:t>
-            </a:r>
-          </a:p>
-          <a:p>
-            <a:r>
-              <a:rPr lang="hu-HU" dirty="0" smtClean="0"/>
-              <a:t>Javasolt módszer</a:t>
+              <a:t>ráépülő projektekre?</a:t>
+            </a:r>
+          </a:p>
+          <a:p>
+            <a:r>
+              <a:rPr lang="hu-HU" dirty="0" smtClean="0"/>
+              <a:t>Függőségi adatok automatikus megjelenítése</a:t>
+            </a:r>
+          </a:p>
+          <a:p>
+            <a:r>
+              <a:rPr lang="hu-HU" dirty="0" smtClean="0"/>
+              <a:t>Javasolt </a:t>
+            </a:r>
+            <a:r>
+              <a:rPr lang="hu-HU" dirty="0" smtClean="0"/>
+              <a:t>módszer</a:t>
             </a:r>
           </a:p>
           <a:p>
@@ -13317,14 +13374,15 @@
             </a:r>
             <a:r>
               <a:rPr lang="hu-HU" dirty="0"/>
-              <a:t> →</a:t>
-            </a:r>
-            <a:br>
+              <a:t> </a:t>
+            </a:r>
+            <a:r>
+              <a:rPr lang="hu-HU" dirty="0" smtClean="0"/>
+              <a:t>→ Azonnali </a:t>
+            </a:r>
+            <a:r>
               <a:rPr lang="hu-HU" dirty="0"/>
-            </a:br>
-            <a:r>
-              <a:rPr lang="hu-HU" dirty="0"/>
-              <a:t>Azonnali visszacsatolás a forráskód szerkesztése közben</a:t>
+              <a:t>visszacsatolás a forráskód szerkesztése közben</a:t>
             </a:r>
             <a:endParaRPr lang="hu-HU" dirty="0" smtClean="0"/>
           </a:p>

</xml_diff>